<commit_message>
Ajout graphismes, modifications sons.
</commit_message>
<xml_diff>
--- a/GD/Présentation.pptx
+++ b/GD/Présentation.pptx
@@ -202,7 +202,8 @@
           <a:p>
             <a:fld id="{BF4B9C54-43B8-4766-9FE4-E3DEA84B2C1A}" type="datetimeFigureOut">
               <a:rPr lang="fr-FR" smtClean="0"/>
-              <a:t>27/11/2012</a:t>
+              <a:pPr/>
+              <a:t>28/11/2012</a:t>
             </a:fld>
             <a:endParaRPr lang="fr-FR"/>
           </a:p>
@@ -361,7 +362,8 @@
           <a:p>
             <a:fld id="{B2C29A06-1551-4A06-B4CD-0375CD268EB8}" type="slidenum">
               <a:rPr lang="fr-FR" smtClean="0"/>
-              <a:t>‹N°›</a:t>
+              <a:pPr/>
+              <a:t>‹#›</a:t>
             </a:fld>
             <a:endParaRPr lang="fr-FR"/>
           </a:p>
@@ -370,7 +372,7 @@
     </p:spTree>
     <p:extLst>
       <p:ext uri="{BB962C8B-B14F-4D97-AF65-F5344CB8AC3E}">
-        <p14:creationId xmlns:p14="http://schemas.microsoft.com/office/powerpoint/2010/main" val="1782812008"/>
+        <p14:creationId xmlns:p14="http://schemas.microsoft.com/office/powerpoint/2010/main" xmlns="" val="1782812008"/>
       </p:ext>
     </p:extLst>
   </p:cSld>
@@ -758,7 +760,7 @@
             <a:fld id="{9DDF0C85-99BB-428E-8D90-A207FA2E644C}" type="slidenum">
               <a:rPr lang="fr-FR" smtClean="0"/>
               <a:pPr/>
-              <a:t>‹N°›</a:t>
+              <a:t>‹#›</a:t>
             </a:fld>
             <a:endParaRPr lang="fr-FR" dirty="0"/>
           </a:p>
@@ -929,7 +931,7 @@
             <a:fld id="{9DDF0C85-99BB-428E-8D90-A207FA2E644C}" type="slidenum">
               <a:rPr lang="fr-FR" smtClean="0"/>
               <a:pPr/>
-              <a:t>‹N°›</a:t>
+              <a:t>‹#›</a:t>
             </a:fld>
             <a:endParaRPr lang="fr-FR" dirty="0"/>
           </a:p>
@@ -1110,7 +1112,7 @@
             <a:fld id="{9DDF0C85-99BB-428E-8D90-A207FA2E644C}" type="slidenum">
               <a:rPr lang="fr-FR" smtClean="0"/>
               <a:pPr/>
-              <a:t>‹N°›</a:t>
+              <a:t>‹#›</a:t>
             </a:fld>
             <a:endParaRPr lang="fr-FR" dirty="0"/>
           </a:p>
@@ -1301,7 +1303,7 @@
             <a:fld id="{9DDF0C85-99BB-428E-8D90-A207FA2E644C}" type="slidenum">
               <a:rPr lang="fr-FR" smtClean="0"/>
               <a:pPr/>
-              <a:t>‹N°›</a:t>
+              <a:t>‹#›</a:t>
             </a:fld>
             <a:endParaRPr lang="fr-FR" dirty="0"/>
           </a:p>
@@ -1559,7 +1561,7 @@
             <a:fld id="{9DDF0C85-99BB-428E-8D90-A207FA2E644C}" type="slidenum">
               <a:rPr lang="fr-FR" smtClean="0"/>
               <a:pPr/>
-              <a:t>‹N°›</a:t>
+              <a:t>‹#›</a:t>
             </a:fld>
             <a:endParaRPr lang="fr-FR" dirty="0"/>
           </a:p>
@@ -2039,7 +2041,7 @@
             <a:fld id="{9DDF0C85-99BB-428E-8D90-A207FA2E644C}" type="slidenum">
               <a:rPr lang="fr-FR" smtClean="0"/>
               <a:pPr/>
-              <a:t>‹N°›</a:t>
+              <a:t>‹#›</a:t>
             </a:fld>
             <a:endParaRPr lang="fr-FR" dirty="0"/>
           </a:p>
@@ -2464,7 +2466,7 @@
             <a:fld id="{9DDF0C85-99BB-428E-8D90-A207FA2E644C}" type="slidenum">
               <a:rPr lang="fr-FR" smtClean="0"/>
               <a:pPr/>
-              <a:t>‹N°›</a:t>
+              <a:t>‹#›</a:t>
             </a:fld>
             <a:endParaRPr lang="fr-FR" dirty="0"/>
           </a:p>
@@ -2587,7 +2589,7 @@
             <a:fld id="{9DDF0C85-99BB-428E-8D90-A207FA2E644C}" type="slidenum">
               <a:rPr lang="fr-FR" smtClean="0"/>
               <a:pPr/>
-              <a:t>‹N°›</a:t>
+              <a:t>‹#›</a:t>
             </a:fld>
             <a:endParaRPr lang="fr-FR" dirty="0"/>
           </a:p>
@@ -2698,7 +2700,7 @@
             <a:fld id="{9DDF0C85-99BB-428E-8D90-A207FA2E644C}" type="slidenum">
               <a:rPr lang="fr-FR" smtClean="0"/>
               <a:pPr/>
-              <a:t>‹N°›</a:t>
+              <a:t>‹#›</a:t>
             </a:fld>
             <a:endParaRPr lang="fr-FR" dirty="0"/>
           </a:p>
@@ -2990,7 +2992,7 @@
             <a:fld id="{9DDF0C85-99BB-428E-8D90-A207FA2E644C}" type="slidenum">
               <a:rPr lang="fr-FR" smtClean="0"/>
               <a:pPr/>
-              <a:t>‹N°›</a:t>
+              <a:t>‹#›</a:t>
             </a:fld>
             <a:endParaRPr lang="fr-FR" dirty="0"/>
           </a:p>
@@ -3248,7 +3250,7 @@
             <a:fld id="{9DDF0C85-99BB-428E-8D90-A207FA2E644C}" type="slidenum">
               <a:rPr lang="fr-FR" smtClean="0"/>
               <a:pPr/>
-              <a:t>‹N°›</a:t>
+              <a:t>‹#›</a:t>
             </a:fld>
             <a:endParaRPr lang="fr-FR" dirty="0"/>
           </a:p>
@@ -3640,7 +3642,7 @@
             <a:fld id="{9DDF0C85-99BB-428E-8D90-A207FA2E644C}" type="slidenum">
               <a:rPr lang="fr-FR" smtClean="0"/>
               <a:pPr/>
-              <a:t>‹N°›</a:t>
+              <a:t>‹#›</a:t>
             </a:fld>
             <a:endParaRPr lang="fr-FR" dirty="0"/>
           </a:p>
@@ -4117,7 +4119,7 @@
     </p:spTree>
     <p:extLst>
       <p:ext uri="{BB962C8B-B14F-4D97-AF65-F5344CB8AC3E}">
-        <p14:creationId xmlns:p14="http://schemas.microsoft.com/office/powerpoint/2010/main" val="1100524434"/>
+        <p14:creationId xmlns:p14="http://schemas.microsoft.com/office/powerpoint/2010/main" xmlns="" val="1100524434"/>
       </p:ext>
     </p:extLst>
   </p:cSld>
@@ -4296,8 +4298,32 @@
         </p:blipFill>
         <p:spPr>
           <a:xfrm>
-            <a:off x="1785918" y="3071810"/>
-            <a:ext cx="5689600" cy="3022600"/>
+            <a:off x="3357554" y="2928934"/>
+            <a:ext cx="2428892" cy="1290349"/>
+          </a:xfrm>
+          <a:prstGeom prst="rect">
+            <a:avLst/>
+          </a:prstGeom>
+        </p:spPr>
+      </p:pic>
+      <p:pic>
+        <p:nvPicPr>
+          <p:cNvPr id="8" name="Picture 7" descr="virus.jpg"/>
+          <p:cNvPicPr>
+            <a:picLocks noChangeAspect="1"/>
+          </p:cNvPicPr>
+          <p:nvPr/>
+        </p:nvPicPr>
+        <p:blipFill>
+          <a:blip r:embed="rId3"/>
+          <a:stretch>
+            <a:fillRect/>
+          </a:stretch>
+        </p:blipFill>
+        <p:spPr>
+          <a:xfrm>
+            <a:off x="5929322" y="2928934"/>
+            <a:ext cx="2524369" cy="1285884"/>
           </a:xfrm>
           <a:prstGeom prst="rect">
             <a:avLst/>
@@ -4462,7 +4488,9 @@
           </a:xfrm>
         </p:spPr>
         <p:txBody>
-          <a:bodyPr/>
+          <a:bodyPr>
+            <a:normAutofit/>
+          </a:bodyPr>
           <a:lstStyle/>
           <a:p>
             <a:endParaRPr lang="fr-FR" dirty="0" smtClean="0"/>
@@ -4473,16 +4501,7 @@
           <a:p>
             <a:r>
               <a:rPr lang="fr-FR" dirty="0" smtClean="0"/>
-              <a:t>La musique est en style 8bit, rythmée et entraînante.</a:t>
-            </a:r>
-          </a:p>
-          <a:p>
-            <a:endParaRPr lang="fr-FR" dirty="0" smtClean="0"/>
-          </a:p>
-          <a:p>
-            <a:r>
-              <a:rPr lang="fr-FR" dirty="0" smtClean="0"/>
-              <a:t>Les feedbacks et bruitages sonores auront un effet « liquide » et « spongieux » pour correspondre à l’univers du jeu</a:t>
+              <a:t>La musique est en style 8bit, rythmée et entraînante</a:t>
             </a:r>
             <a:r>
               <a:rPr lang="fr-FR" dirty="0" smtClean="0"/>
@@ -4490,6 +4509,100 @@
             </a:r>
           </a:p>
           <a:p>
+            <a:r>
+              <a:rPr lang="fr-FR" smtClean="0"/>
+              <a:t>Kiosken</a:t>
+            </a:r>
+            <a:r>
+              <a:rPr lang="fr-FR" dirty="0" smtClean="0"/>
+              <a:t> </a:t>
+            </a:r>
+            <a:r>
+              <a:rPr lang="fr-FR" dirty="0" err="1" smtClean="0"/>
+              <a:t>Är</a:t>
+            </a:r>
+            <a:r>
+              <a:rPr lang="fr-FR" dirty="0" smtClean="0"/>
+              <a:t> </a:t>
+            </a:r>
+            <a:r>
+              <a:rPr lang="fr-FR" dirty="0" err="1" smtClean="0"/>
+              <a:t>Vidöppen</a:t>
+            </a:r>
+            <a:endParaRPr lang="fr-FR" dirty="0" smtClean="0"/>
+          </a:p>
+          <a:p>
+            <a:r>
+              <a:rPr lang="fr-FR" dirty="0" err="1" smtClean="0"/>
+              <a:t>Filter</a:t>
+            </a:r>
+            <a:r>
+              <a:rPr lang="fr-FR" dirty="0" smtClean="0"/>
+              <a:t> </a:t>
+            </a:r>
+            <a:r>
+              <a:rPr lang="fr-FR" dirty="0" err="1" smtClean="0"/>
+              <a:t>Fabric</a:t>
+            </a:r>
+            <a:r>
+              <a:rPr lang="fr-FR" dirty="0" smtClean="0"/>
+              <a:t> </a:t>
+            </a:r>
+            <a:r>
+              <a:rPr lang="fr-FR" dirty="0" err="1" smtClean="0"/>
+              <a:t>Facts</a:t>
+            </a:r>
+            <a:endParaRPr lang="fr-FR" dirty="0" smtClean="0"/>
+          </a:p>
+          <a:p>
+            <a:endParaRPr lang="fr-FR" dirty="0" smtClean="0"/>
+          </a:p>
+          <a:p>
+            <a:endParaRPr lang="fr-FR" dirty="0" smtClean="0"/>
+          </a:p>
+          <a:p>
+            <a:r>
+              <a:rPr lang="fr-FR" dirty="0" smtClean="0"/>
+              <a:t>Les feedbacks et bruitages sonores auront un effet « liquide </a:t>
+            </a:r>
+            <a:r>
+              <a:rPr lang="fr-FR" dirty="0" smtClean="0"/>
+              <a:t>» et « profonds » pour correspondre à l’environnement du jeu.</a:t>
+            </a:r>
+          </a:p>
+          <a:p>
+            <a:endParaRPr lang="fr-FR" dirty="0" smtClean="0"/>
+          </a:p>
+          <a:p>
+            <a:pPr>
+              <a:buFontTx/>
+              <a:buChar char="-"/>
+            </a:pPr>
+            <a:r>
+              <a:rPr lang="fr-FR" dirty="0" smtClean="0"/>
+              <a:t>Bulles :	 </a:t>
+            </a:r>
+            <a:r>
+              <a:rPr lang="fr-FR" dirty="0" err="1" smtClean="0"/>
+              <a:t>Splash</a:t>
+            </a:r>
+            <a:r>
+              <a:rPr lang="fr-FR" dirty="0" smtClean="0"/>
+              <a:t> : 	Explosions</a:t>
+            </a:r>
+          </a:p>
+          <a:p>
+            <a:pPr>
+              <a:buFontTx/>
+              <a:buChar char="-"/>
+            </a:pPr>
+            <a:endParaRPr lang="fr-FR" dirty="0" smtClean="0"/>
+          </a:p>
+          <a:p>
+            <a:r>
+              <a:rPr lang="fr-FR" dirty="0" smtClean="0"/>
+              <a:t>Pas de parole.</a:t>
+            </a:r>
             <a:endParaRPr lang="fr-FR" dirty="0"/>
           </a:p>
           <a:p>
@@ -4499,31 +4612,82 @@
       </p:sp>
       <p:pic>
         <p:nvPicPr>
-          <p:cNvPr id="7" name="tir.mp3">
+          <p:cNvPr id="12" name="Explosion Under Water HD (Download Link).mp3">
             <a:hlinkClick r:id="" action="ppaction://media"/>
           </p:cNvPr>
           <p:cNvPicPr>
-            <a:picLocks noChangeAspect="1"/>
+            <a:picLocks noRot="1" noChangeAspect="1"/>
           </p:cNvPicPr>
           <p:nvPr>
-            <a:audioFile r:link="rId2"/>
-            <p:extLst>
-              <p:ext uri="{DAA4B4D4-6D71-4841-9C94-3DE7FCFB9230}">
-                <p14:media xmlns:p14="http://schemas.microsoft.com/office/powerpoint/2010/main" r:embed="rId1"/>
-              </p:ext>
-            </p:extLst>
+            <a:audioFile r:link="rId1"/>
           </p:nvPr>
         </p:nvPicPr>
         <p:blipFill>
-          <a:blip r:embed="rId4"/>
+          <a:blip r:embed="rId5"/>
           <a:stretch>
             <a:fillRect/>
           </a:stretch>
         </p:blipFill>
         <p:spPr>
           <a:xfrm>
-            <a:off x="2018184" y="4335327"/>
-            <a:ext cx="609600" cy="609600"/>
+            <a:off x="1785918" y="4143380"/>
+            <a:ext cx="304800" cy="304800"/>
+          </a:xfrm>
+          <a:prstGeom prst="rect">
+            <a:avLst/>
+          </a:prstGeom>
+        </p:spPr>
+      </p:pic>
+      <p:pic>
+        <p:nvPicPr>
+          <p:cNvPr id="13" name="Water Splash Sound FX 1.mp3">
+            <a:hlinkClick r:id="" action="ppaction://media"/>
+          </p:cNvPr>
+          <p:cNvPicPr>
+            <a:picLocks noRot="1" noChangeAspect="1"/>
+          </p:cNvPicPr>
+          <p:nvPr>
+            <a:audioFile r:link="rId2"/>
+          </p:nvPr>
+        </p:nvPicPr>
+        <p:blipFill>
+          <a:blip r:embed="rId6"/>
+          <a:stretch>
+            <a:fillRect/>
+          </a:stretch>
+        </p:blipFill>
+        <p:spPr>
+          <a:xfrm>
+            <a:off x="3500430" y="4143380"/>
+            <a:ext cx="304800" cy="304800"/>
+          </a:xfrm>
+          <a:prstGeom prst="rect">
+            <a:avLst/>
+          </a:prstGeom>
+        </p:spPr>
+      </p:pic>
+      <p:pic>
+        <p:nvPicPr>
+          <p:cNvPr id="14" name="[HQ] Underwater Explosion.mp3">
+            <a:hlinkClick r:id="" action="ppaction://media"/>
+          </p:cNvPr>
+          <p:cNvPicPr>
+            <a:picLocks noRot="1" noChangeAspect="1"/>
+          </p:cNvPicPr>
+          <p:nvPr>
+            <a:audioFile r:link="rId3"/>
+          </p:nvPr>
+        </p:nvPicPr>
+        <p:blipFill>
+          <a:blip r:embed="rId7"/>
+          <a:stretch>
+            <a:fillRect/>
+          </a:stretch>
+        </p:blipFill>
+        <p:spPr>
+          <a:xfrm>
+            <a:off x="5572132" y="4143380"/>
+            <a:ext cx="304800" cy="304800"/>
           </a:xfrm>
           <a:prstGeom prst="rect">
             <a:avLst/>
@@ -4545,7 +4709,7 @@
                 <p:stCondLst>
                   <p:cond evt="onClick" delay="0">
                     <p:tgtEl>
-                      <p:spTgt spid="7"/>
+                      <p:spTgt spid="12"/>
                     </p:tgtEl>
                   </p:cond>
                 </p:stCondLst>
@@ -4573,9 +4737,9 @@
                                   <p:childTnLst>
                                     <p:cmd type="call" cmd="playFrom(0.0)">
                                       <p:cBhvr>
-                                        <p:cTn id="6" dur="1224" fill="hold"/>
+                                        <p:cTn id="6" dur="32236" fill="hold"/>
                                         <p:tgtEl>
-                                          <p:spTgt spid="7"/>
+                                          <p:spTgt spid="12"/>
                                         </p:tgtEl>
                                       </p:cBhvr>
                                     </p:cmd>
@@ -4593,18 +4757,28 @@
               <p:nextCondLst>
                 <p:cond evt="onClick" delay="0">
                   <p:tgtEl>
-                    <p:spTgt spid="7"/>
+                    <p:spTgt spid="12"/>
                   </p:tgtEl>
                 </p:cond>
               </p:nextCondLst>
             </p:seq>
             <p:audio>
-              <p:cMediaNode vol="80000">
+              <p:cMediaNode>
                 <p:cTn id="7" fill="hold" display="0">
                   <p:stCondLst>
                     <p:cond delay="indefinite"/>
                   </p:stCondLst>
                   <p:endCondLst>
+                    <p:cond evt="onNext" delay="0">
+                      <p:tgtEl>
+                        <p:sldTgt/>
+                      </p:tgtEl>
+                    </p:cond>
+                    <p:cond evt="onPrev" delay="0">
+                      <p:tgtEl>
+                        <p:sldTgt/>
+                      </p:tgtEl>
+                    </p:cond>
                     <p:cond evt="onStopAudio" delay="0">
                       <p:tgtEl>
                         <p:sldTgt/>
@@ -4613,7 +4787,181 @@
                   </p:endCondLst>
                 </p:cTn>
                 <p:tgtEl>
-                  <p:spTgt spid="7"/>
+                  <p:spTgt spid="12"/>
+                </p:tgtEl>
+              </p:cMediaNode>
+            </p:audio>
+            <p:seq concurrent="1" nextAc="seek">
+              <p:cTn id="8" restart="whenNotActive" fill="hold" evtFilter="cancelBubble" nodeType="interactiveSeq">
+                <p:stCondLst>
+                  <p:cond evt="onClick" delay="0">
+                    <p:tgtEl>
+                      <p:spTgt spid="13"/>
+                    </p:tgtEl>
+                  </p:cond>
+                </p:stCondLst>
+                <p:endSync evt="end" delay="0">
+                  <p:rtn val="all"/>
+                </p:endSync>
+                <p:childTnLst>
+                  <p:par>
+                    <p:cTn id="9" fill="hold">
+                      <p:stCondLst>
+                        <p:cond delay="0"/>
+                      </p:stCondLst>
+                      <p:childTnLst>
+                        <p:par>
+                          <p:cTn id="10" fill="hold">
+                            <p:stCondLst>
+                              <p:cond delay="0"/>
+                            </p:stCondLst>
+                            <p:childTnLst>
+                              <p:par>
+                                <p:cTn id="11" presetID="1" presetClass="mediacall" presetSubtype="0" fill="hold" nodeType="clickEffect">
+                                  <p:stCondLst>
+                                    <p:cond delay="0"/>
+                                  </p:stCondLst>
+                                  <p:childTnLst>
+                                    <p:cmd type="call" cmd="playFrom(0.0)">
+                                      <p:cBhvr>
+                                        <p:cTn id="12" dur="8412" fill="hold"/>
+                                        <p:tgtEl>
+                                          <p:spTgt spid="13"/>
+                                        </p:tgtEl>
+                                      </p:cBhvr>
+                                    </p:cmd>
+                                  </p:childTnLst>
+                                </p:cTn>
+                              </p:par>
+                            </p:childTnLst>
+                          </p:cTn>
+                        </p:par>
+                      </p:childTnLst>
+                    </p:cTn>
+                  </p:par>
+                </p:childTnLst>
+              </p:cTn>
+              <p:nextCondLst>
+                <p:cond evt="onClick" delay="0">
+                  <p:tgtEl>
+                    <p:spTgt spid="13"/>
+                  </p:tgtEl>
+                </p:cond>
+              </p:nextCondLst>
+            </p:seq>
+            <p:audio>
+              <p:cMediaNode>
+                <p:cTn id="13" fill="hold" display="0">
+                  <p:stCondLst>
+                    <p:cond delay="indefinite"/>
+                  </p:stCondLst>
+                  <p:endCondLst>
+                    <p:cond evt="onNext" delay="0">
+                      <p:tgtEl>
+                        <p:sldTgt/>
+                      </p:tgtEl>
+                    </p:cond>
+                    <p:cond evt="onPrev" delay="0">
+                      <p:tgtEl>
+                        <p:sldTgt/>
+                      </p:tgtEl>
+                    </p:cond>
+                    <p:cond evt="onStopAudio" delay="0">
+                      <p:tgtEl>
+                        <p:sldTgt/>
+                      </p:tgtEl>
+                    </p:cond>
+                  </p:endCondLst>
+                </p:cTn>
+                <p:tgtEl>
+                  <p:spTgt spid="13"/>
+                </p:tgtEl>
+              </p:cMediaNode>
+            </p:audio>
+            <p:seq concurrent="1" nextAc="seek">
+              <p:cTn id="14" restart="whenNotActive" fill="hold" evtFilter="cancelBubble" nodeType="interactiveSeq">
+                <p:stCondLst>
+                  <p:cond evt="onClick" delay="0">
+                    <p:tgtEl>
+                      <p:spTgt spid="14"/>
+                    </p:tgtEl>
+                  </p:cond>
+                </p:stCondLst>
+                <p:endSync evt="end" delay="0">
+                  <p:rtn val="all"/>
+                </p:endSync>
+                <p:childTnLst>
+                  <p:par>
+                    <p:cTn id="15" fill="hold">
+                      <p:stCondLst>
+                        <p:cond delay="0"/>
+                      </p:stCondLst>
+                      <p:childTnLst>
+                        <p:par>
+                          <p:cTn id="16" fill="hold">
+                            <p:stCondLst>
+                              <p:cond delay="0"/>
+                            </p:stCondLst>
+                            <p:childTnLst>
+                              <p:par>
+                                <p:cTn id="17" presetID="1" presetClass="mediacall" presetSubtype="0" fill="hold" nodeType="clickEffect">
+                                  <p:stCondLst>
+                                    <p:cond delay="0"/>
+                                  </p:stCondLst>
+                                  <p:childTnLst>
+                                    <p:cmd type="call" cmd="playFrom(0.0)">
+                                      <p:cBhvr>
+                                        <p:cTn id="18" dur="11199" fill="hold"/>
+                                        <p:tgtEl>
+                                          <p:spTgt spid="14"/>
+                                        </p:tgtEl>
+                                      </p:cBhvr>
+                                    </p:cmd>
+                                  </p:childTnLst>
+                                </p:cTn>
+                              </p:par>
+                            </p:childTnLst>
+                          </p:cTn>
+                        </p:par>
+                      </p:childTnLst>
+                    </p:cTn>
+                  </p:par>
+                </p:childTnLst>
+              </p:cTn>
+              <p:nextCondLst>
+                <p:cond evt="onClick" delay="0">
+                  <p:tgtEl>
+                    <p:spTgt spid="14"/>
+                  </p:tgtEl>
+                </p:cond>
+              </p:nextCondLst>
+            </p:seq>
+            <p:audio>
+              <p:cMediaNode>
+                <p:cTn id="19" fill="hold" display="0">
+                  <p:stCondLst>
+                    <p:cond delay="indefinite"/>
+                  </p:stCondLst>
+                  <p:endCondLst>
+                    <p:cond evt="onNext" delay="0">
+                      <p:tgtEl>
+                        <p:sldTgt/>
+                      </p:tgtEl>
+                    </p:cond>
+                    <p:cond evt="onPrev" delay="0">
+                      <p:tgtEl>
+                        <p:sldTgt/>
+                      </p:tgtEl>
+                    </p:cond>
+                    <p:cond evt="onStopAudio" delay="0">
+                      <p:tgtEl>
+                        <p:sldTgt/>
+                      </p:tgtEl>
+                    </p:cond>
+                  </p:endCondLst>
+                </p:cTn>
+                <p:tgtEl>
+                  <p:spTgt spid="14"/>
                 </p:tgtEl>
               </p:cMediaNode>
             </p:audio>
@@ -4956,11 +5304,7 @@
             </a:r>
             <a:r>
               <a:rPr lang="fr-FR" dirty="0" smtClean="0"/>
-              <a:t>, </a:t>
-            </a:r>
-            <a:r>
-              <a:rPr lang="fr-FR" dirty="0" smtClean="0"/>
-              <a:t>Capitaine Orgazmo.</a:t>
+              <a:t>, Capitaine Orgazmo.</a:t>
             </a:r>
             <a:endParaRPr lang="fr-FR" dirty="0"/>
           </a:p>
@@ -5203,7 +5547,7 @@
     </p:spTree>
     <p:extLst>
       <p:ext uri="{BB962C8B-B14F-4D97-AF65-F5344CB8AC3E}">
-        <p14:creationId xmlns:p14="http://schemas.microsoft.com/office/powerpoint/2010/main" val="3561826763"/>
+        <p14:creationId xmlns:p14="http://schemas.microsoft.com/office/powerpoint/2010/main" xmlns="" val="3561826763"/>
       </p:ext>
     </p:extLst>
   </p:cSld>

</xml_diff>

<commit_message>
Bugfix et ajout assets pour présentation.
</commit_message>
<xml_diff>
--- a/GD/Présentation.pptx
+++ b/GD/Présentation.pptx
@@ -5,20 +5,22 @@
     <p:sldMasterId id="2147484032" r:id="rId1"/>
   </p:sldMasterIdLst>
   <p:notesMasterIdLst>
-    <p:notesMasterId r:id="rId13"/>
+    <p:notesMasterId r:id="rId15"/>
   </p:notesMasterIdLst>
   <p:sldIdLst>
     <p:sldId id="268" r:id="rId2"/>
     <p:sldId id="256" r:id="rId3"/>
-    <p:sldId id="257" r:id="rId4"/>
-    <p:sldId id="269" r:id="rId5"/>
-    <p:sldId id="261" r:id="rId6"/>
-    <p:sldId id="262" r:id="rId7"/>
-    <p:sldId id="264" r:id="rId8"/>
-    <p:sldId id="265" r:id="rId9"/>
-    <p:sldId id="263" r:id="rId10"/>
-    <p:sldId id="266" r:id="rId11"/>
-    <p:sldId id="267" r:id="rId12"/>
+    <p:sldId id="270" r:id="rId4"/>
+    <p:sldId id="271" r:id="rId5"/>
+    <p:sldId id="257" r:id="rId6"/>
+    <p:sldId id="269" r:id="rId7"/>
+    <p:sldId id="261" r:id="rId8"/>
+    <p:sldId id="262" r:id="rId9"/>
+    <p:sldId id="264" r:id="rId10"/>
+    <p:sldId id="265" r:id="rId11"/>
+    <p:sldId id="263" r:id="rId12"/>
+    <p:sldId id="266" r:id="rId13"/>
+    <p:sldId id="267" r:id="rId14"/>
   </p:sldIdLst>
   <p:sldSz cx="9144000" cy="6858000" type="screen4x3"/>
   <p:notesSz cx="6858000" cy="9144000"/>
@@ -372,7 +374,7 @@
     </p:spTree>
     <p:extLst>
       <p:ext uri="{BB962C8B-B14F-4D97-AF65-F5344CB8AC3E}">
-        <p14:creationId xmlns:p14="http://schemas.microsoft.com/office/powerpoint/2010/main" xmlns="" val="1782812008"/>
+        <p14:creationId xmlns="" xmlns:p14="http://schemas.microsoft.com/office/powerpoint/2010/main" val="1782812008"/>
       </p:ext>
     </p:extLst>
   </p:cSld>
@@ -4000,13 +4002,38 @@
         </p:nvSpPr>
         <p:spPr/>
         <p:txBody>
-          <a:bodyPr/>
+          <a:bodyPr>
+            <a:normAutofit fontScale="90000"/>
+          </a:bodyPr>
           <a:lstStyle/>
           <a:p>
             <a:pPr algn="ctr"/>
             <a:r>
               <a:rPr lang="fr-FR" dirty="0" smtClean="0"/>
-              <a:t>Présentation YASU</a:t>
+              <a:t/>
+            </a:r>
+            <a:br>
+              <a:rPr lang="fr-FR" dirty="0" smtClean="0"/>
+            </a:br>
+            <a:r>
+              <a:rPr lang="fr-FR" dirty="0" err="1" smtClean="0"/>
+              <a:t>Let’s</a:t>
+            </a:r>
+            <a:r>
+              <a:rPr lang="fr-FR" dirty="0" smtClean="0"/>
+              <a:t> </a:t>
+            </a:r>
+            <a:r>
+              <a:rPr lang="fr-FR" dirty="0" err="1" smtClean="0"/>
+              <a:t>make</a:t>
+            </a:r>
+            <a:r>
+              <a:rPr lang="fr-FR" dirty="0" smtClean="0"/>
+              <a:t> a baby </a:t>
+            </a:r>
+            <a:r>
+              <a:rPr lang="fr-FR" dirty="0" err="1" smtClean="0"/>
+              <a:t>together</a:t>
             </a:r>
             <a:endParaRPr lang="fr-FR" dirty="0"/>
           </a:p>
@@ -4040,53 +4067,15 @@
             <a:pPr algn="ctr"/>
             <a:r>
               <a:rPr lang="fr-FR" dirty="0" smtClean="0"/>
-              <a:t>Paul Fiat – 29 Novembre 2012</a:t>
-            </a:r>
-            <a:endParaRPr lang="fr-FR" dirty="0"/>
-          </a:p>
-        </p:txBody>
-      </p:sp>
-      <p:sp>
-        <p:nvSpPr>
-          <p:cNvPr id="4" name="Espace réservé de la date 3"/>
-          <p:cNvSpPr>
-            <a:spLocks noGrp="1"/>
-          </p:cNvSpPr>
-          <p:nvPr>
-            <p:ph type="dt" sz="half" idx="10"/>
-          </p:nvPr>
-        </p:nvSpPr>
-        <p:spPr/>
-        <p:txBody>
-          <a:bodyPr/>
-          <a:lstStyle/>
-          <a:p>
-            <a:r>
-              <a:rPr lang="fr-FR" smtClean="0"/>
-              <a:t>Jeudi 29 Novembre 2012</a:t>
-            </a:r>
-            <a:endParaRPr lang="fr-FR" dirty="0"/>
-          </a:p>
-        </p:txBody>
-      </p:sp>
-      <p:sp>
-        <p:nvSpPr>
-          <p:cNvPr id="5" name="Espace réservé du pied de page 4"/>
-          <p:cNvSpPr>
-            <a:spLocks noGrp="1"/>
-          </p:cNvSpPr>
-          <p:nvPr>
-            <p:ph type="ftr" sz="quarter" idx="11"/>
-          </p:nvPr>
-        </p:nvSpPr>
-        <p:spPr/>
-        <p:txBody>
-          <a:bodyPr/>
-          <a:lstStyle/>
-          <a:p>
-            <a:r>
-              <a:rPr lang="fr-FR" smtClean="0"/>
-              <a:t>Paul Fiat</a:t>
+              <a:t>Paul Fiat – </a:t>
+            </a:r>
+            <a:r>
+              <a:rPr lang="fr-FR" dirty="0" smtClean="0"/>
+              <a:t>Jeudi 29 </a:t>
+            </a:r>
+            <a:r>
+              <a:rPr lang="fr-FR" dirty="0" smtClean="0"/>
+              <a:t>Novembre 2012</a:t>
             </a:r>
             <a:endParaRPr lang="fr-FR" dirty="0"/>
           </a:p>
@@ -4119,7 +4108,7 @@
     </p:spTree>
     <p:extLst>
       <p:ext uri="{BB962C8B-B14F-4D97-AF65-F5344CB8AC3E}">
-        <p14:creationId xmlns:p14="http://schemas.microsoft.com/office/powerpoint/2010/main" xmlns="" val="1100524434"/>
+        <p14:creationId xmlns="" xmlns:p14="http://schemas.microsoft.com/office/powerpoint/2010/main" val="1100524434"/>
       </p:ext>
     </p:extLst>
   </p:cSld>
@@ -4155,7 +4144,72 @@
       </p:grpSpPr>
       <p:sp>
         <p:nvSpPr>
-          <p:cNvPr id="5" name="Espace réservé de la date 4"/>
+          <p:cNvPr id="2" name="Title 1"/>
+          <p:cNvSpPr>
+            <a:spLocks noGrp="1"/>
+          </p:cNvSpPr>
+          <p:nvPr>
+            <p:ph type="title"/>
+          </p:nvPr>
+        </p:nvSpPr>
+        <p:spPr/>
+        <p:txBody>
+          <a:bodyPr/>
+          <a:lstStyle/>
+          <a:p>
+            <a:r>
+              <a:rPr lang="fr-FR" dirty="0" smtClean="0"/>
+              <a:t>Mockup</a:t>
+            </a:r>
+            <a:endParaRPr lang="fr-FR" dirty="0"/>
+          </a:p>
+        </p:txBody>
+      </p:sp>
+      <p:pic>
+        <p:nvPicPr>
+          <p:cNvPr id="7" name="Picture Placeholder 6" descr="mockup_legend.png"/>
+          <p:cNvPicPr>
+            <a:picLocks noGrp="1" noChangeAspect="1"/>
+          </p:cNvPicPr>
+          <p:nvPr>
+            <p:ph type="pic" idx="1"/>
+          </p:nvPr>
+        </p:nvPicPr>
+        <p:blipFill>
+          <a:blip r:embed="rId2"/>
+          <a:srcRect t="130" b="130"/>
+          <a:stretch>
+            <a:fillRect/>
+          </a:stretch>
+        </p:blipFill>
+        <p:spPr/>
+      </p:pic>
+      <p:sp>
+        <p:nvSpPr>
+          <p:cNvPr id="4" name="Text Placeholder 3"/>
+          <p:cNvSpPr>
+            <a:spLocks noGrp="1"/>
+          </p:cNvSpPr>
+          <p:nvPr>
+            <p:ph type="body" sz="half" idx="2"/>
+          </p:nvPr>
+        </p:nvSpPr>
+        <p:spPr/>
+        <p:txBody>
+          <a:bodyPr/>
+          <a:lstStyle/>
+          <a:p>
+            <a:r>
+              <a:rPr lang="fr-FR" dirty="0" smtClean="0"/>
+              <a:t>Ecran type du jeu.</a:t>
+            </a:r>
+            <a:endParaRPr lang="fr-FR" dirty="0"/>
+          </a:p>
+        </p:txBody>
+      </p:sp>
+      <p:sp>
+        <p:nvSpPr>
+          <p:cNvPr id="3" name="Espace réservé de la date 2"/>
           <p:cNvSpPr>
             <a:spLocks noGrp="1"/>
           </p:cNvSpPr>
@@ -4178,7 +4232,7 @@
       </p:sp>
       <p:sp>
         <p:nvSpPr>
-          <p:cNvPr id="6" name="Espace réservé du pied de page 5"/>
+          <p:cNvPr id="5" name="Espace réservé du pied de page 4"/>
           <p:cNvSpPr>
             <a:spLocks noGrp="1"/>
           </p:cNvSpPr>
@@ -4201,7 +4255,7 @@
       </p:sp>
       <p:sp>
         <p:nvSpPr>
-          <p:cNvPr id="7" name="Espace réservé du numéro de diapositive 6"/>
+          <p:cNvPr id="6" name="Espace réservé du numéro de diapositive 5"/>
           <p:cNvSpPr>
             <a:spLocks noGrp="1"/>
           </p:cNvSpPr>
@@ -4218,6 +4272,526 @@
               <a:rPr lang="fr-FR" smtClean="0"/>
               <a:pPr/>
               <a:t>10</a:t>
+            </a:fld>
+            <a:endParaRPr lang="fr-FR" dirty="0"/>
+          </a:p>
+        </p:txBody>
+      </p:sp>
+    </p:spTree>
+  </p:cSld>
+  <p:clrMapOvr>
+    <a:masterClrMapping/>
+  </p:clrMapOvr>
+  <p:timing>
+    <p:tnLst>
+      <p:par>
+        <p:cTn id="1" dur="indefinite" restart="never" nodeType="tmRoot"/>
+      </p:par>
+    </p:tnLst>
+  </p:timing>
+</p:sld>
+</file>
+
+<file path=ppt/slides/slide11.xml><?xml version="1.0" encoding="utf-8"?>
+<p:sld xmlns:a="http://schemas.openxmlformats.org/drawingml/2006/main" xmlns:r="http://schemas.openxmlformats.org/officeDocument/2006/relationships" xmlns:p="http://schemas.openxmlformats.org/presentationml/2006/main">
+  <p:cSld>
+    <p:spTree>
+      <p:nvGrpSpPr>
+        <p:cNvPr id="1" name=""/>
+        <p:cNvGrpSpPr/>
+        <p:nvPr/>
+      </p:nvGrpSpPr>
+      <p:grpSpPr>
+        <a:xfrm>
+          <a:off x="0" y="0"/>
+          <a:ext cx="0" cy="0"/>
+          <a:chOff x="0" y="0"/>
+          <a:chExt cx="0" cy="0"/>
+        </a:xfrm>
+      </p:grpSpPr>
+      <p:sp>
+        <p:nvSpPr>
+          <p:cNvPr id="4" name="Espace réservé de la date 3"/>
+          <p:cNvSpPr>
+            <a:spLocks noGrp="1"/>
+          </p:cNvSpPr>
+          <p:nvPr>
+            <p:ph type="dt" sz="half" idx="10"/>
+          </p:nvPr>
+        </p:nvSpPr>
+        <p:spPr/>
+        <p:txBody>
+          <a:bodyPr/>
+          <a:lstStyle/>
+          <a:p>
+            <a:r>
+              <a:rPr lang="fr-FR" smtClean="0"/>
+              <a:t>Jeudi 29 Novembre 2012</a:t>
+            </a:r>
+            <a:endParaRPr lang="fr-FR" dirty="0"/>
+          </a:p>
+        </p:txBody>
+      </p:sp>
+      <p:sp>
+        <p:nvSpPr>
+          <p:cNvPr id="5" name="Espace réservé du pied de page 4"/>
+          <p:cNvSpPr>
+            <a:spLocks noGrp="1"/>
+          </p:cNvSpPr>
+          <p:nvPr>
+            <p:ph type="ftr" sz="quarter" idx="11"/>
+          </p:nvPr>
+        </p:nvSpPr>
+        <p:spPr/>
+        <p:txBody>
+          <a:bodyPr/>
+          <a:lstStyle/>
+          <a:p>
+            <a:r>
+              <a:rPr lang="fr-FR" smtClean="0"/>
+              <a:t>Paul Fiat</a:t>
+            </a:r>
+            <a:endParaRPr lang="fr-FR" dirty="0"/>
+          </a:p>
+        </p:txBody>
+      </p:sp>
+      <p:sp>
+        <p:nvSpPr>
+          <p:cNvPr id="6" name="Espace réservé du numéro de diapositive 5"/>
+          <p:cNvSpPr>
+            <a:spLocks noGrp="1"/>
+          </p:cNvSpPr>
+          <p:nvPr>
+            <p:ph type="sldNum" sz="quarter" idx="12"/>
+          </p:nvPr>
+        </p:nvSpPr>
+        <p:spPr/>
+        <p:txBody>
+          <a:bodyPr/>
+          <a:lstStyle/>
+          <a:p>
+            <a:fld id="{9DDF0C85-99BB-428E-8D90-A207FA2E644C}" type="slidenum">
+              <a:rPr lang="fr-FR" smtClean="0"/>
+              <a:pPr/>
+              <a:t>11</a:t>
+            </a:fld>
+            <a:endParaRPr lang="fr-FR" dirty="0"/>
+          </a:p>
+        </p:txBody>
+      </p:sp>
+      <p:sp>
+        <p:nvSpPr>
+          <p:cNvPr id="2" name="Title 1"/>
+          <p:cNvSpPr>
+            <a:spLocks noGrp="1"/>
+          </p:cNvSpPr>
+          <p:nvPr>
+            <p:ph type="title"/>
+          </p:nvPr>
+        </p:nvSpPr>
+        <p:spPr/>
+        <p:txBody>
+          <a:bodyPr/>
+          <a:lstStyle/>
+          <a:p>
+            <a:r>
+              <a:rPr lang="fr-FR" dirty="0" smtClean="0"/>
+              <a:t>Ambiance</a:t>
+            </a:r>
+            <a:endParaRPr lang="fr-FR" dirty="0"/>
+          </a:p>
+        </p:txBody>
+      </p:sp>
+      <p:sp>
+        <p:nvSpPr>
+          <p:cNvPr id="3" name="Text Placeholder 2"/>
+          <p:cNvSpPr>
+            <a:spLocks noGrp="1"/>
+          </p:cNvSpPr>
+          <p:nvPr>
+            <p:ph type="body" idx="1"/>
+          </p:nvPr>
+        </p:nvSpPr>
+        <p:spPr>
+          <a:xfrm>
+            <a:off x="381000" y="1633536"/>
+            <a:ext cx="8477280" cy="4867298"/>
+          </a:xfrm>
+        </p:spPr>
+        <p:txBody>
+          <a:bodyPr/>
+          <a:lstStyle/>
+          <a:p>
+            <a:endParaRPr lang="fr-FR" dirty="0" smtClean="0"/>
+          </a:p>
+          <a:p>
+            <a:endParaRPr lang="fr-FR" dirty="0" smtClean="0"/>
+          </a:p>
+          <a:p>
+            <a:r>
+              <a:rPr lang="fr-FR" u="sng" dirty="0" smtClean="0"/>
+              <a:t>Dynamique</a:t>
+            </a:r>
+            <a:r>
+              <a:rPr lang="fr-FR" dirty="0" smtClean="0"/>
+              <a:t> :</a:t>
+            </a:r>
+          </a:p>
+          <a:p>
+            <a:r>
+              <a:rPr lang="fr-FR" dirty="0" smtClean="0"/>
+              <a:t>L’apparition des ennemis de tous les côtés de l’écran apporte de la surprise et du stress, remettant constamment le joueur sur ses gardes.</a:t>
+            </a:r>
+          </a:p>
+          <a:p>
+            <a:endParaRPr lang="fr-FR" dirty="0" smtClean="0"/>
+          </a:p>
+          <a:p>
+            <a:r>
+              <a:rPr lang="fr-FR" u="sng" dirty="0" smtClean="0"/>
+              <a:t>Etriqué</a:t>
+            </a:r>
+            <a:r>
+              <a:rPr lang="fr-FR" dirty="0" smtClean="0"/>
+              <a:t> :</a:t>
+            </a:r>
+          </a:p>
+          <a:p>
+            <a:r>
+              <a:rPr lang="fr-FR" dirty="0" smtClean="0"/>
+              <a:t>L’échelle des cartes provoque un sentiment d’étroitesse et d’une faible marge d’erreur.</a:t>
+            </a:r>
+          </a:p>
+        </p:txBody>
+      </p:sp>
+    </p:spTree>
+  </p:cSld>
+  <p:clrMapOvr>
+    <a:masterClrMapping/>
+  </p:clrMapOvr>
+  <p:timing>
+    <p:tnLst>
+      <p:par>
+        <p:cTn id="1" dur="indefinite" restart="never" nodeType="tmRoot">
+          <p:childTnLst>
+            <p:seq concurrent="1" nextAc="seek">
+              <p:cTn id="2" dur="indefinite" nodeType="mainSeq">
+                <p:childTnLst>
+                  <p:par>
+                    <p:cTn id="3" fill="hold">
+                      <p:stCondLst>
+                        <p:cond delay="indefinite"/>
+                      </p:stCondLst>
+                      <p:childTnLst>
+                        <p:par>
+                          <p:cTn id="4" fill="hold">
+                            <p:stCondLst>
+                              <p:cond delay="0"/>
+                            </p:stCondLst>
+                            <p:childTnLst>
+                              <p:par>
+                                <p:cTn id="5" presetID="22" presetClass="entr" presetSubtype="4" fill="hold" nodeType="clickEffect">
+                                  <p:stCondLst>
+                                    <p:cond delay="0"/>
+                                  </p:stCondLst>
+                                  <p:childTnLst>
+                                    <p:set>
+                                      <p:cBhvr>
+                                        <p:cTn id="6" dur="1" fill="hold">
+                                          <p:stCondLst>
+                                            <p:cond delay="0"/>
+                                          </p:stCondLst>
+                                        </p:cTn>
+                                        <p:tgtEl>
+                                          <p:spTgt spid="3">
+                                            <p:txEl>
+                                              <p:pRg st="2" end="2"/>
+                                            </p:txEl>
+                                          </p:spTgt>
+                                        </p:tgtEl>
+                                        <p:attrNameLst>
+                                          <p:attrName>style.visibility</p:attrName>
+                                        </p:attrNameLst>
+                                      </p:cBhvr>
+                                      <p:to>
+                                        <p:strVal val="visible"/>
+                                      </p:to>
+                                    </p:set>
+                                    <p:animEffect transition="in" filter="wipe(down)">
+                                      <p:cBhvr>
+                                        <p:cTn id="7" dur="500"/>
+                                        <p:tgtEl>
+                                          <p:spTgt spid="3">
+                                            <p:txEl>
+                                              <p:pRg st="2" end="2"/>
+                                            </p:txEl>
+                                          </p:spTgt>
+                                        </p:tgtEl>
+                                      </p:cBhvr>
+                                    </p:animEffect>
+                                  </p:childTnLst>
+                                </p:cTn>
+                              </p:par>
+                              <p:par>
+                                <p:cTn id="8" presetID="22" presetClass="entr" presetSubtype="4" fill="hold" nodeType="withEffect">
+                                  <p:stCondLst>
+                                    <p:cond delay="0"/>
+                                  </p:stCondLst>
+                                  <p:childTnLst>
+                                    <p:set>
+                                      <p:cBhvr>
+                                        <p:cTn id="9" dur="1" fill="hold">
+                                          <p:stCondLst>
+                                            <p:cond delay="0"/>
+                                          </p:stCondLst>
+                                        </p:cTn>
+                                        <p:tgtEl>
+                                          <p:spTgt spid="3">
+                                            <p:txEl>
+                                              <p:pRg st="3" end="3"/>
+                                            </p:txEl>
+                                          </p:spTgt>
+                                        </p:tgtEl>
+                                        <p:attrNameLst>
+                                          <p:attrName>style.visibility</p:attrName>
+                                        </p:attrNameLst>
+                                      </p:cBhvr>
+                                      <p:to>
+                                        <p:strVal val="visible"/>
+                                      </p:to>
+                                    </p:set>
+                                    <p:animEffect transition="in" filter="wipe(down)">
+                                      <p:cBhvr>
+                                        <p:cTn id="10" dur="500"/>
+                                        <p:tgtEl>
+                                          <p:spTgt spid="3">
+                                            <p:txEl>
+                                              <p:pRg st="3" end="3"/>
+                                            </p:txEl>
+                                          </p:spTgt>
+                                        </p:tgtEl>
+                                      </p:cBhvr>
+                                    </p:animEffect>
+                                  </p:childTnLst>
+                                </p:cTn>
+                              </p:par>
+                            </p:childTnLst>
+                          </p:cTn>
+                        </p:par>
+                      </p:childTnLst>
+                    </p:cTn>
+                  </p:par>
+                  <p:par>
+                    <p:cTn id="11" fill="hold">
+                      <p:stCondLst>
+                        <p:cond delay="indefinite"/>
+                      </p:stCondLst>
+                      <p:childTnLst>
+                        <p:par>
+                          <p:cTn id="12" fill="hold">
+                            <p:stCondLst>
+                              <p:cond delay="0"/>
+                            </p:stCondLst>
+                            <p:childTnLst>
+                              <p:par>
+                                <p:cTn id="13" presetID="22" presetClass="entr" presetSubtype="4" fill="hold" nodeType="clickEffect">
+                                  <p:stCondLst>
+                                    <p:cond delay="0"/>
+                                  </p:stCondLst>
+                                  <p:childTnLst>
+                                    <p:set>
+                                      <p:cBhvr>
+                                        <p:cTn id="14" dur="1" fill="hold">
+                                          <p:stCondLst>
+                                            <p:cond delay="0"/>
+                                          </p:stCondLst>
+                                        </p:cTn>
+                                        <p:tgtEl>
+                                          <p:spTgt spid="3">
+                                            <p:txEl>
+                                              <p:pRg st="5" end="5"/>
+                                            </p:txEl>
+                                          </p:spTgt>
+                                        </p:tgtEl>
+                                        <p:attrNameLst>
+                                          <p:attrName>style.visibility</p:attrName>
+                                        </p:attrNameLst>
+                                      </p:cBhvr>
+                                      <p:to>
+                                        <p:strVal val="visible"/>
+                                      </p:to>
+                                    </p:set>
+                                    <p:animEffect transition="in" filter="wipe(down)">
+                                      <p:cBhvr>
+                                        <p:cTn id="15" dur="500"/>
+                                        <p:tgtEl>
+                                          <p:spTgt spid="3">
+                                            <p:txEl>
+                                              <p:pRg st="5" end="5"/>
+                                            </p:txEl>
+                                          </p:spTgt>
+                                        </p:tgtEl>
+                                      </p:cBhvr>
+                                    </p:animEffect>
+                                  </p:childTnLst>
+                                </p:cTn>
+                              </p:par>
+                              <p:par>
+                                <p:cTn id="16" presetID="22" presetClass="entr" presetSubtype="4" fill="hold" nodeType="withEffect">
+                                  <p:stCondLst>
+                                    <p:cond delay="0"/>
+                                  </p:stCondLst>
+                                  <p:childTnLst>
+                                    <p:set>
+                                      <p:cBhvr>
+                                        <p:cTn id="17" dur="1" fill="hold">
+                                          <p:stCondLst>
+                                            <p:cond delay="0"/>
+                                          </p:stCondLst>
+                                        </p:cTn>
+                                        <p:tgtEl>
+                                          <p:spTgt spid="3">
+                                            <p:txEl>
+                                              <p:pRg st="6" end="6"/>
+                                            </p:txEl>
+                                          </p:spTgt>
+                                        </p:tgtEl>
+                                        <p:attrNameLst>
+                                          <p:attrName>style.visibility</p:attrName>
+                                        </p:attrNameLst>
+                                      </p:cBhvr>
+                                      <p:to>
+                                        <p:strVal val="visible"/>
+                                      </p:to>
+                                    </p:set>
+                                    <p:animEffect transition="in" filter="wipe(down)">
+                                      <p:cBhvr>
+                                        <p:cTn id="18" dur="500"/>
+                                        <p:tgtEl>
+                                          <p:spTgt spid="3">
+                                            <p:txEl>
+                                              <p:pRg st="6" end="6"/>
+                                            </p:txEl>
+                                          </p:spTgt>
+                                        </p:tgtEl>
+                                      </p:cBhvr>
+                                    </p:animEffect>
+                                  </p:childTnLst>
+                                </p:cTn>
+                              </p:par>
+                            </p:childTnLst>
+                          </p:cTn>
+                        </p:par>
+                      </p:childTnLst>
+                    </p:cTn>
+                  </p:par>
+                </p:childTnLst>
+              </p:cTn>
+              <p:prevCondLst>
+                <p:cond evt="onPrev" delay="0">
+                  <p:tgtEl>
+                    <p:sldTgt/>
+                  </p:tgtEl>
+                </p:cond>
+              </p:prevCondLst>
+              <p:nextCondLst>
+                <p:cond evt="onNext" delay="0">
+                  <p:tgtEl>
+                    <p:sldTgt/>
+                  </p:tgtEl>
+                </p:cond>
+              </p:nextCondLst>
+            </p:seq>
+          </p:childTnLst>
+        </p:cTn>
+      </p:par>
+    </p:tnLst>
+  </p:timing>
+</p:sld>
+</file>
+
+<file path=ppt/slides/slide12.xml><?xml version="1.0" encoding="utf-8"?>
+<p:sld xmlns:a="http://schemas.openxmlformats.org/drawingml/2006/main" xmlns:r="http://schemas.openxmlformats.org/officeDocument/2006/relationships" xmlns:p="http://schemas.openxmlformats.org/presentationml/2006/main">
+  <p:cSld>
+    <p:spTree>
+      <p:nvGrpSpPr>
+        <p:cNvPr id="1" name=""/>
+        <p:cNvGrpSpPr/>
+        <p:nvPr/>
+      </p:nvGrpSpPr>
+      <p:grpSpPr>
+        <a:xfrm>
+          <a:off x="0" y="0"/>
+          <a:ext cx="0" cy="0"/>
+          <a:chOff x="0" y="0"/>
+          <a:chExt cx="0" cy="0"/>
+        </a:xfrm>
+      </p:grpSpPr>
+      <p:sp>
+        <p:nvSpPr>
+          <p:cNvPr id="5" name="Espace réservé de la date 4"/>
+          <p:cNvSpPr>
+            <a:spLocks noGrp="1"/>
+          </p:cNvSpPr>
+          <p:nvPr>
+            <p:ph type="dt" sz="half" idx="10"/>
+          </p:nvPr>
+        </p:nvSpPr>
+        <p:spPr/>
+        <p:txBody>
+          <a:bodyPr/>
+          <a:lstStyle/>
+          <a:p>
+            <a:r>
+              <a:rPr lang="fr-FR" smtClean="0"/>
+              <a:t>Jeudi 29 Novembre 2012</a:t>
+            </a:r>
+            <a:endParaRPr lang="fr-FR" dirty="0"/>
+          </a:p>
+        </p:txBody>
+      </p:sp>
+      <p:sp>
+        <p:nvSpPr>
+          <p:cNvPr id="6" name="Espace réservé du pied de page 5"/>
+          <p:cNvSpPr>
+            <a:spLocks noGrp="1"/>
+          </p:cNvSpPr>
+          <p:nvPr>
+            <p:ph type="ftr" sz="quarter" idx="11"/>
+          </p:nvPr>
+        </p:nvSpPr>
+        <p:spPr/>
+        <p:txBody>
+          <a:bodyPr/>
+          <a:lstStyle/>
+          <a:p>
+            <a:r>
+              <a:rPr lang="fr-FR" smtClean="0"/>
+              <a:t>Paul Fiat</a:t>
+            </a:r>
+            <a:endParaRPr lang="fr-FR" dirty="0"/>
+          </a:p>
+        </p:txBody>
+      </p:sp>
+      <p:sp>
+        <p:nvSpPr>
+          <p:cNvPr id="7" name="Espace réservé du numéro de diapositive 6"/>
+          <p:cNvSpPr>
+            <a:spLocks noGrp="1"/>
+          </p:cNvSpPr>
+          <p:nvPr>
+            <p:ph type="sldNum" sz="quarter" idx="12"/>
+          </p:nvPr>
+        </p:nvSpPr>
+        <p:spPr/>
+        <p:txBody>
+          <a:bodyPr/>
+          <a:lstStyle/>
+          <a:p>
+            <a:fld id="{9DDF0C85-99BB-428E-8D90-A207FA2E644C}" type="slidenum">
+              <a:rPr lang="fr-FR" smtClean="0"/>
+              <a:pPr/>
+              <a:t>12</a:t>
             </a:fld>
             <a:endParaRPr lang="fr-FR" dirty="0"/>
           </a:p>
@@ -4345,7 +4919,7 @@
 </p:sld>
 </file>
 
-<file path=ppt/slides/slide11.xml><?xml version="1.0" encoding="utf-8"?>
+<file path=ppt/slides/slide13.xml><?xml version="1.0" encoding="utf-8"?>
 <p:sld xmlns:a="http://schemas.openxmlformats.org/drawingml/2006/main" xmlns:r="http://schemas.openxmlformats.org/officeDocument/2006/relationships" xmlns:p="http://schemas.openxmlformats.org/presentationml/2006/main">
   <p:cSld>
     <p:spTree>
@@ -4426,7 +5000,7 @@
             <a:fld id="{9DDF0C85-99BB-428E-8D90-A207FA2E644C}" type="slidenum">
               <a:rPr lang="fr-FR" smtClean="0"/>
               <a:pPr/>
-              <a:t>11</a:t>
+              <a:t>13</a:t>
             </a:fld>
             <a:endParaRPr lang="fr-FR" dirty="0"/>
           </a:p>
@@ -4501,11 +5075,7 @@
           <a:p>
             <a:r>
               <a:rPr lang="fr-FR" dirty="0" smtClean="0"/>
-              <a:t>La musique est en style 8bit, rythmée et entraînante</a:t>
-            </a:r>
-            <a:r>
-              <a:rPr lang="fr-FR" dirty="0" smtClean="0"/>
-              <a:t>.</a:t>
+              <a:t>La musique est en style 8bit, rythmée et entraînante.</a:t>
             </a:r>
           </a:p>
           <a:p>
@@ -4563,11 +5133,7 @@
           <a:p>
             <a:r>
               <a:rPr lang="fr-FR" dirty="0" smtClean="0"/>
-              <a:t>Les feedbacks et bruitages sonores auront un effet « liquide </a:t>
-            </a:r>
-            <a:r>
-              <a:rPr lang="fr-FR" dirty="0" smtClean="0"/>
-              <a:t>» et « profonds » pour correspondre à l’environnement du jeu.</a:t>
+              <a:t>Les feedbacks et bruitages sonores auront un effet « liquide » et « profonds » pour correspondre à l’environnement du jeu.</a:t>
             </a:r>
           </a:p>
           <a:p>
@@ -5026,9 +5592,15 @@
         <p:spPr/>
         <p:txBody>
           <a:bodyPr>
-            <a:normAutofit/>
+            <a:normAutofit lnSpcReduction="10000"/>
           </a:bodyPr>
           <a:lstStyle/>
+          <a:p>
+            <a:r>
+              <a:rPr lang="fr-FR" b="1" dirty="0" smtClean="0"/>
+              <a:t>Choix du concept</a:t>
+            </a:r>
+          </a:p>
           <a:p>
             <a:r>
               <a:rPr lang="fr-FR" b="1" dirty="0" smtClean="0"/>
@@ -5215,7 +5787,77 @@
       </p:grpSpPr>
       <p:sp>
         <p:nvSpPr>
-          <p:cNvPr id="2" name="Title 1"/>
+          <p:cNvPr id="2" name="Date Placeholder 1"/>
+          <p:cNvSpPr>
+            <a:spLocks noGrp="1"/>
+          </p:cNvSpPr>
+          <p:nvPr>
+            <p:ph type="dt" sz="half" idx="10"/>
+          </p:nvPr>
+        </p:nvSpPr>
+        <p:spPr/>
+        <p:txBody>
+          <a:bodyPr/>
+          <a:lstStyle/>
+          <a:p>
+            <a:r>
+              <a:rPr lang="fr-FR" smtClean="0"/>
+              <a:t>Jeudi 29 Novembre 2012</a:t>
+            </a:r>
+            <a:endParaRPr lang="fr-FR" dirty="0"/>
+          </a:p>
+        </p:txBody>
+      </p:sp>
+      <p:sp>
+        <p:nvSpPr>
+          <p:cNvPr id="3" name="Footer Placeholder 2"/>
+          <p:cNvSpPr>
+            <a:spLocks noGrp="1"/>
+          </p:cNvSpPr>
+          <p:nvPr>
+            <p:ph type="ftr" sz="quarter" idx="11"/>
+          </p:nvPr>
+        </p:nvSpPr>
+        <p:spPr/>
+        <p:txBody>
+          <a:bodyPr/>
+          <a:lstStyle/>
+          <a:p>
+            <a:r>
+              <a:rPr lang="fr-FR" smtClean="0"/>
+              <a:t>Paul Fiat</a:t>
+            </a:r>
+            <a:endParaRPr lang="fr-FR" dirty="0"/>
+          </a:p>
+        </p:txBody>
+      </p:sp>
+      <p:sp>
+        <p:nvSpPr>
+          <p:cNvPr id="4" name="Slide Number Placeholder 3"/>
+          <p:cNvSpPr>
+            <a:spLocks noGrp="1"/>
+          </p:cNvSpPr>
+          <p:nvPr>
+            <p:ph type="sldNum" sz="quarter" idx="12"/>
+          </p:nvPr>
+        </p:nvSpPr>
+        <p:spPr/>
+        <p:txBody>
+          <a:bodyPr/>
+          <a:lstStyle/>
+          <a:p>
+            <a:fld id="{9DDF0C85-99BB-428E-8D90-A207FA2E644C}" type="slidenum">
+              <a:rPr lang="fr-FR" smtClean="0"/>
+              <a:pPr/>
+              <a:t>3</a:t>
+            </a:fld>
+            <a:endParaRPr lang="fr-FR" dirty="0"/>
+          </a:p>
+        </p:txBody>
+      </p:sp>
+      <p:sp>
+        <p:nvSpPr>
+          <p:cNvPr id="5" name="Title 4"/>
           <p:cNvSpPr>
             <a:spLocks noGrp="1"/>
           </p:cNvSpPr>
@@ -5230,7 +5872,7 @@
           <a:p>
             <a:r>
               <a:rPr lang="fr-FR" dirty="0" smtClean="0"/>
-              <a:t>Type de gameplay</a:t>
+              <a:t>Choix du concept</a:t>
             </a:r>
             <a:endParaRPr lang="fr-FR" dirty="0"/>
           </a:p>
@@ -5238,148 +5880,32 @@
       </p:sp>
       <p:pic>
         <p:nvPicPr>
-          <p:cNvPr id="5" name="Picture Placeholder 4" descr="crimzon.png"/>
+          <p:cNvPr id="7" name="simpsons.wmv">
+            <a:hlinkClick r:id="" action="ppaction://media"/>
+          </p:cNvPr>
           <p:cNvPicPr>
-            <a:picLocks noGrp="1" noChangeAspect="1"/>
+            <a:picLocks noRot="1" noChangeAspect="1"/>
           </p:cNvPicPr>
           <p:nvPr>
-            <p:ph type="pic" idx="1"/>
+            <a:videoFile r:link="rId1"/>
           </p:nvPr>
         </p:nvPicPr>
         <p:blipFill>
-          <a:blip r:embed="rId2"/>
-          <a:srcRect t="130" b="130"/>
+          <a:blip r:embed="rId3"/>
           <a:stretch>
             <a:fillRect/>
           </a:stretch>
         </p:blipFill>
-        <p:spPr/>
+        <p:spPr>
+          <a:xfrm>
+            <a:off x="1071538" y="1928802"/>
+            <a:ext cx="6881861" cy="3871046"/>
+          </a:xfrm>
+          <a:prstGeom prst="rect">
+            <a:avLst/>
+          </a:prstGeom>
+        </p:spPr>
       </p:pic>
-      <p:sp>
-        <p:nvSpPr>
-          <p:cNvPr id="4" name="Text Placeholder 3"/>
-          <p:cNvSpPr>
-            <a:spLocks noGrp="1"/>
-          </p:cNvSpPr>
-          <p:nvPr>
-            <p:ph type="body" sz="half" idx="2"/>
-          </p:nvPr>
-        </p:nvSpPr>
-        <p:spPr/>
-        <p:txBody>
-          <a:bodyPr>
-            <a:normAutofit/>
-          </a:bodyPr>
-          <a:lstStyle/>
-          <a:p>
-            <a:r>
-              <a:rPr lang="fr-FR" dirty="0" smtClean="0"/>
-              <a:t>Type de Gameplay : </a:t>
-            </a:r>
-            <a:r>
-              <a:rPr lang="fr-FR" dirty="0" err="1" smtClean="0"/>
-              <a:t>Shoot’em</a:t>
-            </a:r>
-            <a:r>
-              <a:rPr lang="fr-FR" dirty="0" smtClean="0"/>
-              <a:t> Up.</a:t>
-            </a:r>
-          </a:p>
-          <a:p>
-            <a:r>
-              <a:rPr lang="fr-FR" dirty="0" smtClean="0"/>
-              <a:t>Références :  </a:t>
-            </a:r>
-            <a:r>
-              <a:rPr lang="fr-FR" dirty="0" err="1" smtClean="0"/>
-              <a:t>Crimzon</a:t>
-            </a:r>
-            <a:r>
-              <a:rPr lang="fr-FR" dirty="0" smtClean="0"/>
-              <a:t> </a:t>
-            </a:r>
-            <a:r>
-              <a:rPr lang="fr-FR" dirty="0" err="1" smtClean="0"/>
-              <a:t>Clover</a:t>
-            </a:r>
-            <a:r>
-              <a:rPr lang="fr-FR" dirty="0" smtClean="0"/>
-              <a:t>, Capitaine Orgazmo.</a:t>
-            </a:r>
-            <a:endParaRPr lang="fr-FR" dirty="0"/>
-          </a:p>
-        </p:txBody>
-      </p:sp>
-      <p:sp>
-        <p:nvSpPr>
-          <p:cNvPr id="3" name="Espace réservé de la date 2"/>
-          <p:cNvSpPr>
-            <a:spLocks noGrp="1"/>
-          </p:cNvSpPr>
-          <p:nvPr>
-            <p:ph type="dt" sz="half" idx="10"/>
-          </p:nvPr>
-        </p:nvSpPr>
-        <p:spPr/>
-        <p:txBody>
-          <a:bodyPr/>
-          <a:lstStyle/>
-          <a:p>
-            <a:r>
-              <a:rPr lang="fr-FR" smtClean="0"/>
-              <a:t>Jeudi 29 Novembre 2012</a:t>
-            </a:r>
-            <a:endParaRPr lang="fr-FR" dirty="0"/>
-          </a:p>
-        </p:txBody>
-      </p:sp>
-      <p:sp>
-        <p:nvSpPr>
-          <p:cNvPr id="6" name="Espace réservé du pied de page 5"/>
-          <p:cNvSpPr>
-            <a:spLocks noGrp="1"/>
-          </p:cNvSpPr>
-          <p:nvPr>
-            <p:ph type="ftr" sz="quarter" idx="11"/>
-          </p:nvPr>
-        </p:nvSpPr>
-        <p:spPr/>
-        <p:txBody>
-          <a:bodyPr/>
-          <a:lstStyle/>
-          <a:p>
-            <a:r>
-              <a:rPr lang="fr-FR" smtClean="0"/>
-              <a:t>Paul Fiat</a:t>
-            </a:r>
-            <a:endParaRPr lang="fr-FR" dirty="0"/>
-          </a:p>
-        </p:txBody>
-      </p:sp>
-      <p:sp>
-        <p:nvSpPr>
-          <p:cNvPr id="7" name="Espace réservé du numéro de diapositive 6"/>
-          <p:cNvSpPr>
-            <a:spLocks noGrp="1"/>
-          </p:cNvSpPr>
-          <p:nvPr>
-            <p:ph type="sldNum" sz="quarter" idx="12"/>
-          </p:nvPr>
-        </p:nvSpPr>
-        <p:spPr/>
-        <p:txBody>
-          <a:bodyPr/>
-          <a:lstStyle/>
-          <a:p>
-            <a:fld id="{9DDF0C85-99BB-428E-8D90-A207FA2E644C}" type="slidenum">
-              <a:rPr lang="fr-FR" smtClean="0"/>
-              <a:pPr/>
-              <a:t>3</a:t>
-            </a:fld>
-            <a:endParaRPr lang="fr-FR" dirty="0"/>
-          </a:p>
-        </p:txBody>
-      </p:sp>
     </p:spTree>
   </p:cSld>
   <p:clrMapOvr>
@@ -5388,7 +5914,92 @@
   <p:timing>
     <p:tnLst>
       <p:par>
-        <p:cTn id="1" dur="indefinite" restart="never" nodeType="tmRoot"/>
+        <p:cTn id="1" dur="indefinite" restart="never" nodeType="tmRoot">
+          <p:childTnLst>
+            <p:seq concurrent="1" nextAc="seek">
+              <p:cTn id="2" restart="whenNotActive" fill="hold" evtFilter="cancelBubble" nodeType="interactiveSeq">
+                <p:stCondLst>
+                  <p:cond evt="onClick" delay="0">
+                    <p:tgtEl>
+                      <p:spTgt spid="7"/>
+                    </p:tgtEl>
+                  </p:cond>
+                </p:stCondLst>
+                <p:endSync evt="end" delay="0">
+                  <p:rtn val="all"/>
+                </p:endSync>
+                <p:childTnLst>
+                  <p:par>
+                    <p:cTn id="3" fill="hold">
+                      <p:stCondLst>
+                        <p:cond delay="0"/>
+                      </p:stCondLst>
+                      <p:childTnLst>
+                        <p:par>
+                          <p:cTn id="4" fill="hold">
+                            <p:stCondLst>
+                              <p:cond delay="0"/>
+                            </p:stCondLst>
+                            <p:childTnLst>
+                              <p:par>
+                                <p:cTn id="5" presetID="2" presetClass="mediacall" presetSubtype="0" fill="hold" nodeType="clickEffect">
+                                  <p:stCondLst>
+                                    <p:cond delay="0"/>
+                                  </p:stCondLst>
+                                  <p:childTnLst>
+                                    <p:cmd type="call" cmd="togglePause">
+                                      <p:cBhvr>
+                                        <p:cTn id="6" dur="1" fill="hold"/>
+                                        <p:tgtEl>
+                                          <p:spTgt spid="7"/>
+                                        </p:tgtEl>
+                                      </p:cBhvr>
+                                    </p:cmd>
+                                  </p:childTnLst>
+                                </p:cTn>
+                              </p:par>
+                            </p:childTnLst>
+                          </p:cTn>
+                        </p:par>
+                      </p:childTnLst>
+                    </p:cTn>
+                  </p:par>
+                </p:childTnLst>
+              </p:cTn>
+              <p:nextCondLst>
+                <p:cond evt="onClick" delay="0">
+                  <p:tgtEl>
+                    <p:spTgt spid="7"/>
+                  </p:tgtEl>
+                </p:cond>
+              </p:nextCondLst>
+            </p:seq>
+            <p:video>
+              <p:cMediaNode>
+                <p:cTn id="7" fill="hold" display="0">
+                  <p:stCondLst>
+                    <p:cond delay="indefinite"/>
+                  </p:stCondLst>
+                  <p:endCondLst>
+                    <p:cond evt="onNext" delay="0">
+                      <p:tgtEl>
+                        <p:sldTgt/>
+                      </p:tgtEl>
+                    </p:cond>
+                    <p:cond evt="onPrev" delay="0">
+                      <p:tgtEl>
+                        <p:sldTgt/>
+                      </p:tgtEl>
+                    </p:cond>
+                  </p:endCondLst>
+                </p:cTn>
+                <p:tgtEl>
+                  <p:spTgt spid="7"/>
+                </p:tgtEl>
+              </p:cMediaNode>
+            </p:video>
+          </p:childTnLst>
+        </p:cTn>
       </p:par>
     </p:tnLst>
   </p:timing>
@@ -5414,12 +6025,12 @@
       </p:grpSpPr>
       <p:sp>
         <p:nvSpPr>
-          <p:cNvPr id="2" name="Titre 1"/>
-          <p:cNvSpPr>
-            <a:spLocks noGrp="1"/>
-          </p:cNvSpPr>
-          <p:nvPr>
-            <p:ph type="title"/>
+          <p:cNvPr id="2" name="Date Placeholder 1"/>
+          <p:cNvSpPr>
+            <a:spLocks noGrp="1"/>
+          </p:cNvSpPr>
+          <p:nvPr>
+            <p:ph type="dt" sz="half" idx="10"/>
           </p:nvPr>
         </p:nvSpPr>
         <p:spPr/>
@@ -5428,21 +6039,21 @@
           <a:lstStyle/>
           <a:p>
             <a:r>
-              <a:rPr lang="fr-FR" dirty="0" err="1" smtClean="0"/>
-              <a:t>Simpsons</a:t>
-            </a:r>
-            <a:endParaRPr lang="fr-FR" dirty="0"/>
-          </a:p>
-        </p:txBody>
-      </p:sp>
-      <p:sp>
-        <p:nvSpPr>
-          <p:cNvPr id="4" name="Espace réservé du texte 3"/>
-          <p:cNvSpPr>
-            <a:spLocks noGrp="1"/>
-          </p:cNvSpPr>
-          <p:nvPr>
-            <p:ph type="body" sz="half" idx="2"/>
+              <a:rPr lang="fr-FR" smtClean="0"/>
+              <a:t>Jeudi 29 Novembre 2012</a:t>
+            </a:r>
+            <a:endParaRPr lang="fr-FR" dirty="0"/>
+          </a:p>
+        </p:txBody>
+      </p:sp>
+      <p:sp>
+        <p:nvSpPr>
+          <p:cNvPr id="3" name="Footer Placeholder 2"/>
+          <p:cNvSpPr>
+            <a:spLocks noGrp="1"/>
+          </p:cNvSpPr>
+          <p:nvPr>
+            <p:ph type="ftr" sz="quarter" idx="11"/>
           </p:nvPr>
         </p:nvSpPr>
         <p:spPr/>
@@ -5451,68 +6062,6 @@
           <a:lstStyle/>
           <a:p>
             <a:r>
-              <a:rPr lang="fr-FR" dirty="0" smtClean="0"/>
-              <a:t>918 This </a:t>
-            </a:r>
-            <a:r>
-              <a:rPr lang="fr-FR" dirty="0" err="1" smtClean="0"/>
-              <a:t>little</a:t>
-            </a:r>
-            <a:r>
-              <a:rPr lang="fr-FR" dirty="0" smtClean="0"/>
-              <a:t> </a:t>
-            </a:r>
-            <a:r>
-              <a:rPr lang="fr-FR" dirty="0" err="1" smtClean="0"/>
-              <a:t>wiggy</a:t>
-            </a:r>
-            <a:r>
-              <a:rPr lang="fr-FR" dirty="0" smtClean="0"/>
-              <a:t> – 3:40</a:t>
-            </a:r>
-            <a:endParaRPr lang="fr-FR" dirty="0"/>
-          </a:p>
-        </p:txBody>
-      </p:sp>
-      <p:sp>
-        <p:nvSpPr>
-          <p:cNvPr id="5" name="Espace réservé de la date 4"/>
-          <p:cNvSpPr>
-            <a:spLocks noGrp="1"/>
-          </p:cNvSpPr>
-          <p:nvPr>
-            <p:ph type="dt" sz="half" idx="10"/>
-          </p:nvPr>
-        </p:nvSpPr>
-        <p:spPr/>
-        <p:txBody>
-          <a:bodyPr/>
-          <a:lstStyle/>
-          <a:p>
-            <a:r>
-              <a:rPr lang="fr-FR" smtClean="0"/>
-              <a:t>Jeudi 29 Novembre 2012</a:t>
-            </a:r>
-            <a:endParaRPr lang="fr-FR" dirty="0"/>
-          </a:p>
-        </p:txBody>
-      </p:sp>
-      <p:sp>
-        <p:nvSpPr>
-          <p:cNvPr id="6" name="Espace réservé du pied de page 5"/>
-          <p:cNvSpPr>
-            <a:spLocks noGrp="1"/>
-          </p:cNvSpPr>
-          <p:nvPr>
-            <p:ph type="ftr" sz="quarter" idx="11"/>
-          </p:nvPr>
-        </p:nvSpPr>
-        <p:spPr/>
-        <p:txBody>
-          <a:bodyPr/>
-          <a:lstStyle/>
-          <a:p>
-            <a:r>
               <a:rPr lang="fr-FR" smtClean="0"/>
               <a:t>Paul Fiat</a:t>
             </a:r>
@@ -5522,7 +6071,7 @@
       </p:sp>
       <p:sp>
         <p:nvSpPr>
-          <p:cNvPr id="7" name="Espace réservé du numéro de diapositive 6"/>
+          <p:cNvPr id="4" name="Slide Number Placeholder 3"/>
           <p:cNvSpPr>
             <a:spLocks noGrp="1"/>
           </p:cNvSpPr>
@@ -5544,23 +6093,64 @@
           </a:p>
         </p:txBody>
       </p:sp>
+      <p:sp>
+        <p:nvSpPr>
+          <p:cNvPr id="5" name="Title 4"/>
+          <p:cNvSpPr>
+            <a:spLocks noGrp="1"/>
+          </p:cNvSpPr>
+          <p:nvPr>
+            <p:ph type="title"/>
+          </p:nvPr>
+        </p:nvSpPr>
+        <p:spPr/>
+        <p:txBody>
+          <a:bodyPr/>
+          <a:lstStyle/>
+          <a:p>
+            <a:r>
+              <a:rPr lang="fr-FR" dirty="0" smtClean="0"/>
+              <a:t>Prototype</a:t>
+            </a:r>
+            <a:endParaRPr lang="fr-FR" dirty="0"/>
+          </a:p>
+        </p:txBody>
+      </p:sp>
+      <p:sp>
+        <p:nvSpPr>
+          <p:cNvPr id="7" name="TextBox 6"/>
+          <p:cNvSpPr txBox="1"/>
+          <p:nvPr/>
+        </p:nvSpPr>
+        <p:spPr>
+          <a:xfrm>
+            <a:off x="1428728" y="2571744"/>
+            <a:ext cx="3714776" cy="369332"/>
+          </a:xfrm>
+          <a:prstGeom prst="rect">
+            <a:avLst/>
+          </a:prstGeom>
+          <a:noFill/>
+        </p:spPr>
+        <p:txBody>
+          <a:bodyPr wrap="square" rtlCol="0">
+            <a:spAutoFit/>
+          </a:bodyPr>
+          <a:lstStyle/>
+          <a:p>
+            <a:r>
+              <a:rPr lang="fr-FR" dirty="0" smtClean="0"/>
+              <a:t>AJOUT SWF EN FIN</a:t>
+            </a:r>
+            <a:endParaRPr lang="fr-FR" dirty="0"/>
+          </a:p>
+        </p:txBody>
+      </p:sp>
     </p:spTree>
-    <p:extLst>
-      <p:ext uri="{BB962C8B-B14F-4D97-AF65-F5344CB8AC3E}">
-        <p14:creationId xmlns:p14="http://schemas.microsoft.com/office/powerpoint/2010/main" xmlns="" val="3561826763"/>
-      </p:ext>
-    </p:extLst>
   </p:cSld>
   <p:clrMapOvr>
     <a:masterClrMapping/>
   </p:clrMapOvr>
-  <p:timing>
-    <p:tnLst>
-      <p:par>
-        <p:cTn id="1" dur="indefinite" restart="never" nodeType="tmRoot"/>
-      </p:par>
-    </p:tnLst>
-  </p:timing>
 </p:sld>
 </file>
 
@@ -5583,7 +6173,145 @@
       </p:grpSpPr>
       <p:sp>
         <p:nvSpPr>
-          <p:cNvPr id="4" name="Espace réservé de la date 3"/>
+          <p:cNvPr id="2" name="Title 1"/>
+          <p:cNvSpPr>
+            <a:spLocks noGrp="1"/>
+          </p:cNvSpPr>
+          <p:nvPr>
+            <p:ph type="title"/>
+          </p:nvPr>
+        </p:nvSpPr>
+        <p:spPr/>
+        <p:txBody>
+          <a:bodyPr/>
+          <a:lstStyle/>
+          <a:p>
+            <a:r>
+              <a:rPr lang="fr-FR" dirty="0" smtClean="0"/>
+              <a:t>Type de gameplay</a:t>
+            </a:r>
+            <a:endParaRPr lang="fr-FR" dirty="0"/>
+          </a:p>
+        </p:txBody>
+      </p:sp>
+      <p:pic>
+        <p:nvPicPr>
+          <p:cNvPr id="5" name="Picture Placeholder 4" descr="crimzon.png"/>
+          <p:cNvPicPr>
+            <a:picLocks noGrp="1" noChangeAspect="1"/>
+          </p:cNvPicPr>
+          <p:nvPr>
+            <p:ph type="pic" idx="1"/>
+          </p:nvPr>
+        </p:nvPicPr>
+        <p:blipFill>
+          <a:blip r:embed="rId2"/>
+          <a:srcRect t="130" b="130"/>
+          <a:stretch>
+            <a:fillRect/>
+          </a:stretch>
+        </p:blipFill>
+        <p:spPr/>
+      </p:pic>
+      <p:sp>
+        <p:nvSpPr>
+          <p:cNvPr id="4" name="Text Placeholder 3"/>
+          <p:cNvSpPr>
+            <a:spLocks noGrp="1"/>
+          </p:cNvSpPr>
+          <p:nvPr>
+            <p:ph type="body" sz="half" idx="2"/>
+          </p:nvPr>
+        </p:nvSpPr>
+        <p:spPr/>
+        <p:txBody>
+          <a:bodyPr>
+            <a:normAutofit/>
+          </a:bodyPr>
+          <a:lstStyle/>
+          <a:p>
+            <a:r>
+              <a:rPr lang="fr-FR" dirty="0" smtClean="0"/>
+              <a:t>Type de Gameplay : </a:t>
+            </a:r>
+            <a:r>
+              <a:rPr lang="fr-FR" dirty="0" err="1" smtClean="0"/>
+              <a:t>Shoot’em</a:t>
+            </a:r>
+            <a:r>
+              <a:rPr lang="fr-FR" dirty="0" smtClean="0"/>
+              <a:t> </a:t>
+            </a:r>
+            <a:r>
+              <a:rPr lang="fr-FR" dirty="0" smtClean="0"/>
+              <a:t>Up / Bullet </a:t>
+            </a:r>
+            <a:r>
+              <a:rPr lang="fr-FR" dirty="0" err="1" smtClean="0"/>
+              <a:t>Hell</a:t>
+            </a:r>
+            <a:r>
+              <a:rPr lang="fr-FR" dirty="0" smtClean="0"/>
+              <a:t>.</a:t>
+            </a:r>
+            <a:endParaRPr lang="fr-FR" dirty="0" smtClean="0"/>
+          </a:p>
+          <a:p>
+            <a:r>
+              <a:rPr lang="fr-FR" dirty="0" smtClean="0"/>
+              <a:t>Références :  </a:t>
+            </a:r>
+            <a:r>
+              <a:rPr lang="fr-FR" dirty="0" err="1" smtClean="0"/>
+              <a:t>Crimzon</a:t>
+            </a:r>
+            <a:r>
+              <a:rPr lang="fr-FR" dirty="0" smtClean="0"/>
+              <a:t> </a:t>
+            </a:r>
+            <a:r>
+              <a:rPr lang="fr-FR" dirty="0" err="1" smtClean="0"/>
+              <a:t>Clover</a:t>
+            </a:r>
+            <a:r>
+              <a:rPr lang="fr-FR" dirty="0" smtClean="0"/>
+              <a:t>, </a:t>
+            </a:r>
+            <a:r>
+              <a:rPr lang="fr-FR" dirty="0" smtClean="0"/>
+              <a:t> </a:t>
+            </a:r>
+            <a:r>
+              <a:rPr lang="fr-FR" dirty="0" err="1" smtClean="0"/>
+              <a:t>Geometry</a:t>
+            </a:r>
+            <a:r>
+              <a:rPr lang="fr-FR" dirty="0" smtClean="0"/>
+              <a:t> </a:t>
+            </a:r>
+            <a:r>
+              <a:rPr lang="fr-FR" dirty="0" err="1" smtClean="0"/>
+              <a:t>wars</a:t>
+            </a:r>
+            <a:r>
+              <a:rPr lang="fr-FR" dirty="0" smtClean="0"/>
+              <a:t> (Back </a:t>
+            </a:r>
+            <a:r>
+              <a:rPr lang="fr-FR" dirty="0" err="1" smtClean="0"/>
+              <a:t>from</a:t>
+            </a:r>
+            <a:r>
+              <a:rPr lang="fr-FR" dirty="0" smtClean="0"/>
+              <a:t> the future)</a:t>
+            </a:r>
+            <a:endParaRPr lang="fr-FR" dirty="0"/>
+          </a:p>
+        </p:txBody>
+      </p:sp>
+      <p:sp>
+        <p:nvSpPr>
+          <p:cNvPr id="3" name="Espace réservé de la date 2"/>
           <p:cNvSpPr>
             <a:spLocks noGrp="1"/>
           </p:cNvSpPr>
@@ -5606,7 +6334,7 @@
       </p:sp>
       <p:sp>
         <p:nvSpPr>
-          <p:cNvPr id="5" name="Espace réservé du pied de page 4"/>
+          <p:cNvPr id="6" name="Espace réservé du pied de page 5"/>
           <p:cNvSpPr>
             <a:spLocks noGrp="1"/>
           </p:cNvSpPr>
@@ -5629,7 +6357,7 @@
       </p:sp>
       <p:sp>
         <p:nvSpPr>
-          <p:cNvPr id="6" name="Espace réservé du numéro de diapositive 5"/>
+          <p:cNvPr id="7" name="Espace réservé du numéro de diapositive 6"/>
           <p:cNvSpPr>
             <a:spLocks noGrp="1"/>
           </p:cNvSpPr>
@@ -5646,6 +6374,277 @@
               <a:rPr lang="fr-FR" smtClean="0"/>
               <a:pPr/>
               <a:t>5</a:t>
+            </a:fld>
+            <a:endParaRPr lang="fr-FR" dirty="0"/>
+          </a:p>
+        </p:txBody>
+      </p:sp>
+    </p:spTree>
+  </p:cSld>
+  <p:clrMapOvr>
+    <a:masterClrMapping/>
+  </p:clrMapOvr>
+  <p:timing>
+    <p:tnLst>
+      <p:par>
+        <p:cTn id="1" dur="indefinite" restart="never" nodeType="tmRoot"/>
+      </p:par>
+    </p:tnLst>
+  </p:timing>
+</p:sld>
+</file>
+
+<file path=ppt/slides/slide6.xml><?xml version="1.0" encoding="utf-8"?>
+<p:sld xmlns:a="http://schemas.openxmlformats.org/drawingml/2006/main" xmlns:r="http://schemas.openxmlformats.org/officeDocument/2006/relationships" xmlns:p="http://schemas.openxmlformats.org/presentationml/2006/main">
+  <p:cSld>
+    <p:spTree>
+      <p:nvGrpSpPr>
+        <p:cNvPr id="1" name=""/>
+        <p:cNvGrpSpPr/>
+        <p:nvPr/>
+      </p:nvGrpSpPr>
+      <p:grpSpPr>
+        <a:xfrm>
+          <a:off x="0" y="0"/>
+          <a:ext cx="0" cy="0"/>
+          <a:chOff x="0" y="0"/>
+          <a:chExt cx="0" cy="0"/>
+        </a:xfrm>
+      </p:grpSpPr>
+      <p:sp>
+        <p:nvSpPr>
+          <p:cNvPr id="2" name="Titre 1"/>
+          <p:cNvSpPr>
+            <a:spLocks noGrp="1"/>
+          </p:cNvSpPr>
+          <p:nvPr>
+            <p:ph type="title"/>
+          </p:nvPr>
+        </p:nvSpPr>
+        <p:spPr/>
+        <p:txBody>
+          <a:bodyPr/>
+          <a:lstStyle/>
+          <a:p>
+            <a:r>
+              <a:rPr lang="fr-FR" dirty="0" err="1" smtClean="0"/>
+              <a:t>Simpsons</a:t>
+            </a:r>
+            <a:endParaRPr lang="fr-FR" dirty="0"/>
+          </a:p>
+        </p:txBody>
+      </p:sp>
+      <p:sp>
+        <p:nvSpPr>
+          <p:cNvPr id="4" name="Espace réservé du texte 3"/>
+          <p:cNvSpPr>
+            <a:spLocks noGrp="1"/>
+          </p:cNvSpPr>
+          <p:nvPr>
+            <p:ph type="body" sz="half" idx="2"/>
+          </p:nvPr>
+        </p:nvSpPr>
+        <p:spPr/>
+        <p:txBody>
+          <a:bodyPr/>
+          <a:lstStyle/>
+          <a:p>
+            <a:r>
+              <a:rPr lang="fr-FR" dirty="0" smtClean="0"/>
+              <a:t>918 This </a:t>
+            </a:r>
+            <a:r>
+              <a:rPr lang="fr-FR" dirty="0" err="1" smtClean="0"/>
+              <a:t>little</a:t>
+            </a:r>
+            <a:r>
+              <a:rPr lang="fr-FR" dirty="0" smtClean="0"/>
+              <a:t> </a:t>
+            </a:r>
+            <a:r>
+              <a:rPr lang="fr-FR" dirty="0" err="1" smtClean="0"/>
+              <a:t>wiggy</a:t>
+            </a:r>
+            <a:r>
+              <a:rPr lang="fr-FR" dirty="0" smtClean="0"/>
+              <a:t> – 3:40</a:t>
+            </a:r>
+            <a:endParaRPr lang="fr-FR" dirty="0"/>
+          </a:p>
+        </p:txBody>
+      </p:sp>
+      <p:sp>
+        <p:nvSpPr>
+          <p:cNvPr id="5" name="Espace réservé de la date 4"/>
+          <p:cNvSpPr>
+            <a:spLocks noGrp="1"/>
+          </p:cNvSpPr>
+          <p:nvPr>
+            <p:ph type="dt" sz="half" idx="10"/>
+          </p:nvPr>
+        </p:nvSpPr>
+        <p:spPr/>
+        <p:txBody>
+          <a:bodyPr/>
+          <a:lstStyle/>
+          <a:p>
+            <a:r>
+              <a:rPr lang="fr-FR" smtClean="0"/>
+              <a:t>Jeudi 29 Novembre 2012</a:t>
+            </a:r>
+            <a:endParaRPr lang="fr-FR" dirty="0"/>
+          </a:p>
+        </p:txBody>
+      </p:sp>
+      <p:sp>
+        <p:nvSpPr>
+          <p:cNvPr id="6" name="Espace réservé du pied de page 5"/>
+          <p:cNvSpPr>
+            <a:spLocks noGrp="1"/>
+          </p:cNvSpPr>
+          <p:nvPr>
+            <p:ph type="ftr" sz="quarter" idx="11"/>
+          </p:nvPr>
+        </p:nvSpPr>
+        <p:spPr/>
+        <p:txBody>
+          <a:bodyPr/>
+          <a:lstStyle/>
+          <a:p>
+            <a:r>
+              <a:rPr lang="fr-FR" smtClean="0"/>
+              <a:t>Paul Fiat</a:t>
+            </a:r>
+            <a:endParaRPr lang="fr-FR" dirty="0"/>
+          </a:p>
+        </p:txBody>
+      </p:sp>
+      <p:sp>
+        <p:nvSpPr>
+          <p:cNvPr id="7" name="Espace réservé du numéro de diapositive 6"/>
+          <p:cNvSpPr>
+            <a:spLocks noGrp="1"/>
+          </p:cNvSpPr>
+          <p:nvPr>
+            <p:ph type="sldNum" sz="quarter" idx="12"/>
+          </p:nvPr>
+        </p:nvSpPr>
+        <p:spPr/>
+        <p:txBody>
+          <a:bodyPr/>
+          <a:lstStyle/>
+          <a:p>
+            <a:fld id="{9DDF0C85-99BB-428E-8D90-A207FA2E644C}" type="slidenum">
+              <a:rPr lang="fr-FR" smtClean="0"/>
+              <a:pPr/>
+              <a:t>6</a:t>
+            </a:fld>
+            <a:endParaRPr lang="fr-FR" dirty="0"/>
+          </a:p>
+        </p:txBody>
+      </p:sp>
+    </p:spTree>
+    <p:extLst>
+      <p:ext uri="{BB962C8B-B14F-4D97-AF65-F5344CB8AC3E}">
+        <p14:creationId xmlns="" xmlns:p14="http://schemas.microsoft.com/office/powerpoint/2010/main" val="3561826763"/>
+      </p:ext>
+    </p:extLst>
+  </p:cSld>
+  <p:clrMapOvr>
+    <a:masterClrMapping/>
+  </p:clrMapOvr>
+  <p:timing>
+    <p:tnLst>
+      <p:par>
+        <p:cTn id="1" dur="indefinite" restart="never" nodeType="tmRoot"/>
+      </p:par>
+    </p:tnLst>
+  </p:timing>
+</p:sld>
+</file>
+
+<file path=ppt/slides/slide7.xml><?xml version="1.0" encoding="utf-8"?>
+<p:sld xmlns:a="http://schemas.openxmlformats.org/drawingml/2006/main" xmlns:r="http://schemas.openxmlformats.org/officeDocument/2006/relationships" xmlns:p="http://schemas.openxmlformats.org/presentationml/2006/main">
+  <p:cSld>
+    <p:spTree>
+      <p:nvGrpSpPr>
+        <p:cNvPr id="1" name=""/>
+        <p:cNvGrpSpPr/>
+        <p:nvPr/>
+      </p:nvGrpSpPr>
+      <p:grpSpPr>
+        <a:xfrm>
+          <a:off x="0" y="0"/>
+          <a:ext cx="0" cy="0"/>
+          <a:chOff x="0" y="0"/>
+          <a:chExt cx="0" cy="0"/>
+        </a:xfrm>
+      </p:grpSpPr>
+      <p:sp>
+        <p:nvSpPr>
+          <p:cNvPr id="4" name="Espace réservé de la date 3"/>
+          <p:cNvSpPr>
+            <a:spLocks noGrp="1"/>
+          </p:cNvSpPr>
+          <p:nvPr>
+            <p:ph type="dt" sz="half" idx="10"/>
+          </p:nvPr>
+        </p:nvSpPr>
+        <p:spPr/>
+        <p:txBody>
+          <a:bodyPr/>
+          <a:lstStyle/>
+          <a:p>
+            <a:r>
+              <a:rPr lang="fr-FR" smtClean="0"/>
+              <a:t>Jeudi 29 Novembre 2012</a:t>
+            </a:r>
+            <a:endParaRPr lang="fr-FR" dirty="0"/>
+          </a:p>
+        </p:txBody>
+      </p:sp>
+      <p:sp>
+        <p:nvSpPr>
+          <p:cNvPr id="5" name="Espace réservé du pied de page 4"/>
+          <p:cNvSpPr>
+            <a:spLocks noGrp="1"/>
+          </p:cNvSpPr>
+          <p:nvPr>
+            <p:ph type="ftr" sz="quarter" idx="11"/>
+          </p:nvPr>
+        </p:nvSpPr>
+        <p:spPr/>
+        <p:txBody>
+          <a:bodyPr/>
+          <a:lstStyle/>
+          <a:p>
+            <a:r>
+              <a:rPr lang="fr-FR" smtClean="0"/>
+              <a:t>Paul Fiat</a:t>
+            </a:r>
+            <a:endParaRPr lang="fr-FR" dirty="0"/>
+          </a:p>
+        </p:txBody>
+      </p:sp>
+      <p:sp>
+        <p:nvSpPr>
+          <p:cNvPr id="6" name="Espace réservé du numéro de diapositive 5"/>
+          <p:cNvSpPr>
+            <a:spLocks noGrp="1"/>
+          </p:cNvSpPr>
+          <p:nvPr>
+            <p:ph type="sldNum" sz="quarter" idx="12"/>
+          </p:nvPr>
+        </p:nvSpPr>
+        <p:spPr/>
+        <p:txBody>
+          <a:bodyPr/>
+          <a:lstStyle/>
+          <a:p>
+            <a:fld id="{9DDF0C85-99BB-428E-8D90-A207FA2E644C}" type="slidenum">
+              <a:rPr lang="fr-FR" smtClean="0"/>
+              <a:pPr/>
+              <a:t>7</a:t>
             </a:fld>
             <a:endParaRPr lang="fr-FR" dirty="0"/>
           </a:p>
@@ -6109,7 +7108,7 @@
 </p:sld>
 </file>
 
-<file path=ppt/slides/slide6.xml><?xml version="1.0" encoding="utf-8"?>
+<file path=ppt/slides/slide8.xml><?xml version="1.0" encoding="utf-8"?>
 <p:sld xmlns:a="http://schemas.openxmlformats.org/drawingml/2006/main" xmlns:r="http://schemas.openxmlformats.org/officeDocument/2006/relationships" xmlns:p="http://schemas.openxmlformats.org/presentationml/2006/main">
   <p:cSld>
     <p:spTree>
@@ -6190,7 +7189,7 @@
             <a:fld id="{9DDF0C85-99BB-428E-8D90-A207FA2E644C}" type="slidenum">
               <a:rPr lang="fr-FR" smtClean="0"/>
               <a:pPr/>
-              <a:t>6</a:t>
+              <a:t>8</a:t>
             </a:fld>
             <a:endParaRPr lang="fr-FR" dirty="0"/>
           </a:p>
@@ -6297,7 +7296,7 @@
 </p:sld>
 </file>
 
-<file path=ppt/slides/slide7.xml><?xml version="1.0" encoding="utf-8"?>
+<file path=ppt/slides/slide9.xml><?xml version="1.0" encoding="utf-8"?>
 <p:sld xmlns:a="http://schemas.openxmlformats.org/drawingml/2006/main" xmlns:r="http://schemas.openxmlformats.org/officeDocument/2006/relationships" xmlns:p="http://schemas.openxmlformats.org/presentationml/2006/main">
   <p:cSld>
     <p:spTree>
@@ -6378,7 +7377,7 @@
             <a:fld id="{9DDF0C85-99BB-428E-8D90-A207FA2E644C}" type="slidenum">
               <a:rPr lang="fr-FR" smtClean="0"/>
               <a:pPr/>
-              <a:t>7</a:t>
+              <a:t>9</a:t>
             </a:fld>
             <a:endParaRPr lang="fr-FR" dirty="0"/>
           </a:p>
@@ -6882,595 +7881,10 @@
 </p:sld>
 </file>
 
-<file path=ppt/slides/slide8.xml><?xml version="1.0" encoding="utf-8"?>
-<p:sld xmlns:a="http://schemas.openxmlformats.org/drawingml/2006/main" xmlns:r="http://schemas.openxmlformats.org/officeDocument/2006/relationships" xmlns:p="http://schemas.openxmlformats.org/presentationml/2006/main">
-  <p:cSld>
-    <p:spTree>
-      <p:nvGrpSpPr>
-        <p:cNvPr id="1" name=""/>
-        <p:cNvGrpSpPr/>
-        <p:nvPr/>
-      </p:nvGrpSpPr>
-      <p:grpSpPr>
-        <a:xfrm>
-          <a:off x="0" y="0"/>
-          <a:ext cx="0" cy="0"/>
-          <a:chOff x="0" y="0"/>
-          <a:chExt cx="0" cy="0"/>
-        </a:xfrm>
-      </p:grpSpPr>
-      <p:sp>
-        <p:nvSpPr>
-          <p:cNvPr id="2" name="Title 1"/>
-          <p:cNvSpPr>
-            <a:spLocks noGrp="1"/>
-          </p:cNvSpPr>
-          <p:nvPr>
-            <p:ph type="title"/>
-          </p:nvPr>
-        </p:nvSpPr>
-        <p:spPr/>
-        <p:txBody>
-          <a:bodyPr/>
-          <a:lstStyle/>
-          <a:p>
-            <a:r>
-              <a:rPr lang="fr-FR" dirty="0" smtClean="0"/>
-              <a:t>Mockup</a:t>
-            </a:r>
-            <a:endParaRPr lang="fr-FR" dirty="0"/>
-          </a:p>
-        </p:txBody>
-      </p:sp>
-      <p:pic>
-        <p:nvPicPr>
-          <p:cNvPr id="7" name="Picture Placeholder 6" descr="mockup_legend.png"/>
-          <p:cNvPicPr>
-            <a:picLocks noGrp="1" noChangeAspect="1"/>
-          </p:cNvPicPr>
-          <p:nvPr>
-            <p:ph type="pic" idx="1"/>
-          </p:nvPr>
-        </p:nvPicPr>
-        <p:blipFill>
-          <a:blip r:embed="rId2"/>
-          <a:srcRect t="130" b="130"/>
-          <a:stretch>
-            <a:fillRect/>
-          </a:stretch>
-        </p:blipFill>
-        <p:spPr/>
-      </p:pic>
-      <p:sp>
-        <p:nvSpPr>
-          <p:cNvPr id="4" name="Text Placeholder 3"/>
-          <p:cNvSpPr>
-            <a:spLocks noGrp="1"/>
-          </p:cNvSpPr>
-          <p:nvPr>
-            <p:ph type="body" sz="half" idx="2"/>
-          </p:nvPr>
-        </p:nvSpPr>
-        <p:spPr/>
-        <p:txBody>
-          <a:bodyPr/>
-          <a:lstStyle/>
-          <a:p>
-            <a:r>
-              <a:rPr lang="fr-FR" dirty="0" smtClean="0"/>
-              <a:t>Ecran type du jeu.</a:t>
-            </a:r>
-            <a:endParaRPr lang="fr-FR" dirty="0"/>
-          </a:p>
-        </p:txBody>
-      </p:sp>
-      <p:sp>
-        <p:nvSpPr>
-          <p:cNvPr id="3" name="Espace réservé de la date 2"/>
-          <p:cNvSpPr>
-            <a:spLocks noGrp="1"/>
-          </p:cNvSpPr>
-          <p:nvPr>
-            <p:ph type="dt" sz="half" idx="10"/>
-          </p:nvPr>
-        </p:nvSpPr>
-        <p:spPr/>
-        <p:txBody>
-          <a:bodyPr/>
-          <a:lstStyle/>
-          <a:p>
-            <a:r>
-              <a:rPr lang="fr-FR" smtClean="0"/>
-              <a:t>Jeudi 29 Novembre 2012</a:t>
-            </a:r>
-            <a:endParaRPr lang="fr-FR" dirty="0"/>
-          </a:p>
-        </p:txBody>
-      </p:sp>
-      <p:sp>
-        <p:nvSpPr>
-          <p:cNvPr id="5" name="Espace réservé du pied de page 4"/>
-          <p:cNvSpPr>
-            <a:spLocks noGrp="1"/>
-          </p:cNvSpPr>
-          <p:nvPr>
-            <p:ph type="ftr" sz="quarter" idx="11"/>
-          </p:nvPr>
-        </p:nvSpPr>
-        <p:spPr/>
-        <p:txBody>
-          <a:bodyPr/>
-          <a:lstStyle/>
-          <a:p>
-            <a:r>
-              <a:rPr lang="fr-FR" smtClean="0"/>
-              <a:t>Paul Fiat</a:t>
-            </a:r>
-            <a:endParaRPr lang="fr-FR" dirty="0"/>
-          </a:p>
-        </p:txBody>
-      </p:sp>
-      <p:sp>
-        <p:nvSpPr>
-          <p:cNvPr id="6" name="Espace réservé du numéro de diapositive 5"/>
-          <p:cNvSpPr>
-            <a:spLocks noGrp="1"/>
-          </p:cNvSpPr>
-          <p:nvPr>
-            <p:ph type="sldNum" sz="quarter" idx="12"/>
-          </p:nvPr>
-        </p:nvSpPr>
-        <p:spPr/>
-        <p:txBody>
-          <a:bodyPr/>
-          <a:lstStyle/>
-          <a:p>
-            <a:fld id="{9DDF0C85-99BB-428E-8D90-A207FA2E644C}" type="slidenum">
-              <a:rPr lang="fr-FR" smtClean="0"/>
-              <a:pPr/>
-              <a:t>8</a:t>
-            </a:fld>
-            <a:endParaRPr lang="fr-FR" dirty="0"/>
-          </a:p>
-        </p:txBody>
-      </p:sp>
-    </p:spTree>
-  </p:cSld>
-  <p:clrMapOvr>
-    <a:masterClrMapping/>
-  </p:clrMapOvr>
-  <p:timing>
-    <p:tnLst>
-      <p:par>
-        <p:cTn id="1" dur="indefinite" restart="never" nodeType="tmRoot"/>
-      </p:par>
-    </p:tnLst>
-  </p:timing>
-</p:sld>
-</file>
-
-<file path=ppt/slides/slide9.xml><?xml version="1.0" encoding="utf-8"?>
-<p:sld xmlns:a="http://schemas.openxmlformats.org/drawingml/2006/main" xmlns:r="http://schemas.openxmlformats.org/officeDocument/2006/relationships" xmlns:p="http://schemas.openxmlformats.org/presentationml/2006/main">
-  <p:cSld>
-    <p:spTree>
-      <p:nvGrpSpPr>
-        <p:cNvPr id="1" name=""/>
-        <p:cNvGrpSpPr/>
-        <p:nvPr/>
-      </p:nvGrpSpPr>
-      <p:grpSpPr>
-        <a:xfrm>
-          <a:off x="0" y="0"/>
-          <a:ext cx="0" cy="0"/>
-          <a:chOff x="0" y="0"/>
-          <a:chExt cx="0" cy="0"/>
-        </a:xfrm>
-      </p:grpSpPr>
-      <p:sp>
-        <p:nvSpPr>
-          <p:cNvPr id="4" name="Espace réservé de la date 3"/>
-          <p:cNvSpPr>
-            <a:spLocks noGrp="1"/>
-          </p:cNvSpPr>
-          <p:nvPr>
-            <p:ph type="dt" sz="half" idx="10"/>
-          </p:nvPr>
-        </p:nvSpPr>
-        <p:spPr/>
-        <p:txBody>
-          <a:bodyPr/>
-          <a:lstStyle/>
-          <a:p>
-            <a:r>
-              <a:rPr lang="fr-FR" smtClean="0"/>
-              <a:t>Jeudi 29 Novembre 2012</a:t>
-            </a:r>
-            <a:endParaRPr lang="fr-FR" dirty="0"/>
-          </a:p>
-        </p:txBody>
-      </p:sp>
-      <p:sp>
-        <p:nvSpPr>
-          <p:cNvPr id="5" name="Espace réservé du pied de page 4"/>
-          <p:cNvSpPr>
-            <a:spLocks noGrp="1"/>
-          </p:cNvSpPr>
-          <p:nvPr>
-            <p:ph type="ftr" sz="quarter" idx="11"/>
-          </p:nvPr>
-        </p:nvSpPr>
-        <p:spPr/>
-        <p:txBody>
-          <a:bodyPr/>
-          <a:lstStyle/>
-          <a:p>
-            <a:r>
-              <a:rPr lang="fr-FR" smtClean="0"/>
-              <a:t>Paul Fiat</a:t>
-            </a:r>
-            <a:endParaRPr lang="fr-FR" dirty="0"/>
-          </a:p>
-        </p:txBody>
-      </p:sp>
-      <p:sp>
-        <p:nvSpPr>
-          <p:cNvPr id="6" name="Espace réservé du numéro de diapositive 5"/>
-          <p:cNvSpPr>
-            <a:spLocks noGrp="1"/>
-          </p:cNvSpPr>
-          <p:nvPr>
-            <p:ph type="sldNum" sz="quarter" idx="12"/>
-          </p:nvPr>
-        </p:nvSpPr>
-        <p:spPr/>
-        <p:txBody>
-          <a:bodyPr/>
-          <a:lstStyle/>
-          <a:p>
-            <a:fld id="{9DDF0C85-99BB-428E-8D90-A207FA2E644C}" type="slidenum">
-              <a:rPr lang="fr-FR" smtClean="0"/>
-              <a:pPr/>
-              <a:t>9</a:t>
-            </a:fld>
-            <a:endParaRPr lang="fr-FR" dirty="0"/>
-          </a:p>
-        </p:txBody>
-      </p:sp>
-      <p:sp>
-        <p:nvSpPr>
-          <p:cNvPr id="2" name="Title 1"/>
-          <p:cNvSpPr>
-            <a:spLocks noGrp="1"/>
-          </p:cNvSpPr>
-          <p:nvPr>
-            <p:ph type="title"/>
-          </p:nvPr>
-        </p:nvSpPr>
-        <p:spPr/>
-        <p:txBody>
-          <a:bodyPr/>
-          <a:lstStyle/>
-          <a:p>
-            <a:r>
-              <a:rPr lang="fr-FR" dirty="0" smtClean="0"/>
-              <a:t>Ambiance</a:t>
-            </a:r>
-            <a:endParaRPr lang="fr-FR" dirty="0"/>
-          </a:p>
-        </p:txBody>
-      </p:sp>
-      <p:sp>
-        <p:nvSpPr>
-          <p:cNvPr id="3" name="Text Placeholder 2"/>
-          <p:cNvSpPr>
-            <a:spLocks noGrp="1"/>
-          </p:cNvSpPr>
-          <p:nvPr>
-            <p:ph type="body" idx="1"/>
-          </p:nvPr>
-        </p:nvSpPr>
-        <p:spPr>
-          <a:xfrm>
-            <a:off x="381000" y="1633536"/>
-            <a:ext cx="8477280" cy="4867298"/>
-          </a:xfrm>
-        </p:spPr>
-        <p:txBody>
-          <a:bodyPr/>
-          <a:lstStyle/>
-          <a:p>
-            <a:endParaRPr lang="fr-FR" dirty="0" smtClean="0"/>
-          </a:p>
-          <a:p>
-            <a:endParaRPr lang="fr-FR" dirty="0" smtClean="0"/>
-          </a:p>
-          <a:p>
-            <a:r>
-              <a:rPr lang="fr-FR" u="sng" dirty="0" smtClean="0"/>
-              <a:t>Dynamique</a:t>
-            </a:r>
-            <a:r>
-              <a:rPr lang="fr-FR" dirty="0" smtClean="0"/>
-              <a:t> :</a:t>
-            </a:r>
-          </a:p>
-          <a:p>
-            <a:r>
-              <a:rPr lang="fr-FR" dirty="0" smtClean="0"/>
-              <a:t>L’apparition des ennemis de tous les côtés de l’écran apporte de la surprise et du stress, remettant constamment le joueur sur ses gardes.</a:t>
-            </a:r>
-          </a:p>
-          <a:p>
-            <a:endParaRPr lang="fr-FR" dirty="0" smtClean="0"/>
-          </a:p>
-          <a:p>
-            <a:r>
-              <a:rPr lang="fr-FR" u="sng" dirty="0" smtClean="0"/>
-              <a:t>Etriqué</a:t>
-            </a:r>
-            <a:r>
-              <a:rPr lang="fr-FR" dirty="0" smtClean="0"/>
-              <a:t> :</a:t>
-            </a:r>
-          </a:p>
-          <a:p>
-            <a:r>
-              <a:rPr lang="fr-FR" dirty="0" smtClean="0"/>
-              <a:t>L’échelle des cartes provoque un sentiment d’étroitesse et d’une faible marge d’erreur.</a:t>
-            </a:r>
-          </a:p>
-        </p:txBody>
-      </p:sp>
-    </p:spTree>
-  </p:cSld>
-  <p:clrMapOvr>
-    <a:masterClrMapping/>
-  </p:clrMapOvr>
-  <p:timing>
-    <p:tnLst>
-      <p:par>
-        <p:cTn id="1" dur="indefinite" restart="never" nodeType="tmRoot">
-          <p:childTnLst>
-            <p:seq concurrent="1" nextAc="seek">
-              <p:cTn id="2" dur="indefinite" nodeType="mainSeq">
-                <p:childTnLst>
-                  <p:par>
-                    <p:cTn id="3" fill="hold">
-                      <p:stCondLst>
-                        <p:cond delay="indefinite"/>
-                      </p:stCondLst>
-                      <p:childTnLst>
-                        <p:par>
-                          <p:cTn id="4" fill="hold">
-                            <p:stCondLst>
-                              <p:cond delay="0"/>
-                            </p:stCondLst>
-                            <p:childTnLst>
-                              <p:par>
-                                <p:cTn id="5" presetID="22" presetClass="entr" presetSubtype="4" fill="hold" nodeType="clickEffect">
-                                  <p:stCondLst>
-                                    <p:cond delay="0"/>
-                                  </p:stCondLst>
-                                  <p:childTnLst>
-                                    <p:set>
-                                      <p:cBhvr>
-                                        <p:cTn id="6" dur="1" fill="hold">
-                                          <p:stCondLst>
-                                            <p:cond delay="0"/>
-                                          </p:stCondLst>
-                                        </p:cTn>
-                                        <p:tgtEl>
-                                          <p:spTgt spid="3">
-                                            <p:txEl>
-                                              <p:pRg st="2" end="2"/>
-                                            </p:txEl>
-                                          </p:spTgt>
-                                        </p:tgtEl>
-                                        <p:attrNameLst>
-                                          <p:attrName>style.visibility</p:attrName>
-                                        </p:attrNameLst>
-                                      </p:cBhvr>
-                                      <p:to>
-                                        <p:strVal val="visible"/>
-                                      </p:to>
-                                    </p:set>
-                                    <p:animEffect transition="in" filter="wipe(down)">
-                                      <p:cBhvr>
-                                        <p:cTn id="7" dur="500"/>
-                                        <p:tgtEl>
-                                          <p:spTgt spid="3">
-                                            <p:txEl>
-                                              <p:pRg st="2" end="2"/>
-                                            </p:txEl>
-                                          </p:spTgt>
-                                        </p:tgtEl>
-                                      </p:cBhvr>
-                                    </p:animEffect>
-                                  </p:childTnLst>
-                                </p:cTn>
-                              </p:par>
-                              <p:par>
-                                <p:cTn id="8" presetID="22" presetClass="entr" presetSubtype="4" fill="hold" nodeType="withEffect">
-                                  <p:stCondLst>
-                                    <p:cond delay="0"/>
-                                  </p:stCondLst>
-                                  <p:childTnLst>
-                                    <p:set>
-                                      <p:cBhvr>
-                                        <p:cTn id="9" dur="1" fill="hold">
-                                          <p:stCondLst>
-                                            <p:cond delay="0"/>
-                                          </p:stCondLst>
-                                        </p:cTn>
-                                        <p:tgtEl>
-                                          <p:spTgt spid="3">
-                                            <p:txEl>
-                                              <p:pRg st="3" end="3"/>
-                                            </p:txEl>
-                                          </p:spTgt>
-                                        </p:tgtEl>
-                                        <p:attrNameLst>
-                                          <p:attrName>style.visibility</p:attrName>
-                                        </p:attrNameLst>
-                                      </p:cBhvr>
-                                      <p:to>
-                                        <p:strVal val="visible"/>
-                                      </p:to>
-                                    </p:set>
-                                    <p:animEffect transition="in" filter="wipe(down)">
-                                      <p:cBhvr>
-                                        <p:cTn id="10" dur="500"/>
-                                        <p:tgtEl>
-                                          <p:spTgt spid="3">
-                                            <p:txEl>
-                                              <p:pRg st="3" end="3"/>
-                                            </p:txEl>
-                                          </p:spTgt>
-                                        </p:tgtEl>
-                                      </p:cBhvr>
-                                    </p:animEffect>
-                                  </p:childTnLst>
-                                </p:cTn>
-                              </p:par>
-                            </p:childTnLst>
-                          </p:cTn>
-                        </p:par>
-                      </p:childTnLst>
-                    </p:cTn>
-                  </p:par>
-                  <p:par>
-                    <p:cTn id="11" fill="hold">
-                      <p:stCondLst>
-                        <p:cond delay="indefinite"/>
-                      </p:stCondLst>
-                      <p:childTnLst>
-                        <p:par>
-                          <p:cTn id="12" fill="hold">
-                            <p:stCondLst>
-                              <p:cond delay="0"/>
-                            </p:stCondLst>
-                            <p:childTnLst>
-                              <p:par>
-                                <p:cTn id="13" presetID="22" presetClass="entr" presetSubtype="4" fill="hold" nodeType="clickEffect">
-                                  <p:stCondLst>
-                                    <p:cond delay="0"/>
-                                  </p:stCondLst>
-                                  <p:childTnLst>
-                                    <p:set>
-                                      <p:cBhvr>
-                                        <p:cTn id="14" dur="1" fill="hold">
-                                          <p:stCondLst>
-                                            <p:cond delay="0"/>
-                                          </p:stCondLst>
-                                        </p:cTn>
-                                        <p:tgtEl>
-                                          <p:spTgt spid="3">
-                                            <p:txEl>
-                                              <p:pRg st="5" end="5"/>
-                                            </p:txEl>
-                                          </p:spTgt>
-                                        </p:tgtEl>
-                                        <p:attrNameLst>
-                                          <p:attrName>style.visibility</p:attrName>
-                                        </p:attrNameLst>
-                                      </p:cBhvr>
-                                      <p:to>
-                                        <p:strVal val="visible"/>
-                                      </p:to>
-                                    </p:set>
-                                    <p:animEffect transition="in" filter="wipe(down)">
-                                      <p:cBhvr>
-                                        <p:cTn id="15" dur="500"/>
-                                        <p:tgtEl>
-                                          <p:spTgt spid="3">
-                                            <p:txEl>
-                                              <p:pRg st="5" end="5"/>
-                                            </p:txEl>
-                                          </p:spTgt>
-                                        </p:tgtEl>
-                                      </p:cBhvr>
-                                    </p:animEffect>
-                                  </p:childTnLst>
-                                </p:cTn>
-                              </p:par>
-                              <p:par>
-                                <p:cTn id="16" presetID="22" presetClass="entr" presetSubtype="4" fill="hold" nodeType="withEffect">
-                                  <p:stCondLst>
-                                    <p:cond delay="0"/>
-                                  </p:stCondLst>
-                                  <p:childTnLst>
-                                    <p:set>
-                                      <p:cBhvr>
-                                        <p:cTn id="17" dur="1" fill="hold">
-                                          <p:stCondLst>
-                                            <p:cond delay="0"/>
-                                          </p:stCondLst>
-                                        </p:cTn>
-                                        <p:tgtEl>
-                                          <p:spTgt spid="3">
-                                            <p:txEl>
-                                              <p:pRg st="6" end="6"/>
-                                            </p:txEl>
-                                          </p:spTgt>
-                                        </p:tgtEl>
-                                        <p:attrNameLst>
-                                          <p:attrName>style.visibility</p:attrName>
-                                        </p:attrNameLst>
-                                      </p:cBhvr>
-                                      <p:to>
-                                        <p:strVal val="visible"/>
-                                      </p:to>
-                                    </p:set>
-                                    <p:animEffect transition="in" filter="wipe(down)">
-                                      <p:cBhvr>
-                                        <p:cTn id="18" dur="500"/>
-                                        <p:tgtEl>
-                                          <p:spTgt spid="3">
-                                            <p:txEl>
-                                              <p:pRg st="6" end="6"/>
-                                            </p:txEl>
-                                          </p:spTgt>
-                                        </p:tgtEl>
-                                      </p:cBhvr>
-                                    </p:animEffect>
-                                  </p:childTnLst>
-                                </p:cTn>
-                              </p:par>
-                            </p:childTnLst>
-                          </p:cTn>
-                        </p:par>
-                      </p:childTnLst>
-                    </p:cTn>
-                  </p:par>
-                </p:childTnLst>
-              </p:cTn>
-              <p:prevCondLst>
-                <p:cond evt="onPrev" delay="0">
-                  <p:tgtEl>
-                    <p:sldTgt/>
-                  </p:tgtEl>
-                </p:cond>
-              </p:prevCondLst>
-              <p:nextCondLst>
-                <p:cond evt="onNext" delay="0">
-                  <p:tgtEl>
-                    <p:sldTgt/>
-                  </p:tgtEl>
-                </p:cond>
-              </p:nextCondLst>
-            </p:seq>
-          </p:childTnLst>
-        </p:cTn>
-      </p:par>
-    </p:tnLst>
-  </p:timing>
-</p:sld>
-</file>
-
 <file path=ppt/theme/theme1.xml><?xml version="1.0" encoding="utf-8"?>
 <a:theme xmlns:a="http://schemas.openxmlformats.org/drawingml/2006/main" name="Verve">
   <a:themeElements>
-    <a:clrScheme name="NewsPrint">
+    <a:clrScheme name="Verve">
       <a:dk1>
         <a:sysClr val="windowText" lastClr="000000"/>
       </a:dk1>
@@ -7478,34 +7892,34 @@
         <a:sysClr val="window" lastClr="FFFFFF"/>
       </a:lt1>
       <a:dk2>
-        <a:srgbClr val="303030"/>
+        <a:srgbClr val="666666"/>
       </a:dk2>
       <a:lt2>
-        <a:srgbClr val="DEDEE0"/>
+        <a:srgbClr val="D2D2D2"/>
       </a:lt2>
       <a:accent1>
-        <a:srgbClr val="AD0101"/>
+        <a:srgbClr val="FF388C"/>
       </a:accent1>
       <a:accent2>
-        <a:srgbClr val="726056"/>
+        <a:srgbClr val="E40059"/>
       </a:accent2>
       <a:accent3>
-        <a:srgbClr val="AC956E"/>
+        <a:srgbClr val="9C007F"/>
       </a:accent3>
       <a:accent4>
-        <a:srgbClr val="808DA9"/>
+        <a:srgbClr val="68007F"/>
       </a:accent4>
       <a:accent5>
-        <a:srgbClr val="424E5B"/>
+        <a:srgbClr val="005BD3"/>
       </a:accent5>
       <a:accent6>
-        <a:srgbClr val="730E00"/>
+        <a:srgbClr val="00349E"/>
       </a:accent6>
       <a:hlink>
-        <a:srgbClr val="D26900"/>
+        <a:srgbClr val="17BBFD"/>
       </a:hlink>
       <a:folHlink>
-        <a:srgbClr val="D89243"/>
+        <a:srgbClr val="FF79C2"/>
       </a:folHlink>
     </a:clrScheme>
     <a:fontScheme name="Verve">

</xml_diff>

<commit_message>
Avancée sur la présentation, nettoyage des dossiers.
</commit_message>
<xml_diff>
--- a/GD/Présentation.pptx
+++ b/GD/Présentation.pptx
@@ -5,7 +5,7 @@
     <p:sldMasterId id="2147484032" r:id="rId1"/>
   </p:sldMasterIdLst>
   <p:notesMasterIdLst>
-    <p:notesMasterId r:id="rId15"/>
+    <p:notesMasterId r:id="rId13"/>
   </p:notesMasterIdLst>
   <p:sldIdLst>
     <p:sldId id="268" r:id="rId2"/>
@@ -13,14 +13,12 @@
     <p:sldId id="270" r:id="rId4"/>
     <p:sldId id="271" r:id="rId5"/>
     <p:sldId id="257" r:id="rId6"/>
-    <p:sldId id="269" r:id="rId7"/>
-    <p:sldId id="261" r:id="rId8"/>
+    <p:sldId id="261" r:id="rId7"/>
+    <p:sldId id="264" r:id="rId8"/>
     <p:sldId id="262" r:id="rId9"/>
-    <p:sldId id="264" r:id="rId10"/>
+    <p:sldId id="266" r:id="rId10"/>
     <p:sldId id="265" r:id="rId11"/>
-    <p:sldId id="263" r:id="rId12"/>
-    <p:sldId id="266" r:id="rId13"/>
-    <p:sldId id="267" r:id="rId14"/>
+    <p:sldId id="267" r:id="rId12"/>
   </p:sldIdLst>
   <p:sldSz cx="9144000" cy="6858000" type="screen4x3"/>
   <p:notesSz cx="6858000" cy="9144000"/>
@@ -4000,7 +3998,12 @@
             <p:ph type="ctrTitle"/>
           </p:nvPr>
         </p:nvSpPr>
-        <p:spPr/>
+        <p:spPr>
+          <a:xfrm>
+            <a:off x="357158" y="785794"/>
+            <a:ext cx="8062912" cy="1470025"/>
+          </a:xfrm>
+        </p:spPr>
         <p:txBody>
           <a:bodyPr>
             <a:normAutofit fontScale="90000"/>
@@ -4067,7 +4070,11 @@
             <a:pPr algn="ctr"/>
             <a:r>
               <a:rPr lang="fr-FR" dirty="0" smtClean="0"/>
-              <a:t>Paul Fiat – </a:t>
+              <a:t>Paul </a:t>
+            </a:r>
+            <a:r>
+              <a:rPr lang="fr-FR" dirty="0" smtClean="0"/>
+              <a:t>Fiat – </a:t>
             </a:r>
             <a:r>
               <a:rPr lang="fr-FR" dirty="0" smtClean="0"/>
@@ -4165,9 +4172,102 @@
           </a:p>
         </p:txBody>
       </p:sp>
+      <p:sp>
+        <p:nvSpPr>
+          <p:cNvPr id="4" name="Text Placeholder 3"/>
+          <p:cNvSpPr>
+            <a:spLocks noGrp="1"/>
+          </p:cNvSpPr>
+          <p:nvPr>
+            <p:ph type="body" sz="half" idx="2"/>
+          </p:nvPr>
+        </p:nvSpPr>
+        <p:spPr/>
+        <p:txBody>
+          <a:bodyPr/>
+          <a:lstStyle/>
+          <a:p>
+            <a:r>
+              <a:rPr lang="fr-FR" dirty="0" smtClean="0"/>
+              <a:t>Ecran type du jeu.</a:t>
+            </a:r>
+            <a:endParaRPr lang="fr-FR" dirty="0"/>
+          </a:p>
+        </p:txBody>
+      </p:sp>
+      <p:sp>
+        <p:nvSpPr>
+          <p:cNvPr id="3" name="Espace réservé de la date 2"/>
+          <p:cNvSpPr>
+            <a:spLocks noGrp="1"/>
+          </p:cNvSpPr>
+          <p:nvPr>
+            <p:ph type="dt" sz="half" idx="10"/>
+          </p:nvPr>
+        </p:nvSpPr>
+        <p:spPr/>
+        <p:txBody>
+          <a:bodyPr/>
+          <a:lstStyle/>
+          <a:p>
+            <a:r>
+              <a:rPr lang="fr-FR" smtClean="0"/>
+              <a:t>Jeudi 29 Novembre 2012</a:t>
+            </a:r>
+            <a:endParaRPr lang="fr-FR" dirty="0"/>
+          </a:p>
+        </p:txBody>
+      </p:sp>
+      <p:sp>
+        <p:nvSpPr>
+          <p:cNvPr id="5" name="Espace réservé du pied de page 4"/>
+          <p:cNvSpPr>
+            <a:spLocks noGrp="1"/>
+          </p:cNvSpPr>
+          <p:nvPr>
+            <p:ph type="ftr" sz="quarter" idx="11"/>
+          </p:nvPr>
+        </p:nvSpPr>
+        <p:spPr/>
+        <p:txBody>
+          <a:bodyPr/>
+          <a:lstStyle/>
+          <a:p>
+            <a:r>
+              <a:rPr lang="fr-FR" smtClean="0"/>
+              <a:t>Paul Fiat</a:t>
+            </a:r>
+            <a:endParaRPr lang="fr-FR" dirty="0"/>
+          </a:p>
+        </p:txBody>
+      </p:sp>
+      <p:sp>
+        <p:nvSpPr>
+          <p:cNvPr id="6" name="Espace réservé du numéro de diapositive 5"/>
+          <p:cNvSpPr>
+            <a:spLocks noGrp="1"/>
+          </p:cNvSpPr>
+          <p:nvPr>
+            <p:ph type="sldNum" sz="quarter" idx="12"/>
+          </p:nvPr>
+        </p:nvSpPr>
+        <p:spPr/>
+        <p:txBody>
+          <a:bodyPr/>
+          <a:lstStyle/>
+          <a:p>
+            <a:fld id="{9DDF0C85-99BB-428E-8D90-A207FA2E644C}" type="slidenum">
+              <a:rPr lang="fr-FR" smtClean="0"/>
+              <a:pPr/>
+              <a:t>10</a:t>
+            </a:fld>
+            <a:endParaRPr lang="fr-FR" dirty="0"/>
+          </a:p>
+        </p:txBody>
+      </p:sp>
       <p:pic>
         <p:nvPicPr>
-          <p:cNvPr id="7" name="Picture Placeholder 6" descr="mockup_legend.png"/>
+          <p:cNvPr id="11" name="Picture Placeholder 10" descr="mockup_legend.png"/>
           <p:cNvPicPr>
             <a:picLocks noGrp="1" noChangeAspect="1"/>
           </p:cNvPicPr>
@@ -4184,99 +4284,6 @@
         </p:blipFill>
         <p:spPr/>
       </p:pic>
-      <p:sp>
-        <p:nvSpPr>
-          <p:cNvPr id="4" name="Text Placeholder 3"/>
-          <p:cNvSpPr>
-            <a:spLocks noGrp="1"/>
-          </p:cNvSpPr>
-          <p:nvPr>
-            <p:ph type="body" sz="half" idx="2"/>
-          </p:nvPr>
-        </p:nvSpPr>
-        <p:spPr/>
-        <p:txBody>
-          <a:bodyPr/>
-          <a:lstStyle/>
-          <a:p>
-            <a:r>
-              <a:rPr lang="fr-FR" dirty="0" smtClean="0"/>
-              <a:t>Ecran type du jeu.</a:t>
-            </a:r>
-            <a:endParaRPr lang="fr-FR" dirty="0"/>
-          </a:p>
-        </p:txBody>
-      </p:sp>
-      <p:sp>
-        <p:nvSpPr>
-          <p:cNvPr id="3" name="Espace réservé de la date 2"/>
-          <p:cNvSpPr>
-            <a:spLocks noGrp="1"/>
-          </p:cNvSpPr>
-          <p:nvPr>
-            <p:ph type="dt" sz="half" idx="10"/>
-          </p:nvPr>
-        </p:nvSpPr>
-        <p:spPr/>
-        <p:txBody>
-          <a:bodyPr/>
-          <a:lstStyle/>
-          <a:p>
-            <a:r>
-              <a:rPr lang="fr-FR" smtClean="0"/>
-              <a:t>Jeudi 29 Novembre 2012</a:t>
-            </a:r>
-            <a:endParaRPr lang="fr-FR" dirty="0"/>
-          </a:p>
-        </p:txBody>
-      </p:sp>
-      <p:sp>
-        <p:nvSpPr>
-          <p:cNvPr id="5" name="Espace réservé du pied de page 4"/>
-          <p:cNvSpPr>
-            <a:spLocks noGrp="1"/>
-          </p:cNvSpPr>
-          <p:nvPr>
-            <p:ph type="ftr" sz="quarter" idx="11"/>
-          </p:nvPr>
-        </p:nvSpPr>
-        <p:spPr/>
-        <p:txBody>
-          <a:bodyPr/>
-          <a:lstStyle/>
-          <a:p>
-            <a:r>
-              <a:rPr lang="fr-FR" smtClean="0"/>
-              <a:t>Paul Fiat</a:t>
-            </a:r>
-            <a:endParaRPr lang="fr-FR" dirty="0"/>
-          </a:p>
-        </p:txBody>
-      </p:sp>
-      <p:sp>
-        <p:nvSpPr>
-          <p:cNvPr id="6" name="Espace réservé du numéro de diapositive 5"/>
-          <p:cNvSpPr>
-            <a:spLocks noGrp="1"/>
-          </p:cNvSpPr>
-          <p:nvPr>
-            <p:ph type="sldNum" sz="quarter" idx="12"/>
-          </p:nvPr>
-        </p:nvSpPr>
-        <p:spPr/>
-        <p:txBody>
-          <a:bodyPr/>
-          <a:lstStyle/>
-          <a:p>
-            <a:fld id="{9DDF0C85-99BB-428E-8D90-A207FA2E644C}" type="slidenum">
-              <a:rPr lang="fr-FR" smtClean="0"/>
-              <a:pPr/>
-              <a:t>10</a:t>
-            </a:fld>
-            <a:endParaRPr lang="fr-FR" dirty="0"/>
-          </a:p>
-        </p:txBody>
-      </p:sp>
     </p:spTree>
   </p:cSld>
   <p:clrMapOvr>
@@ -4391,431 +4398,29 @@
         </p:nvSpPr>
         <p:spPr/>
         <p:txBody>
-          <a:bodyPr/>
+          <a:bodyPr>
+            <a:normAutofit fontScale="90000"/>
+          </a:bodyPr>
           <a:lstStyle/>
           <a:p>
             <a:r>
+              <a:rPr lang="fr-FR" smtClean="0"/>
+              <a:t/>
+            </a:r>
+            <a:br>
+              <a:rPr lang="fr-FR" smtClean="0"/>
+            </a:br>
+            <a:r>
+              <a:rPr lang="fr-FR" smtClean="0"/>
+              <a:t>Thème </a:t>
+            </a:r>
+            <a:r>
               <a:rPr lang="fr-FR" dirty="0" smtClean="0"/>
-              <a:t>Ambiance</a:t>
-            </a:r>
-            <a:endParaRPr lang="fr-FR" dirty="0"/>
-          </a:p>
-        </p:txBody>
-      </p:sp>
-      <p:sp>
-        <p:nvSpPr>
-          <p:cNvPr id="3" name="Text Placeholder 2"/>
-          <p:cNvSpPr>
-            <a:spLocks noGrp="1"/>
-          </p:cNvSpPr>
-          <p:nvPr>
-            <p:ph type="body" idx="1"/>
-          </p:nvPr>
-        </p:nvSpPr>
-        <p:spPr>
-          <a:xfrm>
-            <a:off x="381000" y="1633536"/>
-            <a:ext cx="8477280" cy="4867298"/>
-          </a:xfrm>
-        </p:spPr>
-        <p:txBody>
-          <a:bodyPr/>
-          <a:lstStyle/>
-          <a:p>
-            <a:endParaRPr lang="fr-FR" dirty="0" smtClean="0"/>
-          </a:p>
-          <a:p>
-            <a:endParaRPr lang="fr-FR" dirty="0" smtClean="0"/>
-          </a:p>
-          <a:p>
-            <a:r>
-              <a:rPr lang="fr-FR" u="sng" dirty="0" smtClean="0"/>
-              <a:t>Dynamique</a:t>
-            </a:r>
-            <a:r>
+              <a:t>sonore et musicale</a:t>
+            </a:r>
+            <a:br>
               <a:rPr lang="fr-FR" dirty="0" smtClean="0"/>
-              <a:t> :</a:t>
-            </a:r>
-          </a:p>
-          <a:p>
-            <a:r>
-              <a:rPr lang="fr-FR" dirty="0" smtClean="0"/>
-              <a:t>L’apparition des ennemis de tous les côtés de l’écran apporte de la surprise et du stress, remettant constamment le joueur sur ses gardes.</a:t>
-            </a:r>
-          </a:p>
-          <a:p>
-            <a:endParaRPr lang="fr-FR" dirty="0" smtClean="0"/>
-          </a:p>
-          <a:p>
-            <a:r>
-              <a:rPr lang="fr-FR" u="sng" dirty="0" smtClean="0"/>
-              <a:t>Etriqué</a:t>
-            </a:r>
-            <a:r>
-              <a:rPr lang="fr-FR" dirty="0" smtClean="0"/>
-              <a:t> :</a:t>
-            </a:r>
-          </a:p>
-          <a:p>
-            <a:r>
-              <a:rPr lang="fr-FR" dirty="0" smtClean="0"/>
-              <a:t>L’échelle des cartes provoque un sentiment d’étroitesse et d’une faible marge d’erreur.</a:t>
-            </a:r>
-          </a:p>
-        </p:txBody>
-      </p:sp>
-    </p:spTree>
-  </p:cSld>
-  <p:clrMapOvr>
-    <a:masterClrMapping/>
-  </p:clrMapOvr>
-  <p:timing>
-    <p:tnLst>
-      <p:par>
-        <p:cTn id="1" dur="indefinite" restart="never" nodeType="tmRoot">
-          <p:childTnLst>
-            <p:seq concurrent="1" nextAc="seek">
-              <p:cTn id="2" dur="indefinite" nodeType="mainSeq">
-                <p:childTnLst>
-                  <p:par>
-                    <p:cTn id="3" fill="hold">
-                      <p:stCondLst>
-                        <p:cond delay="indefinite"/>
-                      </p:stCondLst>
-                      <p:childTnLst>
-                        <p:par>
-                          <p:cTn id="4" fill="hold">
-                            <p:stCondLst>
-                              <p:cond delay="0"/>
-                            </p:stCondLst>
-                            <p:childTnLst>
-                              <p:par>
-                                <p:cTn id="5" presetID="22" presetClass="entr" presetSubtype="4" fill="hold" nodeType="clickEffect">
-                                  <p:stCondLst>
-                                    <p:cond delay="0"/>
-                                  </p:stCondLst>
-                                  <p:childTnLst>
-                                    <p:set>
-                                      <p:cBhvr>
-                                        <p:cTn id="6" dur="1" fill="hold">
-                                          <p:stCondLst>
-                                            <p:cond delay="0"/>
-                                          </p:stCondLst>
-                                        </p:cTn>
-                                        <p:tgtEl>
-                                          <p:spTgt spid="3">
-                                            <p:txEl>
-                                              <p:pRg st="2" end="2"/>
-                                            </p:txEl>
-                                          </p:spTgt>
-                                        </p:tgtEl>
-                                        <p:attrNameLst>
-                                          <p:attrName>style.visibility</p:attrName>
-                                        </p:attrNameLst>
-                                      </p:cBhvr>
-                                      <p:to>
-                                        <p:strVal val="visible"/>
-                                      </p:to>
-                                    </p:set>
-                                    <p:animEffect transition="in" filter="wipe(down)">
-                                      <p:cBhvr>
-                                        <p:cTn id="7" dur="500"/>
-                                        <p:tgtEl>
-                                          <p:spTgt spid="3">
-                                            <p:txEl>
-                                              <p:pRg st="2" end="2"/>
-                                            </p:txEl>
-                                          </p:spTgt>
-                                        </p:tgtEl>
-                                      </p:cBhvr>
-                                    </p:animEffect>
-                                  </p:childTnLst>
-                                </p:cTn>
-                              </p:par>
-                              <p:par>
-                                <p:cTn id="8" presetID="22" presetClass="entr" presetSubtype="4" fill="hold" nodeType="withEffect">
-                                  <p:stCondLst>
-                                    <p:cond delay="0"/>
-                                  </p:stCondLst>
-                                  <p:childTnLst>
-                                    <p:set>
-                                      <p:cBhvr>
-                                        <p:cTn id="9" dur="1" fill="hold">
-                                          <p:stCondLst>
-                                            <p:cond delay="0"/>
-                                          </p:stCondLst>
-                                        </p:cTn>
-                                        <p:tgtEl>
-                                          <p:spTgt spid="3">
-                                            <p:txEl>
-                                              <p:pRg st="3" end="3"/>
-                                            </p:txEl>
-                                          </p:spTgt>
-                                        </p:tgtEl>
-                                        <p:attrNameLst>
-                                          <p:attrName>style.visibility</p:attrName>
-                                        </p:attrNameLst>
-                                      </p:cBhvr>
-                                      <p:to>
-                                        <p:strVal val="visible"/>
-                                      </p:to>
-                                    </p:set>
-                                    <p:animEffect transition="in" filter="wipe(down)">
-                                      <p:cBhvr>
-                                        <p:cTn id="10" dur="500"/>
-                                        <p:tgtEl>
-                                          <p:spTgt spid="3">
-                                            <p:txEl>
-                                              <p:pRg st="3" end="3"/>
-                                            </p:txEl>
-                                          </p:spTgt>
-                                        </p:tgtEl>
-                                      </p:cBhvr>
-                                    </p:animEffect>
-                                  </p:childTnLst>
-                                </p:cTn>
-                              </p:par>
-                            </p:childTnLst>
-                          </p:cTn>
-                        </p:par>
-                      </p:childTnLst>
-                    </p:cTn>
-                  </p:par>
-                  <p:par>
-                    <p:cTn id="11" fill="hold">
-                      <p:stCondLst>
-                        <p:cond delay="indefinite"/>
-                      </p:stCondLst>
-                      <p:childTnLst>
-                        <p:par>
-                          <p:cTn id="12" fill="hold">
-                            <p:stCondLst>
-                              <p:cond delay="0"/>
-                            </p:stCondLst>
-                            <p:childTnLst>
-                              <p:par>
-                                <p:cTn id="13" presetID="22" presetClass="entr" presetSubtype="4" fill="hold" nodeType="clickEffect">
-                                  <p:stCondLst>
-                                    <p:cond delay="0"/>
-                                  </p:stCondLst>
-                                  <p:childTnLst>
-                                    <p:set>
-                                      <p:cBhvr>
-                                        <p:cTn id="14" dur="1" fill="hold">
-                                          <p:stCondLst>
-                                            <p:cond delay="0"/>
-                                          </p:stCondLst>
-                                        </p:cTn>
-                                        <p:tgtEl>
-                                          <p:spTgt spid="3">
-                                            <p:txEl>
-                                              <p:pRg st="5" end="5"/>
-                                            </p:txEl>
-                                          </p:spTgt>
-                                        </p:tgtEl>
-                                        <p:attrNameLst>
-                                          <p:attrName>style.visibility</p:attrName>
-                                        </p:attrNameLst>
-                                      </p:cBhvr>
-                                      <p:to>
-                                        <p:strVal val="visible"/>
-                                      </p:to>
-                                    </p:set>
-                                    <p:animEffect transition="in" filter="wipe(down)">
-                                      <p:cBhvr>
-                                        <p:cTn id="15" dur="500"/>
-                                        <p:tgtEl>
-                                          <p:spTgt spid="3">
-                                            <p:txEl>
-                                              <p:pRg st="5" end="5"/>
-                                            </p:txEl>
-                                          </p:spTgt>
-                                        </p:tgtEl>
-                                      </p:cBhvr>
-                                    </p:animEffect>
-                                  </p:childTnLst>
-                                </p:cTn>
-                              </p:par>
-                              <p:par>
-                                <p:cTn id="16" presetID="22" presetClass="entr" presetSubtype="4" fill="hold" nodeType="withEffect">
-                                  <p:stCondLst>
-                                    <p:cond delay="0"/>
-                                  </p:stCondLst>
-                                  <p:childTnLst>
-                                    <p:set>
-                                      <p:cBhvr>
-                                        <p:cTn id="17" dur="1" fill="hold">
-                                          <p:stCondLst>
-                                            <p:cond delay="0"/>
-                                          </p:stCondLst>
-                                        </p:cTn>
-                                        <p:tgtEl>
-                                          <p:spTgt spid="3">
-                                            <p:txEl>
-                                              <p:pRg st="6" end="6"/>
-                                            </p:txEl>
-                                          </p:spTgt>
-                                        </p:tgtEl>
-                                        <p:attrNameLst>
-                                          <p:attrName>style.visibility</p:attrName>
-                                        </p:attrNameLst>
-                                      </p:cBhvr>
-                                      <p:to>
-                                        <p:strVal val="visible"/>
-                                      </p:to>
-                                    </p:set>
-                                    <p:animEffect transition="in" filter="wipe(down)">
-                                      <p:cBhvr>
-                                        <p:cTn id="18" dur="500"/>
-                                        <p:tgtEl>
-                                          <p:spTgt spid="3">
-                                            <p:txEl>
-                                              <p:pRg st="6" end="6"/>
-                                            </p:txEl>
-                                          </p:spTgt>
-                                        </p:tgtEl>
-                                      </p:cBhvr>
-                                    </p:animEffect>
-                                  </p:childTnLst>
-                                </p:cTn>
-                              </p:par>
-                            </p:childTnLst>
-                          </p:cTn>
-                        </p:par>
-                      </p:childTnLst>
-                    </p:cTn>
-                  </p:par>
-                </p:childTnLst>
-              </p:cTn>
-              <p:prevCondLst>
-                <p:cond evt="onPrev" delay="0">
-                  <p:tgtEl>
-                    <p:sldTgt/>
-                  </p:tgtEl>
-                </p:cond>
-              </p:prevCondLst>
-              <p:nextCondLst>
-                <p:cond evt="onNext" delay="0">
-                  <p:tgtEl>
-                    <p:sldTgt/>
-                  </p:tgtEl>
-                </p:cond>
-              </p:nextCondLst>
-            </p:seq>
-          </p:childTnLst>
-        </p:cTn>
-      </p:par>
-    </p:tnLst>
-  </p:timing>
-</p:sld>
-</file>
-
-<file path=ppt/slides/slide12.xml><?xml version="1.0" encoding="utf-8"?>
-<p:sld xmlns:a="http://schemas.openxmlformats.org/drawingml/2006/main" xmlns:r="http://schemas.openxmlformats.org/officeDocument/2006/relationships" xmlns:p="http://schemas.openxmlformats.org/presentationml/2006/main">
-  <p:cSld>
-    <p:spTree>
-      <p:nvGrpSpPr>
-        <p:cNvPr id="1" name=""/>
-        <p:cNvGrpSpPr/>
-        <p:nvPr/>
-      </p:nvGrpSpPr>
-      <p:grpSpPr>
-        <a:xfrm>
-          <a:off x="0" y="0"/>
-          <a:ext cx="0" cy="0"/>
-          <a:chOff x="0" y="0"/>
-          <a:chExt cx="0" cy="0"/>
-        </a:xfrm>
-      </p:grpSpPr>
-      <p:sp>
-        <p:nvSpPr>
-          <p:cNvPr id="5" name="Espace réservé de la date 4"/>
-          <p:cNvSpPr>
-            <a:spLocks noGrp="1"/>
-          </p:cNvSpPr>
-          <p:nvPr>
-            <p:ph type="dt" sz="half" idx="10"/>
-          </p:nvPr>
-        </p:nvSpPr>
-        <p:spPr/>
-        <p:txBody>
-          <a:bodyPr/>
-          <a:lstStyle/>
-          <a:p>
-            <a:r>
-              <a:rPr lang="fr-FR" smtClean="0"/>
-              <a:t>Jeudi 29 Novembre 2012</a:t>
-            </a:r>
-            <a:endParaRPr lang="fr-FR" dirty="0"/>
-          </a:p>
-        </p:txBody>
-      </p:sp>
-      <p:sp>
-        <p:nvSpPr>
-          <p:cNvPr id="6" name="Espace réservé du pied de page 5"/>
-          <p:cNvSpPr>
-            <a:spLocks noGrp="1"/>
-          </p:cNvSpPr>
-          <p:nvPr>
-            <p:ph type="ftr" sz="quarter" idx="11"/>
-          </p:nvPr>
-        </p:nvSpPr>
-        <p:spPr/>
-        <p:txBody>
-          <a:bodyPr/>
-          <a:lstStyle/>
-          <a:p>
-            <a:r>
-              <a:rPr lang="fr-FR" smtClean="0"/>
-              <a:t>Paul Fiat</a:t>
-            </a:r>
-            <a:endParaRPr lang="fr-FR" dirty="0"/>
-          </a:p>
-        </p:txBody>
-      </p:sp>
-      <p:sp>
-        <p:nvSpPr>
-          <p:cNvPr id="7" name="Espace réservé du numéro de diapositive 6"/>
-          <p:cNvSpPr>
-            <a:spLocks noGrp="1"/>
-          </p:cNvSpPr>
-          <p:nvPr>
-            <p:ph type="sldNum" sz="quarter" idx="12"/>
-          </p:nvPr>
-        </p:nvSpPr>
-        <p:spPr/>
-        <p:txBody>
-          <a:bodyPr/>
-          <a:lstStyle/>
-          <a:p>
-            <a:fld id="{9DDF0C85-99BB-428E-8D90-A207FA2E644C}" type="slidenum">
-              <a:rPr lang="fr-FR" smtClean="0"/>
-              <a:pPr/>
-              <a:t>12</a:t>
-            </a:fld>
-            <a:endParaRPr lang="fr-FR" dirty="0"/>
-          </a:p>
-        </p:txBody>
-      </p:sp>
-      <p:sp>
-        <p:nvSpPr>
-          <p:cNvPr id="2" name="Title 1"/>
-          <p:cNvSpPr>
-            <a:spLocks noGrp="1"/>
-          </p:cNvSpPr>
-          <p:nvPr>
-            <p:ph type="title"/>
-          </p:nvPr>
-        </p:nvSpPr>
-        <p:spPr/>
-        <p:txBody>
-          <a:bodyPr/>
-          <a:lstStyle/>
-          <a:p>
-            <a:r>
-              <a:rPr lang="fr-FR" dirty="0" smtClean="0"/>
-              <a:t>Direction artistique</a:t>
-            </a:r>
+            </a:br>
             <a:endParaRPr lang="fr-FR" dirty="0"/>
           </a:p>
         </p:txBody>
@@ -4837,250 +4442,13 @@
           </a:xfrm>
         </p:spPr>
         <p:txBody>
-          <a:bodyPr/>
-          <a:lstStyle/>
-          <a:p>
-            <a:endParaRPr lang="fr-FR" dirty="0" smtClean="0"/>
-          </a:p>
-          <a:p>
-            <a:r>
-              <a:rPr lang="fr-FR" dirty="0" smtClean="0"/>
-              <a:t>Les graphismes se veulent réalistes, en accord avec la conception générale de ces entités microscopiques.</a:t>
-            </a:r>
-          </a:p>
-          <a:p>
-            <a:endParaRPr lang="fr-FR" dirty="0" smtClean="0"/>
-          </a:p>
-          <a:p>
-            <a:endParaRPr lang="fr-FR" dirty="0"/>
-          </a:p>
-        </p:txBody>
-      </p:sp>
-      <p:pic>
-        <p:nvPicPr>
-          <p:cNvPr id="4" name="Picture 3" descr="virus.jpg"/>
-          <p:cNvPicPr>
-            <a:picLocks noChangeAspect="1"/>
-          </p:cNvPicPr>
-          <p:nvPr/>
-        </p:nvPicPr>
-        <p:blipFill>
-          <a:blip r:embed="rId2"/>
-          <a:stretch>
-            <a:fillRect/>
-          </a:stretch>
-        </p:blipFill>
-        <p:spPr>
-          <a:xfrm>
-            <a:off x="3357554" y="2928934"/>
-            <a:ext cx="2428892" cy="1290349"/>
-          </a:xfrm>
-          <a:prstGeom prst="rect">
-            <a:avLst/>
-          </a:prstGeom>
-        </p:spPr>
-      </p:pic>
-      <p:pic>
-        <p:nvPicPr>
-          <p:cNvPr id="8" name="Picture 7" descr="virus.jpg"/>
-          <p:cNvPicPr>
-            <a:picLocks noChangeAspect="1"/>
-          </p:cNvPicPr>
-          <p:nvPr/>
-        </p:nvPicPr>
-        <p:blipFill>
-          <a:blip r:embed="rId3"/>
-          <a:stretch>
-            <a:fillRect/>
-          </a:stretch>
-        </p:blipFill>
-        <p:spPr>
-          <a:xfrm>
-            <a:off x="5929322" y="2928934"/>
-            <a:ext cx="2524369" cy="1285884"/>
-          </a:xfrm>
-          <a:prstGeom prst="rect">
-            <a:avLst/>
-          </a:prstGeom>
-        </p:spPr>
-      </p:pic>
-    </p:spTree>
-  </p:cSld>
-  <p:clrMapOvr>
-    <a:masterClrMapping/>
-  </p:clrMapOvr>
-  <p:timing>
-    <p:tnLst>
-      <p:par>
-        <p:cTn id="1" dur="indefinite" restart="never" nodeType="tmRoot"/>
-      </p:par>
-    </p:tnLst>
-  </p:timing>
-</p:sld>
-</file>
-
-<file path=ppt/slides/slide13.xml><?xml version="1.0" encoding="utf-8"?>
-<p:sld xmlns:a="http://schemas.openxmlformats.org/drawingml/2006/main" xmlns:r="http://schemas.openxmlformats.org/officeDocument/2006/relationships" xmlns:p="http://schemas.openxmlformats.org/presentationml/2006/main">
-  <p:cSld>
-    <p:spTree>
-      <p:nvGrpSpPr>
-        <p:cNvPr id="1" name=""/>
-        <p:cNvGrpSpPr/>
-        <p:nvPr/>
-      </p:nvGrpSpPr>
-      <p:grpSpPr>
-        <a:xfrm>
-          <a:off x="0" y="0"/>
-          <a:ext cx="0" cy="0"/>
-          <a:chOff x="0" y="0"/>
-          <a:chExt cx="0" cy="0"/>
-        </a:xfrm>
-      </p:grpSpPr>
-      <p:sp>
-        <p:nvSpPr>
-          <p:cNvPr id="4" name="Espace réservé de la date 3"/>
-          <p:cNvSpPr>
-            <a:spLocks noGrp="1"/>
-          </p:cNvSpPr>
-          <p:nvPr>
-            <p:ph type="dt" sz="half" idx="10"/>
-          </p:nvPr>
-        </p:nvSpPr>
-        <p:spPr/>
-        <p:txBody>
-          <a:bodyPr/>
-          <a:lstStyle/>
-          <a:p>
-            <a:r>
-              <a:rPr lang="fr-FR" smtClean="0"/>
-              <a:t>Jeudi 29 Novembre 2012</a:t>
-            </a:r>
-            <a:endParaRPr lang="fr-FR" dirty="0"/>
-          </a:p>
-        </p:txBody>
-      </p:sp>
-      <p:sp>
-        <p:nvSpPr>
-          <p:cNvPr id="5" name="Espace réservé du pied de page 4"/>
-          <p:cNvSpPr>
-            <a:spLocks noGrp="1"/>
-          </p:cNvSpPr>
-          <p:nvPr>
-            <p:ph type="ftr" sz="quarter" idx="11"/>
-          </p:nvPr>
-        </p:nvSpPr>
-        <p:spPr/>
-        <p:txBody>
-          <a:bodyPr/>
-          <a:lstStyle/>
-          <a:p>
-            <a:r>
-              <a:rPr lang="fr-FR" smtClean="0"/>
-              <a:t>Paul Fiat</a:t>
-            </a:r>
-            <a:endParaRPr lang="fr-FR" dirty="0"/>
-          </a:p>
-        </p:txBody>
-      </p:sp>
-      <p:sp>
-        <p:nvSpPr>
-          <p:cNvPr id="6" name="Espace réservé du numéro de diapositive 5"/>
-          <p:cNvSpPr>
-            <a:spLocks noGrp="1"/>
-          </p:cNvSpPr>
-          <p:nvPr>
-            <p:ph type="sldNum" sz="quarter" idx="12"/>
-          </p:nvPr>
-        </p:nvSpPr>
-        <p:spPr/>
-        <p:txBody>
-          <a:bodyPr/>
-          <a:lstStyle/>
-          <a:p>
-            <a:fld id="{9DDF0C85-99BB-428E-8D90-A207FA2E644C}" type="slidenum">
-              <a:rPr lang="fr-FR" smtClean="0"/>
-              <a:pPr/>
-              <a:t>13</a:t>
-            </a:fld>
-            <a:endParaRPr lang="fr-FR" dirty="0"/>
-          </a:p>
-        </p:txBody>
-      </p:sp>
-      <p:sp>
-        <p:nvSpPr>
-          <p:cNvPr id="2" name="Title 1"/>
-          <p:cNvSpPr>
-            <a:spLocks noGrp="1"/>
-          </p:cNvSpPr>
-          <p:nvPr>
-            <p:ph type="title"/>
-          </p:nvPr>
-        </p:nvSpPr>
-        <p:spPr/>
-        <p:txBody>
-          <a:bodyPr>
-            <a:normAutofit fontScale="90000"/>
-          </a:bodyPr>
-          <a:lstStyle/>
-          <a:p>
-            <a:r>
-              <a:rPr lang="fr-FR" smtClean="0"/>
-              <a:t/>
-            </a:r>
-            <a:br>
-              <a:rPr lang="fr-FR" smtClean="0"/>
-            </a:br>
-            <a:r>
-              <a:rPr lang="fr-FR" smtClean="0"/>
-              <a:t>Thème </a:t>
-            </a:r>
-            <a:r>
-              <a:rPr lang="fr-FR" dirty="0" smtClean="0"/>
-              <a:t>sonore et musicale</a:t>
-            </a:r>
-            <a:br>
-              <a:rPr lang="fr-FR" dirty="0" smtClean="0"/>
-            </a:br>
-            <a:endParaRPr lang="fr-FR" dirty="0"/>
-          </a:p>
-        </p:txBody>
-      </p:sp>
-      <p:sp>
-        <p:nvSpPr>
-          <p:cNvPr id="3" name="Text Placeholder 2"/>
-          <p:cNvSpPr>
-            <a:spLocks noGrp="1"/>
-          </p:cNvSpPr>
-          <p:nvPr>
-            <p:ph type="body" idx="1"/>
-          </p:nvPr>
-        </p:nvSpPr>
-        <p:spPr>
-          <a:xfrm>
-            <a:off x="381000" y="1633536"/>
-            <a:ext cx="8477280" cy="4938736"/>
-          </a:xfrm>
-        </p:spPr>
-        <p:txBody>
           <a:bodyPr>
             <a:normAutofit/>
           </a:bodyPr>
           <a:lstStyle/>
           <a:p>
-            <a:endParaRPr lang="fr-FR" dirty="0" smtClean="0"/>
-          </a:p>
-          <a:p>
-            <a:endParaRPr lang="fr-FR" dirty="0" smtClean="0"/>
-          </a:p>
-          <a:p>
-            <a:r>
-              <a:rPr lang="fr-FR" dirty="0" smtClean="0"/>
-              <a:t>La musique est en style 8bit, rythmée et entraînante.</a:t>
-            </a:r>
-          </a:p>
-          <a:p>
-            <a:r>
-              <a:rPr lang="fr-FR" smtClean="0"/>
+            <a:r>
+              <a:rPr lang="fr-FR" dirty="0" err="1" smtClean="0"/>
               <a:t>Kiosken</a:t>
             </a:r>
             <a:r>
@@ -5120,29 +4488,60 @@
             </a:r>
             <a:r>
               <a:rPr lang="fr-FR" dirty="0" err="1" smtClean="0"/>
-              <a:t>Facts</a:t>
+              <a:t>Fact</a:t>
             </a:r>
             <a:endParaRPr lang="fr-FR" dirty="0" smtClean="0"/>
           </a:p>
           <a:p>
+            <a:pPr>
+              <a:buFont typeface="Wingdings" pitchFamily="2" charset="2"/>
+              <a:buChar char="Ø"/>
+            </a:pPr>
+            <a:r>
+              <a:rPr lang="fr-FR" dirty="0" smtClean="0"/>
+              <a:t>Musique style 8bit</a:t>
+            </a:r>
+            <a:r>
+              <a:rPr lang="fr-FR" dirty="0" smtClean="0"/>
+              <a:t>, rythmée et entraînante</a:t>
+            </a:r>
+            <a:r>
+              <a:rPr lang="fr-FR" dirty="0" smtClean="0"/>
+              <a:t>.</a:t>
+            </a:r>
+          </a:p>
+          <a:p>
+            <a:pPr>
+              <a:buFont typeface="Wingdings" pitchFamily="2" charset="2"/>
+              <a:buChar char="Ø"/>
+            </a:pPr>
             <a:endParaRPr lang="fr-FR" dirty="0" smtClean="0"/>
           </a:p>
           <a:p>
+            <a:pPr>
+              <a:buFont typeface="Wingdings" pitchFamily="2" charset="2"/>
+              <a:buChar char="Ø"/>
+            </a:pPr>
+            <a:r>
+              <a:rPr lang="fr-FR" dirty="0" smtClean="0"/>
+              <a:t>Les feedbacks et bruitages sonores auront un effet « liquide » et « profonds » pour correspondre à l’environnement du jeu</a:t>
+            </a:r>
+            <a:r>
+              <a:rPr lang="fr-FR" dirty="0" smtClean="0"/>
+              <a:t>.</a:t>
+            </a:r>
+          </a:p>
+          <a:p>
+            <a:pPr>
+              <a:buFont typeface="Wingdings" pitchFamily="2" charset="2"/>
+              <a:buChar char="Ø"/>
+            </a:pPr>
             <a:endParaRPr lang="fr-FR" dirty="0" smtClean="0"/>
           </a:p>
           <a:p>
-            <a:r>
-              <a:rPr lang="fr-FR" dirty="0" smtClean="0"/>
-              <a:t>Les feedbacks et bruitages sonores auront un effet « liquide » et « profonds » pour correspondre à l’environnement du jeu.</a:t>
-            </a:r>
-          </a:p>
-          <a:p>
-            <a:endParaRPr lang="fr-FR" dirty="0" smtClean="0"/>
-          </a:p>
-          <a:p>
             <a:pPr>
-              <a:buFontTx/>
-              <a:buChar char="-"/>
+              <a:buFont typeface="Wingdings" pitchFamily="2" charset="2"/>
+              <a:buChar char="Ø"/>
             </a:pPr>
             <a:r>
               <a:rPr lang="fr-FR" dirty="0" smtClean="0"/>
@@ -5154,20 +4553,32 @@
             </a:r>
             <a:r>
               <a:rPr lang="fr-FR" dirty="0" smtClean="0"/>
-              <a:t> : 	Explosions</a:t>
+              <a:t> : 	</a:t>
+            </a:r>
+            <a:r>
+              <a:rPr lang="fr-FR" dirty="0" smtClean="0"/>
+              <a:t>Explosions : </a:t>
             </a:r>
           </a:p>
           <a:p>
             <a:pPr>
-              <a:buFontTx/>
-              <a:buChar char="-"/>
+              <a:buFont typeface="Wingdings" pitchFamily="2" charset="2"/>
+              <a:buChar char="Ø"/>
             </a:pPr>
             <a:endParaRPr lang="fr-FR" dirty="0" smtClean="0"/>
           </a:p>
           <a:p>
+            <a:pPr>
+              <a:buFont typeface="Wingdings" pitchFamily="2" charset="2"/>
+              <a:buChar char="Ø"/>
+            </a:pPr>
             <a:r>
               <a:rPr lang="fr-FR" dirty="0" smtClean="0"/>
-              <a:t>Pas de parole.</a:t>
+              <a:t>Pas </a:t>
+            </a:r>
+            <a:r>
+              <a:rPr lang="fr-FR" dirty="0" smtClean="0"/>
+              <a:t>de parole.</a:t>
             </a:r>
             <a:endParaRPr lang="fr-FR" dirty="0"/>
           </a:p>
@@ -5178,7 +4589,7 @@
       </p:sp>
       <p:pic>
         <p:nvPicPr>
-          <p:cNvPr id="12" name="Explosion Under Water HD (Download Link).mp3">
+          <p:cNvPr id="10" name="bulles.mp3">
             <a:hlinkClick r:id="" action="ppaction://media"/>
           </p:cNvPr>
           <p:cNvPicPr>
@@ -5196,7 +4607,7 @@
         </p:blipFill>
         <p:spPr>
           <a:xfrm>
-            <a:off x="1785918" y="4143380"/>
+            <a:off x="1785918" y="4214818"/>
             <a:ext cx="304800" cy="304800"/>
           </a:xfrm>
           <a:prstGeom prst="rect">
@@ -5206,7 +4617,7 @@
       </p:pic>
       <p:pic>
         <p:nvPicPr>
-          <p:cNvPr id="13" name="Water Splash Sound FX 1.mp3">
+          <p:cNvPr id="11" name="explosion.mp3">
             <a:hlinkClick r:id="" action="ppaction://media"/>
           </p:cNvPr>
           <p:cNvPicPr>
@@ -5224,7 +4635,7 @@
         </p:blipFill>
         <p:spPr>
           <a:xfrm>
-            <a:off x="3500430" y="4143380"/>
+            <a:off x="5786446" y="4214818"/>
             <a:ext cx="304800" cy="304800"/>
           </a:xfrm>
           <a:prstGeom prst="rect">
@@ -5234,7 +4645,7 @@
       </p:pic>
       <p:pic>
         <p:nvPicPr>
-          <p:cNvPr id="14" name="[HQ] Underwater Explosion.mp3">
+          <p:cNvPr id="15" name="splash.mp3">
             <a:hlinkClick r:id="" action="ppaction://media"/>
           </p:cNvPr>
           <p:cNvPicPr>
@@ -5252,7 +4663,7 @@
         </p:blipFill>
         <p:spPr>
           <a:xfrm>
-            <a:off x="5572132" y="4143380"/>
+            <a:off x="3571868" y="4214818"/>
             <a:ext cx="304800" cy="304800"/>
           </a:xfrm>
           <a:prstGeom prst="rect">
@@ -5275,7 +4686,7 @@
                 <p:stCondLst>
                   <p:cond evt="onClick" delay="0">
                     <p:tgtEl>
-                      <p:spTgt spid="12"/>
+                      <p:spTgt spid="10"/>
                     </p:tgtEl>
                   </p:cond>
                 </p:stCondLst>
@@ -5305,7 +4716,7 @@
                                       <p:cBhvr>
                                         <p:cTn id="6" dur="32236" fill="hold"/>
                                         <p:tgtEl>
-                                          <p:spTgt spid="12"/>
+                                          <p:spTgt spid="10"/>
                                         </p:tgtEl>
                                       </p:cBhvr>
                                     </p:cmd>
@@ -5323,7 +4734,7 @@
               <p:nextCondLst>
                 <p:cond evt="onClick" delay="0">
                   <p:tgtEl>
-                    <p:spTgt spid="12"/>
+                    <p:spTgt spid="10"/>
                   </p:tgtEl>
                 </p:cond>
               </p:nextCondLst>
@@ -5353,7 +4764,7 @@
                   </p:endCondLst>
                 </p:cTn>
                 <p:tgtEl>
-                  <p:spTgt spid="12"/>
+                  <p:spTgt spid="10"/>
                 </p:tgtEl>
               </p:cMediaNode>
             </p:audio>
@@ -5362,7 +4773,7 @@
                 <p:stCondLst>
                   <p:cond evt="onClick" delay="0">
                     <p:tgtEl>
-                      <p:spTgt spid="13"/>
+                      <p:spTgt spid="11"/>
                     </p:tgtEl>
                   </p:cond>
                 </p:stCondLst>
@@ -5390,9 +4801,9 @@
                                   <p:childTnLst>
                                     <p:cmd type="call" cmd="playFrom(0.0)">
                                       <p:cBhvr>
-                                        <p:cTn id="12" dur="8412" fill="hold"/>
+                                        <p:cTn id="12" dur="11199" fill="hold"/>
                                         <p:tgtEl>
-                                          <p:spTgt spid="13"/>
+                                          <p:spTgt spid="11"/>
                                         </p:tgtEl>
                                       </p:cBhvr>
                                     </p:cmd>
@@ -5410,7 +4821,7 @@
               <p:nextCondLst>
                 <p:cond evt="onClick" delay="0">
                   <p:tgtEl>
-                    <p:spTgt spid="13"/>
+                    <p:spTgt spid="11"/>
                   </p:tgtEl>
                 </p:cond>
               </p:nextCondLst>
@@ -5440,7 +4851,7 @@
                   </p:endCondLst>
                 </p:cTn>
                 <p:tgtEl>
-                  <p:spTgt spid="13"/>
+                  <p:spTgt spid="11"/>
                 </p:tgtEl>
               </p:cMediaNode>
             </p:audio>
@@ -5449,7 +4860,7 @@
                 <p:stCondLst>
                   <p:cond evt="onClick" delay="0">
                     <p:tgtEl>
-                      <p:spTgt spid="14"/>
+                      <p:spTgt spid="15"/>
                     </p:tgtEl>
                   </p:cond>
                 </p:stCondLst>
@@ -5477,9 +4888,9 @@
                                   <p:childTnLst>
                                     <p:cmd type="call" cmd="playFrom(0.0)">
                                       <p:cBhvr>
-                                        <p:cTn id="18" dur="11199" fill="hold"/>
+                                        <p:cTn id="18" dur="8412" fill="hold"/>
                                         <p:tgtEl>
-                                          <p:spTgt spid="14"/>
+                                          <p:spTgt spid="15"/>
                                         </p:tgtEl>
                                       </p:cBhvr>
                                     </p:cmd>
@@ -5497,7 +4908,7 @@
               <p:nextCondLst>
                 <p:cond evt="onClick" delay="0">
                   <p:tgtEl>
-                    <p:spTgt spid="14"/>
+                    <p:spTgt spid="15"/>
                   </p:tgtEl>
                 </p:cond>
               </p:nextCondLst>
@@ -5527,7 +4938,7 @@
                   </p:endCondLst>
                 </p:cTn>
                 <p:tgtEl>
-                  <p:spTgt spid="14"/>
+                  <p:spTgt spid="15"/>
                 </p:tgtEl>
               </p:cMediaNode>
             </p:audio>
@@ -5592,13 +5003,19 @@
         <p:spPr/>
         <p:txBody>
           <a:bodyPr>
-            <a:normAutofit lnSpcReduction="10000"/>
+            <a:normAutofit fontScale="92500" lnSpcReduction="20000"/>
           </a:bodyPr>
           <a:lstStyle/>
           <a:p>
             <a:r>
               <a:rPr lang="fr-FR" b="1" dirty="0" smtClean="0"/>
               <a:t>Choix du concept</a:t>
+            </a:r>
+          </a:p>
+          <a:p>
+            <a:r>
+              <a:rPr lang="fr-FR" b="1" dirty="0" smtClean="0"/>
+              <a:t>Prototype</a:t>
             </a:r>
           </a:p>
           <a:p>
@@ -6151,6 +5568,13 @@
   <p:clrMapOvr>
     <a:masterClrMapping/>
   </p:clrMapOvr>
+  <p:timing>
+    <p:tnLst>
+      <p:par>
+        <p:cTn id="1" dur="indefinite" restart="never" nodeType="tmRoot"/>
+      </p:par>
+    </p:tnLst>
+  </p:timing>
 </p:sld>
 </file>
 
@@ -6413,12 +5837,12 @@
       </p:grpSpPr>
       <p:sp>
         <p:nvSpPr>
-          <p:cNvPr id="2" name="Titre 1"/>
-          <p:cNvSpPr>
-            <a:spLocks noGrp="1"/>
-          </p:cNvSpPr>
-          <p:nvPr>
-            <p:ph type="title"/>
+          <p:cNvPr id="4" name="Espace réservé de la date 3"/>
+          <p:cNvSpPr>
+            <a:spLocks noGrp="1"/>
+          </p:cNvSpPr>
+          <p:nvPr>
+            <p:ph type="dt" sz="half" idx="10"/>
           </p:nvPr>
         </p:nvSpPr>
         <p:spPr/>
@@ -6427,8 +5851,8 @@
           <a:lstStyle/>
           <a:p>
             <a:r>
-              <a:rPr lang="fr-FR" dirty="0" err="1" smtClean="0"/>
-              <a:t>Simpsons</a:t>
+              <a:rPr lang="fr-FR" smtClean="0"/>
+              <a:t>Jeudi 29 Novembre 2012</a:t>
             </a:r>
             <a:endParaRPr lang="fr-FR" dirty="0"/>
           </a:p>
@@ -6436,12 +5860,12 @@
       </p:sp>
       <p:sp>
         <p:nvSpPr>
-          <p:cNvPr id="4" name="Espace réservé du texte 3"/>
-          <p:cNvSpPr>
-            <a:spLocks noGrp="1"/>
-          </p:cNvSpPr>
-          <p:nvPr>
-            <p:ph type="body" sz="half" idx="2"/>
+          <p:cNvPr id="5" name="Espace réservé du pied de page 4"/>
+          <p:cNvSpPr>
+            <a:spLocks noGrp="1"/>
+          </p:cNvSpPr>
+          <p:nvPr>
+            <p:ph type="ftr" sz="quarter" idx="11"/>
           </p:nvPr>
         </p:nvSpPr>
         <p:spPr/>
@@ -6450,24 +5874,8 @@
           <a:lstStyle/>
           <a:p>
             <a:r>
-              <a:rPr lang="fr-FR" dirty="0" smtClean="0"/>
-              <a:t>918 This </a:t>
-            </a:r>
-            <a:r>
-              <a:rPr lang="fr-FR" dirty="0" err="1" smtClean="0"/>
-              <a:t>little</a:t>
-            </a:r>
-            <a:r>
-              <a:rPr lang="fr-FR" dirty="0" smtClean="0"/>
-              <a:t> </a:t>
-            </a:r>
-            <a:r>
-              <a:rPr lang="fr-FR" dirty="0" err="1" smtClean="0"/>
-              <a:t>wiggy</a:t>
-            </a:r>
-            <a:r>
-              <a:rPr lang="fr-FR" dirty="0" smtClean="0"/>
-              <a:t> – 3:40</a:t>
+              <a:rPr lang="fr-FR" smtClean="0"/>
+              <a:t>Paul Fiat</a:t>
             </a:r>
             <a:endParaRPr lang="fr-FR" dirty="0"/>
           </a:p>
@@ -6475,12 +5883,12 @@
       </p:sp>
       <p:sp>
         <p:nvSpPr>
-          <p:cNvPr id="5" name="Espace réservé de la date 4"/>
-          <p:cNvSpPr>
-            <a:spLocks noGrp="1"/>
-          </p:cNvSpPr>
-          <p:nvPr>
-            <p:ph type="dt" sz="half" idx="10"/>
+          <p:cNvPr id="6" name="Espace réservé du numéro de diapositive 5"/>
+          <p:cNvSpPr>
+            <a:spLocks noGrp="1"/>
+          </p:cNvSpPr>
+          <p:nvPr>
+            <p:ph type="sldNum" sz="quarter" idx="12"/>
           </p:nvPr>
         </p:nvSpPr>
         <p:spPr/>
@@ -6488,163 +5896,10 @@
           <a:bodyPr/>
           <a:lstStyle/>
           <a:p>
-            <a:r>
-              <a:rPr lang="fr-FR" smtClean="0"/>
-              <a:t>Jeudi 29 Novembre 2012</a:t>
-            </a:r>
-            <a:endParaRPr lang="fr-FR" dirty="0"/>
-          </a:p>
-        </p:txBody>
-      </p:sp>
-      <p:sp>
-        <p:nvSpPr>
-          <p:cNvPr id="6" name="Espace réservé du pied de page 5"/>
-          <p:cNvSpPr>
-            <a:spLocks noGrp="1"/>
-          </p:cNvSpPr>
-          <p:nvPr>
-            <p:ph type="ftr" sz="quarter" idx="11"/>
-          </p:nvPr>
-        </p:nvSpPr>
-        <p:spPr/>
-        <p:txBody>
-          <a:bodyPr/>
-          <a:lstStyle/>
-          <a:p>
-            <a:r>
-              <a:rPr lang="fr-FR" smtClean="0"/>
-              <a:t>Paul Fiat</a:t>
-            </a:r>
-            <a:endParaRPr lang="fr-FR" dirty="0"/>
-          </a:p>
-        </p:txBody>
-      </p:sp>
-      <p:sp>
-        <p:nvSpPr>
-          <p:cNvPr id="7" name="Espace réservé du numéro de diapositive 6"/>
-          <p:cNvSpPr>
-            <a:spLocks noGrp="1"/>
-          </p:cNvSpPr>
-          <p:nvPr>
-            <p:ph type="sldNum" sz="quarter" idx="12"/>
-          </p:nvPr>
-        </p:nvSpPr>
-        <p:spPr/>
-        <p:txBody>
-          <a:bodyPr/>
-          <a:lstStyle/>
-          <a:p>
             <a:fld id="{9DDF0C85-99BB-428E-8D90-A207FA2E644C}" type="slidenum">
               <a:rPr lang="fr-FR" smtClean="0"/>
               <a:pPr/>
               <a:t>6</a:t>
-            </a:fld>
-            <a:endParaRPr lang="fr-FR" dirty="0"/>
-          </a:p>
-        </p:txBody>
-      </p:sp>
-    </p:spTree>
-    <p:extLst>
-      <p:ext uri="{BB962C8B-B14F-4D97-AF65-F5344CB8AC3E}">
-        <p14:creationId xmlns="" xmlns:p14="http://schemas.microsoft.com/office/powerpoint/2010/main" val="3561826763"/>
-      </p:ext>
-    </p:extLst>
-  </p:cSld>
-  <p:clrMapOvr>
-    <a:masterClrMapping/>
-  </p:clrMapOvr>
-  <p:timing>
-    <p:tnLst>
-      <p:par>
-        <p:cTn id="1" dur="indefinite" restart="never" nodeType="tmRoot"/>
-      </p:par>
-    </p:tnLst>
-  </p:timing>
-</p:sld>
-</file>
-
-<file path=ppt/slides/slide7.xml><?xml version="1.0" encoding="utf-8"?>
-<p:sld xmlns:a="http://schemas.openxmlformats.org/drawingml/2006/main" xmlns:r="http://schemas.openxmlformats.org/officeDocument/2006/relationships" xmlns:p="http://schemas.openxmlformats.org/presentationml/2006/main">
-  <p:cSld>
-    <p:spTree>
-      <p:nvGrpSpPr>
-        <p:cNvPr id="1" name=""/>
-        <p:cNvGrpSpPr/>
-        <p:nvPr/>
-      </p:nvGrpSpPr>
-      <p:grpSpPr>
-        <a:xfrm>
-          <a:off x="0" y="0"/>
-          <a:ext cx="0" cy="0"/>
-          <a:chOff x="0" y="0"/>
-          <a:chExt cx="0" cy="0"/>
-        </a:xfrm>
-      </p:grpSpPr>
-      <p:sp>
-        <p:nvSpPr>
-          <p:cNvPr id="4" name="Espace réservé de la date 3"/>
-          <p:cNvSpPr>
-            <a:spLocks noGrp="1"/>
-          </p:cNvSpPr>
-          <p:nvPr>
-            <p:ph type="dt" sz="half" idx="10"/>
-          </p:nvPr>
-        </p:nvSpPr>
-        <p:spPr/>
-        <p:txBody>
-          <a:bodyPr/>
-          <a:lstStyle/>
-          <a:p>
-            <a:r>
-              <a:rPr lang="fr-FR" smtClean="0"/>
-              <a:t>Jeudi 29 Novembre 2012</a:t>
-            </a:r>
-            <a:endParaRPr lang="fr-FR" dirty="0"/>
-          </a:p>
-        </p:txBody>
-      </p:sp>
-      <p:sp>
-        <p:nvSpPr>
-          <p:cNvPr id="5" name="Espace réservé du pied de page 4"/>
-          <p:cNvSpPr>
-            <a:spLocks noGrp="1"/>
-          </p:cNvSpPr>
-          <p:nvPr>
-            <p:ph type="ftr" sz="quarter" idx="11"/>
-          </p:nvPr>
-        </p:nvSpPr>
-        <p:spPr/>
-        <p:txBody>
-          <a:bodyPr/>
-          <a:lstStyle/>
-          <a:p>
-            <a:r>
-              <a:rPr lang="fr-FR" smtClean="0"/>
-              <a:t>Paul Fiat</a:t>
-            </a:r>
-            <a:endParaRPr lang="fr-FR" dirty="0"/>
-          </a:p>
-        </p:txBody>
-      </p:sp>
-      <p:sp>
-        <p:nvSpPr>
-          <p:cNvPr id="6" name="Espace réservé du numéro de diapositive 5"/>
-          <p:cNvSpPr>
-            <a:spLocks noGrp="1"/>
-          </p:cNvSpPr>
-          <p:nvPr>
-            <p:ph type="sldNum" sz="quarter" idx="12"/>
-          </p:nvPr>
-        </p:nvSpPr>
-        <p:spPr/>
-        <p:txBody>
-          <a:bodyPr/>
-          <a:lstStyle/>
-          <a:p>
-            <a:fld id="{9DDF0C85-99BB-428E-8D90-A207FA2E644C}" type="slidenum">
-              <a:rPr lang="fr-FR" smtClean="0"/>
-              <a:pPr/>
-              <a:t>7</a:t>
             </a:fld>
             <a:endParaRPr lang="fr-FR" dirty="0"/>
           </a:p>
@@ -6703,6 +5958,10 @@
             <a:endParaRPr lang="fr-FR" u="sng" dirty="0" smtClean="0"/>
           </a:p>
           <a:p>
+            <a:pPr>
+              <a:buFont typeface="Wingdings" pitchFamily="2" charset="2"/>
+              <a:buChar char="v"/>
+            </a:pPr>
             <a:r>
               <a:rPr lang="fr-FR" u="sng" dirty="0" smtClean="0"/>
               <a:t>USP</a:t>
@@ -6716,59 +5975,75 @@
             <a:endParaRPr lang="fr-FR" u="sng" dirty="0" smtClean="0"/>
           </a:p>
           <a:p>
+            <a:r>
+              <a:rPr lang="fr-FR" dirty="0" smtClean="0"/>
+              <a:t>Déplacement </a:t>
+            </a:r>
+            <a:r>
+              <a:rPr lang="fr-FR" dirty="0" smtClean="0"/>
+              <a:t>à la souris sur 360°.</a:t>
+            </a:r>
+          </a:p>
+          <a:p>
+            <a:endParaRPr lang="fr-FR" dirty="0" smtClean="0"/>
+          </a:p>
+          <a:p>
             <a:pPr>
               <a:buFont typeface="Wingdings" pitchFamily="2" charset="2"/>
-              <a:buChar char="Ø"/>
+              <a:buChar char="v"/>
             </a:pPr>
             <a:r>
+              <a:rPr lang="fr-FR" u="sng" dirty="0" smtClean="0"/>
+              <a:t>Key </a:t>
+            </a:r>
+            <a:r>
+              <a:rPr lang="fr-FR" u="sng" dirty="0" err="1" smtClean="0"/>
+              <a:t>Features</a:t>
+            </a:r>
+            <a:endParaRPr lang="fr-FR" dirty="0" smtClean="0"/>
+          </a:p>
+          <a:p>
+            <a:endParaRPr lang="fr-FR" dirty="0" smtClean="0"/>
+          </a:p>
+          <a:p>
+            <a:r>
               <a:rPr lang="fr-FR" dirty="0" smtClean="0"/>
-              <a:t> Déplacement à la souris sur 360°.</a:t>
-            </a:r>
-          </a:p>
-          <a:p>
+              <a:t>- Univers </a:t>
+            </a:r>
+            <a:r>
+              <a:rPr lang="fr-FR" dirty="0" smtClean="0"/>
+              <a:t>original.</a:t>
+            </a:r>
+          </a:p>
+          <a:p>
+            <a:r>
+              <a:rPr lang="fr-FR" dirty="0" smtClean="0"/>
+              <a:t>- </a:t>
+            </a:r>
+            <a:r>
+              <a:rPr lang="fr-FR" dirty="0" smtClean="0"/>
+              <a:t>Apparitions des ennemis </a:t>
+            </a:r>
+            <a:r>
+              <a:rPr lang="fr-FR" dirty="0" smtClean="0"/>
+              <a:t>de tout bords.</a:t>
+            </a:r>
+          </a:p>
+          <a:p>
+            <a:r>
+              <a:rPr lang="fr-FR" dirty="0" smtClean="0"/>
+              <a:t>- Scrolling sur toutes les directions.</a:t>
+            </a:r>
             <a:endParaRPr lang="fr-FR" dirty="0" smtClean="0"/>
           </a:p>
           <a:p>
             <a:r>
-              <a:rPr lang="fr-FR" u="sng" dirty="0" smtClean="0"/>
-              <a:t>KSPs</a:t>
-            </a:r>
-            <a:r>
               <a:rPr lang="fr-FR" dirty="0" smtClean="0"/>
-              <a:t> :</a:t>
-            </a:r>
-          </a:p>
-          <a:p>
-            <a:endParaRPr lang="fr-FR" dirty="0" smtClean="0"/>
-          </a:p>
-          <a:p>
-            <a:pPr>
-              <a:buFont typeface="Wingdings" pitchFamily="2" charset="2"/>
-              <a:buChar char="Ø"/>
-            </a:pPr>
+              <a:t>- </a:t>
+            </a:r>
             <a:r>
               <a:rPr lang="fr-FR" dirty="0" smtClean="0"/>
-              <a:t> Univers original.</a:t>
-            </a:r>
-          </a:p>
-          <a:p>
-            <a:pPr>
-              <a:buFont typeface="Wingdings" pitchFamily="2" charset="2"/>
-              <a:buChar char="Ø"/>
-            </a:pPr>
-            <a:r>
-              <a:rPr lang="fr-FR" dirty="0" smtClean="0"/>
-              <a:t> Apparitions des ennemis à 360°.</a:t>
-            </a:r>
-          </a:p>
-          <a:p>
-            <a:pPr>
-              <a:buFont typeface="Wingdings" pitchFamily="2" charset="2"/>
-              <a:buChar char="Ø"/>
-            </a:pPr>
-            <a:r>
-              <a:rPr lang="fr-FR" dirty="0" smtClean="0"/>
-              <a:t> Influence des actions du joueur sur la fin du jeu.</a:t>
+              <a:t>Influence des actions du joueur sur la fin du jeu.</a:t>
             </a:r>
           </a:p>
           <a:p>
@@ -6802,7 +6077,7 @@
                             </p:stCondLst>
                             <p:childTnLst>
                               <p:par>
-                                <p:cTn id="5" presetID="22" presetClass="entr" presetSubtype="4" fill="hold" nodeType="clickEffect">
+                                <p:cTn id="5" presetID="37" presetClass="entr" presetSubtype="0" fill="hold" nodeType="clickEffect">
                                   <p:stCondLst>
                                     <p:cond delay="0"/>
                                   </p:stCondLst>
@@ -6810,110 +6085,6 @@
                                     <p:set>
                                       <p:cBhvr>
                                         <p:cTn id="6" dur="1" fill="hold">
-                                          <p:stCondLst>
-                                            <p:cond delay="0"/>
-                                          </p:stCondLst>
-                                        </p:cTn>
-                                        <p:tgtEl>
-                                          <p:spTgt spid="3">
-                                            <p:txEl>
-                                              <p:pRg st="1" end="1"/>
-                                            </p:txEl>
-                                          </p:spTgt>
-                                        </p:tgtEl>
-                                        <p:attrNameLst>
-                                          <p:attrName>style.visibility</p:attrName>
-                                        </p:attrNameLst>
-                                      </p:cBhvr>
-                                      <p:to>
-                                        <p:strVal val="visible"/>
-                                      </p:to>
-                                    </p:set>
-                                    <p:animEffect transition="in" filter="wipe(down)">
-                                      <p:cBhvr>
-                                        <p:cTn id="7" dur="500"/>
-                                        <p:tgtEl>
-                                          <p:spTgt spid="3">
-                                            <p:txEl>
-                                              <p:pRg st="1" end="1"/>
-                                            </p:txEl>
-                                          </p:spTgt>
-                                        </p:tgtEl>
-                                      </p:cBhvr>
-                                    </p:animEffect>
-                                  </p:childTnLst>
-                                </p:cTn>
-                              </p:par>
-                              <p:par>
-                                <p:cTn id="8" presetID="22" presetClass="entr" presetSubtype="4" fill="hold" nodeType="withEffect">
-                                  <p:stCondLst>
-                                    <p:cond delay="0"/>
-                                  </p:stCondLst>
-                                  <p:childTnLst>
-                                    <p:set>
-                                      <p:cBhvr>
-                                        <p:cTn id="9" dur="1" fill="hold">
-                                          <p:stCondLst>
-                                            <p:cond delay="0"/>
-                                          </p:stCondLst>
-                                        </p:cTn>
-                                        <p:tgtEl>
-                                          <p:spTgt spid="3">
-                                            <p:txEl>
-                                              <p:pRg st="3" end="3"/>
-                                            </p:txEl>
-                                          </p:spTgt>
-                                        </p:tgtEl>
-                                        <p:attrNameLst>
-                                          <p:attrName>style.visibility</p:attrName>
-                                        </p:attrNameLst>
-                                      </p:cBhvr>
-                                      <p:to>
-                                        <p:strVal val="visible"/>
-                                      </p:to>
-                                    </p:set>
-                                    <p:animEffect transition="in" filter="wipe(down)">
-                                      <p:cBhvr>
-                                        <p:cTn id="10" dur="500"/>
-                                        <p:tgtEl>
-                                          <p:spTgt spid="3">
-                                            <p:txEl>
-                                              <p:pRg st="3" end="3"/>
-                                            </p:txEl>
-                                          </p:spTgt>
-                                        </p:tgtEl>
-                                      </p:cBhvr>
-                                    </p:animEffect>
-                                  </p:childTnLst>
-                                </p:cTn>
-                              </p:par>
-                            </p:childTnLst>
-                          </p:cTn>
-                        </p:par>
-                      </p:childTnLst>
-                    </p:cTn>
-                  </p:par>
-                  <p:par>
-                    <p:cTn id="11" fill="hold">
-                      <p:stCondLst>
-                        <p:cond delay="indefinite"/>
-                      </p:stCondLst>
-                      <p:childTnLst>
-                        <p:par>
-                          <p:cTn id="12" fill="hold">
-                            <p:stCondLst>
-                              <p:cond delay="0"/>
-                            </p:stCondLst>
-                            <p:childTnLst>
-                              <p:par>
-                                <p:cTn id="13" presetID="22" presetClass="entr" presetSubtype="4" fill="hold" nodeType="clickEffect">
-                                  <p:stCondLst>
-                                    <p:cond delay="0"/>
-                                  </p:stCondLst>
-                                  <p:childTnLst>
-                                    <p:set>
-                                      <p:cBhvr>
-                                        <p:cTn id="14" dur="1" fill="hold">
                                           <p:stCondLst>
                                             <p:cond delay="0"/>
                                           </p:stCondLst>
@@ -6933,9 +6104,9 @@
                                         <p:strVal val="visible"/>
                                       </p:to>
                                     </p:set>
-                                    <p:animEffect transition="in" filter="wipe(down)">
+                                    <p:animEffect transition="in" filter="fade">
                                       <p:cBhvr>
-                                        <p:cTn id="15" dur="500"/>
+                                        <p:cTn id="7" dur="500"/>
                                         <p:tgtEl>
                                           <p:spTgt spid="3">
                                             <p:txEl>
@@ -6945,18 +6116,103 @@
                                         </p:tgtEl>
                                       </p:cBhvr>
                                     </p:animEffect>
+                                    <p:anim calcmode="lin" valueType="num">
+                                      <p:cBhvr>
+                                        <p:cTn id="8" dur="500" fill="hold"/>
+                                        <p:tgtEl>
+                                          <p:spTgt spid="3">
+                                            <p:txEl>
+                                              <p:pRg st="5" end="5"/>
+                                            </p:txEl>
+                                          </p:spTgt>
+                                        </p:tgtEl>
+                                        <p:attrNameLst>
+                                          <p:attrName>ppt_x</p:attrName>
+                                        </p:attrNameLst>
+                                      </p:cBhvr>
+                                      <p:tavLst>
+                                        <p:tav tm="0">
+                                          <p:val>
+                                            <p:strVal val="#ppt_x"/>
+                                          </p:val>
+                                        </p:tav>
+                                        <p:tav tm="100000">
+                                          <p:val>
+                                            <p:strVal val="#ppt_x"/>
+                                          </p:val>
+                                        </p:tav>
+                                      </p:tavLst>
+                                    </p:anim>
+                                    <p:anim calcmode="lin" valueType="num">
+                                      <p:cBhvr>
+                                        <p:cTn id="9" dur="450" decel="100000" fill="hold"/>
+                                        <p:tgtEl>
+                                          <p:spTgt spid="3">
+                                            <p:txEl>
+                                              <p:pRg st="5" end="5"/>
+                                            </p:txEl>
+                                          </p:spTgt>
+                                        </p:tgtEl>
+                                        <p:attrNameLst>
+                                          <p:attrName>ppt_y</p:attrName>
+                                        </p:attrNameLst>
+                                      </p:cBhvr>
+                                      <p:tavLst>
+                                        <p:tav tm="0">
+                                          <p:val>
+                                            <p:strVal val="#ppt_y+1"/>
+                                          </p:val>
+                                        </p:tav>
+                                        <p:tav tm="100000">
+                                          <p:val>
+                                            <p:strVal val="#ppt_y-.03"/>
+                                          </p:val>
+                                        </p:tav>
+                                      </p:tavLst>
+                                    </p:anim>
+                                    <p:anim calcmode="lin" valueType="num">
+                                      <p:cBhvr>
+                                        <p:cTn id="10" dur="50" accel="100000" fill="hold">
+                                          <p:stCondLst>
+                                            <p:cond delay="450"/>
+                                          </p:stCondLst>
+                                        </p:cTn>
+                                        <p:tgtEl>
+                                          <p:spTgt spid="3">
+                                            <p:txEl>
+                                              <p:pRg st="5" end="5"/>
+                                            </p:txEl>
+                                          </p:spTgt>
+                                        </p:tgtEl>
+                                        <p:attrNameLst>
+                                          <p:attrName>ppt_y</p:attrName>
+                                        </p:attrNameLst>
+                                      </p:cBhvr>
+                                      <p:tavLst>
+                                        <p:tav tm="0">
+                                          <p:val>
+                                            <p:strVal val="#ppt_y-.03"/>
+                                          </p:val>
+                                        </p:tav>
+                                        <p:tav tm="100000">
+                                          <p:val>
+                                            <p:strVal val="#ppt_y"/>
+                                          </p:val>
+                                        </p:tav>
+                                      </p:tavLst>
+                                    </p:anim>
                                   </p:childTnLst>
                                 </p:cTn>
                               </p:par>
                               <p:par>
-                                <p:cTn id="16" presetID="22" presetClass="entr" presetSubtype="4" fill="hold" nodeType="withEffect">
+                                <p:cTn id="11" presetID="37" presetClass="entr" presetSubtype="0" fill="hold" nodeType="withEffect">
                                   <p:stCondLst>
                                     <p:cond delay="0"/>
                                   </p:stCondLst>
                                   <p:childTnLst>
                                     <p:set>
                                       <p:cBhvr>
-                                        <p:cTn id="17" dur="1" fill="hold">
+                                        <p:cTn id="12" dur="1" fill="hold">
                                           <p:stCondLst>
                                             <p:cond delay="0"/>
                                           </p:stCondLst>
@@ -6976,9 +6232,9 @@
                                         <p:strVal val="visible"/>
                                       </p:to>
                                     </p:set>
-                                    <p:animEffect transition="in" filter="wipe(down)">
+                                    <p:animEffect transition="in" filter="fade">
                                       <p:cBhvr>
-                                        <p:cTn id="18" dur="500"/>
+                                        <p:cTn id="13" dur="500"/>
                                         <p:tgtEl>
                                           <p:spTgt spid="3">
                                             <p:txEl>
@@ -6988,18 +6244,103 @@
                                         </p:tgtEl>
                                       </p:cBhvr>
                                     </p:animEffect>
+                                    <p:anim calcmode="lin" valueType="num">
+                                      <p:cBhvr>
+                                        <p:cTn id="14" dur="500" fill="hold"/>
+                                        <p:tgtEl>
+                                          <p:spTgt spid="3">
+                                            <p:txEl>
+                                              <p:pRg st="7" end="7"/>
+                                            </p:txEl>
+                                          </p:spTgt>
+                                        </p:tgtEl>
+                                        <p:attrNameLst>
+                                          <p:attrName>ppt_x</p:attrName>
+                                        </p:attrNameLst>
+                                      </p:cBhvr>
+                                      <p:tavLst>
+                                        <p:tav tm="0">
+                                          <p:val>
+                                            <p:strVal val="#ppt_x"/>
+                                          </p:val>
+                                        </p:tav>
+                                        <p:tav tm="100000">
+                                          <p:val>
+                                            <p:strVal val="#ppt_x"/>
+                                          </p:val>
+                                        </p:tav>
+                                      </p:tavLst>
+                                    </p:anim>
+                                    <p:anim calcmode="lin" valueType="num">
+                                      <p:cBhvr>
+                                        <p:cTn id="15" dur="450" decel="100000" fill="hold"/>
+                                        <p:tgtEl>
+                                          <p:spTgt spid="3">
+                                            <p:txEl>
+                                              <p:pRg st="7" end="7"/>
+                                            </p:txEl>
+                                          </p:spTgt>
+                                        </p:tgtEl>
+                                        <p:attrNameLst>
+                                          <p:attrName>ppt_y</p:attrName>
+                                        </p:attrNameLst>
+                                      </p:cBhvr>
+                                      <p:tavLst>
+                                        <p:tav tm="0">
+                                          <p:val>
+                                            <p:strVal val="#ppt_y+1"/>
+                                          </p:val>
+                                        </p:tav>
+                                        <p:tav tm="100000">
+                                          <p:val>
+                                            <p:strVal val="#ppt_y-.03"/>
+                                          </p:val>
+                                        </p:tav>
+                                      </p:tavLst>
+                                    </p:anim>
+                                    <p:anim calcmode="lin" valueType="num">
+                                      <p:cBhvr>
+                                        <p:cTn id="16" dur="50" accel="100000" fill="hold">
+                                          <p:stCondLst>
+                                            <p:cond delay="450"/>
+                                          </p:stCondLst>
+                                        </p:cTn>
+                                        <p:tgtEl>
+                                          <p:spTgt spid="3">
+                                            <p:txEl>
+                                              <p:pRg st="7" end="7"/>
+                                            </p:txEl>
+                                          </p:spTgt>
+                                        </p:tgtEl>
+                                        <p:attrNameLst>
+                                          <p:attrName>ppt_y</p:attrName>
+                                        </p:attrNameLst>
+                                      </p:cBhvr>
+                                      <p:tavLst>
+                                        <p:tav tm="0">
+                                          <p:val>
+                                            <p:strVal val="#ppt_y-.03"/>
+                                          </p:val>
+                                        </p:tav>
+                                        <p:tav tm="100000">
+                                          <p:val>
+                                            <p:strVal val="#ppt_y"/>
+                                          </p:val>
+                                        </p:tav>
+                                      </p:tavLst>
+                                    </p:anim>
                                   </p:childTnLst>
                                 </p:cTn>
                               </p:par>
                               <p:par>
-                                <p:cTn id="19" presetID="22" presetClass="entr" presetSubtype="4" fill="hold" nodeType="withEffect">
+                                <p:cTn id="17" presetID="37" presetClass="entr" presetSubtype="0" fill="hold" nodeType="withEffect">
                                   <p:stCondLst>
                                     <p:cond delay="0"/>
                                   </p:stCondLst>
                                   <p:childTnLst>
                                     <p:set>
                                       <p:cBhvr>
-                                        <p:cTn id="20" dur="1" fill="hold">
+                                        <p:cTn id="18" dur="1" fill="hold">
                                           <p:stCondLst>
                                             <p:cond delay="0"/>
                                           </p:stCondLst>
@@ -7019,9 +6360,9 @@
                                         <p:strVal val="visible"/>
                                       </p:to>
                                     </p:set>
-                                    <p:animEffect transition="in" filter="wipe(down)">
+                                    <p:animEffect transition="in" filter="fade">
                                       <p:cBhvr>
-                                        <p:cTn id="21" dur="500"/>
+                                        <p:cTn id="19" dur="500"/>
                                         <p:tgtEl>
                                           <p:spTgt spid="3">
                                             <p:txEl>
@@ -7031,18 +6372,103 @@
                                         </p:tgtEl>
                                       </p:cBhvr>
                                     </p:animEffect>
+                                    <p:anim calcmode="lin" valueType="num">
+                                      <p:cBhvr>
+                                        <p:cTn id="20" dur="500" fill="hold"/>
+                                        <p:tgtEl>
+                                          <p:spTgt spid="3">
+                                            <p:txEl>
+                                              <p:pRg st="8" end="8"/>
+                                            </p:txEl>
+                                          </p:spTgt>
+                                        </p:tgtEl>
+                                        <p:attrNameLst>
+                                          <p:attrName>ppt_x</p:attrName>
+                                        </p:attrNameLst>
+                                      </p:cBhvr>
+                                      <p:tavLst>
+                                        <p:tav tm="0">
+                                          <p:val>
+                                            <p:strVal val="#ppt_x"/>
+                                          </p:val>
+                                        </p:tav>
+                                        <p:tav tm="100000">
+                                          <p:val>
+                                            <p:strVal val="#ppt_x"/>
+                                          </p:val>
+                                        </p:tav>
+                                      </p:tavLst>
+                                    </p:anim>
+                                    <p:anim calcmode="lin" valueType="num">
+                                      <p:cBhvr>
+                                        <p:cTn id="21" dur="450" decel="100000" fill="hold"/>
+                                        <p:tgtEl>
+                                          <p:spTgt spid="3">
+                                            <p:txEl>
+                                              <p:pRg st="8" end="8"/>
+                                            </p:txEl>
+                                          </p:spTgt>
+                                        </p:tgtEl>
+                                        <p:attrNameLst>
+                                          <p:attrName>ppt_y</p:attrName>
+                                        </p:attrNameLst>
+                                      </p:cBhvr>
+                                      <p:tavLst>
+                                        <p:tav tm="0">
+                                          <p:val>
+                                            <p:strVal val="#ppt_y+1"/>
+                                          </p:val>
+                                        </p:tav>
+                                        <p:tav tm="100000">
+                                          <p:val>
+                                            <p:strVal val="#ppt_y-.03"/>
+                                          </p:val>
+                                        </p:tav>
+                                      </p:tavLst>
+                                    </p:anim>
+                                    <p:anim calcmode="lin" valueType="num">
+                                      <p:cBhvr>
+                                        <p:cTn id="22" dur="50" accel="100000" fill="hold">
+                                          <p:stCondLst>
+                                            <p:cond delay="450"/>
+                                          </p:stCondLst>
+                                        </p:cTn>
+                                        <p:tgtEl>
+                                          <p:spTgt spid="3">
+                                            <p:txEl>
+                                              <p:pRg st="8" end="8"/>
+                                            </p:txEl>
+                                          </p:spTgt>
+                                        </p:tgtEl>
+                                        <p:attrNameLst>
+                                          <p:attrName>ppt_y</p:attrName>
+                                        </p:attrNameLst>
+                                      </p:cBhvr>
+                                      <p:tavLst>
+                                        <p:tav tm="0">
+                                          <p:val>
+                                            <p:strVal val="#ppt_y-.03"/>
+                                          </p:val>
+                                        </p:tav>
+                                        <p:tav tm="100000">
+                                          <p:val>
+                                            <p:strVal val="#ppt_y"/>
+                                          </p:val>
+                                        </p:tav>
+                                      </p:tavLst>
+                                    </p:anim>
                                   </p:childTnLst>
                                 </p:cTn>
                               </p:par>
                               <p:par>
-                                <p:cTn id="22" presetID="22" presetClass="entr" presetSubtype="4" fill="hold" nodeType="withEffect">
+                                <p:cTn id="23" presetID="37" presetClass="entr" presetSubtype="0" fill="hold" nodeType="withEffect">
                                   <p:stCondLst>
                                     <p:cond delay="0"/>
                                   </p:stCondLst>
                                   <p:childTnLst>
                                     <p:set>
                                       <p:cBhvr>
-                                        <p:cTn id="23" dur="1" fill="hold">
+                                        <p:cTn id="24" dur="1" fill="hold">
                                           <p:stCondLst>
                                             <p:cond delay="0"/>
                                           </p:stCondLst>
@@ -7062,9 +6488,9 @@
                                         <p:strVal val="visible"/>
                                       </p:to>
                                     </p:set>
-                                    <p:animEffect transition="in" filter="wipe(down)">
+                                    <p:animEffect transition="in" filter="fade">
                                       <p:cBhvr>
-                                        <p:cTn id="24" dur="500"/>
+                                        <p:cTn id="25" dur="500"/>
                                         <p:tgtEl>
                                           <p:spTgt spid="3">
                                             <p:txEl>
@@ -7074,6 +6500,1068 @@
                                         </p:tgtEl>
                                       </p:cBhvr>
                                     </p:animEffect>
+                                    <p:anim calcmode="lin" valueType="num">
+                                      <p:cBhvr>
+                                        <p:cTn id="26" dur="500" fill="hold"/>
+                                        <p:tgtEl>
+                                          <p:spTgt spid="3">
+                                            <p:txEl>
+                                              <p:pRg st="9" end="9"/>
+                                            </p:txEl>
+                                          </p:spTgt>
+                                        </p:tgtEl>
+                                        <p:attrNameLst>
+                                          <p:attrName>ppt_x</p:attrName>
+                                        </p:attrNameLst>
+                                      </p:cBhvr>
+                                      <p:tavLst>
+                                        <p:tav tm="0">
+                                          <p:val>
+                                            <p:strVal val="#ppt_x"/>
+                                          </p:val>
+                                        </p:tav>
+                                        <p:tav tm="100000">
+                                          <p:val>
+                                            <p:strVal val="#ppt_x"/>
+                                          </p:val>
+                                        </p:tav>
+                                      </p:tavLst>
+                                    </p:anim>
+                                    <p:anim calcmode="lin" valueType="num">
+                                      <p:cBhvr>
+                                        <p:cTn id="27" dur="450" decel="100000" fill="hold"/>
+                                        <p:tgtEl>
+                                          <p:spTgt spid="3">
+                                            <p:txEl>
+                                              <p:pRg st="9" end="9"/>
+                                            </p:txEl>
+                                          </p:spTgt>
+                                        </p:tgtEl>
+                                        <p:attrNameLst>
+                                          <p:attrName>ppt_y</p:attrName>
+                                        </p:attrNameLst>
+                                      </p:cBhvr>
+                                      <p:tavLst>
+                                        <p:tav tm="0">
+                                          <p:val>
+                                            <p:strVal val="#ppt_y+1"/>
+                                          </p:val>
+                                        </p:tav>
+                                        <p:tav tm="100000">
+                                          <p:val>
+                                            <p:strVal val="#ppt_y-.03"/>
+                                          </p:val>
+                                        </p:tav>
+                                      </p:tavLst>
+                                    </p:anim>
+                                    <p:anim calcmode="lin" valueType="num">
+                                      <p:cBhvr>
+                                        <p:cTn id="28" dur="50" accel="100000" fill="hold">
+                                          <p:stCondLst>
+                                            <p:cond delay="450"/>
+                                          </p:stCondLst>
+                                        </p:cTn>
+                                        <p:tgtEl>
+                                          <p:spTgt spid="3">
+                                            <p:txEl>
+                                              <p:pRg st="9" end="9"/>
+                                            </p:txEl>
+                                          </p:spTgt>
+                                        </p:tgtEl>
+                                        <p:attrNameLst>
+                                          <p:attrName>ppt_y</p:attrName>
+                                        </p:attrNameLst>
+                                      </p:cBhvr>
+                                      <p:tavLst>
+                                        <p:tav tm="0">
+                                          <p:val>
+                                            <p:strVal val="#ppt_y-.03"/>
+                                          </p:val>
+                                        </p:tav>
+                                        <p:tav tm="100000">
+                                          <p:val>
+                                            <p:strVal val="#ppt_y"/>
+                                          </p:val>
+                                        </p:tav>
+                                      </p:tavLst>
+                                    </p:anim>
+                                  </p:childTnLst>
+                                </p:cTn>
+                              </p:par>
+                              <p:par>
+                                <p:cTn id="29" presetID="37" presetClass="entr" presetSubtype="0" fill="hold" nodeType="withEffect">
+                                  <p:stCondLst>
+                                    <p:cond delay="0"/>
+                                  </p:stCondLst>
+                                  <p:childTnLst>
+                                    <p:set>
+                                      <p:cBhvr>
+                                        <p:cTn id="30" dur="1" fill="hold">
+                                          <p:stCondLst>
+                                            <p:cond delay="0"/>
+                                          </p:stCondLst>
+                                        </p:cTn>
+                                        <p:tgtEl>
+                                          <p:spTgt spid="3">
+                                            <p:txEl>
+                                              <p:pRg st="10" end="10"/>
+                                            </p:txEl>
+                                          </p:spTgt>
+                                        </p:tgtEl>
+                                        <p:attrNameLst>
+                                          <p:attrName>style.visibility</p:attrName>
+                                        </p:attrNameLst>
+                                      </p:cBhvr>
+                                      <p:to>
+                                        <p:strVal val="visible"/>
+                                      </p:to>
+                                    </p:set>
+                                    <p:animEffect transition="in" filter="fade">
+                                      <p:cBhvr>
+                                        <p:cTn id="31" dur="500"/>
+                                        <p:tgtEl>
+                                          <p:spTgt spid="3">
+                                            <p:txEl>
+                                              <p:pRg st="10" end="10"/>
+                                            </p:txEl>
+                                          </p:spTgt>
+                                        </p:tgtEl>
+                                      </p:cBhvr>
+                                    </p:animEffect>
+                                    <p:anim calcmode="lin" valueType="num">
+                                      <p:cBhvr>
+                                        <p:cTn id="32" dur="500" fill="hold"/>
+                                        <p:tgtEl>
+                                          <p:spTgt spid="3">
+                                            <p:txEl>
+                                              <p:pRg st="10" end="10"/>
+                                            </p:txEl>
+                                          </p:spTgt>
+                                        </p:tgtEl>
+                                        <p:attrNameLst>
+                                          <p:attrName>ppt_x</p:attrName>
+                                        </p:attrNameLst>
+                                      </p:cBhvr>
+                                      <p:tavLst>
+                                        <p:tav tm="0">
+                                          <p:val>
+                                            <p:strVal val="#ppt_x"/>
+                                          </p:val>
+                                        </p:tav>
+                                        <p:tav tm="100000">
+                                          <p:val>
+                                            <p:strVal val="#ppt_x"/>
+                                          </p:val>
+                                        </p:tav>
+                                      </p:tavLst>
+                                    </p:anim>
+                                    <p:anim calcmode="lin" valueType="num">
+                                      <p:cBhvr>
+                                        <p:cTn id="33" dur="450" decel="100000" fill="hold"/>
+                                        <p:tgtEl>
+                                          <p:spTgt spid="3">
+                                            <p:txEl>
+                                              <p:pRg st="10" end="10"/>
+                                            </p:txEl>
+                                          </p:spTgt>
+                                        </p:tgtEl>
+                                        <p:attrNameLst>
+                                          <p:attrName>ppt_y</p:attrName>
+                                        </p:attrNameLst>
+                                      </p:cBhvr>
+                                      <p:tavLst>
+                                        <p:tav tm="0">
+                                          <p:val>
+                                            <p:strVal val="#ppt_y+1"/>
+                                          </p:val>
+                                        </p:tav>
+                                        <p:tav tm="100000">
+                                          <p:val>
+                                            <p:strVal val="#ppt_y-.03"/>
+                                          </p:val>
+                                        </p:tav>
+                                      </p:tavLst>
+                                    </p:anim>
+                                    <p:anim calcmode="lin" valueType="num">
+                                      <p:cBhvr>
+                                        <p:cTn id="34" dur="50" accel="100000" fill="hold">
+                                          <p:stCondLst>
+                                            <p:cond delay="450"/>
+                                          </p:stCondLst>
+                                        </p:cTn>
+                                        <p:tgtEl>
+                                          <p:spTgt spid="3">
+                                            <p:txEl>
+                                              <p:pRg st="10" end="10"/>
+                                            </p:txEl>
+                                          </p:spTgt>
+                                        </p:tgtEl>
+                                        <p:attrNameLst>
+                                          <p:attrName>ppt_y</p:attrName>
+                                        </p:attrNameLst>
+                                      </p:cBhvr>
+                                      <p:tavLst>
+                                        <p:tav tm="0">
+                                          <p:val>
+                                            <p:strVal val="#ppt_y-.03"/>
+                                          </p:val>
+                                        </p:tav>
+                                        <p:tav tm="100000">
+                                          <p:val>
+                                            <p:strVal val="#ppt_y"/>
+                                          </p:val>
+                                        </p:tav>
+                                      </p:tavLst>
+                                    </p:anim>
+                                  </p:childTnLst>
+                                </p:cTn>
+                              </p:par>
+                            </p:childTnLst>
+                          </p:cTn>
+                        </p:par>
+                      </p:childTnLst>
+                    </p:cTn>
+                  </p:par>
+                </p:childTnLst>
+              </p:cTn>
+              <p:prevCondLst>
+                <p:cond evt="onPrev" delay="0">
+                  <p:tgtEl>
+                    <p:sldTgt/>
+                  </p:tgtEl>
+                </p:cond>
+              </p:prevCondLst>
+              <p:nextCondLst>
+                <p:cond evt="onNext" delay="0">
+                  <p:tgtEl>
+                    <p:sldTgt/>
+                  </p:tgtEl>
+                </p:cond>
+              </p:nextCondLst>
+            </p:seq>
+          </p:childTnLst>
+        </p:cTn>
+      </p:par>
+    </p:tnLst>
+  </p:timing>
+</p:sld>
+</file>
+
+<file path=ppt/slides/slide7.xml><?xml version="1.0" encoding="utf-8"?>
+<p:sld xmlns:a="http://schemas.openxmlformats.org/drawingml/2006/main" xmlns:r="http://schemas.openxmlformats.org/officeDocument/2006/relationships" xmlns:p="http://schemas.openxmlformats.org/presentationml/2006/main">
+  <p:cSld>
+    <p:spTree>
+      <p:nvGrpSpPr>
+        <p:cNvPr id="1" name=""/>
+        <p:cNvGrpSpPr/>
+        <p:nvPr/>
+      </p:nvGrpSpPr>
+      <p:grpSpPr>
+        <a:xfrm>
+          <a:off x="0" y="0"/>
+          <a:ext cx="0" cy="0"/>
+          <a:chOff x="0" y="0"/>
+          <a:chExt cx="0" cy="0"/>
+        </a:xfrm>
+      </p:grpSpPr>
+      <p:sp>
+        <p:nvSpPr>
+          <p:cNvPr id="4" name="Espace réservé de la date 3"/>
+          <p:cNvSpPr>
+            <a:spLocks noGrp="1"/>
+          </p:cNvSpPr>
+          <p:nvPr>
+            <p:ph type="dt" sz="half" idx="10"/>
+          </p:nvPr>
+        </p:nvSpPr>
+        <p:spPr/>
+        <p:txBody>
+          <a:bodyPr/>
+          <a:lstStyle/>
+          <a:p>
+            <a:r>
+              <a:rPr lang="fr-FR" smtClean="0"/>
+              <a:t>Jeudi 29 Novembre 2012</a:t>
+            </a:r>
+            <a:endParaRPr lang="fr-FR" dirty="0"/>
+          </a:p>
+        </p:txBody>
+      </p:sp>
+      <p:sp>
+        <p:nvSpPr>
+          <p:cNvPr id="5" name="Espace réservé du pied de page 4"/>
+          <p:cNvSpPr>
+            <a:spLocks noGrp="1"/>
+          </p:cNvSpPr>
+          <p:nvPr>
+            <p:ph type="ftr" sz="quarter" idx="11"/>
+          </p:nvPr>
+        </p:nvSpPr>
+        <p:spPr/>
+        <p:txBody>
+          <a:bodyPr/>
+          <a:lstStyle/>
+          <a:p>
+            <a:r>
+              <a:rPr lang="fr-FR" smtClean="0"/>
+              <a:t>Paul Fiat</a:t>
+            </a:r>
+            <a:endParaRPr lang="fr-FR" dirty="0"/>
+          </a:p>
+        </p:txBody>
+      </p:sp>
+      <p:sp>
+        <p:nvSpPr>
+          <p:cNvPr id="6" name="Espace réservé du numéro de diapositive 5"/>
+          <p:cNvSpPr>
+            <a:spLocks noGrp="1"/>
+          </p:cNvSpPr>
+          <p:nvPr>
+            <p:ph type="sldNum" sz="quarter" idx="12"/>
+          </p:nvPr>
+        </p:nvSpPr>
+        <p:spPr/>
+        <p:txBody>
+          <a:bodyPr/>
+          <a:lstStyle/>
+          <a:p>
+            <a:fld id="{9DDF0C85-99BB-428E-8D90-A207FA2E644C}" type="slidenum">
+              <a:rPr lang="fr-FR" smtClean="0"/>
+              <a:pPr/>
+              <a:t>7</a:t>
+            </a:fld>
+            <a:endParaRPr lang="fr-FR" dirty="0"/>
+          </a:p>
+        </p:txBody>
+      </p:sp>
+      <p:sp>
+        <p:nvSpPr>
+          <p:cNvPr id="2" name="Title 1"/>
+          <p:cNvSpPr>
+            <a:spLocks noGrp="1"/>
+          </p:cNvSpPr>
+          <p:nvPr>
+            <p:ph type="title"/>
+          </p:nvPr>
+        </p:nvSpPr>
+        <p:spPr/>
+        <p:txBody>
+          <a:bodyPr/>
+          <a:lstStyle/>
+          <a:p>
+            <a:r>
+              <a:rPr lang="fr-FR" dirty="0" smtClean="0"/>
+              <a:t>Camera, Character, Controls</a:t>
+            </a:r>
+            <a:endParaRPr lang="fr-FR" dirty="0"/>
+          </a:p>
+        </p:txBody>
+      </p:sp>
+      <p:sp>
+        <p:nvSpPr>
+          <p:cNvPr id="3" name="Text Placeholder 2"/>
+          <p:cNvSpPr>
+            <a:spLocks noGrp="1"/>
+          </p:cNvSpPr>
+          <p:nvPr>
+            <p:ph type="body" idx="1"/>
+          </p:nvPr>
+        </p:nvSpPr>
+        <p:spPr>
+          <a:xfrm>
+            <a:off x="381000" y="1633536"/>
+            <a:ext cx="8548718" cy="5081612"/>
+          </a:xfrm>
+        </p:spPr>
+        <p:txBody>
+          <a:bodyPr>
+            <a:normAutofit/>
+          </a:bodyPr>
+          <a:lstStyle/>
+          <a:p>
+            <a:pPr>
+              <a:buFont typeface="Wingdings" pitchFamily="2" charset="2"/>
+              <a:buChar char="Ø"/>
+            </a:pPr>
+            <a:endParaRPr lang="fr-FR" u="sng" dirty="0" smtClean="0"/>
+          </a:p>
+          <a:p>
+            <a:pPr>
+              <a:buFont typeface="Wingdings" pitchFamily="2" charset="2"/>
+              <a:buChar char="Ø"/>
+            </a:pPr>
+            <a:r>
+              <a:rPr lang="fr-FR" dirty="0" smtClean="0"/>
+              <a:t> </a:t>
+            </a:r>
+            <a:r>
+              <a:rPr lang="fr-FR" u="sng" dirty="0" smtClean="0"/>
+              <a:t>Camera</a:t>
+            </a:r>
+            <a:r>
+              <a:rPr lang="fr-FR" dirty="0" smtClean="0"/>
+              <a:t> :</a:t>
+            </a:r>
+          </a:p>
+          <a:p>
+            <a:r>
+              <a:rPr lang="fr-FR" dirty="0" smtClean="0"/>
+              <a:t>Vue </a:t>
+            </a:r>
+            <a:r>
+              <a:rPr lang="fr-FR" dirty="0" smtClean="0"/>
+              <a:t>2D, la camera suit le </a:t>
+            </a:r>
+            <a:r>
+              <a:rPr lang="fr-FR" dirty="0" smtClean="0"/>
+              <a:t>scrolling.</a:t>
+            </a:r>
+          </a:p>
+          <a:p>
+            <a:endParaRPr lang="fr-FR" dirty="0" smtClean="0"/>
+          </a:p>
+          <a:p>
+            <a:pPr>
+              <a:buFont typeface="Wingdings" pitchFamily="2" charset="2"/>
+              <a:buChar char="Ø"/>
+            </a:pPr>
+            <a:r>
+              <a:rPr lang="fr-FR" dirty="0" smtClean="0"/>
+              <a:t> </a:t>
+            </a:r>
+            <a:r>
+              <a:rPr lang="fr-FR" u="sng" dirty="0" err="1" smtClean="0"/>
+              <a:t>Character</a:t>
+            </a:r>
+            <a:r>
+              <a:rPr lang="fr-FR" dirty="0" smtClean="0"/>
+              <a:t> </a:t>
+            </a:r>
+            <a:r>
+              <a:rPr lang="fr-FR" dirty="0" smtClean="0"/>
+              <a:t>:</a:t>
+            </a:r>
+          </a:p>
+          <a:p>
+            <a:r>
+              <a:rPr lang="fr-FR" dirty="0" smtClean="0"/>
+              <a:t>Spermatozoïde génétiquement modifiable.</a:t>
+            </a:r>
+            <a:endParaRPr lang="fr-FR" dirty="0" smtClean="0"/>
+          </a:p>
+          <a:p>
+            <a:endParaRPr lang="fr-FR" dirty="0" smtClean="0"/>
+          </a:p>
+          <a:p>
+            <a:pPr>
+              <a:buFont typeface="Wingdings" pitchFamily="2" charset="2"/>
+              <a:buChar char="Ø"/>
+            </a:pPr>
+            <a:r>
+              <a:rPr lang="fr-FR" dirty="0" smtClean="0"/>
+              <a:t> </a:t>
+            </a:r>
+            <a:r>
+              <a:rPr lang="fr-FR" u="sng" dirty="0" err="1" smtClean="0"/>
+              <a:t>Controls</a:t>
+            </a:r>
+            <a:r>
+              <a:rPr lang="fr-FR" dirty="0" smtClean="0"/>
+              <a:t> </a:t>
+            </a:r>
+            <a:r>
+              <a:rPr lang="fr-FR" dirty="0" smtClean="0"/>
+              <a:t>:</a:t>
+            </a:r>
+          </a:p>
+          <a:p>
+            <a:r>
+              <a:rPr lang="fr-FR" dirty="0" smtClean="0"/>
+              <a:t>Tirs automatiques, déplacement au clic, zone de paramétrage du canon.</a:t>
+            </a:r>
+          </a:p>
+        </p:txBody>
+      </p:sp>
+      <p:pic>
+        <p:nvPicPr>
+          <p:cNvPr id="7" name="Picture 6" descr="ship.png"/>
+          <p:cNvPicPr>
+            <a:picLocks noChangeAspect="1"/>
+          </p:cNvPicPr>
+          <p:nvPr/>
+        </p:nvPicPr>
+        <p:blipFill>
+          <a:blip r:embed="rId2"/>
+          <a:stretch>
+            <a:fillRect/>
+          </a:stretch>
+        </p:blipFill>
+        <p:spPr>
+          <a:xfrm rot="5400000">
+            <a:off x="6215074" y="2928934"/>
+            <a:ext cx="1428760" cy="1428760"/>
+          </a:xfrm>
+          <a:prstGeom prst="rect">
+            <a:avLst/>
+          </a:prstGeom>
+        </p:spPr>
+      </p:pic>
+      <p:pic>
+        <p:nvPicPr>
+          <p:cNvPr id="8" name="Picture 7" descr="adn.png"/>
+          <p:cNvPicPr>
+            <a:picLocks noChangeAspect="1"/>
+          </p:cNvPicPr>
+          <p:nvPr/>
+        </p:nvPicPr>
+        <p:blipFill>
+          <a:blip r:embed="rId3" cstate="print"/>
+          <a:stretch>
+            <a:fillRect/>
+          </a:stretch>
+        </p:blipFill>
+        <p:spPr>
+          <a:xfrm>
+            <a:off x="7215206" y="3500438"/>
+            <a:ext cx="357190" cy="285752"/>
+          </a:xfrm>
+          <a:prstGeom prst="rect">
+            <a:avLst/>
+          </a:prstGeom>
+        </p:spPr>
+      </p:pic>
+    </p:spTree>
+  </p:cSld>
+  <p:clrMapOvr>
+    <a:masterClrMapping/>
+  </p:clrMapOvr>
+  <p:timing>
+    <p:tnLst>
+      <p:par>
+        <p:cTn id="1" dur="indefinite" restart="never" nodeType="tmRoot">
+          <p:childTnLst>
+            <p:seq concurrent="1" nextAc="seek">
+              <p:cTn id="2" dur="indefinite" nodeType="mainSeq">
+                <p:childTnLst>
+                  <p:par>
+                    <p:cTn id="3" fill="hold">
+                      <p:stCondLst>
+                        <p:cond delay="indefinite"/>
+                      </p:stCondLst>
+                      <p:childTnLst>
+                        <p:par>
+                          <p:cTn id="4" fill="hold">
+                            <p:stCondLst>
+                              <p:cond delay="0"/>
+                            </p:stCondLst>
+                            <p:childTnLst>
+                              <p:par>
+                                <p:cTn id="5" presetID="37" presetClass="entr" presetSubtype="0" fill="hold" nodeType="clickEffect">
+                                  <p:stCondLst>
+                                    <p:cond delay="0"/>
+                                  </p:stCondLst>
+                                  <p:childTnLst>
+                                    <p:set>
+                                      <p:cBhvr>
+                                        <p:cTn id="6" dur="1" fill="hold">
+                                          <p:stCondLst>
+                                            <p:cond delay="0"/>
+                                          </p:stCondLst>
+                                        </p:cTn>
+                                        <p:tgtEl>
+                                          <p:spTgt spid="7"/>
+                                        </p:tgtEl>
+                                        <p:attrNameLst>
+                                          <p:attrName>style.visibility</p:attrName>
+                                        </p:attrNameLst>
+                                      </p:cBhvr>
+                                      <p:to>
+                                        <p:strVal val="visible"/>
+                                      </p:to>
+                                    </p:set>
+                                    <p:animEffect transition="in" filter="fade">
+                                      <p:cBhvr>
+                                        <p:cTn id="7" dur="500"/>
+                                        <p:tgtEl>
+                                          <p:spTgt spid="7"/>
+                                        </p:tgtEl>
+                                      </p:cBhvr>
+                                    </p:animEffect>
+                                    <p:anim calcmode="lin" valueType="num">
+                                      <p:cBhvr>
+                                        <p:cTn id="8" dur="500" fill="hold"/>
+                                        <p:tgtEl>
+                                          <p:spTgt spid="7"/>
+                                        </p:tgtEl>
+                                        <p:attrNameLst>
+                                          <p:attrName>ppt_x</p:attrName>
+                                        </p:attrNameLst>
+                                      </p:cBhvr>
+                                      <p:tavLst>
+                                        <p:tav tm="0">
+                                          <p:val>
+                                            <p:strVal val="#ppt_x"/>
+                                          </p:val>
+                                        </p:tav>
+                                        <p:tav tm="100000">
+                                          <p:val>
+                                            <p:strVal val="#ppt_x"/>
+                                          </p:val>
+                                        </p:tav>
+                                      </p:tavLst>
+                                    </p:anim>
+                                    <p:anim calcmode="lin" valueType="num">
+                                      <p:cBhvr>
+                                        <p:cTn id="9" dur="450" decel="100000" fill="hold"/>
+                                        <p:tgtEl>
+                                          <p:spTgt spid="7"/>
+                                        </p:tgtEl>
+                                        <p:attrNameLst>
+                                          <p:attrName>ppt_y</p:attrName>
+                                        </p:attrNameLst>
+                                      </p:cBhvr>
+                                      <p:tavLst>
+                                        <p:tav tm="0">
+                                          <p:val>
+                                            <p:strVal val="#ppt_y+1"/>
+                                          </p:val>
+                                        </p:tav>
+                                        <p:tav tm="100000">
+                                          <p:val>
+                                            <p:strVal val="#ppt_y-.03"/>
+                                          </p:val>
+                                        </p:tav>
+                                      </p:tavLst>
+                                    </p:anim>
+                                    <p:anim calcmode="lin" valueType="num">
+                                      <p:cBhvr>
+                                        <p:cTn id="10" dur="50" accel="100000" fill="hold">
+                                          <p:stCondLst>
+                                            <p:cond delay="450"/>
+                                          </p:stCondLst>
+                                        </p:cTn>
+                                        <p:tgtEl>
+                                          <p:spTgt spid="7"/>
+                                        </p:tgtEl>
+                                        <p:attrNameLst>
+                                          <p:attrName>ppt_y</p:attrName>
+                                        </p:attrNameLst>
+                                      </p:cBhvr>
+                                      <p:tavLst>
+                                        <p:tav tm="0">
+                                          <p:val>
+                                            <p:strVal val="#ppt_y-.03"/>
+                                          </p:val>
+                                        </p:tav>
+                                        <p:tav tm="100000">
+                                          <p:val>
+                                            <p:strVal val="#ppt_y"/>
+                                          </p:val>
+                                        </p:tav>
+                                      </p:tavLst>
+                                    </p:anim>
+                                  </p:childTnLst>
+                                </p:cTn>
+                              </p:par>
+                              <p:par>
+                                <p:cTn id="11" presetID="37" presetClass="entr" presetSubtype="0" fill="hold" nodeType="withEffect">
+                                  <p:stCondLst>
+                                    <p:cond delay="0"/>
+                                  </p:stCondLst>
+                                  <p:childTnLst>
+                                    <p:set>
+                                      <p:cBhvr>
+                                        <p:cTn id="12" dur="1" fill="hold">
+                                          <p:stCondLst>
+                                            <p:cond delay="0"/>
+                                          </p:stCondLst>
+                                        </p:cTn>
+                                        <p:tgtEl>
+                                          <p:spTgt spid="3">
+                                            <p:txEl>
+                                              <p:pRg st="5" end="5"/>
+                                            </p:txEl>
+                                          </p:spTgt>
+                                        </p:tgtEl>
+                                        <p:attrNameLst>
+                                          <p:attrName>style.visibility</p:attrName>
+                                        </p:attrNameLst>
+                                      </p:cBhvr>
+                                      <p:to>
+                                        <p:strVal val="visible"/>
+                                      </p:to>
+                                    </p:set>
+                                    <p:animEffect transition="in" filter="fade">
+                                      <p:cBhvr>
+                                        <p:cTn id="13" dur="500"/>
+                                        <p:tgtEl>
+                                          <p:spTgt spid="3">
+                                            <p:txEl>
+                                              <p:pRg st="5" end="5"/>
+                                            </p:txEl>
+                                          </p:spTgt>
+                                        </p:tgtEl>
+                                      </p:cBhvr>
+                                    </p:animEffect>
+                                    <p:anim calcmode="lin" valueType="num">
+                                      <p:cBhvr>
+                                        <p:cTn id="14" dur="500" fill="hold"/>
+                                        <p:tgtEl>
+                                          <p:spTgt spid="3">
+                                            <p:txEl>
+                                              <p:pRg st="5" end="5"/>
+                                            </p:txEl>
+                                          </p:spTgt>
+                                        </p:tgtEl>
+                                        <p:attrNameLst>
+                                          <p:attrName>ppt_x</p:attrName>
+                                        </p:attrNameLst>
+                                      </p:cBhvr>
+                                      <p:tavLst>
+                                        <p:tav tm="0">
+                                          <p:val>
+                                            <p:strVal val="#ppt_x"/>
+                                          </p:val>
+                                        </p:tav>
+                                        <p:tav tm="100000">
+                                          <p:val>
+                                            <p:strVal val="#ppt_x"/>
+                                          </p:val>
+                                        </p:tav>
+                                      </p:tavLst>
+                                    </p:anim>
+                                    <p:anim calcmode="lin" valueType="num">
+                                      <p:cBhvr>
+                                        <p:cTn id="15" dur="450" decel="100000" fill="hold"/>
+                                        <p:tgtEl>
+                                          <p:spTgt spid="3">
+                                            <p:txEl>
+                                              <p:pRg st="5" end="5"/>
+                                            </p:txEl>
+                                          </p:spTgt>
+                                        </p:tgtEl>
+                                        <p:attrNameLst>
+                                          <p:attrName>ppt_y</p:attrName>
+                                        </p:attrNameLst>
+                                      </p:cBhvr>
+                                      <p:tavLst>
+                                        <p:tav tm="0">
+                                          <p:val>
+                                            <p:strVal val="#ppt_y+1"/>
+                                          </p:val>
+                                        </p:tav>
+                                        <p:tav tm="100000">
+                                          <p:val>
+                                            <p:strVal val="#ppt_y-.03"/>
+                                          </p:val>
+                                        </p:tav>
+                                      </p:tavLst>
+                                    </p:anim>
+                                    <p:anim calcmode="lin" valueType="num">
+                                      <p:cBhvr>
+                                        <p:cTn id="16" dur="50" accel="100000" fill="hold">
+                                          <p:stCondLst>
+                                            <p:cond delay="450"/>
+                                          </p:stCondLst>
+                                        </p:cTn>
+                                        <p:tgtEl>
+                                          <p:spTgt spid="3">
+                                            <p:txEl>
+                                              <p:pRg st="5" end="5"/>
+                                            </p:txEl>
+                                          </p:spTgt>
+                                        </p:tgtEl>
+                                        <p:attrNameLst>
+                                          <p:attrName>ppt_y</p:attrName>
+                                        </p:attrNameLst>
+                                      </p:cBhvr>
+                                      <p:tavLst>
+                                        <p:tav tm="0">
+                                          <p:val>
+                                            <p:strVal val="#ppt_y-.03"/>
+                                          </p:val>
+                                        </p:tav>
+                                        <p:tav tm="100000">
+                                          <p:val>
+                                            <p:strVal val="#ppt_y"/>
+                                          </p:val>
+                                        </p:tav>
+                                      </p:tavLst>
+                                    </p:anim>
+                                  </p:childTnLst>
+                                </p:cTn>
+                              </p:par>
+                            </p:childTnLst>
+                          </p:cTn>
+                        </p:par>
+                      </p:childTnLst>
+                    </p:cTn>
+                  </p:par>
+                  <p:par>
+                    <p:cTn id="17" fill="hold">
+                      <p:stCondLst>
+                        <p:cond delay="indefinite"/>
+                      </p:stCondLst>
+                      <p:childTnLst>
+                        <p:par>
+                          <p:cTn id="18" fill="hold">
+                            <p:stCondLst>
+                              <p:cond delay="0"/>
+                            </p:stCondLst>
+                            <p:childTnLst>
+                              <p:par>
+                                <p:cTn id="19" presetID="37" presetClass="entr" presetSubtype="0" fill="hold" nodeType="clickEffect">
+                                  <p:stCondLst>
+                                    <p:cond delay="0"/>
+                                  </p:stCondLst>
+                                  <p:childTnLst>
+                                    <p:set>
+                                      <p:cBhvr>
+                                        <p:cTn id="20" dur="1" fill="hold">
+                                          <p:stCondLst>
+                                            <p:cond delay="0"/>
+                                          </p:stCondLst>
+                                        </p:cTn>
+                                        <p:tgtEl>
+                                          <p:spTgt spid="3">
+                                            <p:txEl>
+                                              <p:pRg st="7" end="7"/>
+                                            </p:txEl>
+                                          </p:spTgt>
+                                        </p:tgtEl>
+                                        <p:attrNameLst>
+                                          <p:attrName>style.visibility</p:attrName>
+                                        </p:attrNameLst>
+                                      </p:cBhvr>
+                                      <p:to>
+                                        <p:strVal val="visible"/>
+                                      </p:to>
+                                    </p:set>
+                                    <p:animEffect transition="in" filter="fade">
+                                      <p:cBhvr>
+                                        <p:cTn id="21" dur="500"/>
+                                        <p:tgtEl>
+                                          <p:spTgt spid="3">
+                                            <p:txEl>
+                                              <p:pRg st="7" end="7"/>
+                                            </p:txEl>
+                                          </p:spTgt>
+                                        </p:tgtEl>
+                                      </p:cBhvr>
+                                    </p:animEffect>
+                                    <p:anim calcmode="lin" valueType="num">
+                                      <p:cBhvr>
+                                        <p:cTn id="22" dur="500" fill="hold"/>
+                                        <p:tgtEl>
+                                          <p:spTgt spid="3">
+                                            <p:txEl>
+                                              <p:pRg st="7" end="7"/>
+                                            </p:txEl>
+                                          </p:spTgt>
+                                        </p:tgtEl>
+                                        <p:attrNameLst>
+                                          <p:attrName>ppt_x</p:attrName>
+                                        </p:attrNameLst>
+                                      </p:cBhvr>
+                                      <p:tavLst>
+                                        <p:tav tm="0">
+                                          <p:val>
+                                            <p:strVal val="#ppt_x"/>
+                                          </p:val>
+                                        </p:tav>
+                                        <p:tav tm="100000">
+                                          <p:val>
+                                            <p:strVal val="#ppt_x"/>
+                                          </p:val>
+                                        </p:tav>
+                                      </p:tavLst>
+                                    </p:anim>
+                                    <p:anim calcmode="lin" valueType="num">
+                                      <p:cBhvr>
+                                        <p:cTn id="23" dur="450" decel="100000" fill="hold"/>
+                                        <p:tgtEl>
+                                          <p:spTgt spid="3">
+                                            <p:txEl>
+                                              <p:pRg st="7" end="7"/>
+                                            </p:txEl>
+                                          </p:spTgt>
+                                        </p:tgtEl>
+                                        <p:attrNameLst>
+                                          <p:attrName>ppt_y</p:attrName>
+                                        </p:attrNameLst>
+                                      </p:cBhvr>
+                                      <p:tavLst>
+                                        <p:tav tm="0">
+                                          <p:val>
+                                            <p:strVal val="#ppt_y+1"/>
+                                          </p:val>
+                                        </p:tav>
+                                        <p:tav tm="100000">
+                                          <p:val>
+                                            <p:strVal val="#ppt_y-.03"/>
+                                          </p:val>
+                                        </p:tav>
+                                      </p:tavLst>
+                                    </p:anim>
+                                    <p:anim calcmode="lin" valueType="num">
+                                      <p:cBhvr>
+                                        <p:cTn id="24" dur="50" accel="100000" fill="hold">
+                                          <p:stCondLst>
+                                            <p:cond delay="450"/>
+                                          </p:stCondLst>
+                                        </p:cTn>
+                                        <p:tgtEl>
+                                          <p:spTgt spid="3">
+                                            <p:txEl>
+                                              <p:pRg st="7" end="7"/>
+                                            </p:txEl>
+                                          </p:spTgt>
+                                        </p:tgtEl>
+                                        <p:attrNameLst>
+                                          <p:attrName>ppt_y</p:attrName>
+                                        </p:attrNameLst>
+                                      </p:cBhvr>
+                                      <p:tavLst>
+                                        <p:tav tm="0">
+                                          <p:val>
+                                            <p:strVal val="#ppt_y-.03"/>
+                                          </p:val>
+                                        </p:tav>
+                                        <p:tav tm="100000">
+                                          <p:val>
+                                            <p:strVal val="#ppt_y"/>
+                                          </p:val>
+                                        </p:tav>
+                                      </p:tavLst>
+                                    </p:anim>
+                                  </p:childTnLst>
+                                </p:cTn>
+                              </p:par>
+                              <p:par>
+                                <p:cTn id="25" presetID="37" presetClass="entr" presetSubtype="0" fill="hold" nodeType="withEffect">
+                                  <p:stCondLst>
+                                    <p:cond delay="0"/>
+                                  </p:stCondLst>
+                                  <p:childTnLst>
+                                    <p:set>
+                                      <p:cBhvr>
+                                        <p:cTn id="26" dur="1" fill="hold">
+                                          <p:stCondLst>
+                                            <p:cond delay="0"/>
+                                          </p:stCondLst>
+                                        </p:cTn>
+                                        <p:tgtEl>
+                                          <p:spTgt spid="3">
+                                            <p:txEl>
+                                              <p:pRg st="8" end="8"/>
+                                            </p:txEl>
+                                          </p:spTgt>
+                                        </p:tgtEl>
+                                        <p:attrNameLst>
+                                          <p:attrName>style.visibility</p:attrName>
+                                        </p:attrNameLst>
+                                      </p:cBhvr>
+                                      <p:to>
+                                        <p:strVal val="visible"/>
+                                      </p:to>
+                                    </p:set>
+                                    <p:animEffect transition="in" filter="fade">
+                                      <p:cBhvr>
+                                        <p:cTn id="27" dur="500"/>
+                                        <p:tgtEl>
+                                          <p:spTgt spid="3">
+                                            <p:txEl>
+                                              <p:pRg st="8" end="8"/>
+                                            </p:txEl>
+                                          </p:spTgt>
+                                        </p:tgtEl>
+                                      </p:cBhvr>
+                                    </p:animEffect>
+                                    <p:anim calcmode="lin" valueType="num">
+                                      <p:cBhvr>
+                                        <p:cTn id="28" dur="500" fill="hold"/>
+                                        <p:tgtEl>
+                                          <p:spTgt spid="3">
+                                            <p:txEl>
+                                              <p:pRg st="8" end="8"/>
+                                            </p:txEl>
+                                          </p:spTgt>
+                                        </p:tgtEl>
+                                        <p:attrNameLst>
+                                          <p:attrName>ppt_x</p:attrName>
+                                        </p:attrNameLst>
+                                      </p:cBhvr>
+                                      <p:tavLst>
+                                        <p:tav tm="0">
+                                          <p:val>
+                                            <p:strVal val="#ppt_x"/>
+                                          </p:val>
+                                        </p:tav>
+                                        <p:tav tm="100000">
+                                          <p:val>
+                                            <p:strVal val="#ppt_x"/>
+                                          </p:val>
+                                        </p:tav>
+                                      </p:tavLst>
+                                    </p:anim>
+                                    <p:anim calcmode="lin" valueType="num">
+                                      <p:cBhvr>
+                                        <p:cTn id="29" dur="450" decel="100000" fill="hold"/>
+                                        <p:tgtEl>
+                                          <p:spTgt spid="3">
+                                            <p:txEl>
+                                              <p:pRg st="8" end="8"/>
+                                            </p:txEl>
+                                          </p:spTgt>
+                                        </p:tgtEl>
+                                        <p:attrNameLst>
+                                          <p:attrName>ppt_y</p:attrName>
+                                        </p:attrNameLst>
+                                      </p:cBhvr>
+                                      <p:tavLst>
+                                        <p:tav tm="0">
+                                          <p:val>
+                                            <p:strVal val="#ppt_y+1"/>
+                                          </p:val>
+                                        </p:tav>
+                                        <p:tav tm="100000">
+                                          <p:val>
+                                            <p:strVal val="#ppt_y-.03"/>
+                                          </p:val>
+                                        </p:tav>
+                                      </p:tavLst>
+                                    </p:anim>
+                                    <p:anim calcmode="lin" valueType="num">
+                                      <p:cBhvr>
+                                        <p:cTn id="30" dur="50" accel="100000" fill="hold">
+                                          <p:stCondLst>
+                                            <p:cond delay="450"/>
+                                          </p:stCondLst>
+                                        </p:cTn>
+                                        <p:tgtEl>
+                                          <p:spTgt spid="3">
+                                            <p:txEl>
+                                              <p:pRg st="8" end="8"/>
+                                            </p:txEl>
+                                          </p:spTgt>
+                                        </p:tgtEl>
+                                        <p:attrNameLst>
+                                          <p:attrName>ppt_y</p:attrName>
+                                        </p:attrNameLst>
+                                      </p:cBhvr>
+                                      <p:tavLst>
+                                        <p:tav tm="0">
+                                          <p:val>
+                                            <p:strVal val="#ppt_y-.03"/>
+                                          </p:val>
+                                        </p:tav>
+                                        <p:tav tm="100000">
+                                          <p:val>
+                                            <p:strVal val="#ppt_y"/>
+                                          </p:val>
+                                        </p:tav>
+                                      </p:tavLst>
+                                    </p:anim>
                                   </p:childTnLst>
                                 </p:cTn>
                               </p:par>
@@ -7164,7 +7652,7 @@
           <a:lstStyle/>
           <a:p>
             <a:r>
-              <a:rPr lang="fr-FR" smtClean="0"/>
+              <a:rPr lang="fr-FR" dirty="0" smtClean="0"/>
               <a:t>Paul Fiat</a:t>
             </a:r>
             <a:endParaRPr lang="fr-FR" dirty="0"/>
@@ -7230,264 +7718,155 @@
         </p:nvSpPr>
         <p:spPr>
           <a:xfrm>
-            <a:off x="381000" y="1633536"/>
+            <a:off x="357158" y="1285860"/>
             <a:ext cx="8548718" cy="4938736"/>
           </a:xfrm>
         </p:spPr>
         <p:txBody>
-          <a:bodyPr/>
+          <a:bodyPr>
+            <a:normAutofit/>
+          </a:bodyPr>
           <a:lstStyle/>
           <a:p>
+            <a:pPr>
+              <a:buFont typeface="Wingdings" pitchFamily="2" charset="2"/>
+              <a:buChar char="v"/>
+            </a:pPr>
+            <a:r>
+              <a:rPr lang="fr-FR" dirty="0" smtClean="0"/>
+              <a:t>Histoire</a:t>
+            </a:r>
+          </a:p>
+          <a:p>
             <a:endParaRPr lang="fr-FR" dirty="0" smtClean="0"/>
           </a:p>
           <a:p>
             <a:r>
               <a:rPr lang="fr-FR" dirty="0" smtClean="0"/>
-              <a:t>Le jeu reprend toutes les étapes de la fécondation humaine, du point de vue d’un spermatozoïde, à l’échelle microscopique.</a:t>
-            </a:r>
-          </a:p>
-          <a:p>
+              <a:t>- Fé</a:t>
+            </a:r>
+            <a:r>
+              <a:rPr lang="fr-FR" dirty="0" smtClean="0"/>
+              <a:t>condation vue par le spermatozoïde.</a:t>
+            </a:r>
             <a:endParaRPr lang="fr-FR" dirty="0" smtClean="0"/>
           </a:p>
           <a:p>
             <a:r>
               <a:rPr lang="fr-FR" dirty="0" smtClean="0"/>
-              <a:t>La début du jeu consiste à sortir de l’urètre pour intégrer l’utérus et ainsi pouvoir rejoindre l’ovule afin de la féconder.</a:t>
-            </a:r>
+              <a:t>- Plusieurs niveaux :</a:t>
+            </a:r>
+            <a:endParaRPr lang="fr-FR" dirty="0" smtClean="0"/>
           </a:p>
           <a:p>
             <a:r>
               <a:rPr lang="fr-FR" dirty="0" smtClean="0"/>
-              <a:t>Les niveaux suivent fidèlement la disposition anatomique interne des organes de reproduction des deux sexes.</a:t>
+              <a:t>- </a:t>
+            </a:r>
+            <a:r>
+              <a:rPr lang="fr-FR" dirty="0" smtClean="0"/>
+              <a:t>Périple réellement dangereux</a:t>
             </a:r>
           </a:p>
           <a:p>
             <a:endParaRPr lang="fr-FR" dirty="0" smtClean="0"/>
           </a:p>
           <a:p>
+            <a:pPr>
+              <a:buFont typeface="Wingdings" pitchFamily="2" charset="2"/>
+              <a:buChar char="v"/>
+            </a:pPr>
             <a:r>
               <a:rPr lang="fr-FR" dirty="0" smtClean="0"/>
-              <a:t>Les dangers et obstacles réels qu’affrontent les spermatozoïdes chez l’homme sont les ennemis et pièges du jeu.</a:t>
-            </a:r>
-          </a:p>
-          <a:p>
+              <a:t>Ambiance</a:t>
+            </a:r>
+          </a:p>
+          <a:p>
+            <a:pPr>
+              <a:buFont typeface="Wingdings" pitchFamily="2" charset="2"/>
+              <a:buChar char="v"/>
+            </a:pPr>
             <a:endParaRPr lang="fr-FR" dirty="0" smtClean="0"/>
           </a:p>
           <a:p>
+            <a:r>
+              <a:rPr lang="fr-FR" dirty="0" smtClean="0"/>
+              <a:t>- </a:t>
+            </a:r>
+            <a:r>
+              <a:rPr lang="fr-FR" u="sng" dirty="0" smtClean="0"/>
+              <a:t>Rythmée</a:t>
+            </a:r>
+            <a:r>
+              <a:rPr lang="fr-FR" dirty="0" smtClean="0"/>
+              <a:t> : Surprises</a:t>
+            </a:r>
+            <a:r>
+              <a:rPr lang="fr-FR" dirty="0" smtClean="0"/>
+              <a:t>, boulettes, </a:t>
+            </a:r>
+            <a:r>
+              <a:rPr lang="fr-FR" dirty="0" smtClean="0"/>
+              <a:t>scrolling.</a:t>
+            </a:r>
+          </a:p>
+          <a:p>
+            <a:r>
+              <a:rPr lang="fr-FR" dirty="0" smtClean="0"/>
+              <a:t>- </a:t>
+            </a:r>
+            <a:r>
+              <a:rPr lang="fr-FR" u="sng" dirty="0" smtClean="0"/>
+              <a:t>Etriqué</a:t>
+            </a:r>
+            <a:r>
+              <a:rPr lang="fr-FR" dirty="0" smtClean="0"/>
+              <a:t> : Chemins étroits, difficulté d’esquiver.</a:t>
+            </a:r>
             <a:endParaRPr lang="fr-FR" dirty="0" smtClean="0"/>
           </a:p>
           <a:p>
+            <a:pPr>
+              <a:buFont typeface="Wingdings" pitchFamily="2" charset="2"/>
+              <a:buChar char="§"/>
+            </a:pPr>
+            <a:endParaRPr lang="fr-FR" dirty="0" smtClean="0"/>
+          </a:p>
+          <a:p>
+            <a:endParaRPr lang="fr-FR" dirty="0" smtClean="0"/>
+          </a:p>
+          <a:p>
+            <a:endParaRPr lang="fr-FR" dirty="0" smtClean="0"/>
+          </a:p>
+          <a:p>
             <a:endParaRPr lang="fr-FR" dirty="0"/>
           </a:p>
         </p:txBody>
       </p:sp>
-    </p:spTree>
-  </p:cSld>
-  <p:clrMapOvr>
-    <a:masterClrMapping/>
-  </p:clrMapOvr>
-  <p:timing>
-    <p:tnLst>
-      <p:par>
-        <p:cTn id="1" dur="indefinite" restart="never" nodeType="tmRoot"/>
-      </p:par>
-    </p:tnLst>
-  </p:timing>
-</p:sld>
-</file>
-
-<file path=ppt/slides/slide9.xml><?xml version="1.0" encoding="utf-8"?>
-<p:sld xmlns:a="http://schemas.openxmlformats.org/drawingml/2006/main" xmlns:r="http://schemas.openxmlformats.org/officeDocument/2006/relationships" xmlns:p="http://schemas.openxmlformats.org/presentationml/2006/main">
-  <p:cSld>
-    <p:spTree>
-      <p:nvGrpSpPr>
-        <p:cNvPr id="1" name=""/>
-        <p:cNvGrpSpPr/>
-        <p:nvPr/>
-      </p:nvGrpSpPr>
-      <p:grpSpPr>
-        <a:xfrm>
-          <a:off x="0" y="0"/>
-          <a:ext cx="0" cy="0"/>
-          <a:chOff x="0" y="0"/>
-          <a:chExt cx="0" cy="0"/>
-        </a:xfrm>
-      </p:grpSpPr>
-      <p:sp>
-        <p:nvSpPr>
-          <p:cNvPr id="4" name="Espace réservé de la date 3"/>
-          <p:cNvSpPr>
-            <a:spLocks noGrp="1"/>
-          </p:cNvSpPr>
-          <p:nvPr>
-            <p:ph type="dt" sz="half" idx="10"/>
-          </p:nvPr>
-        </p:nvSpPr>
-        <p:spPr/>
-        <p:txBody>
-          <a:bodyPr/>
-          <a:lstStyle/>
-          <a:p>
-            <a:r>
-              <a:rPr lang="fr-FR" smtClean="0"/>
-              <a:t>Jeudi 29 Novembre 2012</a:t>
-            </a:r>
-            <a:endParaRPr lang="fr-FR" dirty="0"/>
-          </a:p>
-        </p:txBody>
-      </p:sp>
-      <p:sp>
-        <p:nvSpPr>
-          <p:cNvPr id="5" name="Espace réservé du pied de page 4"/>
-          <p:cNvSpPr>
-            <a:spLocks noGrp="1"/>
-          </p:cNvSpPr>
-          <p:nvPr>
-            <p:ph type="ftr" sz="quarter" idx="11"/>
-          </p:nvPr>
-        </p:nvSpPr>
-        <p:spPr/>
-        <p:txBody>
-          <a:bodyPr/>
-          <a:lstStyle/>
-          <a:p>
-            <a:r>
-              <a:rPr lang="fr-FR" smtClean="0"/>
-              <a:t>Paul Fiat</a:t>
-            </a:r>
-            <a:endParaRPr lang="fr-FR" dirty="0"/>
-          </a:p>
-        </p:txBody>
-      </p:sp>
-      <p:sp>
-        <p:nvSpPr>
-          <p:cNvPr id="6" name="Espace réservé du numéro de diapositive 5"/>
-          <p:cNvSpPr>
-            <a:spLocks noGrp="1"/>
-          </p:cNvSpPr>
-          <p:nvPr>
-            <p:ph type="sldNum" sz="quarter" idx="12"/>
-          </p:nvPr>
-        </p:nvSpPr>
-        <p:spPr/>
-        <p:txBody>
-          <a:bodyPr/>
-          <a:lstStyle/>
-          <a:p>
-            <a:fld id="{9DDF0C85-99BB-428E-8D90-A207FA2E644C}" type="slidenum">
-              <a:rPr lang="fr-FR" smtClean="0"/>
-              <a:pPr/>
-              <a:t>9</a:t>
-            </a:fld>
-            <a:endParaRPr lang="fr-FR" dirty="0"/>
-          </a:p>
-        </p:txBody>
-      </p:sp>
-      <p:sp>
-        <p:nvSpPr>
-          <p:cNvPr id="2" name="Title 1"/>
-          <p:cNvSpPr>
-            <a:spLocks noGrp="1"/>
-          </p:cNvSpPr>
-          <p:nvPr>
-            <p:ph type="title"/>
-          </p:nvPr>
-        </p:nvSpPr>
-        <p:spPr/>
-        <p:txBody>
-          <a:bodyPr/>
-          <a:lstStyle/>
-          <a:p>
-            <a:r>
-              <a:rPr lang="fr-FR" dirty="0" smtClean="0"/>
-              <a:t>Camera, Character, Controls</a:t>
-            </a:r>
-            <a:endParaRPr lang="fr-FR" dirty="0"/>
-          </a:p>
-        </p:txBody>
-      </p:sp>
-      <p:sp>
-        <p:nvSpPr>
-          <p:cNvPr id="3" name="Text Placeholder 2"/>
-          <p:cNvSpPr>
-            <a:spLocks noGrp="1"/>
-          </p:cNvSpPr>
-          <p:nvPr>
-            <p:ph type="body" idx="1"/>
-          </p:nvPr>
-        </p:nvSpPr>
+      <p:pic>
+        <p:nvPicPr>
+          <p:cNvPr id="7" name="Picture 6" descr="niveau.png"/>
+          <p:cNvPicPr>
+            <a:picLocks noChangeAspect="1"/>
+          </p:cNvPicPr>
+          <p:nvPr/>
+        </p:nvPicPr>
+        <p:blipFill>
+          <a:blip r:embed="rId2"/>
+          <a:stretch>
+            <a:fillRect/>
+          </a:stretch>
+        </p:blipFill>
         <p:spPr>
           <a:xfrm>
-            <a:off x="381000" y="1633536"/>
-            <a:ext cx="8548718" cy="5081612"/>
+            <a:off x="1714480" y="2928934"/>
+            <a:ext cx="5429288" cy="3332382"/>
           </a:xfrm>
+          <a:prstGeom prst="rect">
+            <a:avLst/>
+          </a:prstGeom>
         </p:spPr>
-        <p:txBody>
-          <a:bodyPr/>
-          <a:lstStyle/>
-          <a:p>
-            <a:r>
-              <a:rPr lang="fr-FR" u="sng" dirty="0" smtClean="0"/>
-              <a:t>Camera</a:t>
-            </a:r>
-            <a:r>
-              <a:rPr lang="fr-FR" dirty="0" smtClean="0"/>
-              <a:t> :</a:t>
-            </a:r>
-          </a:p>
-          <a:p>
-            <a:r>
-              <a:rPr lang="fr-FR" dirty="0" smtClean="0"/>
-              <a:t>En vue 2D de dessus où de côté, la camera suit le scrolling du jeu à direction variable.</a:t>
-            </a:r>
-          </a:p>
-          <a:p>
-            <a:endParaRPr lang="fr-FR" dirty="0" smtClean="0"/>
-          </a:p>
-          <a:p>
-            <a:r>
-              <a:rPr lang="fr-FR" u="sng" dirty="0" smtClean="0"/>
-              <a:t>Character</a:t>
-            </a:r>
-            <a:r>
-              <a:rPr lang="fr-FR" dirty="0" smtClean="0"/>
-              <a:t> :</a:t>
-            </a:r>
-          </a:p>
-          <a:p>
-            <a:r>
-              <a:rPr lang="fr-FR" dirty="0" smtClean="0"/>
-              <a:t>Le joueur incarne un spermatozoïde dont il pourra choisir le code ADN embarqué, influant sans importance sur la fin du jeu.</a:t>
-            </a:r>
-          </a:p>
-          <a:p>
-            <a:endParaRPr lang="fr-FR" dirty="0" smtClean="0"/>
-          </a:p>
-          <a:p>
-            <a:r>
-              <a:rPr lang="fr-FR" u="sng" dirty="0" smtClean="0"/>
-              <a:t>Controls</a:t>
-            </a:r>
-            <a:r>
-              <a:rPr lang="fr-FR" dirty="0" smtClean="0"/>
-              <a:t> :</a:t>
-            </a:r>
-          </a:p>
-          <a:p>
-            <a:r>
-              <a:rPr lang="fr-FR" dirty="0" smtClean="0"/>
-              <a:t>Les déplacements du joueur se font au clic droit de la souris sur la zone de jeu.</a:t>
-            </a:r>
-          </a:p>
-          <a:p>
-            <a:r>
-              <a:rPr lang="fr-FR" dirty="0" smtClean="0"/>
-              <a:t>Un clic dans l’aire bleue entourant le spermatozoïde modifie la direction des tirs.</a:t>
-            </a:r>
-            <a:endParaRPr lang="fr-FR" dirty="0"/>
-          </a:p>
-        </p:txBody>
-      </p:sp>
+      </p:pic>
     </p:spTree>
   </p:cSld>
   <p:clrMapOvr>
@@ -7514,7 +7893,7 @@
                             </p:stCondLst>
                             <p:childTnLst>
                               <p:par>
-                                <p:cTn id="5" presetID="22" presetClass="entr" presetSubtype="4" fill="hold" nodeType="clickEffect">
+                                <p:cTn id="5" presetID="37" presetClass="entr" presetSubtype="0" fill="hold" grpId="0" nodeType="clickEffect">
                                   <p:stCondLst>
                                     <p:cond delay="0"/>
                                   </p:stCondLst>
@@ -7522,110 +7901,6 @@
                                     <p:set>
                                       <p:cBhvr>
                                         <p:cTn id="6" dur="1" fill="hold">
-                                          <p:stCondLst>
-                                            <p:cond delay="0"/>
-                                          </p:stCondLst>
-                                        </p:cTn>
-                                        <p:tgtEl>
-                                          <p:spTgt spid="3">
-                                            <p:txEl>
-                                              <p:pRg st="0" end="0"/>
-                                            </p:txEl>
-                                          </p:spTgt>
-                                        </p:tgtEl>
-                                        <p:attrNameLst>
-                                          <p:attrName>style.visibility</p:attrName>
-                                        </p:attrNameLst>
-                                      </p:cBhvr>
-                                      <p:to>
-                                        <p:strVal val="visible"/>
-                                      </p:to>
-                                    </p:set>
-                                    <p:animEffect transition="in" filter="wipe(down)">
-                                      <p:cBhvr>
-                                        <p:cTn id="7" dur="500"/>
-                                        <p:tgtEl>
-                                          <p:spTgt spid="3">
-                                            <p:txEl>
-                                              <p:pRg st="0" end="0"/>
-                                            </p:txEl>
-                                          </p:spTgt>
-                                        </p:tgtEl>
-                                      </p:cBhvr>
-                                    </p:animEffect>
-                                  </p:childTnLst>
-                                </p:cTn>
-                              </p:par>
-                              <p:par>
-                                <p:cTn id="8" presetID="22" presetClass="entr" presetSubtype="4" fill="hold" nodeType="withEffect">
-                                  <p:stCondLst>
-                                    <p:cond delay="0"/>
-                                  </p:stCondLst>
-                                  <p:childTnLst>
-                                    <p:set>
-                                      <p:cBhvr>
-                                        <p:cTn id="9" dur="1" fill="hold">
-                                          <p:stCondLst>
-                                            <p:cond delay="0"/>
-                                          </p:stCondLst>
-                                        </p:cTn>
-                                        <p:tgtEl>
-                                          <p:spTgt spid="3">
-                                            <p:txEl>
-                                              <p:pRg st="1" end="1"/>
-                                            </p:txEl>
-                                          </p:spTgt>
-                                        </p:tgtEl>
-                                        <p:attrNameLst>
-                                          <p:attrName>style.visibility</p:attrName>
-                                        </p:attrNameLst>
-                                      </p:cBhvr>
-                                      <p:to>
-                                        <p:strVal val="visible"/>
-                                      </p:to>
-                                    </p:set>
-                                    <p:animEffect transition="in" filter="wipe(down)">
-                                      <p:cBhvr>
-                                        <p:cTn id="10" dur="500"/>
-                                        <p:tgtEl>
-                                          <p:spTgt spid="3">
-                                            <p:txEl>
-                                              <p:pRg st="1" end="1"/>
-                                            </p:txEl>
-                                          </p:spTgt>
-                                        </p:tgtEl>
-                                      </p:cBhvr>
-                                    </p:animEffect>
-                                  </p:childTnLst>
-                                </p:cTn>
-                              </p:par>
-                            </p:childTnLst>
-                          </p:cTn>
-                        </p:par>
-                      </p:childTnLst>
-                    </p:cTn>
-                  </p:par>
-                  <p:par>
-                    <p:cTn id="11" fill="hold">
-                      <p:stCondLst>
-                        <p:cond delay="indefinite"/>
-                      </p:stCondLst>
-                      <p:childTnLst>
-                        <p:par>
-                          <p:cTn id="12" fill="hold">
-                            <p:stCondLst>
-                              <p:cond delay="0"/>
-                            </p:stCondLst>
-                            <p:childTnLst>
-                              <p:par>
-                                <p:cTn id="13" presetID="22" presetClass="entr" presetSubtype="4" fill="hold" nodeType="clickEffect">
-                                  <p:stCondLst>
-                                    <p:cond delay="0"/>
-                                  </p:stCondLst>
-                                  <p:childTnLst>
-                                    <p:set>
-                                      <p:cBhvr>
-                                        <p:cTn id="14" dur="1" fill="hold">
                                           <p:stCondLst>
                                             <p:cond delay="0"/>
                                           </p:stCondLst>
@@ -7645,9 +7920,9 @@
                                         <p:strVal val="visible"/>
                                       </p:to>
                                     </p:set>
-                                    <p:animEffect transition="in" filter="wipe(down)">
+                                    <p:animEffect transition="in" filter="fade">
                                       <p:cBhvr>
-                                        <p:cTn id="15" dur="500"/>
+                                        <p:cTn id="7" dur="500"/>
                                         <p:tgtEl>
                                           <p:spTgt spid="3">
                                             <p:txEl>
@@ -7657,18 +7932,229 @@
                                         </p:tgtEl>
                                       </p:cBhvr>
                                     </p:animEffect>
+                                    <p:anim calcmode="lin" valueType="num">
+                                      <p:cBhvr>
+                                        <p:cTn id="8" dur="500" fill="hold"/>
+                                        <p:tgtEl>
+                                          <p:spTgt spid="3">
+                                            <p:txEl>
+                                              <p:pRg st="3" end="3"/>
+                                            </p:txEl>
+                                          </p:spTgt>
+                                        </p:tgtEl>
+                                        <p:attrNameLst>
+                                          <p:attrName>ppt_x</p:attrName>
+                                        </p:attrNameLst>
+                                      </p:cBhvr>
+                                      <p:tavLst>
+                                        <p:tav tm="0">
+                                          <p:val>
+                                            <p:strVal val="#ppt_x"/>
+                                          </p:val>
+                                        </p:tav>
+                                        <p:tav tm="100000">
+                                          <p:val>
+                                            <p:strVal val="#ppt_x"/>
+                                          </p:val>
+                                        </p:tav>
+                                      </p:tavLst>
+                                    </p:anim>
+                                    <p:anim calcmode="lin" valueType="num">
+                                      <p:cBhvr>
+                                        <p:cTn id="9" dur="450" decel="100000" fill="hold"/>
+                                        <p:tgtEl>
+                                          <p:spTgt spid="3">
+                                            <p:txEl>
+                                              <p:pRg st="3" end="3"/>
+                                            </p:txEl>
+                                          </p:spTgt>
+                                        </p:tgtEl>
+                                        <p:attrNameLst>
+                                          <p:attrName>ppt_y</p:attrName>
+                                        </p:attrNameLst>
+                                      </p:cBhvr>
+                                      <p:tavLst>
+                                        <p:tav tm="0">
+                                          <p:val>
+                                            <p:strVal val="#ppt_y+1"/>
+                                          </p:val>
+                                        </p:tav>
+                                        <p:tav tm="100000">
+                                          <p:val>
+                                            <p:strVal val="#ppt_y-.03"/>
+                                          </p:val>
+                                        </p:tav>
+                                      </p:tavLst>
+                                    </p:anim>
+                                    <p:anim calcmode="lin" valueType="num">
+                                      <p:cBhvr>
+                                        <p:cTn id="10" dur="50" accel="100000" fill="hold">
+                                          <p:stCondLst>
+                                            <p:cond delay="450"/>
+                                          </p:stCondLst>
+                                        </p:cTn>
+                                        <p:tgtEl>
+                                          <p:spTgt spid="3">
+                                            <p:txEl>
+                                              <p:pRg st="3" end="3"/>
+                                            </p:txEl>
+                                          </p:spTgt>
+                                        </p:tgtEl>
+                                        <p:attrNameLst>
+                                          <p:attrName>ppt_y</p:attrName>
+                                        </p:attrNameLst>
+                                      </p:cBhvr>
+                                      <p:tavLst>
+                                        <p:tav tm="0">
+                                          <p:val>
+                                            <p:strVal val="#ppt_y-.03"/>
+                                          </p:val>
+                                        </p:tav>
+                                        <p:tav tm="100000">
+                                          <p:val>
+                                            <p:strVal val="#ppt_y"/>
+                                          </p:val>
+                                        </p:tav>
+                                      </p:tavLst>
+                                    </p:anim>
                                   </p:childTnLst>
                                 </p:cTn>
                               </p:par>
                               <p:par>
-                                <p:cTn id="16" presetID="22" presetClass="entr" presetSubtype="4" fill="hold" nodeType="withEffect">
+                                <p:cTn id="11" presetID="37" presetClass="entr" presetSubtype="0" fill="hold" nodeType="withEffect">
                                   <p:stCondLst>
                                     <p:cond delay="0"/>
                                   </p:stCondLst>
                                   <p:childTnLst>
                                     <p:set>
                                       <p:cBhvr>
-                                        <p:cTn id="17" dur="1" fill="hold">
+                                        <p:cTn id="12" dur="1" fill="hold">
+                                          <p:stCondLst>
+                                            <p:cond delay="0"/>
+                                          </p:stCondLst>
+                                        </p:cTn>
+                                        <p:tgtEl>
+                                          <p:spTgt spid="7"/>
+                                        </p:tgtEl>
+                                        <p:attrNameLst>
+                                          <p:attrName>style.visibility</p:attrName>
+                                        </p:attrNameLst>
+                                      </p:cBhvr>
+                                      <p:to>
+                                        <p:strVal val="visible"/>
+                                      </p:to>
+                                    </p:set>
+                                    <p:animEffect transition="in" filter="fade">
+                                      <p:cBhvr>
+                                        <p:cTn id="13" dur="500"/>
+                                        <p:tgtEl>
+                                          <p:spTgt spid="7"/>
+                                        </p:tgtEl>
+                                      </p:cBhvr>
+                                    </p:animEffect>
+                                    <p:anim calcmode="lin" valueType="num">
+                                      <p:cBhvr>
+                                        <p:cTn id="14" dur="500" fill="hold"/>
+                                        <p:tgtEl>
+                                          <p:spTgt spid="7"/>
+                                        </p:tgtEl>
+                                        <p:attrNameLst>
+                                          <p:attrName>ppt_x</p:attrName>
+                                        </p:attrNameLst>
+                                      </p:cBhvr>
+                                      <p:tavLst>
+                                        <p:tav tm="0">
+                                          <p:val>
+                                            <p:strVal val="#ppt_x"/>
+                                          </p:val>
+                                        </p:tav>
+                                        <p:tav tm="100000">
+                                          <p:val>
+                                            <p:strVal val="#ppt_x"/>
+                                          </p:val>
+                                        </p:tav>
+                                      </p:tavLst>
+                                    </p:anim>
+                                    <p:anim calcmode="lin" valueType="num">
+                                      <p:cBhvr>
+                                        <p:cTn id="15" dur="450" decel="100000" fill="hold"/>
+                                        <p:tgtEl>
+                                          <p:spTgt spid="7"/>
+                                        </p:tgtEl>
+                                        <p:attrNameLst>
+                                          <p:attrName>ppt_y</p:attrName>
+                                        </p:attrNameLst>
+                                      </p:cBhvr>
+                                      <p:tavLst>
+                                        <p:tav tm="0">
+                                          <p:val>
+                                            <p:strVal val="#ppt_y+1"/>
+                                          </p:val>
+                                        </p:tav>
+                                        <p:tav tm="100000">
+                                          <p:val>
+                                            <p:strVal val="#ppt_y-.03"/>
+                                          </p:val>
+                                        </p:tav>
+                                      </p:tavLst>
+                                    </p:anim>
+                                    <p:anim calcmode="lin" valueType="num">
+                                      <p:cBhvr>
+                                        <p:cTn id="16" dur="50" accel="100000" fill="hold">
+                                          <p:stCondLst>
+                                            <p:cond delay="450"/>
+                                          </p:stCondLst>
+                                        </p:cTn>
+                                        <p:tgtEl>
+                                          <p:spTgt spid="7"/>
+                                        </p:tgtEl>
+                                        <p:attrNameLst>
+                                          <p:attrName>ppt_y</p:attrName>
+                                        </p:attrNameLst>
+                                      </p:cBhvr>
+                                      <p:tavLst>
+                                        <p:tav tm="0">
+                                          <p:val>
+                                            <p:strVal val="#ppt_y-.03"/>
+                                          </p:val>
+                                        </p:tav>
+                                        <p:tav tm="100000">
+                                          <p:val>
+                                            <p:strVal val="#ppt_y"/>
+                                          </p:val>
+                                        </p:tav>
+                                      </p:tavLst>
+                                    </p:anim>
+                                  </p:childTnLst>
+                                </p:cTn>
+                              </p:par>
+                            </p:childTnLst>
+                          </p:cTn>
+                        </p:par>
+                      </p:childTnLst>
+                    </p:cTn>
+                  </p:par>
+                  <p:par>
+                    <p:cTn id="17" fill="hold">
+                      <p:stCondLst>
+                        <p:cond delay="indefinite"/>
+                      </p:stCondLst>
+                      <p:childTnLst>
+                        <p:par>
+                          <p:cTn id="18" fill="hold">
+                            <p:stCondLst>
+                              <p:cond delay="0"/>
+                            </p:stCondLst>
+                            <p:childTnLst>
+                              <p:par>
+                                <p:cTn id="19" presetID="37" presetClass="entr" presetSubtype="0" fill="hold" grpId="0" nodeType="clickEffect">
+                                  <p:stCondLst>
+                                    <p:cond delay="0"/>
+                                  </p:stCondLst>
+                                  <p:childTnLst>
+                                    <p:set>
+                                      <p:cBhvr>
+                                        <p:cTn id="20" dur="1" fill="hold">
                                           <p:stCondLst>
                                             <p:cond delay="0"/>
                                           </p:stCondLst>
@@ -7688,9 +8174,9 @@
                                         <p:strVal val="visible"/>
                                       </p:to>
                                     </p:set>
-                                    <p:animEffect transition="in" filter="wipe(down)">
+                                    <p:animEffect transition="in" filter="fade">
                                       <p:cBhvr>
-                                        <p:cTn id="18" dur="500"/>
+                                        <p:cTn id="21" dur="500"/>
                                         <p:tgtEl>
                                           <p:spTgt spid="3">
                                             <p:txEl>
@@ -7700,6 +8186,91 @@
                                         </p:tgtEl>
                                       </p:cBhvr>
                                     </p:animEffect>
+                                    <p:anim calcmode="lin" valueType="num">
+                                      <p:cBhvr>
+                                        <p:cTn id="22" dur="500" fill="hold"/>
+                                        <p:tgtEl>
+                                          <p:spTgt spid="3">
+                                            <p:txEl>
+                                              <p:pRg st="4" end="4"/>
+                                            </p:txEl>
+                                          </p:spTgt>
+                                        </p:tgtEl>
+                                        <p:attrNameLst>
+                                          <p:attrName>ppt_x</p:attrName>
+                                        </p:attrNameLst>
+                                      </p:cBhvr>
+                                      <p:tavLst>
+                                        <p:tav tm="0">
+                                          <p:val>
+                                            <p:strVal val="#ppt_x"/>
+                                          </p:val>
+                                        </p:tav>
+                                        <p:tav tm="100000">
+                                          <p:val>
+                                            <p:strVal val="#ppt_x"/>
+                                          </p:val>
+                                        </p:tav>
+                                      </p:tavLst>
+                                    </p:anim>
+                                    <p:anim calcmode="lin" valueType="num">
+                                      <p:cBhvr>
+                                        <p:cTn id="23" dur="450" decel="100000" fill="hold"/>
+                                        <p:tgtEl>
+                                          <p:spTgt spid="3">
+                                            <p:txEl>
+                                              <p:pRg st="4" end="4"/>
+                                            </p:txEl>
+                                          </p:spTgt>
+                                        </p:tgtEl>
+                                        <p:attrNameLst>
+                                          <p:attrName>ppt_y</p:attrName>
+                                        </p:attrNameLst>
+                                      </p:cBhvr>
+                                      <p:tavLst>
+                                        <p:tav tm="0">
+                                          <p:val>
+                                            <p:strVal val="#ppt_y+1"/>
+                                          </p:val>
+                                        </p:tav>
+                                        <p:tav tm="100000">
+                                          <p:val>
+                                            <p:strVal val="#ppt_y-.03"/>
+                                          </p:val>
+                                        </p:tav>
+                                      </p:tavLst>
+                                    </p:anim>
+                                    <p:anim calcmode="lin" valueType="num">
+                                      <p:cBhvr>
+                                        <p:cTn id="24" dur="50" accel="100000" fill="hold">
+                                          <p:stCondLst>
+                                            <p:cond delay="450"/>
+                                          </p:stCondLst>
+                                        </p:cTn>
+                                        <p:tgtEl>
+                                          <p:spTgt spid="3">
+                                            <p:txEl>
+                                              <p:pRg st="4" end="4"/>
+                                            </p:txEl>
+                                          </p:spTgt>
+                                        </p:tgtEl>
+                                        <p:attrNameLst>
+                                          <p:attrName>ppt_y</p:attrName>
+                                        </p:attrNameLst>
+                                      </p:cBhvr>
+                                      <p:tavLst>
+                                        <p:tav tm="0">
+                                          <p:val>
+                                            <p:strVal val="#ppt_y-.03"/>
+                                          </p:val>
+                                        </p:tav>
+                                        <p:tav tm="100000">
+                                          <p:val>
+                                            <p:strVal val="#ppt_y"/>
+                                          </p:val>
+                                        </p:tav>
+                                      </p:tavLst>
+                                    </p:anim>
                                   </p:childTnLst>
                                 </p:cTn>
                               </p:par>
@@ -7710,26 +8281,26 @@
                     </p:cTn>
                   </p:par>
                   <p:par>
-                    <p:cTn id="19" fill="hold">
+                    <p:cTn id="25" fill="hold">
                       <p:stCondLst>
                         <p:cond delay="indefinite"/>
                       </p:stCondLst>
                       <p:childTnLst>
                         <p:par>
-                          <p:cTn id="20" fill="hold">
+                          <p:cTn id="26" fill="hold">
                             <p:stCondLst>
                               <p:cond delay="0"/>
                             </p:stCondLst>
                             <p:childTnLst>
                               <p:par>
-                                <p:cTn id="21" presetID="22" presetClass="entr" presetSubtype="4" fill="hold" nodeType="clickEffect">
+                                <p:cTn id="27" presetID="37" presetClass="entr" presetSubtype="0" fill="hold" grpId="0" nodeType="clickEffect">
                                   <p:stCondLst>
                                     <p:cond delay="0"/>
                                   </p:stCondLst>
                                   <p:childTnLst>
                                     <p:set>
                                       <p:cBhvr>
-                                        <p:cTn id="22" dur="1" fill="hold">
+                                        <p:cTn id="28" dur="1" fill="hold">
                                           <p:stCondLst>
                                             <p:cond delay="0"/>
                                           </p:stCondLst>
@@ -7749,9 +8320,9 @@
                                         <p:strVal val="visible"/>
                                       </p:to>
                                     </p:set>
-                                    <p:animEffect transition="in" filter="wipe(down)">
+                                    <p:animEffect transition="in" filter="fade">
                                       <p:cBhvr>
-                                        <p:cTn id="23" dur="500"/>
+                                        <p:cTn id="29" dur="500"/>
                                         <p:tgtEl>
                                           <p:spTgt spid="3">
                                             <p:txEl>
@@ -7761,61 +8332,121 @@
                                         </p:tgtEl>
                                       </p:cBhvr>
                                     </p:animEffect>
+                                    <p:anim calcmode="lin" valueType="num">
+                                      <p:cBhvr>
+                                        <p:cTn id="30" dur="500" fill="hold"/>
+                                        <p:tgtEl>
+                                          <p:spTgt spid="3">
+                                            <p:txEl>
+                                              <p:pRg st="6" end="6"/>
+                                            </p:txEl>
+                                          </p:spTgt>
+                                        </p:tgtEl>
+                                        <p:attrNameLst>
+                                          <p:attrName>ppt_x</p:attrName>
+                                        </p:attrNameLst>
+                                      </p:cBhvr>
+                                      <p:tavLst>
+                                        <p:tav tm="0">
+                                          <p:val>
+                                            <p:strVal val="#ppt_x"/>
+                                          </p:val>
+                                        </p:tav>
+                                        <p:tav tm="100000">
+                                          <p:val>
+                                            <p:strVal val="#ppt_x"/>
+                                          </p:val>
+                                        </p:tav>
+                                      </p:tavLst>
+                                    </p:anim>
+                                    <p:anim calcmode="lin" valueType="num">
+                                      <p:cBhvr>
+                                        <p:cTn id="31" dur="450" decel="100000" fill="hold"/>
+                                        <p:tgtEl>
+                                          <p:spTgt spid="3">
+                                            <p:txEl>
+                                              <p:pRg st="6" end="6"/>
+                                            </p:txEl>
+                                          </p:spTgt>
+                                        </p:tgtEl>
+                                        <p:attrNameLst>
+                                          <p:attrName>ppt_y</p:attrName>
+                                        </p:attrNameLst>
+                                      </p:cBhvr>
+                                      <p:tavLst>
+                                        <p:tav tm="0">
+                                          <p:val>
+                                            <p:strVal val="#ppt_y+1"/>
+                                          </p:val>
+                                        </p:tav>
+                                        <p:tav tm="100000">
+                                          <p:val>
+                                            <p:strVal val="#ppt_y-.03"/>
+                                          </p:val>
+                                        </p:tav>
+                                      </p:tavLst>
+                                    </p:anim>
+                                    <p:anim calcmode="lin" valueType="num">
+                                      <p:cBhvr>
+                                        <p:cTn id="32" dur="50" accel="100000" fill="hold">
+                                          <p:stCondLst>
+                                            <p:cond delay="450"/>
+                                          </p:stCondLst>
+                                        </p:cTn>
+                                        <p:tgtEl>
+                                          <p:spTgt spid="3">
+                                            <p:txEl>
+                                              <p:pRg st="6" end="6"/>
+                                            </p:txEl>
+                                          </p:spTgt>
+                                        </p:tgtEl>
+                                        <p:attrNameLst>
+                                          <p:attrName>ppt_y</p:attrName>
+                                        </p:attrNameLst>
+                                      </p:cBhvr>
+                                      <p:tavLst>
+                                        <p:tav tm="0">
+                                          <p:val>
+                                            <p:strVal val="#ppt_y-.03"/>
+                                          </p:val>
+                                        </p:tav>
+                                        <p:tav tm="100000">
+                                          <p:val>
+                                            <p:strVal val="#ppt_y"/>
+                                          </p:val>
+                                        </p:tav>
+                                      </p:tavLst>
+                                    </p:anim>
                                   </p:childTnLst>
                                 </p:cTn>
                               </p:par>
+                            </p:childTnLst>
+                          </p:cTn>
+                        </p:par>
+                      </p:childTnLst>
+                    </p:cTn>
+                  </p:par>
+                  <p:par>
+                    <p:cTn id="33" fill="hold">
+                      <p:stCondLst>
+                        <p:cond delay="indefinite"/>
+                      </p:stCondLst>
+                      <p:childTnLst>
+                        <p:par>
+                          <p:cTn id="34" fill="hold">
+                            <p:stCondLst>
+                              <p:cond delay="0"/>
+                            </p:stCondLst>
+                            <p:childTnLst>
                               <p:par>
-                                <p:cTn id="24" presetID="22" presetClass="entr" presetSubtype="4" fill="hold" nodeType="withEffect">
+                                <p:cTn id="35" presetID="37" presetClass="entr" presetSubtype="0" fill="hold" grpId="0" nodeType="clickEffect">
                                   <p:stCondLst>
                                     <p:cond delay="0"/>
                                   </p:stCondLst>
                                   <p:childTnLst>
                                     <p:set>
                                       <p:cBhvr>
-                                        <p:cTn id="25" dur="1" fill="hold">
-                                          <p:stCondLst>
-                                            <p:cond delay="0"/>
-                                          </p:stCondLst>
-                                        </p:cTn>
-                                        <p:tgtEl>
-                                          <p:spTgt spid="3">
-                                            <p:txEl>
-                                              <p:pRg st="7" end="7"/>
-                                            </p:txEl>
-                                          </p:spTgt>
-                                        </p:tgtEl>
-                                        <p:attrNameLst>
-                                          <p:attrName>style.visibility</p:attrName>
-                                        </p:attrNameLst>
-                                      </p:cBhvr>
-                                      <p:to>
-                                        <p:strVal val="visible"/>
-                                      </p:to>
-                                    </p:set>
-                                    <p:animEffect transition="in" filter="wipe(down)">
-                                      <p:cBhvr>
-                                        <p:cTn id="26" dur="500"/>
-                                        <p:tgtEl>
-                                          <p:spTgt spid="3">
-                                            <p:txEl>
-                                              <p:pRg st="7" end="7"/>
-                                            </p:txEl>
-                                          </p:spTgt>
-                                        </p:tgtEl>
-                                      </p:cBhvr>
-                                    </p:animEffect>
-                                  </p:childTnLst>
-                                </p:cTn>
-                              </p:par>
-                              <p:par>
-                                <p:cTn id="27" presetID="22" presetClass="entr" presetSubtype="4" fill="hold" nodeType="withEffect">
-                                  <p:stCondLst>
-                                    <p:cond delay="0"/>
-                                  </p:stCondLst>
-                                  <p:childTnLst>
-                                    <p:set>
-                                      <p:cBhvr>
-                                        <p:cTn id="28" dur="1" fill="hold">
+                                        <p:cTn id="36" dur="1" fill="hold">
                                           <p:stCondLst>
                                             <p:cond delay="0"/>
                                           </p:stCondLst>
@@ -7835,9 +8466,9 @@
                                         <p:strVal val="visible"/>
                                       </p:to>
                                     </p:set>
-                                    <p:animEffect transition="in" filter="wipe(down)">
+                                    <p:animEffect transition="in" filter="fade">
                                       <p:cBhvr>
-                                        <p:cTn id="29" dur="500"/>
+                                        <p:cTn id="37" dur="500"/>
                                         <p:tgtEl>
                                           <p:spTgt spid="3">
                                             <p:txEl>
@@ -7847,6 +8478,310 @@
                                         </p:tgtEl>
                                       </p:cBhvr>
                                     </p:animEffect>
+                                    <p:anim calcmode="lin" valueType="num">
+                                      <p:cBhvr>
+                                        <p:cTn id="38" dur="500" fill="hold"/>
+                                        <p:tgtEl>
+                                          <p:spTgt spid="3">
+                                            <p:txEl>
+                                              <p:pRg st="8" end="8"/>
+                                            </p:txEl>
+                                          </p:spTgt>
+                                        </p:tgtEl>
+                                        <p:attrNameLst>
+                                          <p:attrName>ppt_x</p:attrName>
+                                        </p:attrNameLst>
+                                      </p:cBhvr>
+                                      <p:tavLst>
+                                        <p:tav tm="0">
+                                          <p:val>
+                                            <p:strVal val="#ppt_x"/>
+                                          </p:val>
+                                        </p:tav>
+                                        <p:tav tm="100000">
+                                          <p:val>
+                                            <p:strVal val="#ppt_x"/>
+                                          </p:val>
+                                        </p:tav>
+                                      </p:tavLst>
+                                    </p:anim>
+                                    <p:anim calcmode="lin" valueType="num">
+                                      <p:cBhvr>
+                                        <p:cTn id="39" dur="450" decel="100000" fill="hold"/>
+                                        <p:tgtEl>
+                                          <p:spTgt spid="3">
+                                            <p:txEl>
+                                              <p:pRg st="8" end="8"/>
+                                            </p:txEl>
+                                          </p:spTgt>
+                                        </p:tgtEl>
+                                        <p:attrNameLst>
+                                          <p:attrName>ppt_y</p:attrName>
+                                        </p:attrNameLst>
+                                      </p:cBhvr>
+                                      <p:tavLst>
+                                        <p:tav tm="0">
+                                          <p:val>
+                                            <p:strVal val="#ppt_y+1"/>
+                                          </p:val>
+                                        </p:tav>
+                                        <p:tav tm="100000">
+                                          <p:val>
+                                            <p:strVal val="#ppt_y-.03"/>
+                                          </p:val>
+                                        </p:tav>
+                                      </p:tavLst>
+                                    </p:anim>
+                                    <p:anim calcmode="lin" valueType="num">
+                                      <p:cBhvr>
+                                        <p:cTn id="40" dur="50" accel="100000" fill="hold">
+                                          <p:stCondLst>
+                                            <p:cond delay="450"/>
+                                          </p:stCondLst>
+                                        </p:cTn>
+                                        <p:tgtEl>
+                                          <p:spTgt spid="3">
+                                            <p:txEl>
+                                              <p:pRg st="8" end="8"/>
+                                            </p:txEl>
+                                          </p:spTgt>
+                                        </p:tgtEl>
+                                        <p:attrNameLst>
+                                          <p:attrName>ppt_y</p:attrName>
+                                        </p:attrNameLst>
+                                      </p:cBhvr>
+                                      <p:tavLst>
+                                        <p:tav tm="0">
+                                          <p:val>
+                                            <p:strVal val="#ppt_y-.03"/>
+                                          </p:val>
+                                        </p:tav>
+                                        <p:tav tm="100000">
+                                          <p:val>
+                                            <p:strVal val="#ppt_y"/>
+                                          </p:val>
+                                        </p:tav>
+                                      </p:tavLst>
+                                    </p:anim>
+                                  </p:childTnLst>
+                                </p:cTn>
+                              </p:par>
+                            </p:childTnLst>
+                          </p:cTn>
+                        </p:par>
+                      </p:childTnLst>
+                    </p:cTn>
+                  </p:par>
+                  <p:par>
+                    <p:cTn id="41" fill="hold">
+                      <p:stCondLst>
+                        <p:cond delay="indefinite"/>
+                      </p:stCondLst>
+                      <p:childTnLst>
+                        <p:par>
+                          <p:cTn id="42" fill="hold">
+                            <p:stCondLst>
+                              <p:cond delay="0"/>
+                            </p:stCondLst>
+                            <p:childTnLst>
+                              <p:par>
+                                <p:cTn id="43" presetID="37" presetClass="entr" presetSubtype="0" fill="hold" grpId="0" nodeType="clickEffect">
+                                  <p:stCondLst>
+                                    <p:cond delay="0"/>
+                                  </p:stCondLst>
+                                  <p:childTnLst>
+                                    <p:set>
+                                      <p:cBhvr>
+                                        <p:cTn id="44" dur="1" fill="hold">
+                                          <p:stCondLst>
+                                            <p:cond delay="0"/>
+                                          </p:stCondLst>
+                                        </p:cTn>
+                                        <p:tgtEl>
+                                          <p:spTgt spid="3">
+                                            <p:txEl>
+                                              <p:pRg st="9" end="9"/>
+                                            </p:txEl>
+                                          </p:spTgt>
+                                        </p:tgtEl>
+                                        <p:attrNameLst>
+                                          <p:attrName>style.visibility</p:attrName>
+                                        </p:attrNameLst>
+                                      </p:cBhvr>
+                                      <p:to>
+                                        <p:strVal val="visible"/>
+                                      </p:to>
+                                    </p:set>
+                                    <p:animEffect transition="in" filter="fade">
+                                      <p:cBhvr>
+                                        <p:cTn id="45" dur="500"/>
+                                        <p:tgtEl>
+                                          <p:spTgt spid="3">
+                                            <p:txEl>
+                                              <p:pRg st="9" end="9"/>
+                                            </p:txEl>
+                                          </p:spTgt>
+                                        </p:tgtEl>
+                                      </p:cBhvr>
+                                    </p:animEffect>
+                                    <p:anim calcmode="lin" valueType="num">
+                                      <p:cBhvr>
+                                        <p:cTn id="46" dur="500" fill="hold"/>
+                                        <p:tgtEl>
+                                          <p:spTgt spid="3">
+                                            <p:txEl>
+                                              <p:pRg st="9" end="9"/>
+                                            </p:txEl>
+                                          </p:spTgt>
+                                        </p:tgtEl>
+                                        <p:attrNameLst>
+                                          <p:attrName>ppt_x</p:attrName>
+                                        </p:attrNameLst>
+                                      </p:cBhvr>
+                                      <p:tavLst>
+                                        <p:tav tm="0">
+                                          <p:val>
+                                            <p:strVal val="#ppt_x"/>
+                                          </p:val>
+                                        </p:tav>
+                                        <p:tav tm="100000">
+                                          <p:val>
+                                            <p:strVal val="#ppt_x"/>
+                                          </p:val>
+                                        </p:tav>
+                                      </p:tavLst>
+                                    </p:anim>
+                                    <p:anim calcmode="lin" valueType="num">
+                                      <p:cBhvr>
+                                        <p:cTn id="47" dur="450" decel="100000" fill="hold"/>
+                                        <p:tgtEl>
+                                          <p:spTgt spid="3">
+                                            <p:txEl>
+                                              <p:pRg st="9" end="9"/>
+                                            </p:txEl>
+                                          </p:spTgt>
+                                        </p:tgtEl>
+                                        <p:attrNameLst>
+                                          <p:attrName>ppt_y</p:attrName>
+                                        </p:attrNameLst>
+                                      </p:cBhvr>
+                                      <p:tavLst>
+                                        <p:tav tm="0">
+                                          <p:val>
+                                            <p:strVal val="#ppt_y+1"/>
+                                          </p:val>
+                                        </p:tav>
+                                        <p:tav tm="100000">
+                                          <p:val>
+                                            <p:strVal val="#ppt_y-.03"/>
+                                          </p:val>
+                                        </p:tav>
+                                      </p:tavLst>
+                                    </p:anim>
+                                    <p:anim calcmode="lin" valueType="num">
+                                      <p:cBhvr>
+                                        <p:cTn id="48" dur="50" accel="100000" fill="hold">
+                                          <p:stCondLst>
+                                            <p:cond delay="450"/>
+                                          </p:stCondLst>
+                                        </p:cTn>
+                                        <p:tgtEl>
+                                          <p:spTgt spid="3">
+                                            <p:txEl>
+                                              <p:pRg st="9" end="9"/>
+                                            </p:txEl>
+                                          </p:spTgt>
+                                        </p:tgtEl>
+                                        <p:attrNameLst>
+                                          <p:attrName>ppt_y</p:attrName>
+                                        </p:attrNameLst>
+                                      </p:cBhvr>
+                                      <p:tavLst>
+                                        <p:tav tm="0">
+                                          <p:val>
+                                            <p:strVal val="#ppt_y-.03"/>
+                                          </p:val>
+                                        </p:tav>
+                                        <p:tav tm="100000">
+                                          <p:val>
+                                            <p:strVal val="#ppt_y"/>
+                                          </p:val>
+                                        </p:tav>
+                                      </p:tavLst>
+                                    </p:anim>
+                                  </p:childTnLst>
+                                </p:cTn>
+                              </p:par>
+                              <p:par>
+                                <p:cTn id="49" presetID="2" presetClass="exit" presetSubtype="4" fill="hold" nodeType="withEffect">
+                                  <p:stCondLst>
+                                    <p:cond delay="0"/>
+                                  </p:stCondLst>
+                                  <p:childTnLst>
+                                    <p:anim calcmode="lin" valueType="num">
+                                      <p:cBhvr additive="base">
+                                        <p:cTn id="50" dur="500"/>
+                                        <p:tgtEl>
+                                          <p:spTgt spid="7"/>
+                                        </p:tgtEl>
+                                        <p:attrNameLst>
+                                          <p:attrName>ppt_x</p:attrName>
+                                        </p:attrNameLst>
+                                      </p:cBhvr>
+                                      <p:tavLst>
+                                        <p:tav tm="0">
+                                          <p:val>
+                                            <p:strVal val="ppt_x"/>
+                                          </p:val>
+                                        </p:tav>
+                                        <p:tav tm="100000">
+                                          <p:val>
+                                            <p:strVal val="ppt_x"/>
+                                          </p:val>
+                                        </p:tav>
+                                      </p:tavLst>
+                                    </p:anim>
+                                    <p:anim calcmode="lin" valueType="num">
+                                      <p:cBhvr additive="base">
+                                        <p:cTn id="51" dur="500"/>
+                                        <p:tgtEl>
+                                          <p:spTgt spid="7"/>
+                                        </p:tgtEl>
+                                        <p:attrNameLst>
+                                          <p:attrName>ppt_y</p:attrName>
+                                        </p:attrNameLst>
+                                      </p:cBhvr>
+                                      <p:tavLst>
+                                        <p:tav tm="0">
+                                          <p:val>
+                                            <p:strVal val="ppt_y"/>
+                                          </p:val>
+                                        </p:tav>
+                                        <p:tav tm="100000">
+                                          <p:val>
+                                            <p:strVal val="1+ppt_h/2"/>
+                                          </p:val>
+                                        </p:tav>
+                                      </p:tavLst>
+                                    </p:anim>
+                                    <p:set>
+                                      <p:cBhvr>
+                                        <p:cTn id="52" dur="1" fill="hold">
+                                          <p:stCondLst>
+                                            <p:cond delay="499"/>
+                                          </p:stCondLst>
+                                        </p:cTn>
+                                        <p:tgtEl>
+                                          <p:spTgt spid="7"/>
+                                        </p:tgtEl>
+                                        <p:attrNameLst>
+                                          <p:attrName>style.visibility</p:attrName>
+                                        </p:attrNameLst>
+                                      </p:cBhvr>
+                                      <p:to>
+                                        <p:strVal val="hidden"/>
+                                      </p:to>
+                                    </p:set>
                                   </p:childTnLst>
                                 </p:cTn>
                               </p:par>
@@ -7877,6 +8812,218 @@
         </p:cTn>
       </p:par>
     </p:tnLst>
+    <p:bldLst>
+      <p:bldP spid="3" grpId="0" uiExpand="1" build="p"/>
+    </p:bldLst>
+  </p:timing>
+</p:sld>
+</file>
+
+<file path=ppt/slides/slide9.xml><?xml version="1.0" encoding="utf-8"?>
+<p:sld xmlns:a="http://schemas.openxmlformats.org/drawingml/2006/main" xmlns:r="http://schemas.openxmlformats.org/officeDocument/2006/relationships" xmlns:p="http://schemas.openxmlformats.org/presentationml/2006/main">
+  <p:cSld>
+    <p:spTree>
+      <p:nvGrpSpPr>
+        <p:cNvPr id="1" name=""/>
+        <p:cNvGrpSpPr/>
+        <p:nvPr/>
+      </p:nvGrpSpPr>
+      <p:grpSpPr>
+        <a:xfrm>
+          <a:off x="0" y="0"/>
+          <a:ext cx="0" cy="0"/>
+          <a:chOff x="0" y="0"/>
+          <a:chExt cx="0" cy="0"/>
+        </a:xfrm>
+      </p:grpSpPr>
+      <p:sp>
+        <p:nvSpPr>
+          <p:cNvPr id="5" name="Espace réservé de la date 4"/>
+          <p:cNvSpPr>
+            <a:spLocks noGrp="1"/>
+          </p:cNvSpPr>
+          <p:nvPr>
+            <p:ph type="dt" sz="half" idx="10"/>
+          </p:nvPr>
+        </p:nvSpPr>
+        <p:spPr/>
+        <p:txBody>
+          <a:bodyPr/>
+          <a:lstStyle/>
+          <a:p>
+            <a:r>
+              <a:rPr lang="fr-FR" smtClean="0"/>
+              <a:t>Jeudi 29 Novembre 2012</a:t>
+            </a:r>
+            <a:endParaRPr lang="fr-FR" dirty="0"/>
+          </a:p>
+        </p:txBody>
+      </p:sp>
+      <p:sp>
+        <p:nvSpPr>
+          <p:cNvPr id="6" name="Espace réservé du pied de page 5"/>
+          <p:cNvSpPr>
+            <a:spLocks noGrp="1"/>
+          </p:cNvSpPr>
+          <p:nvPr>
+            <p:ph type="ftr" sz="quarter" idx="11"/>
+          </p:nvPr>
+        </p:nvSpPr>
+        <p:spPr/>
+        <p:txBody>
+          <a:bodyPr/>
+          <a:lstStyle/>
+          <a:p>
+            <a:r>
+              <a:rPr lang="fr-FR" smtClean="0"/>
+              <a:t>Paul Fiat</a:t>
+            </a:r>
+            <a:endParaRPr lang="fr-FR" dirty="0"/>
+          </a:p>
+        </p:txBody>
+      </p:sp>
+      <p:sp>
+        <p:nvSpPr>
+          <p:cNvPr id="7" name="Espace réservé du numéro de diapositive 6"/>
+          <p:cNvSpPr>
+            <a:spLocks noGrp="1"/>
+          </p:cNvSpPr>
+          <p:nvPr>
+            <p:ph type="sldNum" sz="quarter" idx="12"/>
+          </p:nvPr>
+        </p:nvSpPr>
+        <p:spPr/>
+        <p:txBody>
+          <a:bodyPr/>
+          <a:lstStyle/>
+          <a:p>
+            <a:fld id="{9DDF0C85-99BB-428E-8D90-A207FA2E644C}" type="slidenum">
+              <a:rPr lang="fr-FR" smtClean="0"/>
+              <a:pPr/>
+              <a:t>9</a:t>
+            </a:fld>
+            <a:endParaRPr lang="fr-FR" dirty="0"/>
+          </a:p>
+        </p:txBody>
+      </p:sp>
+      <p:sp>
+        <p:nvSpPr>
+          <p:cNvPr id="2" name="Title 1"/>
+          <p:cNvSpPr>
+            <a:spLocks noGrp="1"/>
+          </p:cNvSpPr>
+          <p:nvPr>
+            <p:ph type="title"/>
+          </p:nvPr>
+        </p:nvSpPr>
+        <p:spPr/>
+        <p:txBody>
+          <a:bodyPr/>
+          <a:lstStyle/>
+          <a:p>
+            <a:r>
+              <a:rPr lang="fr-FR" dirty="0" smtClean="0"/>
+              <a:t>Direction artistique</a:t>
+            </a:r>
+            <a:endParaRPr lang="fr-FR" dirty="0"/>
+          </a:p>
+        </p:txBody>
+      </p:sp>
+      <p:sp>
+        <p:nvSpPr>
+          <p:cNvPr id="3" name="Text Placeholder 2"/>
+          <p:cNvSpPr>
+            <a:spLocks noGrp="1"/>
+          </p:cNvSpPr>
+          <p:nvPr>
+            <p:ph type="body" idx="1"/>
+          </p:nvPr>
+        </p:nvSpPr>
+        <p:spPr>
+          <a:xfrm>
+            <a:off x="381000" y="1633536"/>
+            <a:ext cx="8477280" cy="4938736"/>
+          </a:xfrm>
+        </p:spPr>
+        <p:txBody>
+          <a:bodyPr/>
+          <a:lstStyle/>
+          <a:p>
+            <a:endParaRPr lang="fr-FR" dirty="0" smtClean="0"/>
+          </a:p>
+          <a:p>
+            <a:r>
+              <a:rPr lang="fr-FR" dirty="0" smtClean="0"/>
+              <a:t>Les graphismes se veulent réalistes, en accord avec la conception générale de ces entités microscopiques.</a:t>
+            </a:r>
+          </a:p>
+          <a:p>
+            <a:endParaRPr lang="fr-FR" dirty="0" smtClean="0"/>
+          </a:p>
+          <a:p>
+            <a:endParaRPr lang="fr-FR" dirty="0"/>
+          </a:p>
+        </p:txBody>
+      </p:sp>
+      <p:pic>
+        <p:nvPicPr>
+          <p:cNvPr id="4" name="Picture 3" descr="virus.jpg"/>
+          <p:cNvPicPr>
+            <a:picLocks noChangeAspect="1"/>
+          </p:cNvPicPr>
+          <p:nvPr/>
+        </p:nvPicPr>
+        <p:blipFill>
+          <a:blip r:embed="rId2"/>
+          <a:stretch>
+            <a:fillRect/>
+          </a:stretch>
+        </p:blipFill>
+        <p:spPr>
+          <a:xfrm>
+            <a:off x="1643042" y="3143248"/>
+            <a:ext cx="2428892" cy="1290349"/>
+          </a:xfrm>
+          <a:prstGeom prst="rect">
+            <a:avLst/>
+          </a:prstGeom>
+        </p:spPr>
+      </p:pic>
+      <p:pic>
+        <p:nvPicPr>
+          <p:cNvPr id="8" name="Picture 7" descr="virus.jpg"/>
+          <p:cNvPicPr>
+            <a:picLocks noChangeAspect="1"/>
+          </p:cNvPicPr>
+          <p:nvPr/>
+        </p:nvPicPr>
+        <p:blipFill>
+          <a:blip r:embed="rId3"/>
+          <a:stretch>
+            <a:fillRect/>
+          </a:stretch>
+        </p:blipFill>
+        <p:spPr>
+          <a:xfrm>
+            <a:off x="5214942" y="3143248"/>
+            <a:ext cx="2524369" cy="1285884"/>
+          </a:xfrm>
+          <a:prstGeom prst="rect">
+            <a:avLst/>
+          </a:prstGeom>
+        </p:spPr>
+      </p:pic>
+    </p:spTree>
+  </p:cSld>
+  <p:clrMapOvr>
+    <a:masterClrMapping/>
+  </p:clrMapOvr>
+  <p:timing>
+    <p:tnLst>
+      <p:par>
+        <p:cTn id="1" dur="indefinite" restart="never" nodeType="tmRoot"/>
+      </p:par>
+    </p:tnLst>
   </p:timing>
 </p:sld>
 </file>
@@ -7884,9 +9031,9 @@
 <file path=ppt/theme/theme1.xml><?xml version="1.0" encoding="utf-8"?>
 <a:theme xmlns:a="http://schemas.openxmlformats.org/drawingml/2006/main" name="Verve">
   <a:themeElements>
-    <a:clrScheme name="Verve">
+    <a:clrScheme name="Custom 1">
       <a:dk1>
-        <a:sysClr val="windowText" lastClr="000000"/>
+        <a:srgbClr val="666666"/>
       </a:dk1>
       <a:lt1>
         <a:sysClr val="window" lastClr="FFFFFF"/>

</xml_diff>

<commit_message>
Présentation à 90% finie.
</commit_message>
<xml_diff>
--- a/GD/Présentation.pptx
+++ b/GD/Présentation.pptx
@@ -12,13 +12,13 @@
     <p:sldId id="256" r:id="rId3"/>
     <p:sldId id="270" r:id="rId4"/>
     <p:sldId id="271" r:id="rId5"/>
-    <p:sldId id="257" r:id="rId6"/>
+    <p:sldId id="272" r:id="rId6"/>
     <p:sldId id="261" r:id="rId7"/>
     <p:sldId id="264" r:id="rId8"/>
     <p:sldId id="262" r:id="rId9"/>
     <p:sldId id="266" r:id="rId10"/>
-    <p:sldId id="265" r:id="rId11"/>
-    <p:sldId id="267" r:id="rId12"/>
+    <p:sldId id="267" r:id="rId11"/>
+    <p:sldId id="273" r:id="rId12"/>
   </p:sldIdLst>
   <p:sldSz cx="9144000" cy="6858000" type="screen4x3"/>
   <p:notesSz cx="6858000" cy="9144000"/>
@@ -4052,7 +4052,12 @@
             <p:ph type="subTitle" idx="1"/>
           </p:nvPr>
         </p:nvSpPr>
-        <p:spPr/>
+        <p:spPr>
+          <a:xfrm>
+            <a:off x="0" y="2250280"/>
+            <a:ext cx="8603456" cy="3821926"/>
+          </a:xfrm>
+        </p:spPr>
         <p:txBody>
           <a:bodyPr>
             <a:normAutofit/>
@@ -4082,9 +4087,20 @@
             </a:r>
             <a:r>
               <a:rPr lang="fr-FR" dirty="0" smtClean="0"/>
-              <a:t>Novembre 2012</a:t>
-            </a:r>
-            <a:endParaRPr lang="fr-FR" dirty="0"/>
+              <a:t>Novembre </a:t>
+            </a:r>
+            <a:r>
+              <a:rPr lang="fr-FR" dirty="0" smtClean="0"/>
+              <a:t>2012</a:t>
+            </a:r>
+          </a:p>
+          <a:p>
+            <a:pPr algn="l"/>
+            <a:endParaRPr lang="fr-FR" sz="2000" b="1" i="1" dirty="0" smtClean="0"/>
+          </a:p>
+          <a:p>
+            <a:pPr algn="l"/>
+            <a:endParaRPr lang="fr-FR" sz="2000" b="1" i="1" dirty="0" smtClean="0"/>
           </a:p>
         </p:txBody>
       </p:sp>
@@ -4151,12 +4167,12 @@
       </p:grpSpPr>
       <p:sp>
         <p:nvSpPr>
-          <p:cNvPr id="2" name="Title 1"/>
-          <p:cNvSpPr>
-            <a:spLocks noGrp="1"/>
-          </p:cNvSpPr>
-          <p:nvPr>
-            <p:ph type="title"/>
+          <p:cNvPr id="4" name="Espace réservé de la date 3"/>
+          <p:cNvSpPr>
+            <a:spLocks noGrp="1"/>
+          </p:cNvSpPr>
+          <p:nvPr>
+            <p:ph type="dt" sz="half" idx="10"/>
           </p:nvPr>
         </p:nvSpPr>
         <p:spPr/>
@@ -4165,8 +4181,8 @@
           <a:lstStyle/>
           <a:p>
             <a:r>
-              <a:rPr lang="fr-FR" dirty="0" smtClean="0"/>
-              <a:t>Mockup</a:t>
+              <a:rPr lang="fr-FR" smtClean="0"/>
+              <a:t>Jeudi 29 Novembre 2012</a:t>
             </a:r>
             <a:endParaRPr lang="fr-FR" dirty="0"/>
           </a:p>
@@ -4174,12 +4190,12 @@
       </p:sp>
       <p:sp>
         <p:nvSpPr>
-          <p:cNvPr id="4" name="Text Placeholder 3"/>
-          <p:cNvSpPr>
-            <a:spLocks noGrp="1"/>
-          </p:cNvSpPr>
-          <p:nvPr>
-            <p:ph type="body" sz="half" idx="2"/>
+          <p:cNvPr id="5" name="Espace réservé du pied de page 4"/>
+          <p:cNvSpPr>
+            <a:spLocks noGrp="1"/>
+          </p:cNvSpPr>
+          <p:nvPr>
+            <p:ph type="ftr" sz="quarter" idx="11"/>
           </p:nvPr>
         </p:nvSpPr>
         <p:spPr/>
@@ -4188,8 +4204,8 @@
           <a:lstStyle/>
           <a:p>
             <a:r>
-              <a:rPr lang="fr-FR" dirty="0" smtClean="0"/>
-              <a:t>Ecran type du jeu.</a:t>
+              <a:rPr lang="fr-FR" smtClean="0"/>
+              <a:t>Paul Fiat</a:t>
             </a:r>
             <a:endParaRPr lang="fr-FR" dirty="0"/>
           </a:p>
@@ -4197,12 +4213,12 @@
       </p:sp>
       <p:sp>
         <p:nvSpPr>
-          <p:cNvPr id="3" name="Espace réservé de la date 2"/>
-          <p:cNvSpPr>
-            <a:spLocks noGrp="1"/>
-          </p:cNvSpPr>
-          <p:nvPr>
-            <p:ph type="dt" sz="half" idx="10"/>
+          <p:cNvPr id="6" name="Espace réservé du numéro de diapositive 5"/>
+          <p:cNvSpPr>
+            <a:spLocks noGrp="1"/>
+          </p:cNvSpPr>
+          <p:nvPr>
+            <p:ph type="sldNum" sz="quarter" idx="12"/>
           </p:nvPr>
         </p:nvSpPr>
         <p:spPr/>
@@ -4210,177 +4226,10 @@
           <a:bodyPr/>
           <a:lstStyle/>
           <a:p>
-            <a:r>
-              <a:rPr lang="fr-FR" smtClean="0"/>
-              <a:t>Jeudi 29 Novembre 2012</a:t>
-            </a:r>
-            <a:endParaRPr lang="fr-FR" dirty="0"/>
-          </a:p>
-        </p:txBody>
-      </p:sp>
-      <p:sp>
-        <p:nvSpPr>
-          <p:cNvPr id="5" name="Espace réservé du pied de page 4"/>
-          <p:cNvSpPr>
-            <a:spLocks noGrp="1"/>
-          </p:cNvSpPr>
-          <p:nvPr>
-            <p:ph type="ftr" sz="quarter" idx="11"/>
-          </p:nvPr>
-        </p:nvSpPr>
-        <p:spPr/>
-        <p:txBody>
-          <a:bodyPr/>
-          <a:lstStyle/>
-          <a:p>
-            <a:r>
-              <a:rPr lang="fr-FR" smtClean="0"/>
-              <a:t>Paul Fiat</a:t>
-            </a:r>
-            <a:endParaRPr lang="fr-FR" dirty="0"/>
-          </a:p>
-        </p:txBody>
-      </p:sp>
-      <p:sp>
-        <p:nvSpPr>
-          <p:cNvPr id="6" name="Espace réservé du numéro de diapositive 5"/>
-          <p:cNvSpPr>
-            <a:spLocks noGrp="1"/>
-          </p:cNvSpPr>
-          <p:nvPr>
-            <p:ph type="sldNum" sz="quarter" idx="12"/>
-          </p:nvPr>
-        </p:nvSpPr>
-        <p:spPr/>
-        <p:txBody>
-          <a:bodyPr/>
-          <a:lstStyle/>
-          <a:p>
             <a:fld id="{9DDF0C85-99BB-428E-8D90-A207FA2E644C}" type="slidenum">
               <a:rPr lang="fr-FR" smtClean="0"/>
               <a:pPr/>
               <a:t>10</a:t>
-            </a:fld>
-            <a:endParaRPr lang="fr-FR" dirty="0"/>
-          </a:p>
-        </p:txBody>
-      </p:sp>
-      <p:pic>
-        <p:nvPicPr>
-          <p:cNvPr id="11" name="Picture Placeholder 10" descr="mockup_legend.png"/>
-          <p:cNvPicPr>
-            <a:picLocks noGrp="1" noChangeAspect="1"/>
-          </p:cNvPicPr>
-          <p:nvPr>
-            <p:ph type="pic" idx="1"/>
-          </p:nvPr>
-        </p:nvPicPr>
-        <p:blipFill>
-          <a:blip r:embed="rId2"/>
-          <a:srcRect t="130" b="130"/>
-          <a:stretch>
-            <a:fillRect/>
-          </a:stretch>
-        </p:blipFill>
-        <p:spPr/>
-      </p:pic>
-    </p:spTree>
-  </p:cSld>
-  <p:clrMapOvr>
-    <a:masterClrMapping/>
-  </p:clrMapOvr>
-  <p:timing>
-    <p:tnLst>
-      <p:par>
-        <p:cTn id="1" dur="indefinite" restart="never" nodeType="tmRoot"/>
-      </p:par>
-    </p:tnLst>
-  </p:timing>
-</p:sld>
-</file>
-
-<file path=ppt/slides/slide11.xml><?xml version="1.0" encoding="utf-8"?>
-<p:sld xmlns:a="http://schemas.openxmlformats.org/drawingml/2006/main" xmlns:r="http://schemas.openxmlformats.org/officeDocument/2006/relationships" xmlns:p="http://schemas.openxmlformats.org/presentationml/2006/main">
-  <p:cSld>
-    <p:spTree>
-      <p:nvGrpSpPr>
-        <p:cNvPr id="1" name=""/>
-        <p:cNvGrpSpPr/>
-        <p:nvPr/>
-      </p:nvGrpSpPr>
-      <p:grpSpPr>
-        <a:xfrm>
-          <a:off x="0" y="0"/>
-          <a:ext cx="0" cy="0"/>
-          <a:chOff x="0" y="0"/>
-          <a:chExt cx="0" cy="0"/>
-        </a:xfrm>
-      </p:grpSpPr>
-      <p:sp>
-        <p:nvSpPr>
-          <p:cNvPr id="4" name="Espace réservé de la date 3"/>
-          <p:cNvSpPr>
-            <a:spLocks noGrp="1"/>
-          </p:cNvSpPr>
-          <p:nvPr>
-            <p:ph type="dt" sz="half" idx="10"/>
-          </p:nvPr>
-        </p:nvSpPr>
-        <p:spPr/>
-        <p:txBody>
-          <a:bodyPr/>
-          <a:lstStyle/>
-          <a:p>
-            <a:r>
-              <a:rPr lang="fr-FR" smtClean="0"/>
-              <a:t>Jeudi 29 Novembre 2012</a:t>
-            </a:r>
-            <a:endParaRPr lang="fr-FR" dirty="0"/>
-          </a:p>
-        </p:txBody>
-      </p:sp>
-      <p:sp>
-        <p:nvSpPr>
-          <p:cNvPr id="5" name="Espace réservé du pied de page 4"/>
-          <p:cNvSpPr>
-            <a:spLocks noGrp="1"/>
-          </p:cNvSpPr>
-          <p:nvPr>
-            <p:ph type="ftr" sz="quarter" idx="11"/>
-          </p:nvPr>
-        </p:nvSpPr>
-        <p:spPr/>
-        <p:txBody>
-          <a:bodyPr/>
-          <a:lstStyle/>
-          <a:p>
-            <a:r>
-              <a:rPr lang="fr-FR" smtClean="0"/>
-              <a:t>Paul Fiat</a:t>
-            </a:r>
-            <a:endParaRPr lang="fr-FR" dirty="0"/>
-          </a:p>
-        </p:txBody>
-      </p:sp>
-      <p:sp>
-        <p:nvSpPr>
-          <p:cNvPr id="6" name="Espace réservé du numéro de diapositive 5"/>
-          <p:cNvSpPr>
-            <a:spLocks noGrp="1"/>
-          </p:cNvSpPr>
-          <p:nvPr>
-            <p:ph type="sldNum" sz="quarter" idx="12"/>
-          </p:nvPr>
-        </p:nvSpPr>
-        <p:spPr/>
-        <p:txBody>
-          <a:bodyPr/>
-          <a:lstStyle/>
-          <a:p>
-            <a:fld id="{9DDF0C85-99BB-428E-8D90-A207FA2E644C}" type="slidenum">
-              <a:rPr lang="fr-FR" smtClean="0"/>
-              <a:pPr/>
-              <a:t>11</a:t>
             </a:fld>
             <a:endParaRPr lang="fr-FR" dirty="0"/>
           </a:p>
@@ -4524,12 +4373,13 @@
             </a:pPr>
             <a:r>
               <a:rPr lang="fr-FR" dirty="0" smtClean="0"/>
-              <a:t>Les feedbacks et bruitages sonores auront un effet « liquide » et « profonds » pour correspondre à l’environnement du jeu</a:t>
+              <a:t> </a:t>
             </a:r>
             <a:r>
               <a:rPr lang="fr-FR" dirty="0" smtClean="0"/>
-              <a:t>.</a:t>
-            </a:r>
+              <a:t>Feedbacks/bruitages « liquides »</a:t>
+            </a:r>
+            <a:endParaRPr lang="fr-FR" dirty="0" smtClean="0"/>
           </a:p>
           <a:p>
             <a:pPr>
@@ -4539,13 +4389,17 @@
             <a:endParaRPr lang="fr-FR" dirty="0" smtClean="0"/>
           </a:p>
           <a:p>
-            <a:pPr>
-              <a:buFont typeface="Wingdings" pitchFamily="2" charset="2"/>
-              <a:buChar char="Ø"/>
-            </a:pPr>
             <a:r>
               <a:rPr lang="fr-FR" dirty="0" smtClean="0"/>
-              <a:t>Bulles :	 </a:t>
+              <a:t>	</a:t>
+            </a:r>
+            <a:r>
+              <a:rPr lang="fr-FR" dirty="0" smtClean="0"/>
+              <a:t>Bulles :	</a:t>
+            </a:r>
+            <a:r>
+              <a:rPr lang="fr-FR" dirty="0" smtClean="0"/>
+              <a:t>	 </a:t>
             </a:r>
             <a:r>
               <a:rPr lang="fr-FR" dirty="0" err="1" smtClean="0"/>
@@ -4577,8 +4431,12 @@
               <a:t>Pas </a:t>
             </a:r>
             <a:r>
-              <a:rPr lang="fr-FR" dirty="0" smtClean="0"/>
-              <a:t>de parole.</a:t>
+              <a:rPr lang="fr-FR" smtClean="0"/>
+              <a:t>de </a:t>
+            </a:r>
+            <a:r>
+              <a:rPr lang="fr-FR" smtClean="0"/>
+              <a:t>parole.</a:t>
             </a:r>
             <a:endParaRPr lang="fr-FR" dirty="0"/>
           </a:p>
@@ -4607,7 +4465,7 @@
         </p:blipFill>
         <p:spPr>
           <a:xfrm>
-            <a:off x="1785918" y="4214818"/>
+            <a:off x="2428860" y="3929066"/>
             <a:ext cx="304800" cy="304800"/>
           </a:xfrm>
           <a:prstGeom prst="rect">
@@ -4635,7 +4493,7 @@
         </p:blipFill>
         <p:spPr>
           <a:xfrm>
-            <a:off x="5786446" y="4214818"/>
+            <a:off x="6643702" y="3929066"/>
             <a:ext cx="304800" cy="304800"/>
           </a:xfrm>
           <a:prstGeom prst="rect">
@@ -4663,7 +4521,7 @@
         </p:blipFill>
         <p:spPr>
           <a:xfrm>
-            <a:off x="3571868" y="4214818"/>
+            <a:off x="4429124" y="3929066"/>
             <a:ext cx="304800" cy="304800"/>
           </a:xfrm>
           <a:prstGeom prst="rect">
@@ -4682,7 +4540,537 @@
         <p:cTn id="1" dur="indefinite" restart="never" nodeType="tmRoot">
           <p:childTnLst>
             <p:seq concurrent="1" nextAc="seek">
-              <p:cTn id="2" restart="whenNotActive" fill="hold" evtFilter="cancelBubble" nodeType="interactiveSeq">
+              <p:cTn id="2" dur="indefinite" nodeType="mainSeq">
+                <p:childTnLst>
+                  <p:par>
+                    <p:cTn id="3" fill="hold">
+                      <p:stCondLst>
+                        <p:cond delay="indefinite"/>
+                      </p:stCondLst>
+                      <p:childTnLst>
+                        <p:par>
+                          <p:cTn id="4" fill="hold">
+                            <p:stCondLst>
+                              <p:cond delay="0"/>
+                            </p:stCondLst>
+                            <p:childTnLst>
+                              <p:par>
+                                <p:cTn id="5" presetID="2" presetClass="entr" presetSubtype="4" fill="hold" nodeType="clickEffect">
+                                  <p:stCondLst>
+                                    <p:cond delay="0"/>
+                                  </p:stCondLst>
+                                  <p:childTnLst>
+                                    <p:set>
+                                      <p:cBhvr>
+                                        <p:cTn id="6" dur="1" fill="hold">
+                                          <p:stCondLst>
+                                            <p:cond delay="0"/>
+                                          </p:stCondLst>
+                                        </p:cTn>
+                                        <p:tgtEl>
+                                          <p:spTgt spid="3">
+                                            <p:txEl>
+                                              <p:pRg st="4" end="4"/>
+                                            </p:txEl>
+                                          </p:spTgt>
+                                        </p:tgtEl>
+                                        <p:attrNameLst>
+                                          <p:attrName>style.visibility</p:attrName>
+                                        </p:attrNameLst>
+                                      </p:cBhvr>
+                                      <p:to>
+                                        <p:strVal val="visible"/>
+                                      </p:to>
+                                    </p:set>
+                                    <p:anim calcmode="lin" valueType="num">
+                                      <p:cBhvr additive="base">
+                                        <p:cTn id="7" dur="500" fill="hold"/>
+                                        <p:tgtEl>
+                                          <p:spTgt spid="3">
+                                            <p:txEl>
+                                              <p:pRg st="4" end="4"/>
+                                            </p:txEl>
+                                          </p:spTgt>
+                                        </p:tgtEl>
+                                        <p:attrNameLst>
+                                          <p:attrName>ppt_x</p:attrName>
+                                        </p:attrNameLst>
+                                      </p:cBhvr>
+                                      <p:tavLst>
+                                        <p:tav tm="0">
+                                          <p:val>
+                                            <p:strVal val="#ppt_x"/>
+                                          </p:val>
+                                        </p:tav>
+                                        <p:tav tm="100000">
+                                          <p:val>
+                                            <p:strVal val="#ppt_x"/>
+                                          </p:val>
+                                        </p:tav>
+                                      </p:tavLst>
+                                    </p:anim>
+                                    <p:anim calcmode="lin" valueType="num">
+                                      <p:cBhvr additive="base">
+                                        <p:cTn id="8" dur="500" fill="hold"/>
+                                        <p:tgtEl>
+                                          <p:spTgt spid="3">
+                                            <p:txEl>
+                                              <p:pRg st="4" end="4"/>
+                                            </p:txEl>
+                                          </p:spTgt>
+                                        </p:tgtEl>
+                                        <p:attrNameLst>
+                                          <p:attrName>ppt_y</p:attrName>
+                                        </p:attrNameLst>
+                                      </p:cBhvr>
+                                      <p:tavLst>
+                                        <p:tav tm="0">
+                                          <p:val>
+                                            <p:strVal val="1+#ppt_h/2"/>
+                                          </p:val>
+                                        </p:tav>
+                                        <p:tav tm="100000">
+                                          <p:val>
+                                            <p:strVal val="#ppt_y"/>
+                                          </p:val>
+                                        </p:tav>
+                                      </p:tavLst>
+                                    </p:anim>
+                                  </p:childTnLst>
+                                </p:cTn>
+                              </p:par>
+                              <p:par>
+                                <p:cTn id="9" presetID="2" presetClass="entr" presetSubtype="4" fill="hold" nodeType="withEffect">
+                                  <p:stCondLst>
+                                    <p:cond delay="0"/>
+                                  </p:stCondLst>
+                                  <p:childTnLst>
+                                    <p:set>
+                                      <p:cBhvr>
+                                        <p:cTn id="10" dur="1" fill="hold">
+                                          <p:stCondLst>
+                                            <p:cond delay="0"/>
+                                          </p:stCondLst>
+                                        </p:cTn>
+                                        <p:tgtEl>
+                                          <p:spTgt spid="3">
+                                            <p:txEl>
+                                              <p:pRg st="6" end="6"/>
+                                            </p:txEl>
+                                          </p:spTgt>
+                                        </p:tgtEl>
+                                        <p:attrNameLst>
+                                          <p:attrName>style.visibility</p:attrName>
+                                        </p:attrNameLst>
+                                      </p:cBhvr>
+                                      <p:to>
+                                        <p:strVal val="visible"/>
+                                      </p:to>
+                                    </p:set>
+                                    <p:anim calcmode="lin" valueType="num">
+                                      <p:cBhvr additive="base">
+                                        <p:cTn id="11" dur="500" fill="hold"/>
+                                        <p:tgtEl>
+                                          <p:spTgt spid="3">
+                                            <p:txEl>
+                                              <p:pRg st="6" end="6"/>
+                                            </p:txEl>
+                                          </p:spTgt>
+                                        </p:tgtEl>
+                                        <p:attrNameLst>
+                                          <p:attrName>ppt_x</p:attrName>
+                                        </p:attrNameLst>
+                                      </p:cBhvr>
+                                      <p:tavLst>
+                                        <p:tav tm="0">
+                                          <p:val>
+                                            <p:strVal val="#ppt_x"/>
+                                          </p:val>
+                                        </p:tav>
+                                        <p:tav tm="100000">
+                                          <p:val>
+                                            <p:strVal val="#ppt_x"/>
+                                          </p:val>
+                                        </p:tav>
+                                      </p:tavLst>
+                                    </p:anim>
+                                    <p:anim calcmode="lin" valueType="num">
+                                      <p:cBhvr additive="base">
+                                        <p:cTn id="12" dur="500" fill="hold"/>
+                                        <p:tgtEl>
+                                          <p:spTgt spid="3">
+                                            <p:txEl>
+                                              <p:pRg st="6" end="6"/>
+                                            </p:txEl>
+                                          </p:spTgt>
+                                        </p:tgtEl>
+                                        <p:attrNameLst>
+                                          <p:attrName>ppt_y</p:attrName>
+                                        </p:attrNameLst>
+                                      </p:cBhvr>
+                                      <p:tavLst>
+                                        <p:tav tm="0">
+                                          <p:val>
+                                            <p:strVal val="1+#ppt_h/2"/>
+                                          </p:val>
+                                        </p:tav>
+                                        <p:tav tm="100000">
+                                          <p:val>
+                                            <p:strVal val="#ppt_y"/>
+                                          </p:val>
+                                        </p:tav>
+                                      </p:tavLst>
+                                    </p:anim>
+                                  </p:childTnLst>
+                                </p:cTn>
+                              </p:par>
+                              <p:par>
+                                <p:cTn id="13" presetID="2" presetClass="entr" presetSubtype="4" fill="hold" nodeType="withEffect">
+                                  <p:stCondLst>
+                                    <p:cond delay="0"/>
+                                  </p:stCondLst>
+                                  <p:childTnLst>
+                                    <p:set>
+                                      <p:cBhvr>
+                                        <p:cTn id="14" dur="1" fill="hold">
+                                          <p:stCondLst>
+                                            <p:cond delay="0"/>
+                                          </p:stCondLst>
+                                        </p:cTn>
+                                        <p:tgtEl>
+                                          <p:spTgt spid="10"/>
+                                        </p:tgtEl>
+                                        <p:attrNameLst>
+                                          <p:attrName>style.visibility</p:attrName>
+                                        </p:attrNameLst>
+                                      </p:cBhvr>
+                                      <p:to>
+                                        <p:strVal val="visible"/>
+                                      </p:to>
+                                    </p:set>
+                                    <p:anim calcmode="lin" valueType="num">
+                                      <p:cBhvr additive="base">
+                                        <p:cTn id="15" dur="500" fill="hold"/>
+                                        <p:tgtEl>
+                                          <p:spTgt spid="10"/>
+                                        </p:tgtEl>
+                                        <p:attrNameLst>
+                                          <p:attrName>ppt_x</p:attrName>
+                                        </p:attrNameLst>
+                                      </p:cBhvr>
+                                      <p:tavLst>
+                                        <p:tav tm="0">
+                                          <p:val>
+                                            <p:strVal val="#ppt_x"/>
+                                          </p:val>
+                                        </p:tav>
+                                        <p:tav tm="100000">
+                                          <p:val>
+                                            <p:strVal val="#ppt_x"/>
+                                          </p:val>
+                                        </p:tav>
+                                      </p:tavLst>
+                                    </p:anim>
+                                    <p:anim calcmode="lin" valueType="num">
+                                      <p:cBhvr additive="base">
+                                        <p:cTn id="16" dur="500" fill="hold"/>
+                                        <p:tgtEl>
+                                          <p:spTgt spid="10"/>
+                                        </p:tgtEl>
+                                        <p:attrNameLst>
+                                          <p:attrName>ppt_y</p:attrName>
+                                        </p:attrNameLst>
+                                      </p:cBhvr>
+                                      <p:tavLst>
+                                        <p:tav tm="0">
+                                          <p:val>
+                                            <p:strVal val="1+#ppt_h/2"/>
+                                          </p:val>
+                                        </p:tav>
+                                        <p:tav tm="100000">
+                                          <p:val>
+                                            <p:strVal val="#ppt_y"/>
+                                          </p:val>
+                                        </p:tav>
+                                      </p:tavLst>
+                                    </p:anim>
+                                  </p:childTnLst>
+                                </p:cTn>
+                              </p:par>
+                              <p:par>
+                                <p:cTn id="17" presetID="2" presetClass="entr" presetSubtype="4" fill="hold" nodeType="withEffect">
+                                  <p:stCondLst>
+                                    <p:cond delay="0"/>
+                                  </p:stCondLst>
+                                  <p:childTnLst>
+                                    <p:set>
+                                      <p:cBhvr>
+                                        <p:cTn id="18" dur="1" fill="hold">
+                                          <p:stCondLst>
+                                            <p:cond delay="0"/>
+                                          </p:stCondLst>
+                                        </p:cTn>
+                                        <p:tgtEl>
+                                          <p:spTgt spid="15"/>
+                                        </p:tgtEl>
+                                        <p:attrNameLst>
+                                          <p:attrName>style.visibility</p:attrName>
+                                        </p:attrNameLst>
+                                      </p:cBhvr>
+                                      <p:to>
+                                        <p:strVal val="visible"/>
+                                      </p:to>
+                                    </p:set>
+                                    <p:anim calcmode="lin" valueType="num">
+                                      <p:cBhvr additive="base">
+                                        <p:cTn id="19" dur="500" fill="hold"/>
+                                        <p:tgtEl>
+                                          <p:spTgt spid="15"/>
+                                        </p:tgtEl>
+                                        <p:attrNameLst>
+                                          <p:attrName>ppt_x</p:attrName>
+                                        </p:attrNameLst>
+                                      </p:cBhvr>
+                                      <p:tavLst>
+                                        <p:tav tm="0">
+                                          <p:val>
+                                            <p:strVal val="#ppt_x"/>
+                                          </p:val>
+                                        </p:tav>
+                                        <p:tav tm="100000">
+                                          <p:val>
+                                            <p:strVal val="#ppt_x"/>
+                                          </p:val>
+                                        </p:tav>
+                                      </p:tavLst>
+                                    </p:anim>
+                                    <p:anim calcmode="lin" valueType="num">
+                                      <p:cBhvr additive="base">
+                                        <p:cTn id="20" dur="500" fill="hold"/>
+                                        <p:tgtEl>
+                                          <p:spTgt spid="15"/>
+                                        </p:tgtEl>
+                                        <p:attrNameLst>
+                                          <p:attrName>ppt_y</p:attrName>
+                                        </p:attrNameLst>
+                                      </p:cBhvr>
+                                      <p:tavLst>
+                                        <p:tav tm="0">
+                                          <p:val>
+                                            <p:strVal val="1+#ppt_h/2"/>
+                                          </p:val>
+                                        </p:tav>
+                                        <p:tav tm="100000">
+                                          <p:val>
+                                            <p:strVal val="#ppt_y"/>
+                                          </p:val>
+                                        </p:tav>
+                                      </p:tavLst>
+                                    </p:anim>
+                                  </p:childTnLst>
+                                </p:cTn>
+                              </p:par>
+                              <p:par>
+                                <p:cTn id="21" presetID="2" presetClass="entr" presetSubtype="4" fill="hold" nodeType="withEffect">
+                                  <p:stCondLst>
+                                    <p:cond delay="0"/>
+                                  </p:stCondLst>
+                                  <p:childTnLst>
+                                    <p:set>
+                                      <p:cBhvr>
+                                        <p:cTn id="22" dur="1" fill="hold">
+                                          <p:stCondLst>
+                                            <p:cond delay="0"/>
+                                          </p:stCondLst>
+                                        </p:cTn>
+                                        <p:tgtEl>
+                                          <p:spTgt spid="11"/>
+                                        </p:tgtEl>
+                                        <p:attrNameLst>
+                                          <p:attrName>style.visibility</p:attrName>
+                                        </p:attrNameLst>
+                                      </p:cBhvr>
+                                      <p:to>
+                                        <p:strVal val="visible"/>
+                                      </p:to>
+                                    </p:set>
+                                    <p:anim calcmode="lin" valueType="num">
+                                      <p:cBhvr additive="base">
+                                        <p:cTn id="23" dur="500" fill="hold"/>
+                                        <p:tgtEl>
+                                          <p:spTgt spid="11"/>
+                                        </p:tgtEl>
+                                        <p:attrNameLst>
+                                          <p:attrName>ppt_x</p:attrName>
+                                        </p:attrNameLst>
+                                      </p:cBhvr>
+                                      <p:tavLst>
+                                        <p:tav tm="0">
+                                          <p:val>
+                                            <p:strVal val="#ppt_x"/>
+                                          </p:val>
+                                        </p:tav>
+                                        <p:tav tm="100000">
+                                          <p:val>
+                                            <p:strVal val="#ppt_x"/>
+                                          </p:val>
+                                        </p:tav>
+                                      </p:tavLst>
+                                    </p:anim>
+                                    <p:anim calcmode="lin" valueType="num">
+                                      <p:cBhvr additive="base">
+                                        <p:cTn id="24" dur="500" fill="hold"/>
+                                        <p:tgtEl>
+                                          <p:spTgt spid="11"/>
+                                        </p:tgtEl>
+                                        <p:attrNameLst>
+                                          <p:attrName>ppt_y</p:attrName>
+                                        </p:attrNameLst>
+                                      </p:cBhvr>
+                                      <p:tavLst>
+                                        <p:tav tm="0">
+                                          <p:val>
+                                            <p:strVal val="1+#ppt_h/2"/>
+                                          </p:val>
+                                        </p:tav>
+                                        <p:tav tm="100000">
+                                          <p:val>
+                                            <p:strVal val="#ppt_y"/>
+                                          </p:val>
+                                        </p:tav>
+                                      </p:tavLst>
+                                    </p:anim>
+                                  </p:childTnLst>
+                                </p:cTn>
+                              </p:par>
+                            </p:childTnLst>
+                          </p:cTn>
+                        </p:par>
+                      </p:childTnLst>
+                    </p:cTn>
+                  </p:par>
+                  <p:par>
+                    <p:cTn id="25" fill="hold">
+                      <p:stCondLst>
+                        <p:cond delay="indefinite"/>
+                      </p:stCondLst>
+                      <p:childTnLst>
+                        <p:par>
+                          <p:cTn id="26" fill="hold">
+                            <p:stCondLst>
+                              <p:cond delay="0"/>
+                            </p:stCondLst>
+                            <p:childTnLst>
+                              <p:par>
+                                <p:cTn id="27" presetID="2" presetClass="entr" presetSubtype="4" fill="hold" nodeType="clickEffect">
+                                  <p:stCondLst>
+                                    <p:cond delay="0"/>
+                                  </p:stCondLst>
+                                  <p:childTnLst>
+                                    <p:set>
+                                      <p:cBhvr>
+                                        <p:cTn id="28" dur="1" fill="hold">
+                                          <p:stCondLst>
+                                            <p:cond delay="0"/>
+                                          </p:stCondLst>
+                                        </p:cTn>
+                                        <p:tgtEl>
+                                          <p:spTgt spid="3">
+                                            <p:txEl>
+                                              <p:pRg st="8" end="8"/>
+                                            </p:txEl>
+                                          </p:spTgt>
+                                        </p:tgtEl>
+                                        <p:attrNameLst>
+                                          <p:attrName>style.visibility</p:attrName>
+                                        </p:attrNameLst>
+                                      </p:cBhvr>
+                                      <p:to>
+                                        <p:strVal val="visible"/>
+                                      </p:to>
+                                    </p:set>
+                                    <p:anim calcmode="lin" valueType="num">
+                                      <p:cBhvr additive="base">
+                                        <p:cTn id="29" dur="500" fill="hold"/>
+                                        <p:tgtEl>
+                                          <p:spTgt spid="3">
+                                            <p:txEl>
+                                              <p:pRg st="8" end="8"/>
+                                            </p:txEl>
+                                          </p:spTgt>
+                                        </p:tgtEl>
+                                        <p:attrNameLst>
+                                          <p:attrName>ppt_x</p:attrName>
+                                        </p:attrNameLst>
+                                      </p:cBhvr>
+                                      <p:tavLst>
+                                        <p:tav tm="0">
+                                          <p:val>
+                                            <p:strVal val="#ppt_x"/>
+                                          </p:val>
+                                        </p:tav>
+                                        <p:tav tm="100000">
+                                          <p:val>
+                                            <p:strVal val="#ppt_x"/>
+                                          </p:val>
+                                        </p:tav>
+                                      </p:tavLst>
+                                    </p:anim>
+                                    <p:anim calcmode="lin" valueType="num">
+                                      <p:cBhvr additive="base">
+                                        <p:cTn id="30" dur="500" fill="hold"/>
+                                        <p:tgtEl>
+                                          <p:spTgt spid="3">
+                                            <p:txEl>
+                                              <p:pRg st="8" end="8"/>
+                                            </p:txEl>
+                                          </p:spTgt>
+                                        </p:tgtEl>
+                                        <p:attrNameLst>
+                                          <p:attrName>ppt_y</p:attrName>
+                                        </p:attrNameLst>
+                                      </p:cBhvr>
+                                      <p:tavLst>
+                                        <p:tav tm="0">
+                                          <p:val>
+                                            <p:strVal val="1+#ppt_h/2"/>
+                                          </p:val>
+                                        </p:tav>
+                                        <p:tav tm="100000">
+                                          <p:val>
+                                            <p:strVal val="#ppt_y"/>
+                                          </p:val>
+                                        </p:tav>
+                                      </p:tavLst>
+                                    </p:anim>
+                                  </p:childTnLst>
+                                </p:cTn>
+                              </p:par>
+                            </p:childTnLst>
+                          </p:cTn>
+                        </p:par>
+                      </p:childTnLst>
+                    </p:cTn>
+                  </p:par>
+                </p:childTnLst>
+              </p:cTn>
+              <p:prevCondLst>
+                <p:cond evt="onPrev" delay="0">
+                  <p:tgtEl>
+                    <p:sldTgt/>
+                  </p:tgtEl>
+                </p:cond>
+              </p:prevCondLst>
+              <p:nextCondLst>
+                <p:cond evt="onNext" delay="0">
+                  <p:tgtEl>
+                    <p:sldTgt/>
+                  </p:tgtEl>
+                </p:cond>
+              </p:nextCondLst>
+            </p:seq>
+            <p:seq concurrent="1" nextAc="seek">
+              <p:cTn id="31" restart="whenNotActive" fill="hold" evtFilter="cancelBubble" nodeType="interactiveSeq">
                 <p:stCondLst>
                   <p:cond evt="onClick" delay="0">
                     <p:tgtEl>
@@ -4695,26 +5083,26 @@
                 </p:endSync>
                 <p:childTnLst>
                   <p:par>
-                    <p:cTn id="3" fill="hold">
+                    <p:cTn id="32" fill="hold">
                       <p:stCondLst>
                         <p:cond delay="0"/>
                       </p:stCondLst>
                       <p:childTnLst>
                         <p:par>
-                          <p:cTn id="4" fill="hold">
+                          <p:cTn id="33" fill="hold">
                             <p:stCondLst>
                               <p:cond delay="0"/>
                             </p:stCondLst>
                             <p:childTnLst>
                               <p:par>
-                                <p:cTn id="5" presetID="1" presetClass="mediacall" presetSubtype="0" fill="hold" nodeType="clickEffect">
+                                <p:cTn id="34" presetID="1" presetClass="mediacall" presetSubtype="0" fill="hold" nodeType="clickEffect">
                                   <p:stCondLst>
                                     <p:cond delay="0"/>
                                   </p:stCondLst>
                                   <p:childTnLst>
                                     <p:cmd type="call" cmd="playFrom(0.0)">
                                       <p:cBhvr>
-                                        <p:cTn id="6" dur="32236" fill="hold"/>
+                                        <p:cTn id="35" dur="32236" fill="hold"/>
                                         <p:tgtEl>
                                           <p:spTgt spid="10"/>
                                         </p:tgtEl>
@@ -4741,7 +5129,7 @@
             </p:seq>
             <p:audio>
               <p:cMediaNode>
-                <p:cTn id="7" fill="hold" display="0">
+                <p:cTn id="36" fill="hold" display="0">
                   <p:stCondLst>
                     <p:cond delay="indefinite"/>
                   </p:stCondLst>
@@ -4769,7 +5157,7 @@
               </p:cMediaNode>
             </p:audio>
             <p:seq concurrent="1" nextAc="seek">
-              <p:cTn id="8" restart="whenNotActive" fill="hold" evtFilter="cancelBubble" nodeType="interactiveSeq">
+              <p:cTn id="37" restart="whenNotActive" fill="hold" evtFilter="cancelBubble" nodeType="interactiveSeq">
                 <p:stCondLst>
                   <p:cond evt="onClick" delay="0">
                     <p:tgtEl>
@@ -4782,26 +5170,26 @@
                 </p:endSync>
                 <p:childTnLst>
                   <p:par>
-                    <p:cTn id="9" fill="hold">
+                    <p:cTn id="38" fill="hold">
                       <p:stCondLst>
                         <p:cond delay="0"/>
                       </p:stCondLst>
                       <p:childTnLst>
                         <p:par>
-                          <p:cTn id="10" fill="hold">
+                          <p:cTn id="39" fill="hold">
                             <p:stCondLst>
                               <p:cond delay="0"/>
                             </p:stCondLst>
                             <p:childTnLst>
                               <p:par>
-                                <p:cTn id="11" presetID="1" presetClass="mediacall" presetSubtype="0" fill="hold" nodeType="clickEffect">
+                                <p:cTn id="40" presetID="1" presetClass="mediacall" presetSubtype="0" fill="hold" nodeType="clickEffect">
                                   <p:stCondLst>
                                     <p:cond delay="0"/>
                                   </p:stCondLst>
                                   <p:childTnLst>
                                     <p:cmd type="call" cmd="playFrom(0.0)">
                                       <p:cBhvr>
-                                        <p:cTn id="12" dur="11199" fill="hold"/>
+                                        <p:cTn id="41" dur="11199" fill="hold"/>
                                         <p:tgtEl>
                                           <p:spTgt spid="11"/>
                                         </p:tgtEl>
@@ -4828,7 +5216,7 @@
             </p:seq>
             <p:audio>
               <p:cMediaNode>
-                <p:cTn id="13" fill="hold" display="0">
+                <p:cTn id="42" fill="hold" display="0">
                   <p:stCondLst>
                     <p:cond delay="indefinite"/>
                   </p:stCondLst>
@@ -4856,7 +5244,7 @@
               </p:cMediaNode>
             </p:audio>
             <p:seq concurrent="1" nextAc="seek">
-              <p:cTn id="14" restart="whenNotActive" fill="hold" evtFilter="cancelBubble" nodeType="interactiveSeq">
+              <p:cTn id="43" restart="whenNotActive" fill="hold" evtFilter="cancelBubble" nodeType="interactiveSeq">
                 <p:stCondLst>
                   <p:cond evt="onClick" delay="0">
                     <p:tgtEl>
@@ -4869,26 +5257,26 @@
                 </p:endSync>
                 <p:childTnLst>
                   <p:par>
-                    <p:cTn id="15" fill="hold">
+                    <p:cTn id="44" fill="hold">
                       <p:stCondLst>
                         <p:cond delay="0"/>
                       </p:stCondLst>
                       <p:childTnLst>
                         <p:par>
-                          <p:cTn id="16" fill="hold">
+                          <p:cTn id="45" fill="hold">
                             <p:stCondLst>
                               <p:cond delay="0"/>
                             </p:stCondLst>
                             <p:childTnLst>
                               <p:par>
-                                <p:cTn id="17" presetID="1" presetClass="mediacall" presetSubtype="0" fill="hold" nodeType="clickEffect">
+                                <p:cTn id="46" presetID="1" presetClass="mediacall" presetSubtype="0" fill="hold" nodeType="clickEffect">
                                   <p:stCondLst>
                                     <p:cond delay="0"/>
                                   </p:stCondLst>
                                   <p:childTnLst>
                                     <p:cmd type="call" cmd="playFrom(0.0)">
                                       <p:cBhvr>
-                                        <p:cTn id="18" dur="8412" fill="hold"/>
+                                        <p:cTn id="47" dur="8412" fill="hold"/>
                                         <p:tgtEl>
                                           <p:spTgt spid="15"/>
                                         </p:tgtEl>
@@ -4915,7 +5303,7 @@
             </p:seq>
             <p:audio>
               <p:cMediaNode>
-                <p:cTn id="19" fill="hold" display="0">
+                <p:cTn id="48" fill="hold" display="0">
                   <p:stCondLst>
                     <p:cond delay="indefinite"/>
                   </p:stCondLst>
@@ -4950,6 +5338,174 @@
 </p:sld>
 </file>
 
+<file path=ppt/slides/slide11.xml><?xml version="1.0" encoding="utf-8"?>
+<p:sld xmlns:a="http://schemas.openxmlformats.org/drawingml/2006/main" xmlns:r="http://schemas.openxmlformats.org/officeDocument/2006/relationships" xmlns:p="http://schemas.openxmlformats.org/presentationml/2006/main">
+  <p:cSld>
+    <p:spTree>
+      <p:nvGrpSpPr>
+        <p:cNvPr id="1" name=""/>
+        <p:cNvGrpSpPr/>
+        <p:nvPr/>
+      </p:nvGrpSpPr>
+      <p:grpSpPr>
+        <a:xfrm>
+          <a:off x="0" y="0"/>
+          <a:ext cx="0" cy="0"/>
+          <a:chOff x="0" y="0"/>
+          <a:chExt cx="0" cy="0"/>
+        </a:xfrm>
+      </p:grpSpPr>
+      <p:sp>
+        <p:nvSpPr>
+          <p:cNvPr id="2" name="Date Placeholder 1"/>
+          <p:cNvSpPr>
+            <a:spLocks noGrp="1"/>
+          </p:cNvSpPr>
+          <p:nvPr>
+            <p:ph type="dt" sz="half" idx="10"/>
+          </p:nvPr>
+        </p:nvSpPr>
+        <p:spPr/>
+        <p:txBody>
+          <a:bodyPr/>
+          <a:lstStyle/>
+          <a:p>
+            <a:r>
+              <a:rPr lang="fr-FR" smtClean="0"/>
+              <a:t>Jeudi 29 Novembre 2012</a:t>
+            </a:r>
+            <a:endParaRPr lang="fr-FR" dirty="0"/>
+          </a:p>
+        </p:txBody>
+      </p:sp>
+      <p:sp>
+        <p:nvSpPr>
+          <p:cNvPr id="3" name="Footer Placeholder 2"/>
+          <p:cNvSpPr>
+            <a:spLocks noGrp="1"/>
+          </p:cNvSpPr>
+          <p:nvPr>
+            <p:ph type="ftr" sz="quarter" idx="11"/>
+          </p:nvPr>
+        </p:nvSpPr>
+        <p:spPr/>
+        <p:txBody>
+          <a:bodyPr/>
+          <a:lstStyle/>
+          <a:p>
+            <a:r>
+              <a:rPr lang="fr-FR" smtClean="0"/>
+              <a:t>Paul Fiat</a:t>
+            </a:r>
+            <a:endParaRPr lang="fr-FR" dirty="0"/>
+          </a:p>
+        </p:txBody>
+      </p:sp>
+      <p:sp>
+        <p:nvSpPr>
+          <p:cNvPr id="4" name="Slide Number Placeholder 3"/>
+          <p:cNvSpPr>
+            <a:spLocks noGrp="1"/>
+          </p:cNvSpPr>
+          <p:nvPr>
+            <p:ph type="sldNum" sz="quarter" idx="12"/>
+          </p:nvPr>
+        </p:nvSpPr>
+        <p:spPr/>
+        <p:txBody>
+          <a:bodyPr/>
+          <a:lstStyle/>
+          <a:p>
+            <a:fld id="{9DDF0C85-99BB-428E-8D90-A207FA2E644C}" type="slidenum">
+              <a:rPr lang="fr-FR" smtClean="0"/>
+              <a:pPr/>
+              <a:t>11</a:t>
+            </a:fld>
+            <a:endParaRPr lang="fr-FR" dirty="0"/>
+          </a:p>
+        </p:txBody>
+      </p:sp>
+      <p:sp>
+        <p:nvSpPr>
+          <p:cNvPr id="5" name="TextBox 4"/>
+          <p:cNvSpPr txBox="1"/>
+          <p:nvPr/>
+        </p:nvSpPr>
+        <p:spPr>
+          <a:xfrm>
+            <a:off x="571472" y="714356"/>
+            <a:ext cx="8215370" cy="1938992"/>
+          </a:xfrm>
+          <a:prstGeom prst="rect">
+            <a:avLst/>
+          </a:prstGeom>
+          <a:noFill/>
+        </p:spPr>
+        <p:txBody>
+          <a:bodyPr wrap="square" rtlCol="0">
+            <a:spAutoFit/>
+          </a:bodyPr>
+          <a:lstStyle/>
+          <a:p>
+            <a:pPr algn="ctr"/>
+            <a:r>
+              <a:rPr lang="fr-FR" sz="4000" dirty="0" smtClean="0"/>
+              <a:t>Merci de votre attention.</a:t>
+            </a:r>
+          </a:p>
+          <a:p>
+            <a:pPr algn="ctr"/>
+            <a:endParaRPr lang="fr-FR" sz="4000" dirty="0" smtClean="0"/>
+          </a:p>
+          <a:p>
+            <a:pPr algn="ctr"/>
+            <a:r>
+              <a:rPr lang="fr-FR" sz="4000" dirty="0" smtClean="0"/>
+              <a:t>Avez-vous des questions</a:t>
+            </a:r>
+            <a:endParaRPr lang="fr-FR" sz="4000" dirty="0"/>
+          </a:p>
+        </p:txBody>
+      </p:sp>
+      <p:pic>
+        <p:nvPicPr>
+          <p:cNvPr id="7" name="Picture 6" descr=".png"/>
+          <p:cNvPicPr>
+            <a:picLocks noChangeAspect="1"/>
+          </p:cNvPicPr>
+          <p:nvPr/>
+        </p:nvPicPr>
+        <p:blipFill>
+          <a:blip r:embed="rId2"/>
+          <a:stretch>
+            <a:fillRect/>
+          </a:stretch>
+        </p:blipFill>
+        <p:spPr>
+          <a:xfrm>
+            <a:off x="3000364" y="2714620"/>
+            <a:ext cx="3214710" cy="3214710"/>
+          </a:xfrm>
+          <a:prstGeom prst="rect">
+            <a:avLst/>
+          </a:prstGeom>
+        </p:spPr>
+      </p:pic>
+    </p:spTree>
+  </p:cSld>
+  <p:clrMapOvr>
+    <a:masterClrMapping/>
+  </p:clrMapOvr>
+  <p:timing>
+    <p:tnLst>
+      <p:par>
+        <p:cTn id="1" dur="indefinite" restart="never" nodeType="tmRoot"/>
+      </p:par>
+    </p:tnLst>
+  </p:timing>
+</p:sld>
+</file>
+
 <file path=ppt/slides/slide2.xml><?xml version="1.0" encoding="utf-8"?>
 <p:sld xmlns:a="http://schemas.openxmlformats.org/drawingml/2006/main" xmlns:r="http://schemas.openxmlformats.org/officeDocument/2006/relationships" xmlns:p="http://schemas.openxmlformats.org/presentationml/2006/main">
   <p:cSld>
@@ -5003,7 +5559,7 @@
         <p:spPr/>
         <p:txBody>
           <a:bodyPr>
-            <a:normAutofit fontScale="92500" lnSpcReduction="20000"/>
+            <a:normAutofit/>
           </a:bodyPr>
           <a:lstStyle/>
           <a:p>
@@ -5021,11 +5577,7 @@
           <a:p>
             <a:r>
               <a:rPr lang="fr-FR" b="1" dirty="0" smtClean="0"/>
-              <a:t>Type de </a:t>
-            </a:r>
-            <a:r>
-              <a:rPr lang="fr-FR" b="1" dirty="0" err="1" smtClean="0"/>
-              <a:t>gameplay</a:t>
+              <a:t>Spécifications</a:t>
             </a:r>
             <a:endParaRPr lang="fr-FR" dirty="0" smtClean="0"/>
           </a:p>
@@ -5038,12 +5590,23 @@
               <a:rPr lang="fr-FR" b="1" dirty="0" err="1" smtClean="0"/>
               <a:t>KSPs</a:t>
             </a:r>
+            <a:endParaRPr lang="fr-FR" b="1" dirty="0" smtClean="0"/>
+          </a:p>
+          <a:p>
+            <a:r>
+              <a:rPr lang="fr-FR" b="1" dirty="0" smtClean="0"/>
+              <a:t>Les 3C</a:t>
+            </a:r>
             <a:endParaRPr lang="fr-FR" dirty="0" smtClean="0"/>
           </a:p>
           <a:p>
             <a:r>
               <a:rPr lang="fr-FR" b="1" dirty="0" smtClean="0"/>
-              <a:t>Histoire &amp; univers</a:t>
+              <a:t>Histoire &amp; </a:t>
+            </a:r>
+            <a:r>
+              <a:rPr lang="fr-FR" b="1" dirty="0" smtClean="0"/>
+              <a:t>ambiance</a:t>
             </a:r>
             <a:r>
               <a:rPr lang="fr-FR" dirty="0" smtClean="0"/>
@@ -5053,35 +5616,17 @@
           <a:p>
             <a:r>
               <a:rPr lang="fr-FR" b="1" dirty="0" smtClean="0"/>
-              <a:t>Les 3C</a:t>
-            </a:r>
-            <a:endParaRPr lang="fr-FR" dirty="0" smtClean="0"/>
-          </a:p>
-          <a:p>
-            <a:r>
-              <a:rPr lang="fr-FR" b="1" dirty="0" err="1" smtClean="0"/>
-              <a:t>Mockup</a:t>
-            </a:r>
-            <a:endParaRPr lang="fr-FR" dirty="0" smtClean="0"/>
+              <a:t>Direction artistique</a:t>
+            </a:r>
           </a:p>
           <a:p>
             <a:r>
               <a:rPr lang="fr-FR" b="1" dirty="0" smtClean="0"/>
-              <a:t>Ambiance</a:t>
-            </a:r>
-            <a:endParaRPr lang="fr-FR" dirty="0" smtClean="0"/>
-          </a:p>
-          <a:p>
+              <a:t>Thème </a:t>
+            </a:r>
             <a:r>
               <a:rPr lang="fr-FR" b="1" dirty="0" smtClean="0"/>
-              <a:t>Direction artistique</a:t>
-            </a:r>
-            <a:endParaRPr lang="fr-FR" dirty="0" smtClean="0"/>
-          </a:p>
-          <a:p>
-            <a:r>
-              <a:rPr lang="fr-FR" b="1" dirty="0" smtClean="0"/>
-              <a:t>Thème sonore et musicale</a:t>
+              <a:t>sonore et musicale</a:t>
             </a:r>
             <a:endParaRPr lang="fr-FR" dirty="0"/>
           </a:p>
@@ -5297,7 +5842,7 @@
       </p:sp>
       <p:pic>
         <p:nvPicPr>
-          <p:cNvPr id="7" name="simpsons.wmv">
+          <p:cNvPr id="8" name="simpsons.wmv">
             <a:hlinkClick r:id="" action="ppaction://media"/>
           </p:cNvPr>
           <p:cNvPicPr>
@@ -5315,8 +5860,8 @@
         </p:blipFill>
         <p:spPr>
           <a:xfrm>
-            <a:off x="1071538" y="1928802"/>
-            <a:ext cx="6881861" cy="3871046"/>
+            <a:off x="571472" y="1714488"/>
+            <a:ext cx="7715304" cy="4339859"/>
           </a:xfrm>
           <a:prstGeom prst="rect">
             <a:avLst/>
@@ -5338,7 +5883,7 @@
                 <p:stCondLst>
                   <p:cond evt="onClick" delay="0">
                     <p:tgtEl>
-                      <p:spTgt spid="7"/>
+                      <p:spTgt spid="8"/>
                     </p:tgtEl>
                   </p:cond>
                 </p:stCondLst>
@@ -5368,7 +5913,7 @@
                                       <p:cBhvr>
                                         <p:cTn id="6" dur="1" fill="hold"/>
                                         <p:tgtEl>
-                                          <p:spTgt spid="7"/>
+                                          <p:spTgt spid="8"/>
                                         </p:tgtEl>
                                       </p:cBhvr>
                                     </p:cmd>
@@ -5386,7 +5931,7 @@
               <p:nextCondLst>
                 <p:cond evt="onClick" delay="0">
                   <p:tgtEl>
-                    <p:spTgt spid="7"/>
+                    <p:spTgt spid="8"/>
                   </p:tgtEl>
                 </p:cond>
               </p:nextCondLst>
@@ -5411,7 +5956,7 @@
                   </p:endCondLst>
                 </p:cTn>
                 <p:tgtEl>
-                  <p:spTgt spid="7"/>
+                  <p:spTgt spid="8"/>
                 </p:tgtEl>
               </p:cMediaNode>
             </p:video>
@@ -5597,12 +6142,12 @@
       </p:grpSpPr>
       <p:sp>
         <p:nvSpPr>
-          <p:cNvPr id="2" name="Title 1"/>
-          <p:cNvSpPr>
-            <a:spLocks noGrp="1"/>
-          </p:cNvSpPr>
-          <p:nvPr>
-            <p:ph type="title"/>
+          <p:cNvPr id="2" name="Date Placeholder 1"/>
+          <p:cNvSpPr>
+            <a:spLocks noGrp="1"/>
+          </p:cNvSpPr>
+          <p:nvPr>
+            <p:ph type="dt" sz="half" idx="10"/>
           </p:nvPr>
         </p:nvSpPr>
         <p:spPr/>
@@ -5611,198 +6156,512 @@
           <a:lstStyle/>
           <a:p>
             <a:r>
+              <a:rPr lang="fr-FR" smtClean="0"/>
+              <a:t>Jeudi 29 Novembre 2012</a:t>
+            </a:r>
+            <a:endParaRPr lang="fr-FR" dirty="0"/>
+          </a:p>
+        </p:txBody>
+      </p:sp>
+      <p:sp>
+        <p:nvSpPr>
+          <p:cNvPr id="3" name="Footer Placeholder 2"/>
+          <p:cNvSpPr>
+            <a:spLocks noGrp="1"/>
+          </p:cNvSpPr>
+          <p:nvPr>
+            <p:ph type="ftr" sz="quarter" idx="11"/>
+          </p:nvPr>
+        </p:nvSpPr>
+        <p:spPr/>
+        <p:txBody>
+          <a:bodyPr/>
+          <a:lstStyle/>
+          <a:p>
+            <a:r>
+              <a:rPr lang="fr-FR" smtClean="0"/>
+              <a:t>Paul Fiat</a:t>
+            </a:r>
+            <a:endParaRPr lang="fr-FR" dirty="0"/>
+          </a:p>
+        </p:txBody>
+      </p:sp>
+      <p:sp>
+        <p:nvSpPr>
+          <p:cNvPr id="4" name="Slide Number Placeholder 3"/>
+          <p:cNvSpPr>
+            <a:spLocks noGrp="1"/>
+          </p:cNvSpPr>
+          <p:nvPr>
+            <p:ph type="sldNum" sz="quarter" idx="12"/>
+          </p:nvPr>
+        </p:nvSpPr>
+        <p:spPr/>
+        <p:txBody>
+          <a:bodyPr/>
+          <a:lstStyle/>
+          <a:p>
+            <a:fld id="{9DDF0C85-99BB-428E-8D90-A207FA2E644C}" type="slidenum">
+              <a:rPr lang="fr-FR" smtClean="0"/>
+              <a:pPr/>
+              <a:t>5</a:t>
+            </a:fld>
+            <a:endParaRPr lang="fr-FR" dirty="0"/>
+          </a:p>
+        </p:txBody>
+      </p:sp>
+      <p:sp>
+        <p:nvSpPr>
+          <p:cNvPr id="5" name="Title 4"/>
+          <p:cNvSpPr>
+            <a:spLocks noGrp="1"/>
+          </p:cNvSpPr>
+          <p:nvPr>
+            <p:ph type="title"/>
+          </p:nvPr>
+        </p:nvSpPr>
+        <p:spPr/>
+        <p:txBody>
+          <a:bodyPr/>
+          <a:lstStyle/>
+          <a:p>
+            <a:r>
               <a:rPr lang="fr-FR" dirty="0" smtClean="0"/>
-              <a:t>Type de gameplay</a:t>
-            </a:r>
+              <a:t>Spécifications</a:t>
+            </a:r>
+            <a:endParaRPr lang="fr-FR" dirty="0"/>
+          </a:p>
+        </p:txBody>
+      </p:sp>
+      <p:sp>
+        <p:nvSpPr>
+          <p:cNvPr id="6" name="Text Placeholder 5"/>
+          <p:cNvSpPr>
+            <a:spLocks noGrp="1"/>
+          </p:cNvSpPr>
+          <p:nvPr>
+            <p:ph type="body" idx="1"/>
+          </p:nvPr>
+        </p:nvSpPr>
+        <p:spPr>
+          <a:xfrm>
+            <a:off x="381000" y="1633536"/>
+            <a:ext cx="8477280" cy="5081612"/>
+          </a:xfrm>
+        </p:spPr>
+        <p:txBody>
+          <a:bodyPr>
+            <a:normAutofit/>
+          </a:bodyPr>
+          <a:lstStyle/>
+          <a:p>
+            <a:pPr>
+              <a:buFont typeface="Wingdings" pitchFamily="2" charset="2"/>
+              <a:buChar char="Ø"/>
+            </a:pPr>
+            <a:r>
+              <a:rPr lang="fr-FR" u="sng" dirty="0" smtClean="0"/>
+              <a:t>Type de </a:t>
+            </a:r>
+            <a:r>
+              <a:rPr lang="fr-FR" u="sng" dirty="0" err="1" smtClean="0"/>
+              <a:t>gameplay</a:t>
+            </a:r>
+            <a:r>
+              <a:rPr lang="fr-FR" dirty="0" smtClean="0"/>
+              <a:t> : </a:t>
+            </a:r>
+            <a:r>
+              <a:rPr lang="fr-FR" dirty="0" err="1" smtClean="0"/>
+              <a:t>Shoot’em</a:t>
+            </a:r>
+            <a:r>
+              <a:rPr lang="fr-FR" dirty="0" smtClean="0"/>
+              <a:t> </a:t>
+            </a:r>
+            <a:r>
+              <a:rPr lang="fr-FR" dirty="0" smtClean="0"/>
+              <a:t>Up / Bullet </a:t>
+            </a:r>
+            <a:r>
+              <a:rPr lang="fr-FR" dirty="0" err="1" smtClean="0"/>
+              <a:t>Hell</a:t>
+            </a:r>
+            <a:r>
+              <a:rPr lang="fr-FR" dirty="0" smtClean="0"/>
+              <a:t>.</a:t>
+            </a:r>
+          </a:p>
+          <a:p>
+            <a:pPr>
+              <a:buFont typeface="Wingdings" pitchFamily="2" charset="2"/>
+              <a:buChar char="Ø"/>
+            </a:pPr>
+            <a:endParaRPr lang="fr-FR" dirty="0" smtClean="0"/>
+          </a:p>
+          <a:p>
+            <a:pPr>
+              <a:buFont typeface="Wingdings" pitchFamily="2" charset="2"/>
+              <a:buChar char="Ø"/>
+            </a:pPr>
+            <a:r>
+              <a:rPr lang="fr-FR" u="sng" dirty="0" smtClean="0"/>
+              <a:t>Références</a:t>
+            </a:r>
+            <a:r>
+              <a:rPr lang="fr-FR" dirty="0" smtClean="0"/>
+              <a:t> </a:t>
+            </a:r>
+            <a:r>
+              <a:rPr lang="fr-FR" dirty="0" smtClean="0"/>
+              <a:t>:  </a:t>
+            </a:r>
+            <a:r>
+              <a:rPr lang="fr-FR" dirty="0" err="1" smtClean="0"/>
+              <a:t>Crimzon</a:t>
+            </a:r>
+            <a:r>
+              <a:rPr lang="fr-FR" dirty="0" smtClean="0"/>
+              <a:t> </a:t>
+            </a:r>
+            <a:r>
+              <a:rPr lang="fr-FR" dirty="0" err="1" smtClean="0"/>
+              <a:t>Clover</a:t>
+            </a:r>
+            <a:r>
+              <a:rPr lang="fr-FR" dirty="0" smtClean="0"/>
+              <a:t>,  </a:t>
+            </a:r>
+            <a:r>
+              <a:rPr lang="fr-FR" dirty="0" err="1" smtClean="0"/>
+              <a:t>Geometry</a:t>
+            </a:r>
+            <a:r>
+              <a:rPr lang="fr-FR" dirty="0" smtClean="0"/>
+              <a:t> </a:t>
+            </a:r>
+            <a:r>
+              <a:rPr lang="fr-FR" dirty="0" err="1" smtClean="0"/>
+              <a:t>wars</a:t>
+            </a:r>
+            <a:r>
+              <a:rPr lang="fr-FR" dirty="0" smtClean="0"/>
+              <a:t> </a:t>
+            </a:r>
+            <a:r>
+              <a:rPr lang="fr-FR" sz="1600" i="1" dirty="0" smtClean="0"/>
+              <a:t>(Back </a:t>
+            </a:r>
+            <a:r>
+              <a:rPr lang="fr-FR" sz="1600" i="1" dirty="0" err="1" smtClean="0"/>
+              <a:t>from</a:t>
+            </a:r>
+            <a:r>
+              <a:rPr lang="fr-FR" sz="1600" i="1" dirty="0" smtClean="0"/>
+              <a:t> the future</a:t>
+            </a:r>
+            <a:r>
+              <a:rPr lang="fr-FR" sz="1600" i="1" dirty="0" smtClean="0"/>
+              <a:t>)</a:t>
+            </a:r>
+          </a:p>
+          <a:p>
+            <a:endParaRPr lang="fr-FR" sz="1600" i="1" dirty="0" smtClean="0"/>
+          </a:p>
+          <a:p>
+            <a:endParaRPr lang="fr-FR" sz="1600" i="1" dirty="0" smtClean="0"/>
+          </a:p>
+          <a:p>
+            <a:pPr>
+              <a:buFont typeface="Wingdings" pitchFamily="2" charset="2"/>
+              <a:buChar char="Ø"/>
+            </a:pPr>
+            <a:r>
+              <a:rPr lang="fr-FR" u="sng" dirty="0" smtClean="0"/>
+              <a:t>En trois mots</a:t>
+            </a:r>
+          </a:p>
+          <a:p>
+            <a:r>
+              <a:rPr lang="fr-FR" i="1" dirty="0" smtClean="0"/>
+              <a:t>- </a:t>
+            </a:r>
+            <a:r>
+              <a:rPr lang="fr-FR" dirty="0" smtClean="0"/>
+              <a:t>Frayer</a:t>
+            </a:r>
+            <a:r>
+              <a:rPr lang="fr-FR" sz="1600" b="1" i="1" dirty="0" smtClean="0"/>
+              <a:t>	</a:t>
+            </a:r>
+            <a:r>
+              <a:rPr lang="fr-FR" sz="1600" b="1" i="1" dirty="0" smtClean="0">
+                <a:solidFill>
+                  <a:schemeClr val="accent1">
+                    <a:lumMod val="60000"/>
+                    <a:lumOff val="40000"/>
+                  </a:schemeClr>
+                </a:solidFill>
+              </a:rPr>
+              <a:t>Tracer créer (un passage) en dégageant les obstacles</a:t>
+            </a:r>
+          </a:p>
+          <a:p>
+            <a:r>
+              <a:rPr lang="fr-FR" i="1" dirty="0" smtClean="0"/>
+              <a:t>- </a:t>
+            </a:r>
+            <a:r>
+              <a:rPr lang="fr-FR" dirty="0" smtClean="0"/>
+              <a:t>Féconder </a:t>
+            </a:r>
+            <a:r>
+              <a:rPr lang="fr-FR" sz="1600" b="1" i="1" dirty="0" smtClean="0"/>
+              <a:t>	</a:t>
+            </a:r>
+            <a:r>
+              <a:rPr lang="fr-FR" sz="1600" b="1" i="1" dirty="0" smtClean="0">
+                <a:solidFill>
+                  <a:schemeClr val="accent1">
+                    <a:lumMod val="60000"/>
+                    <a:lumOff val="40000"/>
+                  </a:schemeClr>
+                </a:solidFill>
+              </a:rPr>
+              <a:t>Initier la reproduction sexuelle, en transformant un ovule en </a:t>
+            </a:r>
+            <a:r>
+              <a:rPr lang="fr-FR" sz="1600" b="1" i="1" dirty="0" smtClean="0">
+                <a:solidFill>
+                  <a:schemeClr val="accent1">
+                    <a:lumMod val="60000"/>
+                    <a:lumOff val="40000"/>
+                  </a:schemeClr>
+                </a:solidFill>
+              </a:rPr>
+              <a:t>œuf.</a:t>
+            </a:r>
+          </a:p>
+          <a:p>
+            <a:r>
+              <a:rPr lang="fr-FR" dirty="0" smtClean="0"/>
+              <a:t>- Survivre  </a:t>
+            </a:r>
+            <a:r>
+              <a:rPr lang="fr-FR" sz="1600" i="1" dirty="0" smtClean="0"/>
+              <a:t>	</a:t>
+            </a:r>
+            <a:r>
+              <a:rPr lang="fr-FR" sz="1600" b="1" i="1" dirty="0" smtClean="0">
+                <a:solidFill>
+                  <a:schemeClr val="accent1">
+                    <a:lumMod val="60000"/>
+                    <a:lumOff val="40000"/>
+                  </a:schemeClr>
+                </a:solidFill>
+              </a:rPr>
+              <a:t>Réchapper à un évènement, à une catastrophe...</a:t>
+            </a:r>
+            <a:endParaRPr lang="fr-FR" dirty="0" smtClean="0"/>
+          </a:p>
+          <a:p>
+            <a:endParaRPr lang="fr-FR" sz="1200" b="1" i="1" dirty="0" smtClean="0">
+              <a:solidFill>
+                <a:schemeClr val="accent1">
+                  <a:lumMod val="60000"/>
+                  <a:lumOff val="40000"/>
+                </a:schemeClr>
+              </a:solidFill>
+            </a:endParaRPr>
+          </a:p>
+          <a:p>
+            <a:pPr>
+              <a:buFont typeface="Wingdings" pitchFamily="2" charset="2"/>
+              <a:buChar char="Ø"/>
+            </a:pPr>
+            <a:r>
+              <a:rPr lang="fr-FR" dirty="0" smtClean="0">
+                <a:solidFill>
+                  <a:schemeClr val="tx1"/>
+                </a:solidFill>
+              </a:rPr>
+              <a:t> </a:t>
+            </a:r>
+            <a:r>
+              <a:rPr lang="fr-FR" u="sng" dirty="0" smtClean="0">
+                <a:solidFill>
+                  <a:schemeClr val="tx1"/>
+                </a:solidFill>
+              </a:rPr>
+              <a:t>PEGI</a:t>
+            </a:r>
+            <a:r>
+              <a:rPr lang="fr-FR" dirty="0" smtClean="0">
+                <a:solidFill>
+                  <a:schemeClr val="tx1"/>
+                </a:solidFill>
+              </a:rPr>
+              <a:t> : 18+</a:t>
+            </a:r>
+          </a:p>
+          <a:p>
+            <a:pPr>
+              <a:buFont typeface="Wingdings" pitchFamily="2" charset="2"/>
+              <a:buChar char="Ø"/>
+            </a:pPr>
+            <a:r>
+              <a:rPr lang="fr-FR" dirty="0" smtClean="0">
+                <a:solidFill>
+                  <a:schemeClr val="tx1"/>
+                </a:solidFill>
+              </a:rPr>
+              <a:t> </a:t>
+            </a:r>
+            <a:r>
+              <a:rPr lang="fr-FR" u="sng" dirty="0" smtClean="0">
+                <a:solidFill>
+                  <a:schemeClr val="tx1"/>
+                </a:solidFill>
+              </a:rPr>
+              <a:t>Cible</a:t>
+            </a:r>
+            <a:r>
+              <a:rPr lang="fr-FR" dirty="0" smtClean="0">
+                <a:solidFill>
+                  <a:schemeClr val="tx1"/>
+                </a:solidFill>
+              </a:rPr>
+              <a:t> : </a:t>
+            </a:r>
+            <a:r>
+              <a:rPr lang="fr-FR" dirty="0" err="1" smtClean="0">
+                <a:solidFill>
+                  <a:schemeClr val="tx1"/>
+                </a:solidFill>
+              </a:rPr>
+              <a:t>Hardcore</a:t>
+            </a:r>
+            <a:r>
+              <a:rPr lang="fr-FR" dirty="0" smtClean="0">
+                <a:solidFill>
+                  <a:schemeClr val="tx1"/>
+                </a:solidFill>
+              </a:rPr>
+              <a:t> </a:t>
+            </a:r>
+            <a:r>
+              <a:rPr lang="fr-FR" dirty="0" err="1" smtClean="0">
+                <a:solidFill>
+                  <a:schemeClr val="tx1"/>
+                </a:solidFill>
+              </a:rPr>
+              <a:t>gamer</a:t>
+            </a:r>
+            <a:endParaRPr lang="fr-FR" dirty="0" smtClean="0">
+              <a:solidFill>
+                <a:schemeClr val="tx1"/>
+              </a:solidFill>
+            </a:endParaRPr>
+          </a:p>
+          <a:p>
+            <a:pPr>
+              <a:buFont typeface="Wingdings" pitchFamily="2" charset="2"/>
+              <a:buChar char="Ø"/>
+            </a:pPr>
+            <a:r>
+              <a:rPr lang="fr-FR" dirty="0" smtClean="0">
+                <a:solidFill>
+                  <a:schemeClr val="tx1"/>
+                </a:solidFill>
+              </a:rPr>
+              <a:t> </a:t>
+            </a:r>
+            <a:r>
+              <a:rPr lang="fr-FR" u="sng" dirty="0" smtClean="0">
+                <a:solidFill>
+                  <a:schemeClr val="tx1"/>
+                </a:solidFill>
+              </a:rPr>
+              <a:t>Plateforme</a:t>
+            </a:r>
+            <a:r>
+              <a:rPr lang="fr-FR" dirty="0" smtClean="0">
+                <a:solidFill>
+                  <a:schemeClr val="tx1"/>
+                </a:solidFill>
+              </a:rPr>
+              <a:t> : </a:t>
+            </a:r>
+            <a:r>
+              <a:rPr lang="fr-FR" dirty="0" smtClean="0">
+                <a:solidFill>
+                  <a:schemeClr val="tx1"/>
+                </a:solidFill>
+              </a:rPr>
+              <a:t>PC / Web</a:t>
+            </a:r>
+            <a:endParaRPr lang="fr-FR" u="sng" dirty="0" smtClean="0"/>
+          </a:p>
+          <a:p>
+            <a:pPr>
+              <a:buFont typeface="Wingdings" pitchFamily="2" charset="2"/>
+              <a:buChar char="Ø"/>
+            </a:pPr>
+            <a:endParaRPr lang="fr-FR" u="sng" dirty="0" smtClean="0"/>
+          </a:p>
+          <a:p>
             <a:endParaRPr lang="fr-FR" dirty="0"/>
           </a:p>
         </p:txBody>
       </p:sp>
       <p:pic>
         <p:nvPicPr>
-          <p:cNvPr id="5" name="Picture Placeholder 4" descr="crimzon.png"/>
+          <p:cNvPr id="8" name="Picture 7" descr="crimzon.png"/>
           <p:cNvPicPr>
-            <a:picLocks noGrp="1" noChangeAspect="1"/>
+            <a:picLocks noChangeAspect="1"/>
           </p:cNvPicPr>
-          <p:nvPr>
-            <p:ph type="pic" idx="1"/>
-          </p:nvPr>
+          <p:nvPr/>
         </p:nvPicPr>
         <p:blipFill>
           <a:blip r:embed="rId2"/>
-          <a:srcRect t="130" b="130"/>
           <a:stretch>
             <a:fillRect/>
           </a:stretch>
         </p:blipFill>
-        <p:spPr/>
+        <p:spPr>
+          <a:xfrm>
+            <a:off x="214282" y="3000372"/>
+            <a:ext cx="4119591" cy="3089693"/>
+          </a:xfrm>
+          <a:prstGeom prst="rect">
+            <a:avLst/>
+          </a:prstGeom>
+        </p:spPr>
       </p:pic>
-      <p:sp>
-        <p:nvSpPr>
-          <p:cNvPr id="4" name="Text Placeholder 3"/>
-          <p:cNvSpPr>
-            <a:spLocks noGrp="1"/>
-          </p:cNvSpPr>
-          <p:nvPr>
-            <p:ph type="body" sz="half" idx="2"/>
-          </p:nvPr>
-        </p:nvSpPr>
-        <p:spPr/>
-        <p:txBody>
-          <a:bodyPr>
-            <a:normAutofit/>
-          </a:bodyPr>
-          <a:lstStyle/>
-          <a:p>
-            <a:r>
-              <a:rPr lang="fr-FR" dirty="0" smtClean="0"/>
-              <a:t>Type de Gameplay : </a:t>
-            </a:r>
-            <a:r>
-              <a:rPr lang="fr-FR" dirty="0" err="1" smtClean="0"/>
-              <a:t>Shoot’em</a:t>
-            </a:r>
-            <a:r>
-              <a:rPr lang="fr-FR" dirty="0" smtClean="0"/>
-              <a:t> </a:t>
-            </a:r>
-            <a:r>
-              <a:rPr lang="fr-FR" dirty="0" smtClean="0"/>
-              <a:t>Up / Bullet </a:t>
-            </a:r>
-            <a:r>
-              <a:rPr lang="fr-FR" dirty="0" err="1" smtClean="0"/>
-              <a:t>Hell</a:t>
-            </a:r>
-            <a:r>
-              <a:rPr lang="fr-FR" dirty="0" smtClean="0"/>
-              <a:t>.</a:t>
-            </a:r>
-            <a:endParaRPr lang="fr-FR" dirty="0" smtClean="0"/>
-          </a:p>
-          <a:p>
-            <a:r>
-              <a:rPr lang="fr-FR" dirty="0" smtClean="0"/>
-              <a:t>Références :  </a:t>
-            </a:r>
-            <a:r>
-              <a:rPr lang="fr-FR" dirty="0" err="1" smtClean="0"/>
-              <a:t>Crimzon</a:t>
-            </a:r>
-            <a:r>
-              <a:rPr lang="fr-FR" dirty="0" smtClean="0"/>
-              <a:t> </a:t>
-            </a:r>
-            <a:r>
-              <a:rPr lang="fr-FR" dirty="0" err="1" smtClean="0"/>
-              <a:t>Clover</a:t>
-            </a:r>
-            <a:r>
-              <a:rPr lang="fr-FR" dirty="0" smtClean="0"/>
-              <a:t>, </a:t>
-            </a:r>
-            <a:r>
-              <a:rPr lang="fr-FR" dirty="0" smtClean="0"/>
-              <a:t> </a:t>
-            </a:r>
-            <a:r>
-              <a:rPr lang="fr-FR" dirty="0" err="1" smtClean="0"/>
-              <a:t>Geometry</a:t>
-            </a:r>
-            <a:r>
-              <a:rPr lang="fr-FR" dirty="0" smtClean="0"/>
-              <a:t> </a:t>
-            </a:r>
-            <a:r>
-              <a:rPr lang="fr-FR" dirty="0" err="1" smtClean="0"/>
-              <a:t>wars</a:t>
-            </a:r>
-            <a:r>
-              <a:rPr lang="fr-FR" dirty="0" smtClean="0"/>
-              <a:t> (Back </a:t>
-            </a:r>
-            <a:r>
-              <a:rPr lang="fr-FR" dirty="0" err="1" smtClean="0"/>
-              <a:t>from</a:t>
-            </a:r>
-            <a:r>
-              <a:rPr lang="fr-FR" dirty="0" smtClean="0"/>
-              <a:t> the future)</a:t>
-            </a:r>
-            <a:endParaRPr lang="fr-FR" dirty="0"/>
-          </a:p>
-        </p:txBody>
-      </p:sp>
-      <p:sp>
-        <p:nvSpPr>
-          <p:cNvPr id="3" name="Espace réservé de la date 2"/>
-          <p:cNvSpPr>
-            <a:spLocks noGrp="1"/>
-          </p:cNvSpPr>
-          <p:nvPr>
-            <p:ph type="dt" sz="half" idx="10"/>
-          </p:nvPr>
-        </p:nvSpPr>
-        <p:spPr/>
-        <p:txBody>
-          <a:bodyPr/>
-          <a:lstStyle/>
-          <a:p>
-            <a:r>
-              <a:rPr lang="fr-FR" smtClean="0"/>
-              <a:t>Jeudi 29 Novembre 2012</a:t>
-            </a:r>
-            <a:endParaRPr lang="fr-FR" dirty="0"/>
-          </a:p>
-        </p:txBody>
-      </p:sp>
-      <p:sp>
-        <p:nvSpPr>
-          <p:cNvPr id="6" name="Espace réservé du pied de page 5"/>
-          <p:cNvSpPr>
-            <a:spLocks noGrp="1"/>
-          </p:cNvSpPr>
-          <p:nvPr>
-            <p:ph type="ftr" sz="quarter" idx="11"/>
-          </p:nvPr>
-        </p:nvSpPr>
-        <p:spPr/>
-        <p:txBody>
-          <a:bodyPr/>
-          <a:lstStyle/>
-          <a:p>
-            <a:r>
-              <a:rPr lang="fr-FR" smtClean="0"/>
-              <a:t>Paul Fiat</a:t>
-            </a:r>
-            <a:endParaRPr lang="fr-FR" dirty="0"/>
-          </a:p>
-        </p:txBody>
-      </p:sp>
-      <p:sp>
-        <p:nvSpPr>
-          <p:cNvPr id="7" name="Espace réservé du numéro de diapositive 6"/>
-          <p:cNvSpPr>
-            <a:spLocks noGrp="1"/>
-          </p:cNvSpPr>
-          <p:nvPr>
-            <p:ph type="sldNum" sz="quarter" idx="12"/>
-          </p:nvPr>
-        </p:nvSpPr>
-        <p:spPr/>
-        <p:txBody>
-          <a:bodyPr/>
-          <a:lstStyle/>
-          <a:p>
-            <a:fld id="{9DDF0C85-99BB-428E-8D90-A207FA2E644C}" type="slidenum">
-              <a:rPr lang="fr-FR" smtClean="0"/>
-              <a:pPr/>
-              <a:t>5</a:t>
-            </a:fld>
-            <a:endParaRPr lang="fr-FR" dirty="0"/>
-          </a:p>
-        </p:txBody>
-      </p:sp>
+      <p:pic>
+        <p:nvPicPr>
+          <p:cNvPr id="9" name="Picture 8" descr="geometrywars.jpg"/>
+          <p:cNvPicPr>
+            <a:picLocks noChangeAspect="1"/>
+          </p:cNvPicPr>
+          <p:nvPr/>
+        </p:nvPicPr>
+        <p:blipFill>
+          <a:blip r:embed="rId3"/>
+          <a:stretch>
+            <a:fillRect/>
+          </a:stretch>
+        </p:blipFill>
+        <p:spPr>
+          <a:xfrm>
+            <a:off x="4786314" y="3000372"/>
+            <a:ext cx="4095750" cy="3048000"/>
+          </a:xfrm>
+          <a:prstGeom prst="rect">
+            <a:avLst/>
+          </a:prstGeom>
+        </p:spPr>
+      </p:pic>
     </p:spTree>
   </p:cSld>
   <p:clrMapOvr>
@@ -5811,7 +6670,1056 @@
   <p:timing>
     <p:tnLst>
       <p:par>
-        <p:cTn id="1" dur="indefinite" restart="never" nodeType="tmRoot"/>
+        <p:cTn id="1" dur="indefinite" restart="never" nodeType="tmRoot">
+          <p:childTnLst>
+            <p:seq concurrent="1" nextAc="seek">
+              <p:cTn id="2" dur="indefinite" nodeType="mainSeq">
+                <p:childTnLst>
+                  <p:par>
+                    <p:cTn id="3" fill="hold">
+                      <p:stCondLst>
+                        <p:cond delay="indefinite"/>
+                      </p:stCondLst>
+                      <p:childTnLst>
+                        <p:par>
+                          <p:cTn id="4" fill="hold">
+                            <p:stCondLst>
+                              <p:cond delay="0"/>
+                            </p:stCondLst>
+                            <p:childTnLst>
+                              <p:par>
+                                <p:cTn id="5" presetID="2" presetClass="entr" presetSubtype="4" fill="hold" nodeType="clickEffect">
+                                  <p:stCondLst>
+                                    <p:cond delay="0"/>
+                                  </p:stCondLst>
+                                  <p:childTnLst>
+                                    <p:set>
+                                      <p:cBhvr>
+                                        <p:cTn id="6" dur="1" fill="hold">
+                                          <p:stCondLst>
+                                            <p:cond delay="0"/>
+                                          </p:stCondLst>
+                                        </p:cTn>
+                                        <p:tgtEl>
+                                          <p:spTgt spid="6">
+                                            <p:txEl>
+                                              <p:pRg st="2" end="2"/>
+                                            </p:txEl>
+                                          </p:spTgt>
+                                        </p:tgtEl>
+                                        <p:attrNameLst>
+                                          <p:attrName>style.visibility</p:attrName>
+                                        </p:attrNameLst>
+                                      </p:cBhvr>
+                                      <p:to>
+                                        <p:strVal val="visible"/>
+                                      </p:to>
+                                    </p:set>
+                                    <p:anim calcmode="lin" valueType="num">
+                                      <p:cBhvr additive="base">
+                                        <p:cTn id="7" dur="500" fill="hold"/>
+                                        <p:tgtEl>
+                                          <p:spTgt spid="6">
+                                            <p:txEl>
+                                              <p:pRg st="2" end="2"/>
+                                            </p:txEl>
+                                          </p:spTgt>
+                                        </p:tgtEl>
+                                        <p:attrNameLst>
+                                          <p:attrName>ppt_x</p:attrName>
+                                        </p:attrNameLst>
+                                      </p:cBhvr>
+                                      <p:tavLst>
+                                        <p:tav tm="0">
+                                          <p:val>
+                                            <p:strVal val="#ppt_x"/>
+                                          </p:val>
+                                        </p:tav>
+                                        <p:tav tm="100000">
+                                          <p:val>
+                                            <p:strVal val="#ppt_x"/>
+                                          </p:val>
+                                        </p:tav>
+                                      </p:tavLst>
+                                    </p:anim>
+                                    <p:anim calcmode="lin" valueType="num">
+                                      <p:cBhvr additive="base">
+                                        <p:cTn id="8" dur="500" fill="hold"/>
+                                        <p:tgtEl>
+                                          <p:spTgt spid="6">
+                                            <p:txEl>
+                                              <p:pRg st="2" end="2"/>
+                                            </p:txEl>
+                                          </p:spTgt>
+                                        </p:tgtEl>
+                                        <p:attrNameLst>
+                                          <p:attrName>ppt_y</p:attrName>
+                                        </p:attrNameLst>
+                                      </p:cBhvr>
+                                      <p:tavLst>
+                                        <p:tav tm="0">
+                                          <p:val>
+                                            <p:strVal val="1+#ppt_h/2"/>
+                                          </p:val>
+                                        </p:tav>
+                                        <p:tav tm="100000">
+                                          <p:val>
+                                            <p:strVal val="#ppt_y"/>
+                                          </p:val>
+                                        </p:tav>
+                                      </p:tavLst>
+                                    </p:anim>
+                                  </p:childTnLst>
+                                </p:cTn>
+                              </p:par>
+                              <p:par>
+                                <p:cTn id="9" presetID="2" presetClass="entr" presetSubtype="4" fill="hold" nodeType="withEffect">
+                                  <p:stCondLst>
+                                    <p:cond delay="0"/>
+                                  </p:stCondLst>
+                                  <p:childTnLst>
+                                    <p:set>
+                                      <p:cBhvr>
+                                        <p:cTn id="10" dur="1" fill="hold">
+                                          <p:stCondLst>
+                                            <p:cond delay="0"/>
+                                          </p:stCondLst>
+                                        </p:cTn>
+                                        <p:tgtEl>
+                                          <p:spTgt spid="8"/>
+                                        </p:tgtEl>
+                                        <p:attrNameLst>
+                                          <p:attrName>style.visibility</p:attrName>
+                                        </p:attrNameLst>
+                                      </p:cBhvr>
+                                      <p:to>
+                                        <p:strVal val="visible"/>
+                                      </p:to>
+                                    </p:set>
+                                    <p:anim calcmode="lin" valueType="num">
+                                      <p:cBhvr additive="base">
+                                        <p:cTn id="11" dur="500" fill="hold"/>
+                                        <p:tgtEl>
+                                          <p:spTgt spid="8"/>
+                                        </p:tgtEl>
+                                        <p:attrNameLst>
+                                          <p:attrName>ppt_x</p:attrName>
+                                        </p:attrNameLst>
+                                      </p:cBhvr>
+                                      <p:tavLst>
+                                        <p:tav tm="0">
+                                          <p:val>
+                                            <p:strVal val="#ppt_x"/>
+                                          </p:val>
+                                        </p:tav>
+                                        <p:tav tm="100000">
+                                          <p:val>
+                                            <p:strVal val="#ppt_x"/>
+                                          </p:val>
+                                        </p:tav>
+                                      </p:tavLst>
+                                    </p:anim>
+                                    <p:anim calcmode="lin" valueType="num">
+                                      <p:cBhvr additive="base">
+                                        <p:cTn id="12" dur="500" fill="hold"/>
+                                        <p:tgtEl>
+                                          <p:spTgt spid="8"/>
+                                        </p:tgtEl>
+                                        <p:attrNameLst>
+                                          <p:attrName>ppt_y</p:attrName>
+                                        </p:attrNameLst>
+                                      </p:cBhvr>
+                                      <p:tavLst>
+                                        <p:tav tm="0">
+                                          <p:val>
+                                            <p:strVal val="1+#ppt_h/2"/>
+                                          </p:val>
+                                        </p:tav>
+                                        <p:tav tm="100000">
+                                          <p:val>
+                                            <p:strVal val="#ppt_y"/>
+                                          </p:val>
+                                        </p:tav>
+                                      </p:tavLst>
+                                    </p:anim>
+                                  </p:childTnLst>
+                                </p:cTn>
+                              </p:par>
+                              <p:par>
+                                <p:cTn id="13" presetID="2" presetClass="entr" presetSubtype="4" fill="hold" nodeType="withEffect">
+                                  <p:stCondLst>
+                                    <p:cond delay="0"/>
+                                  </p:stCondLst>
+                                  <p:childTnLst>
+                                    <p:set>
+                                      <p:cBhvr>
+                                        <p:cTn id="14" dur="1" fill="hold">
+                                          <p:stCondLst>
+                                            <p:cond delay="0"/>
+                                          </p:stCondLst>
+                                        </p:cTn>
+                                        <p:tgtEl>
+                                          <p:spTgt spid="9"/>
+                                        </p:tgtEl>
+                                        <p:attrNameLst>
+                                          <p:attrName>style.visibility</p:attrName>
+                                        </p:attrNameLst>
+                                      </p:cBhvr>
+                                      <p:to>
+                                        <p:strVal val="visible"/>
+                                      </p:to>
+                                    </p:set>
+                                    <p:anim calcmode="lin" valueType="num">
+                                      <p:cBhvr additive="base">
+                                        <p:cTn id="15" dur="500" fill="hold"/>
+                                        <p:tgtEl>
+                                          <p:spTgt spid="9"/>
+                                        </p:tgtEl>
+                                        <p:attrNameLst>
+                                          <p:attrName>ppt_x</p:attrName>
+                                        </p:attrNameLst>
+                                      </p:cBhvr>
+                                      <p:tavLst>
+                                        <p:tav tm="0">
+                                          <p:val>
+                                            <p:strVal val="#ppt_x"/>
+                                          </p:val>
+                                        </p:tav>
+                                        <p:tav tm="100000">
+                                          <p:val>
+                                            <p:strVal val="#ppt_x"/>
+                                          </p:val>
+                                        </p:tav>
+                                      </p:tavLst>
+                                    </p:anim>
+                                    <p:anim calcmode="lin" valueType="num">
+                                      <p:cBhvr additive="base">
+                                        <p:cTn id="16" dur="500" fill="hold"/>
+                                        <p:tgtEl>
+                                          <p:spTgt spid="9"/>
+                                        </p:tgtEl>
+                                        <p:attrNameLst>
+                                          <p:attrName>ppt_y</p:attrName>
+                                        </p:attrNameLst>
+                                      </p:cBhvr>
+                                      <p:tavLst>
+                                        <p:tav tm="0">
+                                          <p:val>
+                                            <p:strVal val="1+#ppt_h/2"/>
+                                          </p:val>
+                                        </p:tav>
+                                        <p:tav tm="100000">
+                                          <p:val>
+                                            <p:strVal val="#ppt_y"/>
+                                          </p:val>
+                                        </p:tav>
+                                      </p:tavLst>
+                                    </p:anim>
+                                  </p:childTnLst>
+                                </p:cTn>
+                              </p:par>
+                            </p:childTnLst>
+                          </p:cTn>
+                        </p:par>
+                      </p:childTnLst>
+                    </p:cTn>
+                  </p:par>
+                  <p:par>
+                    <p:cTn id="17" fill="hold">
+                      <p:stCondLst>
+                        <p:cond delay="indefinite"/>
+                      </p:stCondLst>
+                      <p:childTnLst>
+                        <p:par>
+                          <p:cTn id="18" fill="hold">
+                            <p:stCondLst>
+                              <p:cond delay="0"/>
+                            </p:stCondLst>
+                            <p:childTnLst>
+                              <p:par>
+                                <p:cTn id="19" presetID="2" presetClass="exit" presetSubtype="4" fill="hold" nodeType="clickEffect">
+                                  <p:stCondLst>
+                                    <p:cond delay="0"/>
+                                  </p:stCondLst>
+                                  <p:childTnLst>
+                                    <p:anim calcmode="lin" valueType="num">
+                                      <p:cBhvr additive="base">
+                                        <p:cTn id="20" dur="500"/>
+                                        <p:tgtEl>
+                                          <p:spTgt spid="9"/>
+                                        </p:tgtEl>
+                                        <p:attrNameLst>
+                                          <p:attrName>ppt_x</p:attrName>
+                                        </p:attrNameLst>
+                                      </p:cBhvr>
+                                      <p:tavLst>
+                                        <p:tav tm="0">
+                                          <p:val>
+                                            <p:strVal val="ppt_x"/>
+                                          </p:val>
+                                        </p:tav>
+                                        <p:tav tm="100000">
+                                          <p:val>
+                                            <p:strVal val="ppt_x"/>
+                                          </p:val>
+                                        </p:tav>
+                                      </p:tavLst>
+                                    </p:anim>
+                                    <p:anim calcmode="lin" valueType="num">
+                                      <p:cBhvr additive="base">
+                                        <p:cTn id="21" dur="500"/>
+                                        <p:tgtEl>
+                                          <p:spTgt spid="9"/>
+                                        </p:tgtEl>
+                                        <p:attrNameLst>
+                                          <p:attrName>ppt_y</p:attrName>
+                                        </p:attrNameLst>
+                                      </p:cBhvr>
+                                      <p:tavLst>
+                                        <p:tav tm="0">
+                                          <p:val>
+                                            <p:strVal val="ppt_y"/>
+                                          </p:val>
+                                        </p:tav>
+                                        <p:tav tm="100000">
+                                          <p:val>
+                                            <p:strVal val="1+ppt_h/2"/>
+                                          </p:val>
+                                        </p:tav>
+                                      </p:tavLst>
+                                    </p:anim>
+                                    <p:set>
+                                      <p:cBhvr>
+                                        <p:cTn id="22" dur="1" fill="hold">
+                                          <p:stCondLst>
+                                            <p:cond delay="499"/>
+                                          </p:stCondLst>
+                                        </p:cTn>
+                                        <p:tgtEl>
+                                          <p:spTgt spid="9"/>
+                                        </p:tgtEl>
+                                        <p:attrNameLst>
+                                          <p:attrName>style.visibility</p:attrName>
+                                        </p:attrNameLst>
+                                      </p:cBhvr>
+                                      <p:to>
+                                        <p:strVal val="hidden"/>
+                                      </p:to>
+                                    </p:set>
+                                  </p:childTnLst>
+                                </p:cTn>
+                              </p:par>
+                              <p:par>
+                                <p:cTn id="23" presetID="2" presetClass="exit" presetSubtype="4" fill="hold" nodeType="withEffect">
+                                  <p:stCondLst>
+                                    <p:cond delay="0"/>
+                                  </p:stCondLst>
+                                  <p:childTnLst>
+                                    <p:anim calcmode="lin" valueType="num">
+                                      <p:cBhvr additive="base">
+                                        <p:cTn id="24" dur="500"/>
+                                        <p:tgtEl>
+                                          <p:spTgt spid="8"/>
+                                        </p:tgtEl>
+                                        <p:attrNameLst>
+                                          <p:attrName>ppt_x</p:attrName>
+                                        </p:attrNameLst>
+                                      </p:cBhvr>
+                                      <p:tavLst>
+                                        <p:tav tm="0">
+                                          <p:val>
+                                            <p:strVal val="ppt_x"/>
+                                          </p:val>
+                                        </p:tav>
+                                        <p:tav tm="100000">
+                                          <p:val>
+                                            <p:strVal val="ppt_x"/>
+                                          </p:val>
+                                        </p:tav>
+                                      </p:tavLst>
+                                    </p:anim>
+                                    <p:anim calcmode="lin" valueType="num">
+                                      <p:cBhvr additive="base">
+                                        <p:cTn id="25" dur="500"/>
+                                        <p:tgtEl>
+                                          <p:spTgt spid="8"/>
+                                        </p:tgtEl>
+                                        <p:attrNameLst>
+                                          <p:attrName>ppt_y</p:attrName>
+                                        </p:attrNameLst>
+                                      </p:cBhvr>
+                                      <p:tavLst>
+                                        <p:tav tm="0">
+                                          <p:val>
+                                            <p:strVal val="ppt_y"/>
+                                          </p:val>
+                                        </p:tav>
+                                        <p:tav tm="100000">
+                                          <p:val>
+                                            <p:strVal val="1+ppt_h/2"/>
+                                          </p:val>
+                                        </p:tav>
+                                      </p:tavLst>
+                                    </p:anim>
+                                    <p:set>
+                                      <p:cBhvr>
+                                        <p:cTn id="26" dur="1" fill="hold">
+                                          <p:stCondLst>
+                                            <p:cond delay="499"/>
+                                          </p:stCondLst>
+                                        </p:cTn>
+                                        <p:tgtEl>
+                                          <p:spTgt spid="8"/>
+                                        </p:tgtEl>
+                                        <p:attrNameLst>
+                                          <p:attrName>style.visibility</p:attrName>
+                                        </p:attrNameLst>
+                                      </p:cBhvr>
+                                      <p:to>
+                                        <p:strVal val="hidden"/>
+                                      </p:to>
+                                    </p:set>
+                                  </p:childTnLst>
+                                </p:cTn>
+                              </p:par>
+                              <p:par>
+                                <p:cTn id="27" presetID="2" presetClass="entr" presetSubtype="4" fill="hold" nodeType="withEffect">
+                                  <p:stCondLst>
+                                    <p:cond delay="0"/>
+                                  </p:stCondLst>
+                                  <p:childTnLst>
+                                    <p:set>
+                                      <p:cBhvr>
+                                        <p:cTn id="28" dur="1" fill="hold">
+                                          <p:stCondLst>
+                                            <p:cond delay="0"/>
+                                          </p:stCondLst>
+                                        </p:cTn>
+                                        <p:tgtEl>
+                                          <p:spTgt spid="6">
+                                            <p:txEl>
+                                              <p:pRg st="5" end="5"/>
+                                            </p:txEl>
+                                          </p:spTgt>
+                                        </p:tgtEl>
+                                        <p:attrNameLst>
+                                          <p:attrName>style.visibility</p:attrName>
+                                        </p:attrNameLst>
+                                      </p:cBhvr>
+                                      <p:to>
+                                        <p:strVal val="visible"/>
+                                      </p:to>
+                                    </p:set>
+                                    <p:anim calcmode="lin" valueType="num">
+                                      <p:cBhvr additive="base">
+                                        <p:cTn id="29" dur="500" fill="hold"/>
+                                        <p:tgtEl>
+                                          <p:spTgt spid="6">
+                                            <p:txEl>
+                                              <p:pRg st="5" end="5"/>
+                                            </p:txEl>
+                                          </p:spTgt>
+                                        </p:tgtEl>
+                                        <p:attrNameLst>
+                                          <p:attrName>ppt_x</p:attrName>
+                                        </p:attrNameLst>
+                                      </p:cBhvr>
+                                      <p:tavLst>
+                                        <p:tav tm="0">
+                                          <p:val>
+                                            <p:strVal val="#ppt_x"/>
+                                          </p:val>
+                                        </p:tav>
+                                        <p:tav tm="100000">
+                                          <p:val>
+                                            <p:strVal val="#ppt_x"/>
+                                          </p:val>
+                                        </p:tav>
+                                      </p:tavLst>
+                                    </p:anim>
+                                    <p:anim calcmode="lin" valueType="num">
+                                      <p:cBhvr additive="base">
+                                        <p:cTn id="30" dur="500" fill="hold"/>
+                                        <p:tgtEl>
+                                          <p:spTgt spid="6">
+                                            <p:txEl>
+                                              <p:pRg st="5" end="5"/>
+                                            </p:txEl>
+                                          </p:spTgt>
+                                        </p:tgtEl>
+                                        <p:attrNameLst>
+                                          <p:attrName>ppt_y</p:attrName>
+                                        </p:attrNameLst>
+                                      </p:cBhvr>
+                                      <p:tavLst>
+                                        <p:tav tm="0">
+                                          <p:val>
+                                            <p:strVal val="1+#ppt_h/2"/>
+                                          </p:val>
+                                        </p:tav>
+                                        <p:tav tm="100000">
+                                          <p:val>
+                                            <p:strVal val="#ppt_y"/>
+                                          </p:val>
+                                        </p:tav>
+                                      </p:tavLst>
+                                    </p:anim>
+                                  </p:childTnLst>
+                                </p:cTn>
+                              </p:par>
+                              <p:par>
+                                <p:cTn id="31" presetID="2" presetClass="entr" presetSubtype="4" fill="hold" nodeType="withEffect">
+                                  <p:stCondLst>
+                                    <p:cond delay="0"/>
+                                  </p:stCondLst>
+                                  <p:childTnLst>
+                                    <p:set>
+                                      <p:cBhvr>
+                                        <p:cTn id="32" dur="1" fill="hold">
+                                          <p:stCondLst>
+                                            <p:cond delay="0"/>
+                                          </p:stCondLst>
+                                        </p:cTn>
+                                        <p:tgtEl>
+                                          <p:spTgt spid="6">
+                                            <p:txEl>
+                                              <p:pRg st="6" end="6"/>
+                                            </p:txEl>
+                                          </p:spTgt>
+                                        </p:tgtEl>
+                                        <p:attrNameLst>
+                                          <p:attrName>style.visibility</p:attrName>
+                                        </p:attrNameLst>
+                                      </p:cBhvr>
+                                      <p:to>
+                                        <p:strVal val="visible"/>
+                                      </p:to>
+                                    </p:set>
+                                    <p:anim calcmode="lin" valueType="num">
+                                      <p:cBhvr additive="base">
+                                        <p:cTn id="33" dur="500" fill="hold"/>
+                                        <p:tgtEl>
+                                          <p:spTgt spid="6">
+                                            <p:txEl>
+                                              <p:pRg st="6" end="6"/>
+                                            </p:txEl>
+                                          </p:spTgt>
+                                        </p:tgtEl>
+                                        <p:attrNameLst>
+                                          <p:attrName>ppt_x</p:attrName>
+                                        </p:attrNameLst>
+                                      </p:cBhvr>
+                                      <p:tavLst>
+                                        <p:tav tm="0">
+                                          <p:val>
+                                            <p:strVal val="#ppt_x"/>
+                                          </p:val>
+                                        </p:tav>
+                                        <p:tav tm="100000">
+                                          <p:val>
+                                            <p:strVal val="#ppt_x"/>
+                                          </p:val>
+                                        </p:tav>
+                                      </p:tavLst>
+                                    </p:anim>
+                                    <p:anim calcmode="lin" valueType="num">
+                                      <p:cBhvr additive="base">
+                                        <p:cTn id="34" dur="500" fill="hold"/>
+                                        <p:tgtEl>
+                                          <p:spTgt spid="6">
+                                            <p:txEl>
+                                              <p:pRg st="6" end="6"/>
+                                            </p:txEl>
+                                          </p:spTgt>
+                                        </p:tgtEl>
+                                        <p:attrNameLst>
+                                          <p:attrName>ppt_y</p:attrName>
+                                        </p:attrNameLst>
+                                      </p:cBhvr>
+                                      <p:tavLst>
+                                        <p:tav tm="0">
+                                          <p:val>
+                                            <p:strVal val="1+#ppt_h/2"/>
+                                          </p:val>
+                                        </p:tav>
+                                        <p:tav tm="100000">
+                                          <p:val>
+                                            <p:strVal val="#ppt_y"/>
+                                          </p:val>
+                                        </p:tav>
+                                      </p:tavLst>
+                                    </p:anim>
+                                  </p:childTnLst>
+                                </p:cTn>
+                              </p:par>
+                              <p:par>
+                                <p:cTn id="35" presetID="2" presetClass="entr" presetSubtype="4" fill="hold" nodeType="withEffect">
+                                  <p:stCondLst>
+                                    <p:cond delay="0"/>
+                                  </p:stCondLst>
+                                  <p:childTnLst>
+                                    <p:set>
+                                      <p:cBhvr>
+                                        <p:cTn id="36" dur="1" fill="hold">
+                                          <p:stCondLst>
+                                            <p:cond delay="0"/>
+                                          </p:stCondLst>
+                                        </p:cTn>
+                                        <p:tgtEl>
+                                          <p:spTgt spid="6">
+                                            <p:txEl>
+                                              <p:pRg st="7" end="7"/>
+                                            </p:txEl>
+                                          </p:spTgt>
+                                        </p:tgtEl>
+                                        <p:attrNameLst>
+                                          <p:attrName>style.visibility</p:attrName>
+                                        </p:attrNameLst>
+                                      </p:cBhvr>
+                                      <p:to>
+                                        <p:strVal val="visible"/>
+                                      </p:to>
+                                    </p:set>
+                                    <p:anim calcmode="lin" valueType="num">
+                                      <p:cBhvr additive="base">
+                                        <p:cTn id="37" dur="500" fill="hold"/>
+                                        <p:tgtEl>
+                                          <p:spTgt spid="6">
+                                            <p:txEl>
+                                              <p:pRg st="7" end="7"/>
+                                            </p:txEl>
+                                          </p:spTgt>
+                                        </p:tgtEl>
+                                        <p:attrNameLst>
+                                          <p:attrName>ppt_x</p:attrName>
+                                        </p:attrNameLst>
+                                      </p:cBhvr>
+                                      <p:tavLst>
+                                        <p:tav tm="0">
+                                          <p:val>
+                                            <p:strVal val="#ppt_x"/>
+                                          </p:val>
+                                        </p:tav>
+                                        <p:tav tm="100000">
+                                          <p:val>
+                                            <p:strVal val="#ppt_x"/>
+                                          </p:val>
+                                        </p:tav>
+                                      </p:tavLst>
+                                    </p:anim>
+                                    <p:anim calcmode="lin" valueType="num">
+                                      <p:cBhvr additive="base">
+                                        <p:cTn id="38" dur="500" fill="hold"/>
+                                        <p:tgtEl>
+                                          <p:spTgt spid="6">
+                                            <p:txEl>
+                                              <p:pRg st="7" end="7"/>
+                                            </p:txEl>
+                                          </p:spTgt>
+                                        </p:tgtEl>
+                                        <p:attrNameLst>
+                                          <p:attrName>ppt_y</p:attrName>
+                                        </p:attrNameLst>
+                                      </p:cBhvr>
+                                      <p:tavLst>
+                                        <p:tav tm="0">
+                                          <p:val>
+                                            <p:strVal val="1+#ppt_h/2"/>
+                                          </p:val>
+                                        </p:tav>
+                                        <p:tav tm="100000">
+                                          <p:val>
+                                            <p:strVal val="#ppt_y"/>
+                                          </p:val>
+                                        </p:tav>
+                                      </p:tavLst>
+                                    </p:anim>
+                                  </p:childTnLst>
+                                </p:cTn>
+                              </p:par>
+                              <p:par>
+                                <p:cTn id="39" presetID="2" presetClass="entr" presetSubtype="4" fill="hold" nodeType="withEffect">
+                                  <p:stCondLst>
+                                    <p:cond delay="0"/>
+                                  </p:stCondLst>
+                                  <p:childTnLst>
+                                    <p:set>
+                                      <p:cBhvr>
+                                        <p:cTn id="40" dur="1" fill="hold">
+                                          <p:stCondLst>
+                                            <p:cond delay="0"/>
+                                          </p:stCondLst>
+                                        </p:cTn>
+                                        <p:tgtEl>
+                                          <p:spTgt spid="6">
+                                            <p:txEl>
+                                              <p:pRg st="8" end="8"/>
+                                            </p:txEl>
+                                          </p:spTgt>
+                                        </p:tgtEl>
+                                        <p:attrNameLst>
+                                          <p:attrName>style.visibility</p:attrName>
+                                        </p:attrNameLst>
+                                      </p:cBhvr>
+                                      <p:to>
+                                        <p:strVal val="visible"/>
+                                      </p:to>
+                                    </p:set>
+                                    <p:anim calcmode="lin" valueType="num">
+                                      <p:cBhvr additive="base">
+                                        <p:cTn id="41" dur="500" fill="hold"/>
+                                        <p:tgtEl>
+                                          <p:spTgt spid="6">
+                                            <p:txEl>
+                                              <p:pRg st="8" end="8"/>
+                                            </p:txEl>
+                                          </p:spTgt>
+                                        </p:tgtEl>
+                                        <p:attrNameLst>
+                                          <p:attrName>ppt_x</p:attrName>
+                                        </p:attrNameLst>
+                                      </p:cBhvr>
+                                      <p:tavLst>
+                                        <p:tav tm="0">
+                                          <p:val>
+                                            <p:strVal val="#ppt_x"/>
+                                          </p:val>
+                                        </p:tav>
+                                        <p:tav tm="100000">
+                                          <p:val>
+                                            <p:strVal val="#ppt_x"/>
+                                          </p:val>
+                                        </p:tav>
+                                      </p:tavLst>
+                                    </p:anim>
+                                    <p:anim calcmode="lin" valueType="num">
+                                      <p:cBhvr additive="base">
+                                        <p:cTn id="42" dur="500" fill="hold"/>
+                                        <p:tgtEl>
+                                          <p:spTgt spid="6">
+                                            <p:txEl>
+                                              <p:pRg st="8" end="8"/>
+                                            </p:txEl>
+                                          </p:spTgt>
+                                        </p:tgtEl>
+                                        <p:attrNameLst>
+                                          <p:attrName>ppt_y</p:attrName>
+                                        </p:attrNameLst>
+                                      </p:cBhvr>
+                                      <p:tavLst>
+                                        <p:tav tm="0">
+                                          <p:val>
+                                            <p:strVal val="1+#ppt_h/2"/>
+                                          </p:val>
+                                        </p:tav>
+                                        <p:tav tm="100000">
+                                          <p:val>
+                                            <p:strVal val="#ppt_y"/>
+                                          </p:val>
+                                        </p:tav>
+                                      </p:tavLst>
+                                    </p:anim>
+                                  </p:childTnLst>
+                                </p:cTn>
+                              </p:par>
+                            </p:childTnLst>
+                          </p:cTn>
+                        </p:par>
+                      </p:childTnLst>
+                    </p:cTn>
+                  </p:par>
+                  <p:par>
+                    <p:cTn id="43" fill="hold">
+                      <p:stCondLst>
+                        <p:cond delay="indefinite"/>
+                      </p:stCondLst>
+                      <p:childTnLst>
+                        <p:par>
+                          <p:cTn id="44" fill="hold">
+                            <p:stCondLst>
+                              <p:cond delay="0"/>
+                            </p:stCondLst>
+                            <p:childTnLst>
+                              <p:par>
+                                <p:cTn id="45" presetID="2" presetClass="entr" presetSubtype="4" fill="hold" nodeType="clickEffect">
+                                  <p:stCondLst>
+                                    <p:cond delay="0"/>
+                                  </p:stCondLst>
+                                  <p:childTnLst>
+                                    <p:set>
+                                      <p:cBhvr>
+                                        <p:cTn id="46" dur="1" fill="hold">
+                                          <p:stCondLst>
+                                            <p:cond delay="0"/>
+                                          </p:stCondLst>
+                                        </p:cTn>
+                                        <p:tgtEl>
+                                          <p:spTgt spid="6">
+                                            <p:txEl>
+                                              <p:pRg st="10" end="10"/>
+                                            </p:txEl>
+                                          </p:spTgt>
+                                        </p:tgtEl>
+                                        <p:attrNameLst>
+                                          <p:attrName>style.visibility</p:attrName>
+                                        </p:attrNameLst>
+                                      </p:cBhvr>
+                                      <p:to>
+                                        <p:strVal val="visible"/>
+                                      </p:to>
+                                    </p:set>
+                                    <p:anim calcmode="lin" valueType="num">
+                                      <p:cBhvr additive="base">
+                                        <p:cTn id="47" dur="500" fill="hold"/>
+                                        <p:tgtEl>
+                                          <p:spTgt spid="6">
+                                            <p:txEl>
+                                              <p:pRg st="10" end="10"/>
+                                            </p:txEl>
+                                          </p:spTgt>
+                                        </p:tgtEl>
+                                        <p:attrNameLst>
+                                          <p:attrName>ppt_x</p:attrName>
+                                        </p:attrNameLst>
+                                      </p:cBhvr>
+                                      <p:tavLst>
+                                        <p:tav tm="0">
+                                          <p:val>
+                                            <p:strVal val="#ppt_x"/>
+                                          </p:val>
+                                        </p:tav>
+                                        <p:tav tm="100000">
+                                          <p:val>
+                                            <p:strVal val="#ppt_x"/>
+                                          </p:val>
+                                        </p:tav>
+                                      </p:tavLst>
+                                    </p:anim>
+                                    <p:anim calcmode="lin" valueType="num">
+                                      <p:cBhvr additive="base">
+                                        <p:cTn id="48" dur="500" fill="hold"/>
+                                        <p:tgtEl>
+                                          <p:spTgt spid="6">
+                                            <p:txEl>
+                                              <p:pRg st="10" end="10"/>
+                                            </p:txEl>
+                                          </p:spTgt>
+                                        </p:tgtEl>
+                                        <p:attrNameLst>
+                                          <p:attrName>ppt_y</p:attrName>
+                                        </p:attrNameLst>
+                                      </p:cBhvr>
+                                      <p:tavLst>
+                                        <p:tav tm="0">
+                                          <p:val>
+                                            <p:strVal val="1+#ppt_h/2"/>
+                                          </p:val>
+                                        </p:tav>
+                                        <p:tav tm="100000">
+                                          <p:val>
+                                            <p:strVal val="#ppt_y"/>
+                                          </p:val>
+                                        </p:tav>
+                                      </p:tavLst>
+                                    </p:anim>
+                                  </p:childTnLst>
+                                </p:cTn>
+                              </p:par>
+                              <p:par>
+                                <p:cTn id="49" presetID="2" presetClass="entr" presetSubtype="4" fill="hold" nodeType="withEffect">
+                                  <p:stCondLst>
+                                    <p:cond delay="0"/>
+                                  </p:stCondLst>
+                                  <p:childTnLst>
+                                    <p:set>
+                                      <p:cBhvr>
+                                        <p:cTn id="50" dur="1" fill="hold">
+                                          <p:stCondLst>
+                                            <p:cond delay="0"/>
+                                          </p:stCondLst>
+                                        </p:cTn>
+                                        <p:tgtEl>
+                                          <p:spTgt spid="6">
+                                            <p:txEl>
+                                              <p:pRg st="11" end="11"/>
+                                            </p:txEl>
+                                          </p:spTgt>
+                                        </p:tgtEl>
+                                        <p:attrNameLst>
+                                          <p:attrName>style.visibility</p:attrName>
+                                        </p:attrNameLst>
+                                      </p:cBhvr>
+                                      <p:to>
+                                        <p:strVal val="visible"/>
+                                      </p:to>
+                                    </p:set>
+                                    <p:anim calcmode="lin" valueType="num">
+                                      <p:cBhvr additive="base">
+                                        <p:cTn id="51" dur="500" fill="hold"/>
+                                        <p:tgtEl>
+                                          <p:spTgt spid="6">
+                                            <p:txEl>
+                                              <p:pRg st="11" end="11"/>
+                                            </p:txEl>
+                                          </p:spTgt>
+                                        </p:tgtEl>
+                                        <p:attrNameLst>
+                                          <p:attrName>ppt_x</p:attrName>
+                                        </p:attrNameLst>
+                                      </p:cBhvr>
+                                      <p:tavLst>
+                                        <p:tav tm="0">
+                                          <p:val>
+                                            <p:strVal val="#ppt_x"/>
+                                          </p:val>
+                                        </p:tav>
+                                        <p:tav tm="100000">
+                                          <p:val>
+                                            <p:strVal val="#ppt_x"/>
+                                          </p:val>
+                                        </p:tav>
+                                      </p:tavLst>
+                                    </p:anim>
+                                    <p:anim calcmode="lin" valueType="num">
+                                      <p:cBhvr additive="base">
+                                        <p:cTn id="52" dur="500" fill="hold"/>
+                                        <p:tgtEl>
+                                          <p:spTgt spid="6">
+                                            <p:txEl>
+                                              <p:pRg st="11" end="11"/>
+                                            </p:txEl>
+                                          </p:spTgt>
+                                        </p:tgtEl>
+                                        <p:attrNameLst>
+                                          <p:attrName>ppt_y</p:attrName>
+                                        </p:attrNameLst>
+                                      </p:cBhvr>
+                                      <p:tavLst>
+                                        <p:tav tm="0">
+                                          <p:val>
+                                            <p:strVal val="1+#ppt_h/2"/>
+                                          </p:val>
+                                        </p:tav>
+                                        <p:tav tm="100000">
+                                          <p:val>
+                                            <p:strVal val="#ppt_y"/>
+                                          </p:val>
+                                        </p:tav>
+                                      </p:tavLst>
+                                    </p:anim>
+                                  </p:childTnLst>
+                                </p:cTn>
+                              </p:par>
+                              <p:par>
+                                <p:cTn id="53" presetID="2" presetClass="entr" presetSubtype="4" fill="hold" nodeType="withEffect">
+                                  <p:stCondLst>
+                                    <p:cond delay="0"/>
+                                  </p:stCondLst>
+                                  <p:childTnLst>
+                                    <p:set>
+                                      <p:cBhvr>
+                                        <p:cTn id="54" dur="1" fill="hold">
+                                          <p:stCondLst>
+                                            <p:cond delay="0"/>
+                                          </p:stCondLst>
+                                        </p:cTn>
+                                        <p:tgtEl>
+                                          <p:spTgt spid="6">
+                                            <p:txEl>
+                                              <p:pRg st="12" end="12"/>
+                                            </p:txEl>
+                                          </p:spTgt>
+                                        </p:tgtEl>
+                                        <p:attrNameLst>
+                                          <p:attrName>style.visibility</p:attrName>
+                                        </p:attrNameLst>
+                                      </p:cBhvr>
+                                      <p:to>
+                                        <p:strVal val="visible"/>
+                                      </p:to>
+                                    </p:set>
+                                    <p:anim calcmode="lin" valueType="num">
+                                      <p:cBhvr additive="base">
+                                        <p:cTn id="55" dur="500" fill="hold"/>
+                                        <p:tgtEl>
+                                          <p:spTgt spid="6">
+                                            <p:txEl>
+                                              <p:pRg st="12" end="12"/>
+                                            </p:txEl>
+                                          </p:spTgt>
+                                        </p:tgtEl>
+                                        <p:attrNameLst>
+                                          <p:attrName>ppt_x</p:attrName>
+                                        </p:attrNameLst>
+                                      </p:cBhvr>
+                                      <p:tavLst>
+                                        <p:tav tm="0">
+                                          <p:val>
+                                            <p:strVal val="#ppt_x"/>
+                                          </p:val>
+                                        </p:tav>
+                                        <p:tav tm="100000">
+                                          <p:val>
+                                            <p:strVal val="#ppt_x"/>
+                                          </p:val>
+                                        </p:tav>
+                                      </p:tavLst>
+                                    </p:anim>
+                                    <p:anim calcmode="lin" valueType="num">
+                                      <p:cBhvr additive="base">
+                                        <p:cTn id="56" dur="500" fill="hold"/>
+                                        <p:tgtEl>
+                                          <p:spTgt spid="6">
+                                            <p:txEl>
+                                              <p:pRg st="12" end="12"/>
+                                            </p:txEl>
+                                          </p:spTgt>
+                                        </p:tgtEl>
+                                        <p:attrNameLst>
+                                          <p:attrName>ppt_y</p:attrName>
+                                        </p:attrNameLst>
+                                      </p:cBhvr>
+                                      <p:tavLst>
+                                        <p:tav tm="0">
+                                          <p:val>
+                                            <p:strVal val="1+#ppt_h/2"/>
+                                          </p:val>
+                                        </p:tav>
+                                        <p:tav tm="100000">
+                                          <p:val>
+                                            <p:strVal val="#ppt_y"/>
+                                          </p:val>
+                                        </p:tav>
+                                      </p:tavLst>
+                                    </p:anim>
+                                  </p:childTnLst>
+                                </p:cTn>
+                              </p:par>
+                            </p:childTnLst>
+                          </p:cTn>
+                        </p:par>
+                      </p:childTnLst>
+                    </p:cTn>
+                  </p:par>
+                </p:childTnLst>
+              </p:cTn>
+              <p:prevCondLst>
+                <p:cond evt="onPrev" delay="0">
+                  <p:tgtEl>
+                    <p:sldTgt/>
+                  </p:tgtEl>
+                </p:cond>
+              </p:prevCondLst>
+              <p:nextCondLst>
+                <p:cond evt="onNext" delay="0">
+                  <p:tgtEl>
+                    <p:sldTgt/>
+                  </p:tgtEl>
+                </p:cond>
+              </p:nextCondLst>
+            </p:seq>
+          </p:childTnLst>
+        </p:cTn>
       </p:par>
     </p:tnLst>
   </p:timing>
@@ -5966,10 +7874,7 @@
               <a:rPr lang="fr-FR" u="sng" dirty="0" smtClean="0"/>
               <a:t>USP</a:t>
             </a:r>
-            <a:r>
-              <a:rPr lang="fr-FR" dirty="0" smtClean="0"/>
-              <a:t> :</a:t>
-            </a:r>
+            <a:endParaRPr lang="fr-FR" dirty="0" smtClean="0"/>
           </a:p>
           <a:p>
             <a:endParaRPr lang="fr-FR" u="sng" dirty="0" smtClean="0"/>
@@ -7047,6 +8952,9 @@
                     <p:cTn id="3" fill="hold">
                       <p:stCondLst>
                         <p:cond delay="indefinite"/>
+                        <p:cond evt="onBegin" delay="0">
+                          <p:tn val="2"/>
+                        </p:cond>
                       </p:stCondLst>
                       <p:childTnLst>
                         <p:par>
@@ -7056,7 +8964,7 @@
                             </p:stCondLst>
                             <p:childTnLst>
                               <p:par>
-                                <p:cTn id="5" presetID="37" presetClass="entr" presetSubtype="0" fill="hold" nodeType="clickEffect">
+                                <p:cTn id="5" presetID="2" presetClass="entr" presetSubtype="4" fill="hold" nodeType="withEffect">
                                   <p:stCondLst>
                                     <p:cond delay="0"/>
                                   </p:stCondLst>
@@ -7069,6 +8977,91 @@
                                           </p:stCondLst>
                                         </p:cTn>
                                         <p:tgtEl>
+                                          <p:spTgt spid="3">
+                                            <p:txEl>
+                                              <p:pRg st="4" end="4"/>
+                                            </p:txEl>
+                                          </p:spTgt>
+                                        </p:tgtEl>
+                                        <p:attrNameLst>
+                                          <p:attrName>style.visibility</p:attrName>
+                                        </p:attrNameLst>
+                                      </p:cBhvr>
+                                      <p:to>
+                                        <p:strVal val="visible"/>
+                                      </p:to>
+                                    </p:set>
+                                    <p:anim calcmode="lin" valueType="num">
+                                      <p:cBhvr additive="base">
+                                        <p:cTn id="7" dur="500" fill="hold"/>
+                                        <p:tgtEl>
+                                          <p:spTgt spid="3">
+                                            <p:txEl>
+                                              <p:pRg st="4" end="4"/>
+                                            </p:txEl>
+                                          </p:spTgt>
+                                        </p:tgtEl>
+                                        <p:attrNameLst>
+                                          <p:attrName>ppt_x</p:attrName>
+                                        </p:attrNameLst>
+                                      </p:cBhvr>
+                                      <p:tavLst>
+                                        <p:tav tm="0">
+                                          <p:val>
+                                            <p:strVal val="#ppt_x"/>
+                                          </p:val>
+                                        </p:tav>
+                                        <p:tav tm="100000">
+                                          <p:val>
+                                            <p:strVal val="#ppt_x"/>
+                                          </p:val>
+                                        </p:tav>
+                                      </p:tavLst>
+                                    </p:anim>
+                                    <p:anim calcmode="lin" valueType="num">
+                                      <p:cBhvr additive="base">
+                                        <p:cTn id="8" dur="500" fill="hold"/>
+                                        <p:tgtEl>
+                                          <p:spTgt spid="3">
+                                            <p:txEl>
+                                              <p:pRg st="4" end="4"/>
+                                            </p:txEl>
+                                          </p:spTgt>
+                                        </p:tgtEl>
+                                        <p:attrNameLst>
+                                          <p:attrName>ppt_y</p:attrName>
+                                        </p:attrNameLst>
+                                      </p:cBhvr>
+                                      <p:tavLst>
+                                        <p:tav tm="0">
+                                          <p:val>
+                                            <p:strVal val="1+#ppt_h/2"/>
+                                          </p:val>
+                                        </p:tav>
+                                        <p:tav tm="100000">
+                                          <p:val>
+                                            <p:strVal val="#ppt_y"/>
+                                          </p:val>
+                                        </p:tav>
+                                      </p:tavLst>
+                                    </p:anim>
+                                  </p:childTnLst>
+                                </p:cTn>
+                              </p:par>
+                              <p:par>
+                                <p:cTn id="9" presetID="37" presetClass="entr" presetSubtype="0" fill="hold" nodeType="withEffect">
+                                  <p:stCondLst>
+                                    <p:cond delay="0"/>
+                                  </p:stCondLst>
+                                  <p:childTnLst>
+                                    <p:set>
+                                      <p:cBhvr>
+                                        <p:cTn id="10" dur="1" fill="hold">
+                                          <p:stCondLst>
+                                            <p:cond delay="0"/>
+                                          </p:stCondLst>
+                                        </p:cTn>
+                                        <p:tgtEl>
                                           <p:spTgt spid="7"/>
                                         </p:tgtEl>
                                         <p:attrNameLst>
@@ -7081,7 +9074,7 @@
                                     </p:set>
                                     <p:animEffect transition="in" filter="fade">
                                       <p:cBhvr>
-                                        <p:cTn id="7" dur="500"/>
+                                        <p:cTn id="11" dur="500"/>
                                         <p:tgtEl>
                                           <p:spTgt spid="7"/>
                                         </p:tgtEl>
@@ -7089,7 +9082,7 @@
                                     </p:animEffect>
                                     <p:anim calcmode="lin" valueType="num">
                                       <p:cBhvr>
-                                        <p:cTn id="8" dur="500" fill="hold"/>
+                                        <p:cTn id="12" dur="500" fill="hold"/>
                                         <p:tgtEl>
                                           <p:spTgt spid="7"/>
                                         </p:tgtEl>
@@ -7112,7 +9105,7 @@
                                     </p:anim>
                                     <p:anim calcmode="lin" valueType="num">
                                       <p:cBhvr>
-                                        <p:cTn id="9" dur="450" decel="100000" fill="hold"/>
+                                        <p:cTn id="13" dur="450" decel="100000" fill="hold"/>
                                         <p:tgtEl>
                                           <p:spTgt spid="7"/>
                                         </p:tgtEl>
@@ -7135,7 +9128,7 @@
                                     </p:anim>
                                     <p:anim calcmode="lin" valueType="num">
                                       <p:cBhvr>
-                                        <p:cTn id="10" dur="50" accel="100000" fill="hold">
+                                        <p:cTn id="14" dur="50" accel="100000" fill="hold">
                                           <p:stCondLst>
                                             <p:cond delay="450"/>
                                           </p:stCondLst>
@@ -7164,14 +9157,14 @@
                                 </p:cTn>
                               </p:par>
                               <p:par>
-                                <p:cTn id="11" presetID="37" presetClass="entr" presetSubtype="0" fill="hold" nodeType="withEffect">
+                                <p:cTn id="15" presetID="37" presetClass="entr" presetSubtype="0" fill="hold" nodeType="withEffect">
                                   <p:stCondLst>
                                     <p:cond delay="0"/>
                                   </p:stCondLst>
                                   <p:childTnLst>
                                     <p:set>
                                       <p:cBhvr>
-                                        <p:cTn id="12" dur="1" fill="hold">
+                                        <p:cTn id="16" dur="1" fill="hold">
                                           <p:stCondLst>
                                             <p:cond delay="0"/>
                                           </p:stCondLst>
@@ -7193,7 +9186,7 @@
                                     </p:set>
                                     <p:animEffect transition="in" filter="fade">
                                       <p:cBhvr>
-                                        <p:cTn id="13" dur="500"/>
+                                        <p:cTn id="17" dur="500"/>
                                         <p:tgtEl>
                                           <p:spTgt spid="3">
                                             <p:txEl>
@@ -7205,7 +9198,7 @@
                                     </p:animEffect>
                                     <p:anim calcmode="lin" valueType="num">
                                       <p:cBhvr>
-                                        <p:cTn id="14" dur="500" fill="hold"/>
+                                        <p:cTn id="18" dur="500" fill="hold"/>
                                         <p:tgtEl>
                                           <p:spTgt spid="3">
                                             <p:txEl>
@@ -7232,7 +9225,7 @@
                                     </p:anim>
                                     <p:anim calcmode="lin" valueType="num">
                                       <p:cBhvr>
-                                        <p:cTn id="15" dur="450" decel="100000" fill="hold"/>
+                                        <p:cTn id="19" dur="450" decel="100000" fill="hold"/>
                                         <p:tgtEl>
                                           <p:spTgt spid="3">
                                             <p:txEl>
@@ -7259,7 +9252,7 @@
                                     </p:anim>
                                     <p:anim calcmode="lin" valueType="num">
                                       <p:cBhvr>
-                                        <p:cTn id="16" dur="50" accel="100000" fill="hold">
+                                        <p:cTn id="20" dur="50" accel="100000" fill="hold">
                                           <p:stCondLst>
                                             <p:cond delay="450"/>
                                           </p:stCondLst>
@@ -7279,6 +9272,79 @@
                                         <p:tav tm="0">
                                           <p:val>
                                             <p:strVal val="#ppt_y-.03"/>
+                                          </p:val>
+                                        </p:tav>
+                                        <p:tav tm="100000">
+                                          <p:val>
+                                            <p:strVal val="#ppt_y"/>
+                                          </p:val>
+                                        </p:tav>
+                                      </p:tavLst>
+                                    </p:anim>
+                                  </p:childTnLst>
+                                </p:cTn>
+                              </p:par>
+                              <p:par>
+                                <p:cTn id="21" presetID="2" presetClass="entr" presetSubtype="4" fill="hold" nodeType="withEffect">
+                                  <p:stCondLst>
+                                    <p:cond delay="0"/>
+                                  </p:stCondLst>
+                                  <p:childTnLst>
+                                    <p:set>
+                                      <p:cBhvr>
+                                        <p:cTn id="22" dur="1" fill="hold">
+                                          <p:stCondLst>
+                                            <p:cond delay="0"/>
+                                          </p:stCondLst>
+                                        </p:cTn>
+                                        <p:tgtEl>
+                                          <p:spTgt spid="8"/>
+                                        </p:tgtEl>
+                                        <p:attrNameLst>
+                                          <p:attrName>style.visibility</p:attrName>
+                                        </p:attrNameLst>
+                                      </p:cBhvr>
+                                      <p:to>
+                                        <p:strVal val="visible"/>
+                                      </p:to>
+                                    </p:set>
+                                    <p:anim calcmode="lin" valueType="num">
+                                      <p:cBhvr additive="base">
+                                        <p:cTn id="23" dur="500" fill="hold"/>
+                                        <p:tgtEl>
+                                          <p:spTgt spid="8"/>
+                                        </p:tgtEl>
+                                        <p:attrNameLst>
+                                          <p:attrName>ppt_x</p:attrName>
+                                        </p:attrNameLst>
+                                      </p:cBhvr>
+                                      <p:tavLst>
+                                        <p:tav tm="0">
+                                          <p:val>
+                                            <p:strVal val="#ppt_x"/>
+                                          </p:val>
+                                        </p:tav>
+                                        <p:tav tm="100000">
+                                          <p:val>
+                                            <p:strVal val="#ppt_x"/>
+                                          </p:val>
+                                        </p:tav>
+                                      </p:tavLst>
+                                    </p:anim>
+                                    <p:anim calcmode="lin" valueType="num">
+                                      <p:cBhvr additive="base">
+                                        <p:cTn id="24" dur="500" fill="hold"/>
+                                        <p:tgtEl>
+                                          <p:spTgt spid="8"/>
+                                        </p:tgtEl>
+                                        <p:attrNameLst>
+                                          <p:attrName>ppt_y</p:attrName>
+                                        </p:attrNameLst>
+                                      </p:cBhvr>
+                                      <p:tavLst>
+                                        <p:tav tm="0">
+                                          <p:val>
+                                            <p:strVal val="1+#ppt_h/2"/>
                                           </p:val>
                                         </p:tav>
                                         <p:tav tm="100000">
@@ -7298,26 +9364,26 @@
                     </p:cTn>
                   </p:par>
                   <p:par>
-                    <p:cTn id="17" fill="hold">
+                    <p:cTn id="25" fill="hold">
                       <p:stCondLst>
                         <p:cond delay="indefinite"/>
                       </p:stCondLst>
                       <p:childTnLst>
                         <p:par>
-                          <p:cTn id="18" fill="hold">
+                          <p:cTn id="26" fill="hold">
                             <p:stCondLst>
                               <p:cond delay="0"/>
                             </p:stCondLst>
                             <p:childTnLst>
                               <p:par>
-                                <p:cTn id="19" presetID="37" presetClass="entr" presetSubtype="0" fill="hold" nodeType="clickEffect">
+                                <p:cTn id="27" presetID="37" presetClass="entr" presetSubtype="0" fill="hold" nodeType="clickEffect">
                                   <p:stCondLst>
                                     <p:cond delay="0"/>
                                   </p:stCondLst>
                                   <p:childTnLst>
                                     <p:set>
                                       <p:cBhvr>
-                                        <p:cTn id="20" dur="1" fill="hold">
+                                        <p:cTn id="28" dur="1" fill="hold">
                                           <p:stCondLst>
                                             <p:cond delay="0"/>
                                           </p:stCondLst>
@@ -7339,7 +9405,7 @@
                                     </p:set>
                                     <p:animEffect transition="in" filter="fade">
                                       <p:cBhvr>
-                                        <p:cTn id="21" dur="500"/>
+                                        <p:cTn id="29" dur="500"/>
                                         <p:tgtEl>
                                           <p:spTgt spid="3">
                                             <p:txEl>
@@ -7351,7 +9417,7 @@
                                     </p:animEffect>
                                     <p:anim calcmode="lin" valueType="num">
                                       <p:cBhvr>
-                                        <p:cTn id="22" dur="500" fill="hold"/>
+                                        <p:cTn id="30" dur="500" fill="hold"/>
                                         <p:tgtEl>
                                           <p:spTgt spid="3">
                                             <p:txEl>
@@ -7378,7 +9444,7 @@
                                     </p:anim>
                                     <p:anim calcmode="lin" valueType="num">
                                       <p:cBhvr>
-                                        <p:cTn id="23" dur="450" decel="100000" fill="hold"/>
+                                        <p:cTn id="31" dur="450" decel="100000" fill="hold"/>
                                         <p:tgtEl>
                                           <p:spTgt spid="3">
                                             <p:txEl>
@@ -7405,7 +9471,7 @@
                                     </p:anim>
                                     <p:anim calcmode="lin" valueType="num">
                                       <p:cBhvr>
-                                        <p:cTn id="24" dur="50" accel="100000" fill="hold">
+                                        <p:cTn id="32" dur="50" accel="100000" fill="hold">
                                           <p:stCondLst>
                                             <p:cond delay="450"/>
                                           </p:stCondLst>
@@ -7438,14 +9504,14 @@
                                 </p:cTn>
                               </p:par>
                               <p:par>
-                                <p:cTn id="25" presetID="37" presetClass="entr" presetSubtype="0" fill="hold" nodeType="withEffect">
+                                <p:cTn id="33" presetID="37" presetClass="entr" presetSubtype="0" fill="hold" nodeType="withEffect">
                                   <p:stCondLst>
                                     <p:cond delay="0"/>
                                   </p:stCondLst>
                                   <p:childTnLst>
                                     <p:set>
                                       <p:cBhvr>
-                                        <p:cTn id="26" dur="1" fill="hold">
+                                        <p:cTn id="34" dur="1" fill="hold">
                                           <p:stCondLst>
                                             <p:cond delay="0"/>
                                           </p:stCondLst>
@@ -7467,7 +9533,7 @@
                                     </p:set>
                                     <p:animEffect transition="in" filter="fade">
                                       <p:cBhvr>
-                                        <p:cTn id="27" dur="500"/>
+                                        <p:cTn id="35" dur="500"/>
                                         <p:tgtEl>
                                           <p:spTgt spid="3">
                                             <p:txEl>
@@ -7479,7 +9545,7 @@
                                     </p:animEffect>
                                     <p:anim calcmode="lin" valueType="num">
                                       <p:cBhvr>
-                                        <p:cTn id="28" dur="500" fill="hold"/>
+                                        <p:cTn id="36" dur="500" fill="hold"/>
                                         <p:tgtEl>
                                           <p:spTgt spid="3">
                                             <p:txEl>
@@ -7506,7 +9572,7 @@
                                     </p:anim>
                                     <p:anim calcmode="lin" valueType="num">
                                       <p:cBhvr>
-                                        <p:cTn id="29" dur="450" decel="100000" fill="hold"/>
+                                        <p:cTn id="37" dur="450" decel="100000" fill="hold"/>
                                         <p:tgtEl>
                                           <p:spTgt spid="3">
                                             <p:txEl>
@@ -7533,7 +9599,7 @@
                                     </p:anim>
                                     <p:anim calcmode="lin" valueType="num">
                                       <p:cBhvr>
-                                        <p:cTn id="30" dur="50" accel="100000" fill="hold">
+                                        <p:cTn id="38" dur="50" accel="100000" fill="hold">
                                           <p:stCondLst>
                                             <p:cond delay="450"/>
                                           </p:stCondLst>
@@ -7700,7 +9766,15 @@
           <a:p>
             <a:r>
               <a:rPr lang="fr-FR" dirty="0" smtClean="0"/>
-              <a:t>Histoire &amp; univers</a:t>
+              <a:t>Histoire &amp; </a:t>
+            </a:r>
+            <a:r>
+              <a:rPr lang="fr-FR" dirty="0" smtClean="0"/>
+              <a:t>a</a:t>
+            </a:r>
+            <a:r>
+              <a:rPr lang="en-US" dirty="0" err="1" smtClean="0"/>
+              <a:t>mbiance</a:t>
             </a:r>
             <a:endParaRPr lang="fr-FR" dirty="0"/>
           </a:p>
@@ -7754,7 +9828,7 @@
           <a:p>
             <a:r>
               <a:rPr lang="fr-FR" dirty="0" smtClean="0"/>
-              <a:t>- Plusieurs niveaux :</a:t>
+              <a:t>- Plusieurs niveaux</a:t>
             </a:r>
             <a:endParaRPr lang="fr-FR" dirty="0" smtClean="0"/>
           </a:p>
@@ -7859,7 +9933,7 @@
         </p:blipFill>
         <p:spPr>
           <a:xfrm>
-            <a:off x="1714480" y="2928934"/>
+            <a:off x="1571604" y="2928934"/>
             <a:ext cx="5429288" cy="3332382"/>
           </a:xfrm>
           <a:prstGeom prst="rect">
@@ -7893,7 +9967,7 @@
                             </p:stCondLst>
                             <p:childTnLst>
                               <p:par>
-                                <p:cTn id="5" presetID="37" presetClass="entr" presetSubtype="0" fill="hold" grpId="0" nodeType="clickEffect">
+                                <p:cTn id="5" presetID="2" presetClass="entr" presetSubtype="4" fill="hold" nodeType="clickEffect">
                                   <p:stCondLst>
                                     <p:cond delay="0"/>
                                   </p:stCondLst>
@@ -7908,7 +9982,7 @@
                                         <p:tgtEl>
                                           <p:spTgt spid="3">
                                             <p:txEl>
-                                              <p:pRg st="3" end="3"/>
+                                              <p:pRg st="4" end="4"/>
                                             </p:txEl>
                                           </p:spTgt>
                                         </p:tgtEl>
@@ -7920,25 +9994,13 @@
                                         <p:strVal val="visible"/>
                                       </p:to>
                                     </p:set>
-                                    <p:animEffect transition="in" filter="fade">
-                                      <p:cBhvr>
-                                        <p:cTn id="7" dur="500"/>
+                                    <p:anim calcmode="lin" valueType="num">
+                                      <p:cBhvr additive="base">
+                                        <p:cTn id="7" dur="500" fill="hold"/>
                                         <p:tgtEl>
                                           <p:spTgt spid="3">
                                             <p:txEl>
-                                              <p:pRg st="3" end="3"/>
-                                            </p:txEl>
-                                          </p:spTgt>
-                                        </p:tgtEl>
-                                      </p:cBhvr>
-                                    </p:animEffect>
-                                    <p:anim calcmode="lin" valueType="num">
-                                      <p:cBhvr>
-                                        <p:cTn id="8" dur="500" fill="hold"/>
-                                        <p:tgtEl>
-                                          <p:spTgt spid="3">
-                                            <p:txEl>
-                                              <p:pRg st="3" end="3"/>
+                                              <p:pRg st="4" end="4"/>
                                             </p:txEl>
                                           </p:spTgt>
                                         </p:tgtEl>
@@ -7960,12 +10022,12 @@
                                       </p:tavLst>
                                     </p:anim>
                                     <p:anim calcmode="lin" valueType="num">
-                                      <p:cBhvr>
-                                        <p:cTn id="9" dur="450" decel="100000" fill="hold"/>
+                                      <p:cBhvr additive="base">
+                                        <p:cTn id="8" dur="500" fill="hold"/>
                                         <p:tgtEl>
                                           <p:spTgt spid="3">
                                             <p:txEl>
-                                              <p:pRg st="3" end="3"/>
+                                              <p:pRg st="4" end="4"/>
                                             </p:txEl>
                                           </p:spTgt>
                                         </p:tgtEl>
@@ -7976,38 +10038,7 @@
                                       <p:tavLst>
                                         <p:tav tm="0">
                                           <p:val>
-                                            <p:strVal val="#ppt_y+1"/>
-                                          </p:val>
-                                        </p:tav>
-                                        <p:tav tm="100000">
-                                          <p:val>
-                                            <p:strVal val="#ppt_y-.03"/>
-                                          </p:val>
-                                        </p:tav>
-                                      </p:tavLst>
-                                    </p:anim>
-                                    <p:anim calcmode="lin" valueType="num">
-                                      <p:cBhvr>
-                                        <p:cTn id="10" dur="50" accel="100000" fill="hold">
-                                          <p:stCondLst>
-                                            <p:cond delay="450"/>
-                                          </p:stCondLst>
-                                        </p:cTn>
-                                        <p:tgtEl>
-                                          <p:spTgt spid="3">
-                                            <p:txEl>
-                                              <p:pRg st="3" end="3"/>
-                                            </p:txEl>
-                                          </p:spTgt>
-                                        </p:tgtEl>
-                                        <p:attrNameLst>
-                                          <p:attrName>ppt_y</p:attrName>
-                                        </p:attrNameLst>
-                                      </p:cBhvr>
-                                      <p:tavLst>
-                                        <p:tav tm="0">
-                                          <p:val>
-                                            <p:strVal val="#ppt_y-.03"/>
+                                            <p:strVal val="1+#ppt_h/2"/>
                                           </p:val>
                                         </p:tav>
                                         <p:tav tm="100000">
@@ -8021,16 +10052,62 @@
                                 </p:cTn>
                               </p:par>
                               <p:par>
-                                <p:cTn id="11" presetID="37" presetClass="entr" presetSubtype="0" fill="hold" nodeType="withEffect">
+                                <p:cTn id="9" presetID="2" presetClass="exit" presetSubtype="4" fill="hold" nodeType="withEffect">
                                   <p:stCondLst>
                                     <p:cond delay="0"/>
                                   </p:stCondLst>
                                   <p:childTnLst>
+                                    <p:anim calcmode="lin" valueType="num">
+                                      <p:cBhvr additive="base">
+                                        <p:cTn id="10" dur="500"/>
+                                        <p:tgtEl>
+                                          <p:spTgt spid="7"/>
+                                        </p:tgtEl>
+                                        <p:attrNameLst>
+                                          <p:attrName>ppt_x</p:attrName>
+                                        </p:attrNameLst>
+                                      </p:cBhvr>
+                                      <p:tavLst>
+                                        <p:tav tm="0">
+                                          <p:val>
+                                            <p:strVal val="ppt_x"/>
+                                          </p:val>
+                                        </p:tav>
+                                        <p:tav tm="100000">
+                                          <p:val>
+                                            <p:strVal val="ppt_x"/>
+                                          </p:val>
+                                        </p:tav>
+                                      </p:tavLst>
+                                    </p:anim>
+                                    <p:anim calcmode="lin" valueType="num">
+                                      <p:cBhvr additive="base">
+                                        <p:cTn id="11" dur="500"/>
+                                        <p:tgtEl>
+                                          <p:spTgt spid="7"/>
+                                        </p:tgtEl>
+                                        <p:attrNameLst>
+                                          <p:attrName>ppt_y</p:attrName>
+                                        </p:attrNameLst>
+                                      </p:cBhvr>
+                                      <p:tavLst>
+                                        <p:tav tm="0">
+                                          <p:val>
+                                            <p:strVal val="ppt_y"/>
+                                          </p:val>
+                                        </p:tav>
+                                        <p:tav tm="100000">
+                                          <p:val>
+                                            <p:strVal val="1+ppt_h/2"/>
+                                          </p:val>
+                                        </p:tav>
+                                      </p:tavLst>
+                                    </p:anim>
                                     <p:set>
                                       <p:cBhvr>
                                         <p:cTn id="12" dur="1" fill="hold">
                                           <p:stCondLst>
-                                            <p:cond delay="0"/>
+                                            <p:cond delay="499"/>
                                           </p:stCondLst>
                                         </p:cTn>
                                         <p:tgtEl>
@@ -8041,90 +10118,9 @@
                                         </p:attrNameLst>
                                       </p:cBhvr>
                                       <p:to>
-                                        <p:strVal val="visible"/>
+                                        <p:strVal val="hidden"/>
                                       </p:to>
                                     </p:set>
-                                    <p:animEffect transition="in" filter="fade">
-                                      <p:cBhvr>
-                                        <p:cTn id="13" dur="500"/>
-                                        <p:tgtEl>
-                                          <p:spTgt spid="7"/>
-                                        </p:tgtEl>
-                                      </p:cBhvr>
-                                    </p:animEffect>
-                                    <p:anim calcmode="lin" valueType="num">
-                                      <p:cBhvr>
-                                        <p:cTn id="14" dur="500" fill="hold"/>
-                                        <p:tgtEl>
-                                          <p:spTgt spid="7"/>
-                                        </p:tgtEl>
-                                        <p:attrNameLst>
-                                          <p:attrName>ppt_x</p:attrName>
-                                        </p:attrNameLst>
-                                      </p:cBhvr>
-                                      <p:tavLst>
-                                        <p:tav tm="0">
-                                          <p:val>
-                                            <p:strVal val="#ppt_x"/>
-                                          </p:val>
-                                        </p:tav>
-                                        <p:tav tm="100000">
-                                          <p:val>
-                                            <p:strVal val="#ppt_x"/>
-                                          </p:val>
-                                        </p:tav>
-                                      </p:tavLst>
-                                    </p:anim>
-                                    <p:anim calcmode="lin" valueType="num">
-                                      <p:cBhvr>
-                                        <p:cTn id="15" dur="450" decel="100000" fill="hold"/>
-                                        <p:tgtEl>
-                                          <p:spTgt spid="7"/>
-                                        </p:tgtEl>
-                                        <p:attrNameLst>
-                                          <p:attrName>ppt_y</p:attrName>
-                                        </p:attrNameLst>
-                                      </p:cBhvr>
-                                      <p:tavLst>
-                                        <p:tav tm="0">
-                                          <p:val>
-                                            <p:strVal val="#ppt_y+1"/>
-                                          </p:val>
-                                        </p:tav>
-                                        <p:tav tm="100000">
-                                          <p:val>
-                                            <p:strVal val="#ppt_y-.03"/>
-                                          </p:val>
-                                        </p:tav>
-                                      </p:tavLst>
-                                    </p:anim>
-                                    <p:anim calcmode="lin" valueType="num">
-                                      <p:cBhvr>
-                                        <p:cTn id="16" dur="50" accel="100000" fill="hold">
-                                          <p:stCondLst>
-                                            <p:cond delay="450"/>
-                                          </p:stCondLst>
-                                        </p:cTn>
-                                        <p:tgtEl>
-                                          <p:spTgt spid="7"/>
-                                        </p:tgtEl>
-                                        <p:attrNameLst>
-                                          <p:attrName>ppt_y</p:attrName>
-                                        </p:attrNameLst>
-                                      </p:cBhvr>
-                                      <p:tavLst>
-                                        <p:tav tm="0">
-                                          <p:val>
-                                            <p:strVal val="#ppt_y-.03"/>
-                                          </p:val>
-                                        </p:tav>
-                                        <p:tav tm="100000">
-                                          <p:val>
-                                            <p:strVal val="#ppt_y"/>
-                                          </p:val>
-                                        </p:tav>
-                                      </p:tavLst>
-                                    </p:anim>
                                   </p:childTnLst>
                                 </p:cTn>
                               </p:par>
@@ -8135,19 +10131,104 @@
                     </p:cTn>
                   </p:par>
                   <p:par>
-                    <p:cTn id="17" fill="hold">
+                    <p:cTn id="13" fill="hold">
                       <p:stCondLst>
                         <p:cond delay="indefinite"/>
                       </p:stCondLst>
                       <p:childTnLst>
                         <p:par>
-                          <p:cTn id="18" fill="hold">
+                          <p:cTn id="14" fill="hold">
                             <p:stCondLst>
                               <p:cond delay="0"/>
                             </p:stCondLst>
                             <p:childTnLst>
                               <p:par>
-                                <p:cTn id="19" presetID="37" presetClass="entr" presetSubtype="0" fill="hold" grpId="0" nodeType="clickEffect">
+                                <p:cTn id="15" presetID="2" presetClass="entr" presetSubtype="4" fill="hold" nodeType="clickEffect">
+                                  <p:stCondLst>
+                                    <p:cond delay="0"/>
+                                  </p:stCondLst>
+                                  <p:childTnLst>
+                                    <p:set>
+                                      <p:cBhvr>
+                                        <p:cTn id="16" dur="1" fill="hold">
+                                          <p:stCondLst>
+                                            <p:cond delay="0"/>
+                                          </p:stCondLst>
+                                        </p:cTn>
+                                        <p:tgtEl>
+                                          <p:spTgt spid="3">
+                                            <p:txEl>
+                                              <p:pRg st="6" end="6"/>
+                                            </p:txEl>
+                                          </p:spTgt>
+                                        </p:tgtEl>
+                                        <p:attrNameLst>
+                                          <p:attrName>style.visibility</p:attrName>
+                                        </p:attrNameLst>
+                                      </p:cBhvr>
+                                      <p:to>
+                                        <p:strVal val="visible"/>
+                                      </p:to>
+                                    </p:set>
+                                    <p:anim calcmode="lin" valueType="num">
+                                      <p:cBhvr additive="base">
+                                        <p:cTn id="17" dur="500" fill="hold"/>
+                                        <p:tgtEl>
+                                          <p:spTgt spid="3">
+                                            <p:txEl>
+                                              <p:pRg st="6" end="6"/>
+                                            </p:txEl>
+                                          </p:spTgt>
+                                        </p:tgtEl>
+                                        <p:attrNameLst>
+                                          <p:attrName>ppt_x</p:attrName>
+                                        </p:attrNameLst>
+                                      </p:cBhvr>
+                                      <p:tavLst>
+                                        <p:tav tm="0">
+                                          <p:val>
+                                            <p:strVal val="#ppt_x"/>
+                                          </p:val>
+                                        </p:tav>
+                                        <p:tav tm="100000">
+                                          <p:val>
+                                            <p:strVal val="#ppt_x"/>
+                                          </p:val>
+                                        </p:tav>
+                                      </p:tavLst>
+                                    </p:anim>
+                                    <p:anim calcmode="lin" valueType="num">
+                                      <p:cBhvr additive="base">
+                                        <p:cTn id="18" dur="500" fill="hold"/>
+                                        <p:tgtEl>
+                                          <p:spTgt spid="3">
+                                            <p:txEl>
+                                              <p:pRg st="6" end="6"/>
+                                            </p:txEl>
+                                          </p:spTgt>
+                                        </p:tgtEl>
+                                        <p:attrNameLst>
+                                          <p:attrName>ppt_y</p:attrName>
+                                        </p:attrNameLst>
+                                      </p:cBhvr>
+                                      <p:tavLst>
+                                        <p:tav tm="0">
+                                          <p:val>
+                                            <p:strVal val="1+#ppt_h/2"/>
+                                          </p:val>
+                                        </p:tav>
+                                        <p:tav tm="100000">
+                                          <p:val>
+                                            <p:strVal val="#ppt_y"/>
+                                          </p:val>
+                                        </p:tav>
+                                      </p:tavLst>
+                                    </p:anim>
+                                  </p:childTnLst>
+                                </p:cTn>
+                              </p:par>
+                              <p:par>
+                                <p:cTn id="19" presetID="2" presetClass="entr" presetSubtype="4" fill="hold" nodeType="withEffect">
                                   <p:stCondLst>
                                     <p:cond delay="0"/>
                                   </p:stCondLst>
@@ -8162,7 +10243,7 @@
                                         <p:tgtEl>
                                           <p:spTgt spid="3">
                                             <p:txEl>
-                                              <p:pRg st="4" end="4"/>
+                                              <p:pRg st="8" end="8"/>
                                             </p:txEl>
                                           </p:spTgt>
                                         </p:tgtEl>
@@ -8174,25 +10255,13 @@
                                         <p:strVal val="visible"/>
                                       </p:to>
                                     </p:set>
-                                    <p:animEffect transition="in" filter="fade">
-                                      <p:cBhvr>
-                                        <p:cTn id="21" dur="500"/>
+                                    <p:anim calcmode="lin" valueType="num">
+                                      <p:cBhvr additive="base">
+                                        <p:cTn id="21" dur="500" fill="hold"/>
                                         <p:tgtEl>
                                           <p:spTgt spid="3">
                                             <p:txEl>
-                                              <p:pRg st="4" end="4"/>
-                                            </p:txEl>
-                                          </p:spTgt>
-                                        </p:tgtEl>
-                                      </p:cBhvr>
-                                    </p:animEffect>
-                                    <p:anim calcmode="lin" valueType="num">
-                                      <p:cBhvr>
-                                        <p:cTn id="22" dur="500" fill="hold"/>
-                                        <p:tgtEl>
-                                          <p:spTgt spid="3">
-                                            <p:txEl>
-                                              <p:pRg st="4" end="4"/>
+                                              <p:pRg st="8" end="8"/>
                                             </p:txEl>
                                           </p:spTgt>
                                         </p:tgtEl>
@@ -8214,12 +10283,12 @@
                                       </p:tavLst>
                                     </p:anim>
                                     <p:anim calcmode="lin" valueType="num">
-                                      <p:cBhvr>
-                                        <p:cTn id="23" dur="450" decel="100000" fill="hold"/>
+                                      <p:cBhvr additive="base">
+                                        <p:cTn id="22" dur="500" fill="hold"/>
                                         <p:tgtEl>
                                           <p:spTgt spid="3">
                                             <p:txEl>
-                                              <p:pRg st="4" end="4"/>
+                                              <p:pRg st="8" end="8"/>
                                             </p:txEl>
                                           </p:spTgt>
                                         </p:tgtEl>
@@ -8230,38 +10299,7 @@
                                       <p:tavLst>
                                         <p:tav tm="0">
                                           <p:val>
-                                            <p:strVal val="#ppt_y+1"/>
-                                          </p:val>
-                                        </p:tav>
-                                        <p:tav tm="100000">
-                                          <p:val>
-                                            <p:strVal val="#ppt_y-.03"/>
-                                          </p:val>
-                                        </p:tav>
-                                      </p:tavLst>
-                                    </p:anim>
-                                    <p:anim calcmode="lin" valueType="num">
-                                      <p:cBhvr>
-                                        <p:cTn id="24" dur="50" accel="100000" fill="hold">
-                                          <p:stCondLst>
-                                            <p:cond delay="450"/>
-                                          </p:stCondLst>
-                                        </p:cTn>
-                                        <p:tgtEl>
-                                          <p:spTgt spid="3">
-                                            <p:txEl>
-                                              <p:pRg st="4" end="4"/>
-                                            </p:txEl>
-                                          </p:spTgt>
-                                        </p:tgtEl>
-                                        <p:attrNameLst>
-                                          <p:attrName>ppt_y</p:attrName>
-                                        </p:attrNameLst>
-                                      </p:cBhvr>
-                                      <p:tavLst>
-                                        <p:tav tm="0">
-                                          <p:val>
-                                            <p:strVal val="#ppt_y-.03"/>
+                                            <p:strVal val="1+#ppt_h/2"/>
                                           </p:val>
                                         </p:tav>
                                         <p:tav tm="100000">
@@ -8274,325 +10312,15 @@
                                   </p:childTnLst>
                                 </p:cTn>
                               </p:par>
-                            </p:childTnLst>
-                          </p:cTn>
-                        </p:par>
-                      </p:childTnLst>
-                    </p:cTn>
-                  </p:par>
-                  <p:par>
-                    <p:cTn id="25" fill="hold">
-                      <p:stCondLst>
-                        <p:cond delay="indefinite"/>
-                      </p:stCondLst>
-                      <p:childTnLst>
-                        <p:par>
-                          <p:cTn id="26" fill="hold">
-                            <p:stCondLst>
-                              <p:cond delay="0"/>
-                            </p:stCondLst>
-                            <p:childTnLst>
                               <p:par>
-                                <p:cTn id="27" presetID="37" presetClass="entr" presetSubtype="0" fill="hold" grpId="0" nodeType="clickEffect">
+                                <p:cTn id="23" presetID="2" presetClass="entr" presetSubtype="4" fill="hold" nodeType="withEffect">
                                   <p:stCondLst>
                                     <p:cond delay="0"/>
                                   </p:stCondLst>
                                   <p:childTnLst>
                                     <p:set>
                                       <p:cBhvr>
-                                        <p:cTn id="28" dur="1" fill="hold">
-                                          <p:stCondLst>
-                                            <p:cond delay="0"/>
-                                          </p:stCondLst>
-                                        </p:cTn>
-                                        <p:tgtEl>
-                                          <p:spTgt spid="3">
-                                            <p:txEl>
-                                              <p:pRg st="6" end="6"/>
-                                            </p:txEl>
-                                          </p:spTgt>
-                                        </p:tgtEl>
-                                        <p:attrNameLst>
-                                          <p:attrName>style.visibility</p:attrName>
-                                        </p:attrNameLst>
-                                      </p:cBhvr>
-                                      <p:to>
-                                        <p:strVal val="visible"/>
-                                      </p:to>
-                                    </p:set>
-                                    <p:animEffect transition="in" filter="fade">
-                                      <p:cBhvr>
-                                        <p:cTn id="29" dur="500"/>
-                                        <p:tgtEl>
-                                          <p:spTgt spid="3">
-                                            <p:txEl>
-                                              <p:pRg st="6" end="6"/>
-                                            </p:txEl>
-                                          </p:spTgt>
-                                        </p:tgtEl>
-                                      </p:cBhvr>
-                                    </p:animEffect>
-                                    <p:anim calcmode="lin" valueType="num">
-                                      <p:cBhvr>
-                                        <p:cTn id="30" dur="500" fill="hold"/>
-                                        <p:tgtEl>
-                                          <p:spTgt spid="3">
-                                            <p:txEl>
-                                              <p:pRg st="6" end="6"/>
-                                            </p:txEl>
-                                          </p:spTgt>
-                                        </p:tgtEl>
-                                        <p:attrNameLst>
-                                          <p:attrName>ppt_x</p:attrName>
-                                        </p:attrNameLst>
-                                      </p:cBhvr>
-                                      <p:tavLst>
-                                        <p:tav tm="0">
-                                          <p:val>
-                                            <p:strVal val="#ppt_x"/>
-                                          </p:val>
-                                        </p:tav>
-                                        <p:tav tm="100000">
-                                          <p:val>
-                                            <p:strVal val="#ppt_x"/>
-                                          </p:val>
-                                        </p:tav>
-                                      </p:tavLst>
-                                    </p:anim>
-                                    <p:anim calcmode="lin" valueType="num">
-                                      <p:cBhvr>
-                                        <p:cTn id="31" dur="450" decel="100000" fill="hold"/>
-                                        <p:tgtEl>
-                                          <p:spTgt spid="3">
-                                            <p:txEl>
-                                              <p:pRg st="6" end="6"/>
-                                            </p:txEl>
-                                          </p:spTgt>
-                                        </p:tgtEl>
-                                        <p:attrNameLst>
-                                          <p:attrName>ppt_y</p:attrName>
-                                        </p:attrNameLst>
-                                      </p:cBhvr>
-                                      <p:tavLst>
-                                        <p:tav tm="0">
-                                          <p:val>
-                                            <p:strVal val="#ppt_y+1"/>
-                                          </p:val>
-                                        </p:tav>
-                                        <p:tav tm="100000">
-                                          <p:val>
-                                            <p:strVal val="#ppt_y-.03"/>
-                                          </p:val>
-                                        </p:tav>
-                                      </p:tavLst>
-                                    </p:anim>
-                                    <p:anim calcmode="lin" valueType="num">
-                                      <p:cBhvr>
-                                        <p:cTn id="32" dur="50" accel="100000" fill="hold">
-                                          <p:stCondLst>
-                                            <p:cond delay="450"/>
-                                          </p:stCondLst>
-                                        </p:cTn>
-                                        <p:tgtEl>
-                                          <p:spTgt spid="3">
-                                            <p:txEl>
-                                              <p:pRg st="6" end="6"/>
-                                            </p:txEl>
-                                          </p:spTgt>
-                                        </p:tgtEl>
-                                        <p:attrNameLst>
-                                          <p:attrName>ppt_y</p:attrName>
-                                        </p:attrNameLst>
-                                      </p:cBhvr>
-                                      <p:tavLst>
-                                        <p:tav tm="0">
-                                          <p:val>
-                                            <p:strVal val="#ppt_y-.03"/>
-                                          </p:val>
-                                        </p:tav>
-                                        <p:tav tm="100000">
-                                          <p:val>
-                                            <p:strVal val="#ppt_y"/>
-                                          </p:val>
-                                        </p:tav>
-                                      </p:tavLst>
-                                    </p:anim>
-                                  </p:childTnLst>
-                                </p:cTn>
-                              </p:par>
-                            </p:childTnLst>
-                          </p:cTn>
-                        </p:par>
-                      </p:childTnLst>
-                    </p:cTn>
-                  </p:par>
-                  <p:par>
-                    <p:cTn id="33" fill="hold">
-                      <p:stCondLst>
-                        <p:cond delay="indefinite"/>
-                      </p:stCondLst>
-                      <p:childTnLst>
-                        <p:par>
-                          <p:cTn id="34" fill="hold">
-                            <p:stCondLst>
-                              <p:cond delay="0"/>
-                            </p:stCondLst>
-                            <p:childTnLst>
-                              <p:par>
-                                <p:cTn id="35" presetID="37" presetClass="entr" presetSubtype="0" fill="hold" grpId="0" nodeType="clickEffect">
-                                  <p:stCondLst>
-                                    <p:cond delay="0"/>
-                                  </p:stCondLst>
-                                  <p:childTnLst>
-                                    <p:set>
-                                      <p:cBhvr>
-                                        <p:cTn id="36" dur="1" fill="hold">
-                                          <p:stCondLst>
-                                            <p:cond delay="0"/>
-                                          </p:stCondLst>
-                                        </p:cTn>
-                                        <p:tgtEl>
-                                          <p:spTgt spid="3">
-                                            <p:txEl>
-                                              <p:pRg st="8" end="8"/>
-                                            </p:txEl>
-                                          </p:spTgt>
-                                        </p:tgtEl>
-                                        <p:attrNameLst>
-                                          <p:attrName>style.visibility</p:attrName>
-                                        </p:attrNameLst>
-                                      </p:cBhvr>
-                                      <p:to>
-                                        <p:strVal val="visible"/>
-                                      </p:to>
-                                    </p:set>
-                                    <p:animEffect transition="in" filter="fade">
-                                      <p:cBhvr>
-                                        <p:cTn id="37" dur="500"/>
-                                        <p:tgtEl>
-                                          <p:spTgt spid="3">
-                                            <p:txEl>
-                                              <p:pRg st="8" end="8"/>
-                                            </p:txEl>
-                                          </p:spTgt>
-                                        </p:tgtEl>
-                                      </p:cBhvr>
-                                    </p:animEffect>
-                                    <p:anim calcmode="lin" valueType="num">
-                                      <p:cBhvr>
-                                        <p:cTn id="38" dur="500" fill="hold"/>
-                                        <p:tgtEl>
-                                          <p:spTgt spid="3">
-                                            <p:txEl>
-                                              <p:pRg st="8" end="8"/>
-                                            </p:txEl>
-                                          </p:spTgt>
-                                        </p:tgtEl>
-                                        <p:attrNameLst>
-                                          <p:attrName>ppt_x</p:attrName>
-                                        </p:attrNameLst>
-                                      </p:cBhvr>
-                                      <p:tavLst>
-                                        <p:tav tm="0">
-                                          <p:val>
-                                            <p:strVal val="#ppt_x"/>
-                                          </p:val>
-                                        </p:tav>
-                                        <p:tav tm="100000">
-                                          <p:val>
-                                            <p:strVal val="#ppt_x"/>
-                                          </p:val>
-                                        </p:tav>
-                                      </p:tavLst>
-                                    </p:anim>
-                                    <p:anim calcmode="lin" valueType="num">
-                                      <p:cBhvr>
-                                        <p:cTn id="39" dur="450" decel="100000" fill="hold"/>
-                                        <p:tgtEl>
-                                          <p:spTgt spid="3">
-                                            <p:txEl>
-                                              <p:pRg st="8" end="8"/>
-                                            </p:txEl>
-                                          </p:spTgt>
-                                        </p:tgtEl>
-                                        <p:attrNameLst>
-                                          <p:attrName>ppt_y</p:attrName>
-                                        </p:attrNameLst>
-                                      </p:cBhvr>
-                                      <p:tavLst>
-                                        <p:tav tm="0">
-                                          <p:val>
-                                            <p:strVal val="#ppt_y+1"/>
-                                          </p:val>
-                                        </p:tav>
-                                        <p:tav tm="100000">
-                                          <p:val>
-                                            <p:strVal val="#ppt_y-.03"/>
-                                          </p:val>
-                                        </p:tav>
-                                      </p:tavLst>
-                                    </p:anim>
-                                    <p:anim calcmode="lin" valueType="num">
-                                      <p:cBhvr>
-                                        <p:cTn id="40" dur="50" accel="100000" fill="hold">
-                                          <p:stCondLst>
-                                            <p:cond delay="450"/>
-                                          </p:stCondLst>
-                                        </p:cTn>
-                                        <p:tgtEl>
-                                          <p:spTgt spid="3">
-                                            <p:txEl>
-                                              <p:pRg st="8" end="8"/>
-                                            </p:txEl>
-                                          </p:spTgt>
-                                        </p:tgtEl>
-                                        <p:attrNameLst>
-                                          <p:attrName>ppt_y</p:attrName>
-                                        </p:attrNameLst>
-                                      </p:cBhvr>
-                                      <p:tavLst>
-                                        <p:tav tm="0">
-                                          <p:val>
-                                            <p:strVal val="#ppt_y-.03"/>
-                                          </p:val>
-                                        </p:tav>
-                                        <p:tav tm="100000">
-                                          <p:val>
-                                            <p:strVal val="#ppt_y"/>
-                                          </p:val>
-                                        </p:tav>
-                                      </p:tavLst>
-                                    </p:anim>
-                                  </p:childTnLst>
-                                </p:cTn>
-                              </p:par>
-                            </p:childTnLst>
-                          </p:cTn>
-                        </p:par>
-                      </p:childTnLst>
-                    </p:cTn>
-                  </p:par>
-                  <p:par>
-                    <p:cTn id="41" fill="hold">
-                      <p:stCondLst>
-                        <p:cond delay="indefinite"/>
-                      </p:stCondLst>
-                      <p:childTnLst>
-                        <p:par>
-                          <p:cTn id="42" fill="hold">
-                            <p:stCondLst>
-                              <p:cond delay="0"/>
-                            </p:stCondLst>
-                            <p:childTnLst>
-                              <p:par>
-                                <p:cTn id="43" presetID="37" presetClass="entr" presetSubtype="0" fill="hold" grpId="0" nodeType="clickEffect">
-                                  <p:stCondLst>
-                                    <p:cond delay="0"/>
-                                  </p:stCondLst>
-                                  <p:childTnLst>
-                                    <p:set>
-                                      <p:cBhvr>
-                                        <p:cTn id="44" dur="1" fill="hold">
+                                        <p:cTn id="24" dur="1" fill="hold">
                                           <p:stCondLst>
                                             <p:cond delay="0"/>
                                           </p:stCondLst>
@@ -8612,9 +10340,9 @@
                                         <p:strVal val="visible"/>
                                       </p:to>
                                     </p:set>
-                                    <p:animEffect transition="in" filter="fade">
-                                      <p:cBhvr>
-                                        <p:cTn id="45" dur="500"/>
+                                    <p:anim calcmode="lin" valueType="num">
+                                      <p:cBhvr additive="base">
+                                        <p:cTn id="25" dur="500" fill="hold"/>
                                         <p:tgtEl>
                                           <p:spTgt spid="3">
                                             <p:txEl>
@@ -8622,11 +10350,26 @@
                                             </p:txEl>
                                           </p:spTgt>
                                         </p:tgtEl>
-                                      </p:cBhvr>
-                                    </p:animEffect>
+                                        <p:attrNameLst>
+                                          <p:attrName>ppt_x</p:attrName>
+                                        </p:attrNameLst>
+                                      </p:cBhvr>
+                                      <p:tavLst>
+                                        <p:tav tm="0">
+                                          <p:val>
+                                            <p:strVal val="#ppt_x"/>
+                                          </p:val>
+                                        </p:tav>
+                                        <p:tav tm="100000">
+                                          <p:val>
+                                            <p:strVal val="#ppt_x"/>
+                                          </p:val>
+                                        </p:tav>
+                                      </p:tavLst>
+                                    </p:anim>
                                     <p:anim calcmode="lin" valueType="num">
-                                      <p:cBhvr>
-                                        <p:cTn id="46" dur="500" fill="hold"/>
+                                      <p:cBhvr additive="base">
+                                        <p:cTn id="26" dur="500" fill="hold"/>
                                         <p:tgtEl>
                                           <p:spTgt spid="3">
                                             <p:txEl>
@@ -8635,153 +10378,22 @@
                                           </p:spTgt>
                                         </p:tgtEl>
                                         <p:attrNameLst>
-                                          <p:attrName>ppt_x</p:attrName>
+                                          <p:attrName>ppt_y</p:attrName>
                                         </p:attrNameLst>
                                       </p:cBhvr>
                                       <p:tavLst>
                                         <p:tav tm="0">
                                           <p:val>
-                                            <p:strVal val="#ppt_x"/>
+                                            <p:strVal val="1+#ppt_h/2"/>
                                           </p:val>
                                         </p:tav>
                                         <p:tav tm="100000">
                                           <p:val>
-                                            <p:strVal val="#ppt_x"/>
+                                            <p:strVal val="#ppt_y"/>
                                           </p:val>
                                         </p:tav>
                                       </p:tavLst>
                                     </p:anim>
-                                    <p:anim calcmode="lin" valueType="num">
-                                      <p:cBhvr>
-                                        <p:cTn id="47" dur="450" decel="100000" fill="hold"/>
-                                        <p:tgtEl>
-                                          <p:spTgt spid="3">
-                                            <p:txEl>
-                                              <p:pRg st="9" end="9"/>
-                                            </p:txEl>
-                                          </p:spTgt>
-                                        </p:tgtEl>
-                                        <p:attrNameLst>
-                                          <p:attrName>ppt_y</p:attrName>
-                                        </p:attrNameLst>
-                                      </p:cBhvr>
-                                      <p:tavLst>
-                                        <p:tav tm="0">
-                                          <p:val>
-                                            <p:strVal val="#ppt_y+1"/>
-                                          </p:val>
-                                        </p:tav>
-                                        <p:tav tm="100000">
-                                          <p:val>
-                                            <p:strVal val="#ppt_y-.03"/>
-                                          </p:val>
-                                        </p:tav>
-                                      </p:tavLst>
-                                    </p:anim>
-                                    <p:anim calcmode="lin" valueType="num">
-                                      <p:cBhvr>
-                                        <p:cTn id="48" dur="50" accel="100000" fill="hold">
-                                          <p:stCondLst>
-                                            <p:cond delay="450"/>
-                                          </p:stCondLst>
-                                        </p:cTn>
-                                        <p:tgtEl>
-                                          <p:spTgt spid="3">
-                                            <p:txEl>
-                                              <p:pRg st="9" end="9"/>
-                                            </p:txEl>
-                                          </p:spTgt>
-                                        </p:tgtEl>
-                                        <p:attrNameLst>
-                                          <p:attrName>ppt_y</p:attrName>
-                                        </p:attrNameLst>
-                                      </p:cBhvr>
-                                      <p:tavLst>
-                                        <p:tav tm="0">
-                                          <p:val>
-                                            <p:strVal val="#ppt_y-.03"/>
-                                          </p:val>
-                                        </p:tav>
-                                        <p:tav tm="100000">
-                                          <p:val>
-                                            <p:strVal val="#ppt_y"/>
-                                          </p:val>
-                                        </p:tav>
-                                      </p:tavLst>
-                                    </p:anim>
-                                  </p:childTnLst>
-                                </p:cTn>
-                              </p:par>
-                              <p:par>
-                                <p:cTn id="49" presetID="2" presetClass="exit" presetSubtype="4" fill="hold" nodeType="withEffect">
-                                  <p:stCondLst>
-                                    <p:cond delay="0"/>
-                                  </p:stCondLst>
-                                  <p:childTnLst>
-                                    <p:anim calcmode="lin" valueType="num">
-                                      <p:cBhvr additive="base">
-                                        <p:cTn id="50" dur="500"/>
-                                        <p:tgtEl>
-                                          <p:spTgt spid="7"/>
-                                        </p:tgtEl>
-                                        <p:attrNameLst>
-                                          <p:attrName>ppt_x</p:attrName>
-                                        </p:attrNameLst>
-                                      </p:cBhvr>
-                                      <p:tavLst>
-                                        <p:tav tm="0">
-                                          <p:val>
-                                            <p:strVal val="ppt_x"/>
-                                          </p:val>
-                                        </p:tav>
-                                        <p:tav tm="100000">
-                                          <p:val>
-                                            <p:strVal val="ppt_x"/>
-                                          </p:val>
-                                        </p:tav>
-                                      </p:tavLst>
-                                    </p:anim>
-                                    <p:anim calcmode="lin" valueType="num">
-                                      <p:cBhvr additive="base">
-                                        <p:cTn id="51" dur="500"/>
-                                        <p:tgtEl>
-                                          <p:spTgt spid="7"/>
-                                        </p:tgtEl>
-                                        <p:attrNameLst>
-                                          <p:attrName>ppt_y</p:attrName>
-                                        </p:attrNameLst>
-                                      </p:cBhvr>
-                                      <p:tavLst>
-                                        <p:tav tm="0">
-                                          <p:val>
-                                            <p:strVal val="ppt_y"/>
-                                          </p:val>
-                                        </p:tav>
-                                        <p:tav tm="100000">
-                                          <p:val>
-                                            <p:strVal val="1+ppt_h/2"/>
-                                          </p:val>
-                                        </p:tav>
-                                      </p:tavLst>
-                                    </p:anim>
-                                    <p:set>
-                                      <p:cBhvr>
-                                        <p:cTn id="52" dur="1" fill="hold">
-                                          <p:stCondLst>
-                                            <p:cond delay="499"/>
-                                          </p:stCondLst>
-                                        </p:cTn>
-                                        <p:tgtEl>
-                                          <p:spTgt spid="7"/>
-                                        </p:tgtEl>
-                                        <p:attrNameLst>
-                                          <p:attrName>style.visibility</p:attrName>
-                                        </p:attrNameLst>
-                                      </p:cBhvr>
-                                      <p:to>
-                                        <p:strVal val="hidden"/>
-                                      </p:to>
-                                    </p:set>
                                   </p:childTnLst>
                                 </p:cTn>
                               </p:par>
@@ -8812,9 +10424,6 @@
         </p:cTn>
       </p:par>
     </p:tnLst>
-    <p:bldLst>
-      <p:bldP spid="3" grpId="0" uiExpand="1" build="p"/>
-    </p:bldLst>
   </p:timing>
 </p:sld>
 </file>
@@ -8954,8 +10563,30 @@
           <a:p>
             <a:r>
               <a:rPr lang="fr-FR" dirty="0" smtClean="0"/>
-              <a:t>Les graphismes se veulent réalistes, en accord avec la conception générale de ces entités microscopiques.</a:t>
-            </a:r>
+              <a:t>Les graphismes se veulent réalistes, en accord avec la conception générale de ces entités microscopiques</a:t>
+            </a:r>
+            <a:r>
+              <a:rPr lang="fr-FR" dirty="0" smtClean="0"/>
+              <a:t>.</a:t>
+            </a:r>
+          </a:p>
+          <a:p>
+            <a:endParaRPr lang="fr-FR" dirty="0" smtClean="0"/>
+          </a:p>
+          <a:p>
+            <a:endParaRPr lang="fr-FR" dirty="0" smtClean="0"/>
+          </a:p>
+          <a:p>
+            <a:endParaRPr lang="fr-FR" dirty="0" smtClean="0"/>
+          </a:p>
+          <a:p>
+            <a:endParaRPr lang="fr-FR" dirty="0" smtClean="0"/>
+          </a:p>
+          <a:p>
+            <a:endParaRPr lang="fr-FR" dirty="0" smtClean="0"/>
+          </a:p>
+          <a:p>
+            <a:endParaRPr lang="fr-FR" dirty="0" smtClean="0"/>
           </a:p>
           <a:p>
             <a:endParaRPr lang="fr-FR" dirty="0" smtClean="0"/>
@@ -8981,7 +10612,7 @@
         </p:blipFill>
         <p:spPr>
           <a:xfrm>
-            <a:off x="1643042" y="3143248"/>
+            <a:off x="571472" y="3143248"/>
             <a:ext cx="2428892" cy="1290349"/>
           </a:xfrm>
           <a:prstGeom prst="rect">
@@ -9005,8 +10636,32 @@
         </p:blipFill>
         <p:spPr>
           <a:xfrm>
-            <a:off x="5214942" y="3143248"/>
-            <a:ext cx="2524369" cy="1285884"/>
+            <a:off x="571473" y="4429132"/>
+            <a:ext cx="2428892" cy="1285884"/>
+          </a:xfrm>
+          <a:prstGeom prst="rect">
+            <a:avLst/>
+          </a:prstGeom>
+        </p:spPr>
+      </p:pic>
+      <p:pic>
+        <p:nvPicPr>
+          <p:cNvPr id="9" name="Picture 8" descr="mockup_legend.png"/>
+          <p:cNvPicPr>
+            <a:picLocks noChangeAspect="1"/>
+          </p:cNvPicPr>
+          <p:nvPr/>
+        </p:nvPicPr>
+        <p:blipFill>
+          <a:blip r:embed="rId4"/>
+          <a:stretch>
+            <a:fillRect/>
+          </a:stretch>
+        </p:blipFill>
+        <p:spPr>
+          <a:xfrm>
+            <a:off x="3643306" y="2857496"/>
+            <a:ext cx="4876397" cy="3657298"/>
           </a:xfrm>
           <a:prstGeom prst="rect">
             <a:avLst/>

</xml_diff>